<commit_message>
re-wrote notebooks into scripts
</commit_message>
<xml_diff>
--- a/doc/Project_structure_notes.pptx
+++ b/doc/Project_structure_notes.pptx
@@ -24,13 +24,13 @@
     <p:sldId id="281" r:id="rId15"/>
     <p:sldId id="282" r:id="rId16"/>
     <p:sldId id="283" r:id="rId17"/>
-    <p:sldId id="290" r:id="rId18"/>
-    <p:sldId id="286" r:id="rId19"/>
-    <p:sldId id="288" r:id="rId20"/>
-    <p:sldId id="289" r:id="rId21"/>
-    <p:sldId id="277" r:id="rId22"/>
-    <p:sldId id="279" r:id="rId23"/>
-    <p:sldId id="278" r:id="rId24"/>
+    <p:sldId id="286" r:id="rId18"/>
+    <p:sldId id="288" r:id="rId19"/>
+    <p:sldId id="289" r:id="rId20"/>
+    <p:sldId id="277" r:id="rId21"/>
+    <p:sldId id="279" r:id="rId22"/>
+    <p:sldId id="278" r:id="rId23"/>
+    <p:sldId id="290" r:id="rId24"/>
     <p:sldId id="269" r:id="rId25"/>
     <p:sldId id="263" r:id="rId26"/>
     <p:sldId id="258" r:id="rId27"/>
@@ -169,7 +169,6 @@
             <p14:sldId id="281"/>
             <p14:sldId id="282"/>
             <p14:sldId id="283"/>
-            <p14:sldId id="290"/>
             <p14:sldId id="286"/>
             <p14:sldId id="288"/>
             <p14:sldId id="289"/>
@@ -180,6 +179,7 @@
             <p14:sldId id="277"/>
             <p14:sldId id="279"/>
             <p14:sldId id="278"/>
+            <p14:sldId id="290"/>
             <p14:sldId id="269"/>
             <p14:sldId id="263"/>
             <p14:sldId id="258"/>
@@ -7182,7 +7182,7 @@
           <a:p>
             <a:fld id="{0D3712C0-BD94-4EDD-81B8-404EF18DF498}" type="datetimeFigureOut">
               <a:rPr lang="en-US" smtClean="0"/>
-              <a:t>4/14/2022</a:t>
+              <a:t>4/16/2022</a:t>
             </a:fld>
             <a:endParaRPr lang="en-US"/>
           </a:p>
@@ -7637,7 +7637,7 @@
           <a:p>
             <a:fld id="{843A20DD-8926-4B91-8D72-D1DC7F5C31EF}" type="datetime1">
               <a:rPr lang="en-US" smtClean="0"/>
-              <a:t>4/14/2022</a:t>
+              <a:t>4/16/2022</a:t>
             </a:fld>
             <a:endParaRPr lang="en-US" dirty="0"/>
           </a:p>
@@ -7980,7 +7980,7 @@
           <a:p>
             <a:fld id="{D2DD2B10-BCB9-40E5-8141-F17001376370}" type="datetime1">
               <a:rPr lang="en-US" smtClean="0"/>
-              <a:t>4/14/2022</a:t>
+              <a:t>4/16/2022</a:t>
             </a:fld>
             <a:endParaRPr lang="en-US" dirty="0"/>
           </a:p>
@@ -8386,7 +8386,7 @@
           <a:p>
             <a:fld id="{927FFA6D-4E8C-437E-BCA1-3CF73EB8B252}" type="datetime1">
               <a:rPr lang="en-US" smtClean="0"/>
-              <a:t>4/14/2022</a:t>
+              <a:t>4/16/2022</a:t>
             </a:fld>
             <a:endParaRPr lang="en-US" dirty="0"/>
           </a:p>
@@ -8727,7 +8727,7 @@
           <a:p>
             <a:fld id="{A2C7F92B-2A35-4C09-8346-C40AAA997302}" type="datetime1">
               <a:rPr lang="en-US" smtClean="0"/>
-              <a:t>4/14/2022</a:t>
+              <a:t>4/16/2022</a:t>
             </a:fld>
             <a:endParaRPr lang="en-US" dirty="0"/>
           </a:p>
@@ -9053,7 +9053,7 @@
           <a:p>
             <a:fld id="{A2C7F92B-2A35-4C09-8346-C40AAA997302}" type="datetime1">
               <a:rPr lang="en-US" smtClean="0"/>
-              <a:t>4/14/2022</a:t>
+              <a:t>4/16/2022</a:t>
             </a:fld>
             <a:endParaRPr lang="en-US" dirty="0"/>
           </a:p>
@@ -9455,7 +9455,7 @@
           <a:p>
             <a:fld id="{A2C7F92B-2A35-4C09-8346-C40AAA997302}" type="datetime1">
               <a:rPr lang="en-US" smtClean="0"/>
-              <a:t>4/14/2022</a:t>
+              <a:t>4/16/2022</a:t>
             </a:fld>
             <a:endParaRPr lang="en-US" dirty="0"/>
           </a:p>
@@ -9718,7 +9718,7 @@
           <a:p>
             <a:fld id="{8A427DC1-41D9-41ED-AAB7-DF919DFB0B7D}" type="datetime1">
               <a:rPr lang="en-US" smtClean="0"/>
-              <a:t>4/14/2022</a:t>
+              <a:t>4/16/2022</a:t>
             </a:fld>
             <a:endParaRPr lang="en-US" dirty="0"/>
           </a:p>
@@ -9985,7 +9985,7 @@
           <a:p>
             <a:fld id="{49530F64-B6F9-41E5-8499-9B56B7F93996}" type="datetime1">
               <a:rPr lang="en-US" smtClean="0"/>
-              <a:t>4/14/2022</a:t>
+              <a:t>4/16/2022</a:t>
             </a:fld>
             <a:endParaRPr lang="en-US" dirty="0"/>
           </a:p>
@@ -10256,7 +10256,7 @@
             <a:fld id="{36D18B76-5E8B-4456-8722-FC5B14B0F354}" type="datetime1">
               <a:rPr lang="en-US" smtClean="0"/>
               <a:pPr/>
-              <a:t>4/14/2022</a:t>
+              <a:t>4/16/2022</a:t>
             </a:fld>
             <a:endParaRPr lang="en-US" dirty="0"/>
           </a:p>
@@ -10594,7 +10594,7 @@
           <a:p>
             <a:fld id="{3E914A3D-A565-477F-8682-1AE6EFE36557}" type="datetime1">
               <a:rPr lang="en-US" smtClean="0"/>
-              <a:t>4/14/2022</a:t>
+              <a:t>4/16/2022</a:t>
             </a:fld>
             <a:endParaRPr lang="en-US" dirty="0"/>
           </a:p>
@@ -10922,7 +10922,7 @@
           <a:p>
             <a:fld id="{D45A6A21-0914-4A46-BCF1-163E9A00E688}" type="datetime1">
               <a:rPr lang="en-US" smtClean="0"/>
-              <a:t>4/14/2022</a:t>
+              <a:t>4/16/2022</a:t>
             </a:fld>
             <a:endParaRPr lang="en-US" dirty="0"/>
           </a:p>
@@ -11384,7 +11384,7 @@
           <a:p>
             <a:fld id="{6BDD7FCB-B1A7-4982-8C8B-674E644B14B0}" type="datetime1">
               <a:rPr lang="en-US" smtClean="0"/>
-              <a:t>4/14/2022</a:t>
+              <a:t>4/16/2022</a:t>
             </a:fld>
             <a:endParaRPr lang="en-US" dirty="0"/>
           </a:p>
@@ -11604,7 +11604,7 @@
             <a:fld id="{4C731089-17FC-4C04-87B1-2157F67F0117}" type="datetime1">
               <a:rPr lang="en-US" smtClean="0"/>
               <a:pPr/>
-              <a:t>4/14/2022</a:t>
+              <a:t>4/16/2022</a:t>
             </a:fld>
             <a:endParaRPr lang="en-US" dirty="0"/>
           </a:p>
@@ -11790,7 +11790,7 @@
           <a:p>
             <a:fld id="{1278D66F-D6E5-4434-B311-7DA25CA81F5A}" type="datetime1">
               <a:rPr lang="en-US" smtClean="0"/>
-              <a:t>4/14/2022</a:t>
+              <a:t>4/16/2022</a:t>
             </a:fld>
             <a:endParaRPr lang="en-US" dirty="0"/>
           </a:p>
@@ -12128,7 +12128,7 @@
           <a:p>
             <a:fld id="{2253374B-0B0C-42C0-A0DF-1550CE3AA116}" type="datetime1">
               <a:rPr lang="en-US" smtClean="0"/>
-              <a:t>4/14/2022</a:t>
+              <a:t>4/16/2022</a:t>
             </a:fld>
             <a:endParaRPr lang="en-US" dirty="0"/>
           </a:p>
@@ -12478,7 +12478,7 @@
           <a:p>
             <a:fld id="{F589A7BC-DDDD-4FB0-A8E7-5046A2EF84B8}" type="datetime1">
               <a:rPr lang="en-US" smtClean="0"/>
-              <a:t>4/14/2022</a:t>
+              <a:t>4/16/2022</a:t>
             </a:fld>
             <a:endParaRPr lang="en-US" dirty="0"/>
           </a:p>
@@ -14600,7 +14600,7 @@
           <a:p>
             <a:fld id="{A2C7F92B-2A35-4C09-8346-C40AAA997302}" type="datetime1">
               <a:rPr lang="en-US" smtClean="0"/>
-              <a:t>4/14/2022</a:t>
+              <a:t>4/16/2022</a:t>
             </a:fld>
             <a:endParaRPr lang="en-US" dirty="0"/>
           </a:p>
@@ -15218,7 +15218,7 @@
           <a:p>
             <a:fld id="{EFFFF5E6-438B-4B86-AF1B-DB82D6C33C1C}" type="datetime1">
               <a:rPr lang="en-US" smtClean="0"/>
-              <a:t>4/14/2022</a:t>
+              <a:t>4/16/2022</a:t>
             </a:fld>
             <a:endParaRPr lang="en-US" dirty="0"/>
           </a:p>
@@ -15588,7 +15588,7 @@
             <a:fld id="{36D18B76-5E8B-4456-8722-FC5B14B0F354}" type="datetime1">
               <a:rPr lang="en-US" smtClean="0"/>
               <a:pPr/>
-              <a:t>4/14/2022</a:t>
+              <a:t>4/16/2022</a:t>
             </a:fld>
             <a:endParaRPr lang="en-US" dirty="0"/>
           </a:p>
@@ -16716,7 +16716,7 @@
             <a:fld id="{36D18B76-5E8B-4456-8722-FC5B14B0F354}" type="datetime1">
               <a:rPr lang="en-US" smtClean="0"/>
               <a:pPr/>
-              <a:t>4/14/2022</a:t>
+              <a:t>4/16/2022</a:t>
             </a:fld>
             <a:endParaRPr lang="en-US" dirty="0"/>
           </a:p>
@@ -17688,6 +17688,41 @@
           </a:p>
         </p:txBody>
       </p:sp>
+      <p:sp>
+        <p:nvSpPr>
+          <p:cNvPr id="11" name="TextBox 10">
+            <a:extLst>
+              <a:ext uri="{FF2B5EF4-FFF2-40B4-BE49-F238E27FC236}">
+                <a16:creationId xmlns:a16="http://schemas.microsoft.com/office/drawing/2014/main" id="{B3241AAD-CD24-4BF2-BBA3-F2E82C622DDA}"/>
+              </a:ext>
+            </a:extLst>
+          </p:cNvPr>
+          <p:cNvSpPr txBox="1"/>
+          <p:nvPr/>
+        </p:nvSpPr>
+        <p:spPr>
+          <a:xfrm>
+            <a:off x="712381" y="1323487"/>
+            <a:ext cx="2509284" cy="646331"/>
+          </a:xfrm>
+          <a:prstGeom prst="rect">
+            <a:avLst/>
+          </a:prstGeom>
+          <a:noFill/>
+        </p:spPr>
+        <p:txBody>
+          <a:bodyPr wrap="square" rtlCol="0">
+            <a:spAutoFit/>
+          </a:bodyPr>
+          <a:lstStyle/>
+          <a:p>
+            <a:r>
+              <a:rPr lang="de-DE" dirty="0"/>
+              <a:t>Repeated CV, not nested CV!</a:t>
+            </a:r>
+          </a:p>
+        </p:txBody>
+      </p:sp>
     </p:spTree>
     <p:extLst>
       <p:ext uri="{BB962C8B-B14F-4D97-AF65-F5344CB8AC3E}">
@@ -17828,7 +17863,7 @@
         </p:blipFill>
         <p:spPr>
           <a:xfrm>
-            <a:off x="4575360" y="127474"/>
+            <a:off x="4522198" y="36342"/>
             <a:ext cx="7435702" cy="6373459"/>
           </a:xfrm>
           <a:prstGeom prst="rect">
@@ -17882,6 +17917,41 @@
           </a:p>
           <a:p>
             <a:endParaRPr lang="de-DE" i="1" dirty="0"/>
+          </a:p>
+        </p:txBody>
+      </p:sp>
+      <p:sp>
+        <p:nvSpPr>
+          <p:cNvPr id="7" name="TextBox 6">
+            <a:extLst>
+              <a:ext uri="{FF2B5EF4-FFF2-40B4-BE49-F238E27FC236}">
+                <a16:creationId xmlns:a16="http://schemas.microsoft.com/office/drawing/2014/main" id="{9CB0C28A-D293-400C-888A-1E5E50278208}"/>
+              </a:ext>
+            </a:extLst>
+          </p:cNvPr>
+          <p:cNvSpPr txBox="1"/>
+          <p:nvPr/>
+        </p:nvSpPr>
+        <p:spPr>
+          <a:xfrm>
+            <a:off x="1640156" y="2445731"/>
+            <a:ext cx="2229293" cy="923330"/>
+          </a:xfrm>
+          <a:prstGeom prst="rect">
+            <a:avLst/>
+          </a:prstGeom>
+          <a:noFill/>
+        </p:spPr>
+        <p:txBody>
+          <a:bodyPr wrap="square" rtlCol="0">
+            <a:spAutoFit/>
+          </a:bodyPr>
+          <a:lstStyle/>
+          <a:p>
+            <a:r>
+              <a:rPr lang="de-DE" b="1" i="1" dirty="0"/>
+              <a:t>Different training/test set every iteration</a:t>
+            </a:r>
           </a:p>
         </p:txBody>
       </p:sp>
@@ -18082,6 +18152,41 @@
           </a:ln>
         </p:spPr>
       </p:pic>
+      <p:sp>
+        <p:nvSpPr>
+          <p:cNvPr id="7" name="TextBox 6">
+            <a:extLst>
+              <a:ext uri="{FF2B5EF4-FFF2-40B4-BE49-F238E27FC236}">
+                <a16:creationId xmlns:a16="http://schemas.microsoft.com/office/drawing/2014/main" id="{3C27F803-3AA8-4F69-AF3B-7E5614CA4C9C}"/>
+              </a:ext>
+            </a:extLst>
+          </p:cNvPr>
+          <p:cNvSpPr txBox="1"/>
+          <p:nvPr/>
+        </p:nvSpPr>
+        <p:spPr>
+          <a:xfrm>
+            <a:off x="1640156" y="2445731"/>
+            <a:ext cx="2229293" cy="923330"/>
+          </a:xfrm>
+          <a:prstGeom prst="rect">
+            <a:avLst/>
+          </a:prstGeom>
+          <a:noFill/>
+        </p:spPr>
+        <p:txBody>
+          <a:bodyPr wrap="square" rtlCol="0">
+            <a:spAutoFit/>
+          </a:bodyPr>
+          <a:lstStyle/>
+          <a:p>
+            <a:r>
+              <a:rPr lang="de-DE" b="1" i="1" dirty="0"/>
+              <a:t>Different training/test set every iteration</a:t>
+            </a:r>
+          </a:p>
+        </p:txBody>
+      </p:sp>
     </p:spTree>
     <p:extLst>
       <p:ext uri="{BB962C8B-B14F-4D97-AF65-F5344CB8AC3E}">
@@ -18633,6 +18738,41 @@
           </a:p>
         </p:txBody>
       </p:sp>
+      <p:sp>
+        <p:nvSpPr>
+          <p:cNvPr id="13" name="TextBox 12">
+            <a:extLst>
+              <a:ext uri="{FF2B5EF4-FFF2-40B4-BE49-F238E27FC236}">
+                <a16:creationId xmlns:a16="http://schemas.microsoft.com/office/drawing/2014/main" id="{F8634985-91FC-4261-88FA-9BFB2B58DA18}"/>
+              </a:ext>
+            </a:extLst>
+          </p:cNvPr>
+          <p:cNvSpPr txBox="1"/>
+          <p:nvPr/>
+        </p:nvSpPr>
+        <p:spPr>
+          <a:xfrm>
+            <a:off x="4874769" y="357067"/>
+            <a:ext cx="2229293" cy="923330"/>
+          </a:xfrm>
+          <a:prstGeom prst="rect">
+            <a:avLst/>
+          </a:prstGeom>
+          <a:noFill/>
+        </p:spPr>
+        <p:txBody>
+          <a:bodyPr wrap="square" rtlCol="0">
+            <a:spAutoFit/>
+          </a:bodyPr>
+          <a:lstStyle/>
+          <a:p>
+            <a:r>
+              <a:rPr lang="de-DE" b="1" i="1" dirty="0"/>
+              <a:t>Different training/test set every iteration</a:t>
+            </a:r>
+          </a:p>
+        </p:txBody>
+      </p:sp>
     </p:spTree>
     <p:extLst>
       <p:ext uri="{BB962C8B-B14F-4D97-AF65-F5344CB8AC3E}">
@@ -18688,9 +18828,38 @@
           <a:p>
             <a:r>
               <a:rPr lang="de-DE" sz="3200" b="1" dirty="0"/>
-              <a:t>mikropml</a:t>
+              <a:t>PCOS classification and same initial split</a:t>
             </a:r>
             <a:endParaRPr lang="en-US" sz="3200" b="1" dirty="0"/>
+          </a:p>
+        </p:txBody>
+      </p:sp>
+      <p:sp>
+        <p:nvSpPr>
+          <p:cNvPr id="5" name="Footer Placeholder 4">
+            <a:extLst>
+              <a:ext uri="{FF2B5EF4-FFF2-40B4-BE49-F238E27FC236}">
+                <a16:creationId xmlns:a16="http://schemas.microsoft.com/office/drawing/2014/main" id="{707C4F70-832A-416B-9491-EE86347B2812}"/>
+              </a:ext>
+            </a:extLst>
+          </p:cNvPr>
+          <p:cNvSpPr>
+            <a:spLocks noGrp="1"/>
+          </p:cNvSpPr>
+          <p:nvPr>
+            <p:ph type="ftr" sz="quarter" idx="11"/>
+          </p:nvPr>
+        </p:nvSpPr>
+        <p:spPr/>
+        <p:txBody>
+          <a:bodyPr/>
+          <a:lstStyle/>
+          <a:p>
+            <a:r>
+              <a:rPr lang="en-US"/>
+              <a:t>jennifer.neumaier@t-online.de</a:t>
+            </a:r>
+            <a:endParaRPr lang="en-US" dirty="0"/>
           </a:p>
         </p:txBody>
       </p:sp>
@@ -18719,311 +18888,6 @@
               <a:rPr lang="en-US" smtClean="0"/>
               <a:pPr/>
               <a:t>17</a:t>
-            </a:fld>
-            <a:endParaRPr lang="en-US" dirty="0"/>
-          </a:p>
-        </p:txBody>
-      </p:sp>
-      <p:sp>
-        <p:nvSpPr>
-          <p:cNvPr id="8" name="TextBox 7">
-            <a:extLst>
-              <a:ext uri="{FF2B5EF4-FFF2-40B4-BE49-F238E27FC236}">
-                <a16:creationId xmlns:a16="http://schemas.microsoft.com/office/drawing/2014/main" id="{C9FAD4F5-81D5-4890-8BB5-F06C93EDD254}"/>
-              </a:ext>
-            </a:extLst>
-          </p:cNvPr>
-          <p:cNvSpPr txBox="1"/>
-          <p:nvPr/>
-        </p:nvSpPr>
-        <p:spPr>
-          <a:xfrm>
-            <a:off x="1392866" y="1268569"/>
-            <a:ext cx="8753253" cy="5509200"/>
-          </a:xfrm>
-          <a:prstGeom prst="rect">
-            <a:avLst/>
-          </a:prstGeom>
-          <a:noFill/>
-        </p:spPr>
-        <p:txBody>
-          <a:bodyPr wrap="square">
-            <a:spAutoFit/>
-          </a:bodyPr>
-          <a:lstStyle/>
-          <a:p>
-            <a:r>
-              <a:rPr lang="de-DE" sz="1100" dirty="0"/>
-              <a:t>Testing out mikropml as it already has a function run_ml() that incorporates nested cross-validation for several standard supervised machine learning models:</a:t>
-            </a:r>
-          </a:p>
-          <a:p>
-            <a:endParaRPr lang="de-DE" sz="1100" dirty="0"/>
-          </a:p>
-          <a:p>
-            <a:r>
-              <a:rPr lang="de-DE" sz="1100" dirty="0"/>
-              <a:t>    Logistic/multiclass/linear regression ("glmnet")</a:t>
-            </a:r>
-          </a:p>
-          <a:p>
-            <a:r>
-              <a:rPr lang="de-DE" sz="1100" dirty="0"/>
-              <a:t>    Random forest ("rf")</a:t>
-            </a:r>
-          </a:p>
-          <a:p>
-            <a:r>
-              <a:rPr lang="de-DE" sz="1100" dirty="0"/>
-              <a:t>    Decision tree ("rpart2")</a:t>
-            </a:r>
-          </a:p>
-          <a:p>
-            <a:r>
-              <a:rPr lang="de-DE" sz="1100" dirty="0"/>
-              <a:t>    Support vector machine with a radial basis kernel ("svmRadial")</a:t>
-            </a:r>
-          </a:p>
-          <a:p>
-            <a:r>
-              <a:rPr lang="de-DE" sz="1100" dirty="0"/>
-              <a:t>    xgboost ("xgbTree")</a:t>
-            </a:r>
-          </a:p>
-          <a:p>
-            <a:endParaRPr lang="de-DE" sz="1100" dirty="0"/>
-          </a:p>
-          <a:p>
-            <a:r>
-              <a:rPr lang="de-DE" sz="1100" dirty="0"/>
-              <a:t>Test it here for linear regression and xgboost.</a:t>
-            </a:r>
-          </a:p>
-          <a:p>
-            <a:r>
-              <a:rPr lang="de-DE" sz="1100" dirty="0"/>
-              <a:t>Function run_ml has several parameters:</a:t>
-            </a:r>
-          </a:p>
-          <a:p>
-            <a:r>
-              <a:rPr lang="de-DE" sz="1100" dirty="0"/>
-              <a:t>           dataset,</a:t>
-            </a:r>
-          </a:p>
-          <a:p>
-            <a:r>
-              <a:rPr lang="de-DE" sz="1100" dirty="0"/>
-              <a:t>           method,</a:t>
-            </a:r>
-          </a:p>
-          <a:p>
-            <a:r>
-              <a:rPr lang="de-DE" sz="1100" dirty="0"/>
-              <a:t>           outcome_colname = NULL, (standardized the first column)</a:t>
-            </a:r>
-          </a:p>
-          <a:p>
-            <a:r>
-              <a:rPr lang="de-DE" sz="1100" dirty="0"/>
-              <a:t>           hyperparameters = NULL,</a:t>
-            </a:r>
-          </a:p>
-          <a:p>
-            <a:r>
-              <a:rPr lang="de-DE" sz="1100" dirty="0"/>
-              <a:t>           find_feature_importance = FALSE, (`TRUE` is recommended if you would like to identify features important for predicting your                                                outcome, but it is resource-intensive.</a:t>
-            </a:r>
-          </a:p>
-          <a:p>
-            <a:r>
-              <a:rPr lang="de-DE" sz="1100" dirty="0"/>
-              <a:t>           calculate_performance = TRUE,</a:t>
-            </a:r>
-          </a:p>
-          <a:p>
-            <a:r>
-              <a:rPr lang="de-DE" sz="1100" dirty="0"/>
-              <a:t>           kfold = 5, (standard at 5)</a:t>
-            </a:r>
-          </a:p>
-          <a:p>
-            <a:r>
-              <a:rPr lang="de-DE" sz="1100" dirty="0"/>
-              <a:t>           cv_times = 100, (standard at 100)</a:t>
-            </a:r>
-          </a:p>
-          <a:p>
-            <a:r>
-              <a:rPr lang="de-DE" sz="1100" dirty="0"/>
-              <a:t>           cross_val = NULL, (cross_val a custom cross-validation scheme from `caret::trainControl()` (default: `NULL`, uses `kfold` cross                              validation repeated `cv_times`). `kfold` and `cv_times` are ignored if the user provides a custom                                          cross-validation scheme.)</a:t>
-            </a:r>
-          </a:p>
-          <a:p>
-            <a:r>
-              <a:rPr lang="de-DE" sz="1100" dirty="0"/>
-              <a:t>           training_frac = 0.8, (standard at 0.8)</a:t>
-            </a:r>
-          </a:p>
-          <a:p>
-            <a:r>
-              <a:rPr lang="de-DE" sz="1100" dirty="0"/>
-              <a:t>           perf_metric_function = NULL,</a:t>
-            </a:r>
-          </a:p>
-          <a:p>
-            <a:r>
-              <a:rPr lang="de-DE" sz="1100" dirty="0"/>
-              <a:t>           perf_metric_name = NULL,</a:t>
-            </a:r>
-          </a:p>
-          <a:p>
-            <a:r>
-              <a:rPr lang="de-DE" sz="1100" dirty="0"/>
-              <a:t>           groups = NULL,</a:t>
-            </a:r>
-          </a:p>
-          <a:p>
-            <a:r>
-              <a:rPr lang="de-DE" sz="1100" dirty="0"/>
-              <a:t>           group_partitions = NULL,</a:t>
-            </a:r>
-          </a:p>
-          <a:p>
-            <a:r>
-              <a:rPr lang="de-DE" sz="1100" dirty="0"/>
-              <a:t>           corr_thresh = 1,</a:t>
-            </a:r>
-          </a:p>
-          <a:p>
-            <a:r>
-              <a:rPr lang="de-DE" sz="1100" dirty="0"/>
-              <a:t>           ntree = 1000, (For random forest, how many trees to use (default: `1000`). Caret doesn't allow this hyperparameter to be tuned)</a:t>
-            </a:r>
-          </a:p>
-          <a:p>
-            <a:r>
-              <a:rPr lang="de-DE" sz="1100" dirty="0"/>
-              <a:t>           seed = NA (set seed for reproducibility)</a:t>
-            </a:r>
-          </a:p>
-        </p:txBody>
-      </p:sp>
-    </p:spTree>
-    <p:extLst>
-      <p:ext uri="{BB962C8B-B14F-4D97-AF65-F5344CB8AC3E}">
-        <p14:creationId xmlns:p14="http://schemas.microsoft.com/office/powerpoint/2010/main" val="3541464901"/>
-      </p:ext>
-    </p:extLst>
-  </p:cSld>
-  <p:clrMapOvr>
-    <a:masterClrMapping/>
-  </p:clrMapOvr>
-</p:sld>
-</file>
-
-<file path=ppt/slides/slide18.xml><?xml version="1.0" encoding="utf-8"?>
-<p:sld xmlns:a="http://schemas.openxmlformats.org/drawingml/2006/main" xmlns:r="http://schemas.openxmlformats.org/officeDocument/2006/relationships" xmlns:p="http://schemas.openxmlformats.org/presentationml/2006/main">
-  <p:cSld>
-    <p:spTree>
-      <p:nvGrpSpPr>
-        <p:cNvPr id="1" name=""/>
-        <p:cNvGrpSpPr/>
-        <p:nvPr/>
-      </p:nvGrpSpPr>
-      <p:grpSpPr>
-        <a:xfrm>
-          <a:off x="0" y="0"/>
-          <a:ext cx="0" cy="0"/>
-          <a:chOff x="0" y="0"/>
-          <a:chExt cx="0" cy="0"/>
-        </a:xfrm>
-      </p:grpSpPr>
-      <p:sp>
-        <p:nvSpPr>
-          <p:cNvPr id="2" name="Title 1">
-            <a:extLst>
-              <a:ext uri="{FF2B5EF4-FFF2-40B4-BE49-F238E27FC236}">
-                <a16:creationId xmlns:a16="http://schemas.microsoft.com/office/drawing/2014/main" id="{6806FBA4-537C-4226-9D3A-758C7B787D79}"/>
-              </a:ext>
-            </a:extLst>
-          </p:cNvPr>
-          <p:cNvSpPr>
-            <a:spLocks noGrp="1"/>
-          </p:cNvSpPr>
-          <p:nvPr>
-            <p:ph type="title"/>
-          </p:nvPr>
-        </p:nvSpPr>
-        <p:spPr/>
-        <p:txBody>
-          <a:bodyPr>
-            <a:normAutofit/>
-          </a:bodyPr>
-          <a:lstStyle/>
-          <a:p>
-            <a:r>
-              <a:rPr lang="de-DE" sz="3200" b="1" dirty="0"/>
-              <a:t>PCOS classification and same initial split</a:t>
-            </a:r>
-            <a:endParaRPr lang="en-US" sz="3200" b="1" dirty="0"/>
-          </a:p>
-        </p:txBody>
-      </p:sp>
-      <p:sp>
-        <p:nvSpPr>
-          <p:cNvPr id="5" name="Footer Placeholder 4">
-            <a:extLst>
-              <a:ext uri="{FF2B5EF4-FFF2-40B4-BE49-F238E27FC236}">
-                <a16:creationId xmlns:a16="http://schemas.microsoft.com/office/drawing/2014/main" id="{707C4F70-832A-416B-9491-EE86347B2812}"/>
-              </a:ext>
-            </a:extLst>
-          </p:cNvPr>
-          <p:cNvSpPr>
-            <a:spLocks noGrp="1"/>
-          </p:cNvSpPr>
-          <p:nvPr>
-            <p:ph type="ftr" sz="quarter" idx="11"/>
-          </p:nvPr>
-        </p:nvSpPr>
-        <p:spPr/>
-        <p:txBody>
-          <a:bodyPr/>
-          <a:lstStyle/>
-          <a:p>
-            <a:r>
-              <a:rPr lang="en-US"/>
-              <a:t>jennifer.neumaier@t-online.de</a:t>
-            </a:r>
-            <a:endParaRPr lang="en-US" dirty="0"/>
-          </a:p>
-        </p:txBody>
-      </p:sp>
-      <p:sp>
-        <p:nvSpPr>
-          <p:cNvPr id="6" name="Slide Number Placeholder 5">
-            <a:extLst>
-              <a:ext uri="{FF2B5EF4-FFF2-40B4-BE49-F238E27FC236}">
-                <a16:creationId xmlns:a16="http://schemas.microsoft.com/office/drawing/2014/main" id="{1028CB34-29B5-49CB-99E4-E945C3D78896}"/>
-              </a:ext>
-            </a:extLst>
-          </p:cNvPr>
-          <p:cNvSpPr>
-            <a:spLocks noGrp="1"/>
-          </p:cNvSpPr>
-          <p:nvPr>
-            <p:ph type="sldNum" sz="quarter" idx="12"/>
-          </p:nvPr>
-        </p:nvSpPr>
-        <p:spPr/>
-        <p:txBody>
-          <a:bodyPr/>
-          <a:lstStyle/>
-          <a:p>
-            <a:fld id="{D57F1E4F-1CFF-5643-939E-217C01CDF565}" type="slidenum">
-              <a:rPr lang="en-US" smtClean="0"/>
-              <a:pPr/>
-              <a:t>18</a:t>
             </a:fld>
             <a:endParaRPr lang="en-US" dirty="0"/>
           </a:p>
@@ -19113,7 +18977,7 @@
         </p:nvSpPr>
         <p:spPr>
           <a:xfrm rot="365251">
-            <a:off x="8610369" y="326117"/>
+            <a:off x="9472069" y="326117"/>
             <a:ext cx="3710763" cy="923330"/>
           </a:xfrm>
           <a:prstGeom prst="rect">
@@ -19159,7 +19023,7 @@
 </p:sld>
 </file>
 
-<file path=ppt/slides/slide19.xml><?xml version="1.0" encoding="utf-8"?>
+<file path=ppt/slides/slide18.xml><?xml version="1.0" encoding="utf-8"?>
 <p:sld xmlns:a="http://schemas.openxmlformats.org/drawingml/2006/main" xmlns:r="http://schemas.openxmlformats.org/officeDocument/2006/relationships" xmlns:p="http://schemas.openxmlformats.org/presentationml/2006/main">
   <p:cSld>
     <p:spTree>
@@ -19260,7 +19124,7 @@
             <a:fld id="{D57F1E4F-1CFF-5643-939E-217C01CDF565}" type="slidenum">
               <a:rPr lang="en-US" smtClean="0"/>
               <a:pPr/>
-              <a:t>19</a:t>
+              <a:t>18</a:t>
             </a:fld>
             <a:endParaRPr lang="en-US" dirty="0"/>
           </a:p>
@@ -19377,6 +19241,53 @@
           </a:ln>
         </p:spPr>
       </p:pic>
+      <p:sp>
+        <p:nvSpPr>
+          <p:cNvPr id="9" name="TextBox 8">
+            <a:extLst>
+              <a:ext uri="{FF2B5EF4-FFF2-40B4-BE49-F238E27FC236}">
+                <a16:creationId xmlns:a16="http://schemas.microsoft.com/office/drawing/2014/main" id="{3DE969E2-60DC-4C16-A660-13721F090F3F}"/>
+              </a:ext>
+            </a:extLst>
+          </p:cNvPr>
+          <p:cNvSpPr txBox="1"/>
+          <p:nvPr/>
+        </p:nvSpPr>
+        <p:spPr>
+          <a:xfrm rot="365251">
+            <a:off x="9247581" y="1462724"/>
+            <a:ext cx="3710763" cy="923330"/>
+          </a:xfrm>
+          <a:prstGeom prst="rect">
+            <a:avLst/>
+          </a:prstGeom>
+          <a:solidFill>
+            <a:schemeClr val="bg1"/>
+          </a:solidFill>
+          <a:ln>
+            <a:solidFill>
+              <a:schemeClr val="tx1"/>
+            </a:solidFill>
+          </a:ln>
+        </p:spPr>
+        <p:txBody>
+          <a:bodyPr wrap="square" rtlCol="0">
+            <a:spAutoFit/>
+          </a:bodyPr>
+          <a:lstStyle/>
+          <a:p>
+            <a:pPr algn="ctr"/>
+            <a:r>
+              <a:rPr lang="de-DE" b="1" dirty="0">
+                <a:solidFill>
+                  <a:srgbClr val="FF0000"/>
+                </a:solidFill>
+              </a:rPr>
+              <a:t>Make format nicer (like codacore and with nicer headlines)</a:t>
+            </a:r>
+          </a:p>
+        </p:txBody>
+      </p:sp>
     </p:spTree>
     <p:extLst>
       <p:ext uri="{BB962C8B-B14F-4D97-AF65-F5344CB8AC3E}">
@@ -19390,7 +19301,7 @@
 </p:sld>
 </file>
 
-<file path=ppt/slides/slide2.xml><?xml version="1.0" encoding="utf-8"?>
+<file path=ppt/slides/slide19.xml><?xml version="1.0" encoding="utf-8"?>
 <p:sld xmlns:a="http://schemas.openxmlformats.org/drawingml/2006/main" xmlns:r="http://schemas.openxmlformats.org/officeDocument/2006/relationships" xmlns:p="http://schemas.openxmlformats.org/presentationml/2006/main">
   <p:cSld>
     <p:spTree>
@@ -19409,181 +19320,6 @@
       </p:grpSpPr>
       <p:sp>
         <p:nvSpPr>
-          <p:cNvPr id="7" name="Title 6">
-            <a:extLst>
-              <a:ext uri="{FF2B5EF4-FFF2-40B4-BE49-F238E27FC236}">
-                <a16:creationId xmlns:a16="http://schemas.microsoft.com/office/drawing/2014/main" id="{097F2DA0-82A3-49C5-A952-4C41FC7A8B0D}"/>
-              </a:ext>
-            </a:extLst>
-          </p:cNvPr>
-          <p:cNvSpPr>
-            <a:spLocks noGrp="1"/>
-          </p:cNvSpPr>
-          <p:nvPr>
-            <p:ph type="title"/>
-          </p:nvPr>
-        </p:nvSpPr>
-        <p:spPr/>
-        <p:txBody>
-          <a:bodyPr/>
-          <a:lstStyle/>
-          <a:p>
-            <a:r>
-              <a:rPr lang="de-DE" b="1" dirty="0"/>
-              <a:t>Goals</a:t>
-            </a:r>
-            <a:endParaRPr lang="en-US" b="1" dirty="0"/>
-          </a:p>
-        </p:txBody>
-      </p:sp>
-      <p:sp>
-        <p:nvSpPr>
-          <p:cNvPr id="2" name="Date Placeholder 1">
-            <a:extLst>
-              <a:ext uri="{FF2B5EF4-FFF2-40B4-BE49-F238E27FC236}">
-                <a16:creationId xmlns:a16="http://schemas.microsoft.com/office/drawing/2014/main" id="{021C34A8-38CB-4F99-BD0A-21BB12003EDD}"/>
-              </a:ext>
-            </a:extLst>
-          </p:cNvPr>
-          <p:cNvSpPr>
-            <a:spLocks noGrp="1"/>
-          </p:cNvSpPr>
-          <p:nvPr>
-            <p:ph type="dt" sz="half" idx="10"/>
-          </p:nvPr>
-        </p:nvSpPr>
-        <p:spPr/>
-        <p:txBody>
-          <a:bodyPr/>
-          <a:lstStyle/>
-          <a:p>
-            <a:fld id="{1278D66F-D6E5-4434-B311-7DA25CA81F5A}" type="datetime1">
-              <a:rPr lang="en-US" smtClean="0"/>
-              <a:t>4/14/2022</a:t>
-            </a:fld>
-            <a:endParaRPr lang="en-US" dirty="0"/>
-          </a:p>
-        </p:txBody>
-      </p:sp>
-      <p:sp>
-        <p:nvSpPr>
-          <p:cNvPr id="3" name="Footer Placeholder 2">
-            <a:extLst>
-              <a:ext uri="{FF2B5EF4-FFF2-40B4-BE49-F238E27FC236}">
-                <a16:creationId xmlns:a16="http://schemas.microsoft.com/office/drawing/2014/main" id="{1438E154-BA79-4A10-8450-061DB6E4741C}"/>
-              </a:ext>
-            </a:extLst>
-          </p:cNvPr>
-          <p:cNvSpPr>
-            <a:spLocks noGrp="1"/>
-          </p:cNvSpPr>
-          <p:nvPr>
-            <p:ph type="ftr" sz="quarter" idx="11"/>
-          </p:nvPr>
-        </p:nvSpPr>
-        <p:spPr/>
-        <p:txBody>
-          <a:bodyPr/>
-          <a:lstStyle/>
-          <a:p>
-            <a:r>
-              <a:rPr lang="en-US"/>
-              <a:t>jennifer.neumaier@t-online.de</a:t>
-            </a:r>
-            <a:endParaRPr lang="en-US" dirty="0"/>
-          </a:p>
-        </p:txBody>
-      </p:sp>
-      <p:sp>
-        <p:nvSpPr>
-          <p:cNvPr id="4" name="Slide Number Placeholder 3">
-            <a:extLst>
-              <a:ext uri="{FF2B5EF4-FFF2-40B4-BE49-F238E27FC236}">
-                <a16:creationId xmlns:a16="http://schemas.microsoft.com/office/drawing/2014/main" id="{AA4FC915-1ED9-4611-8B0F-C8AB3E2F7277}"/>
-              </a:ext>
-            </a:extLst>
-          </p:cNvPr>
-          <p:cNvSpPr>
-            <a:spLocks noGrp="1"/>
-          </p:cNvSpPr>
-          <p:nvPr>
-            <p:ph type="sldNum" sz="quarter" idx="12"/>
-          </p:nvPr>
-        </p:nvSpPr>
-        <p:spPr/>
-        <p:txBody>
-          <a:bodyPr/>
-          <a:lstStyle/>
-          <a:p>
-            <a:fld id="{D57F1E4F-1CFF-5643-939E-217C01CDF565}" type="slidenum">
-              <a:rPr lang="en-US" smtClean="0"/>
-              <a:pPr/>
-              <a:t>2</a:t>
-            </a:fld>
-            <a:endParaRPr lang="en-US" dirty="0"/>
-          </a:p>
-        </p:txBody>
-      </p:sp>
-      <p:graphicFrame>
-        <p:nvGraphicFramePr>
-          <p:cNvPr id="5" name="Diagram 4">
-            <a:extLst>
-              <a:ext uri="{FF2B5EF4-FFF2-40B4-BE49-F238E27FC236}">
-                <a16:creationId xmlns:a16="http://schemas.microsoft.com/office/drawing/2014/main" id="{F3220D42-CE5E-491B-98FD-975C2BE57521}"/>
-              </a:ext>
-            </a:extLst>
-          </p:cNvPr>
-          <p:cNvGraphicFramePr/>
-          <p:nvPr>
-            <p:extLst>
-              <p:ext uri="{D42A27DB-BD31-4B8C-83A1-F6EECF244321}">
-                <p14:modId xmlns:p14="http://schemas.microsoft.com/office/powerpoint/2010/main" val="2946467629"/>
-              </p:ext>
-            </p:extLst>
-          </p:nvPr>
-        </p:nvGraphicFramePr>
-        <p:xfrm>
-          <a:off x="2423843" y="724958"/>
-          <a:ext cx="8128000" cy="5418667"/>
-        </p:xfrm>
-        <a:graphic>
-          <a:graphicData uri="http://schemas.openxmlformats.org/drawingml/2006/diagram">
-            <dgm:relIds xmlns:dgm="http://schemas.openxmlformats.org/drawingml/2006/diagram" xmlns:r="http://schemas.openxmlformats.org/officeDocument/2006/relationships" r:dm="rId2" r:lo="rId3" r:qs="rId4" r:cs="rId5"/>
-          </a:graphicData>
-        </a:graphic>
-      </p:graphicFrame>
-    </p:spTree>
-    <p:extLst>
-      <p:ext uri="{BB962C8B-B14F-4D97-AF65-F5344CB8AC3E}">
-        <p14:creationId xmlns:p14="http://schemas.microsoft.com/office/powerpoint/2010/main" val="2392951674"/>
-      </p:ext>
-    </p:extLst>
-  </p:cSld>
-  <p:clrMapOvr>
-    <a:masterClrMapping/>
-  </p:clrMapOvr>
-</p:sld>
-</file>
-
-<file path=ppt/slides/slide20.xml><?xml version="1.0" encoding="utf-8"?>
-<p:sld xmlns:a="http://schemas.openxmlformats.org/drawingml/2006/main" xmlns:r="http://schemas.openxmlformats.org/officeDocument/2006/relationships" xmlns:p="http://schemas.openxmlformats.org/presentationml/2006/main">
-  <p:cSld>
-    <p:spTree>
-      <p:nvGrpSpPr>
-        <p:cNvPr id="1" name=""/>
-        <p:cNvGrpSpPr/>
-        <p:nvPr/>
-      </p:nvGrpSpPr>
-      <p:grpSpPr>
-        <a:xfrm>
-          <a:off x="0" y="0"/>
-          <a:ext cx="0" cy="0"/>
-          <a:chOff x="0" y="0"/>
-          <a:chExt cx="0" cy="0"/>
-        </a:xfrm>
-      </p:grpSpPr>
-      <p:sp>
-        <p:nvSpPr>
           <p:cNvPr id="2" name="Title 1">
             <a:extLst>
               <a:ext uri="{FF2B5EF4-FFF2-40B4-BE49-F238E27FC236}">
@@ -19666,7 +19402,7 @@
             <a:fld id="{D57F1E4F-1CFF-5643-939E-217C01CDF565}" type="slidenum">
               <a:rPr lang="en-US" smtClean="0"/>
               <a:pPr/>
-              <a:t>20</a:t>
+              <a:t>19</a:t>
             </a:fld>
             <a:endParaRPr lang="en-US" dirty="0"/>
           </a:p>
@@ -19777,10 +19513,662 @@
           </a:ln>
         </p:spPr>
       </p:pic>
+      <p:sp>
+        <p:nvSpPr>
+          <p:cNvPr id="9" name="TextBox 8">
+            <a:extLst>
+              <a:ext uri="{FF2B5EF4-FFF2-40B4-BE49-F238E27FC236}">
+                <a16:creationId xmlns:a16="http://schemas.microsoft.com/office/drawing/2014/main" id="{C2CC989F-FEAB-4597-B493-25EE09A942E9}"/>
+              </a:ext>
+            </a:extLst>
+          </p:cNvPr>
+          <p:cNvSpPr txBox="1"/>
+          <p:nvPr/>
+        </p:nvSpPr>
+        <p:spPr>
+          <a:xfrm rot="365251">
+            <a:off x="8219319" y="627044"/>
+            <a:ext cx="3710763" cy="923330"/>
+          </a:xfrm>
+          <a:prstGeom prst="rect">
+            <a:avLst/>
+          </a:prstGeom>
+          <a:solidFill>
+            <a:schemeClr val="bg1"/>
+          </a:solidFill>
+          <a:ln>
+            <a:solidFill>
+              <a:schemeClr val="tx1"/>
+            </a:solidFill>
+          </a:ln>
+        </p:spPr>
+        <p:txBody>
+          <a:bodyPr wrap="square" rtlCol="0">
+            <a:spAutoFit/>
+          </a:bodyPr>
+          <a:lstStyle/>
+          <a:p>
+            <a:pPr algn="ctr"/>
+            <a:r>
+              <a:rPr lang="de-DE" b="1" dirty="0">
+                <a:solidFill>
+                  <a:srgbClr val="FF0000"/>
+                </a:solidFill>
+              </a:rPr>
+              <a:t>Make format nicer (like codacore and with nicer headlines)</a:t>
+            </a:r>
+          </a:p>
+        </p:txBody>
+      </p:sp>
     </p:spTree>
     <p:extLst>
       <p:ext uri="{BB962C8B-B14F-4D97-AF65-F5344CB8AC3E}">
         <p14:creationId xmlns:p14="http://schemas.microsoft.com/office/powerpoint/2010/main" val="2629132382"/>
+      </p:ext>
+    </p:extLst>
+  </p:cSld>
+  <p:clrMapOvr>
+    <a:masterClrMapping/>
+  </p:clrMapOvr>
+</p:sld>
+</file>
+
+<file path=ppt/slides/slide2.xml><?xml version="1.0" encoding="utf-8"?>
+<p:sld xmlns:a="http://schemas.openxmlformats.org/drawingml/2006/main" xmlns:r="http://schemas.openxmlformats.org/officeDocument/2006/relationships" xmlns:p="http://schemas.openxmlformats.org/presentationml/2006/main">
+  <p:cSld>
+    <p:spTree>
+      <p:nvGrpSpPr>
+        <p:cNvPr id="1" name=""/>
+        <p:cNvGrpSpPr/>
+        <p:nvPr/>
+      </p:nvGrpSpPr>
+      <p:grpSpPr>
+        <a:xfrm>
+          <a:off x="0" y="0"/>
+          <a:ext cx="0" cy="0"/>
+          <a:chOff x="0" y="0"/>
+          <a:chExt cx="0" cy="0"/>
+        </a:xfrm>
+      </p:grpSpPr>
+      <p:sp>
+        <p:nvSpPr>
+          <p:cNvPr id="7" name="Title 6">
+            <a:extLst>
+              <a:ext uri="{FF2B5EF4-FFF2-40B4-BE49-F238E27FC236}">
+                <a16:creationId xmlns:a16="http://schemas.microsoft.com/office/drawing/2014/main" id="{097F2DA0-82A3-49C5-A952-4C41FC7A8B0D}"/>
+              </a:ext>
+            </a:extLst>
+          </p:cNvPr>
+          <p:cNvSpPr>
+            <a:spLocks noGrp="1"/>
+          </p:cNvSpPr>
+          <p:nvPr>
+            <p:ph type="title"/>
+          </p:nvPr>
+        </p:nvSpPr>
+        <p:spPr/>
+        <p:txBody>
+          <a:bodyPr/>
+          <a:lstStyle/>
+          <a:p>
+            <a:r>
+              <a:rPr lang="de-DE" b="1" dirty="0"/>
+              <a:t>Goals</a:t>
+            </a:r>
+            <a:endParaRPr lang="en-US" b="1" dirty="0"/>
+          </a:p>
+        </p:txBody>
+      </p:sp>
+      <p:sp>
+        <p:nvSpPr>
+          <p:cNvPr id="2" name="Date Placeholder 1">
+            <a:extLst>
+              <a:ext uri="{FF2B5EF4-FFF2-40B4-BE49-F238E27FC236}">
+                <a16:creationId xmlns:a16="http://schemas.microsoft.com/office/drawing/2014/main" id="{021C34A8-38CB-4F99-BD0A-21BB12003EDD}"/>
+              </a:ext>
+            </a:extLst>
+          </p:cNvPr>
+          <p:cNvSpPr>
+            <a:spLocks noGrp="1"/>
+          </p:cNvSpPr>
+          <p:nvPr>
+            <p:ph type="dt" sz="half" idx="10"/>
+          </p:nvPr>
+        </p:nvSpPr>
+        <p:spPr/>
+        <p:txBody>
+          <a:bodyPr/>
+          <a:lstStyle/>
+          <a:p>
+            <a:fld id="{1278D66F-D6E5-4434-B311-7DA25CA81F5A}" type="datetime1">
+              <a:rPr lang="en-US" smtClean="0"/>
+              <a:t>4/16/2022</a:t>
+            </a:fld>
+            <a:endParaRPr lang="en-US" dirty="0"/>
+          </a:p>
+        </p:txBody>
+      </p:sp>
+      <p:sp>
+        <p:nvSpPr>
+          <p:cNvPr id="3" name="Footer Placeholder 2">
+            <a:extLst>
+              <a:ext uri="{FF2B5EF4-FFF2-40B4-BE49-F238E27FC236}">
+                <a16:creationId xmlns:a16="http://schemas.microsoft.com/office/drawing/2014/main" id="{1438E154-BA79-4A10-8450-061DB6E4741C}"/>
+              </a:ext>
+            </a:extLst>
+          </p:cNvPr>
+          <p:cNvSpPr>
+            <a:spLocks noGrp="1"/>
+          </p:cNvSpPr>
+          <p:nvPr>
+            <p:ph type="ftr" sz="quarter" idx="11"/>
+          </p:nvPr>
+        </p:nvSpPr>
+        <p:spPr/>
+        <p:txBody>
+          <a:bodyPr/>
+          <a:lstStyle/>
+          <a:p>
+            <a:r>
+              <a:rPr lang="en-US"/>
+              <a:t>jennifer.neumaier@t-online.de</a:t>
+            </a:r>
+            <a:endParaRPr lang="en-US" dirty="0"/>
+          </a:p>
+        </p:txBody>
+      </p:sp>
+      <p:sp>
+        <p:nvSpPr>
+          <p:cNvPr id="4" name="Slide Number Placeholder 3">
+            <a:extLst>
+              <a:ext uri="{FF2B5EF4-FFF2-40B4-BE49-F238E27FC236}">
+                <a16:creationId xmlns:a16="http://schemas.microsoft.com/office/drawing/2014/main" id="{AA4FC915-1ED9-4611-8B0F-C8AB3E2F7277}"/>
+              </a:ext>
+            </a:extLst>
+          </p:cNvPr>
+          <p:cNvSpPr>
+            <a:spLocks noGrp="1"/>
+          </p:cNvSpPr>
+          <p:nvPr>
+            <p:ph type="sldNum" sz="quarter" idx="12"/>
+          </p:nvPr>
+        </p:nvSpPr>
+        <p:spPr/>
+        <p:txBody>
+          <a:bodyPr/>
+          <a:lstStyle/>
+          <a:p>
+            <a:fld id="{D57F1E4F-1CFF-5643-939E-217C01CDF565}" type="slidenum">
+              <a:rPr lang="en-US" smtClean="0"/>
+              <a:pPr/>
+              <a:t>2</a:t>
+            </a:fld>
+            <a:endParaRPr lang="en-US" dirty="0"/>
+          </a:p>
+        </p:txBody>
+      </p:sp>
+      <p:graphicFrame>
+        <p:nvGraphicFramePr>
+          <p:cNvPr id="5" name="Diagram 4">
+            <a:extLst>
+              <a:ext uri="{FF2B5EF4-FFF2-40B4-BE49-F238E27FC236}">
+                <a16:creationId xmlns:a16="http://schemas.microsoft.com/office/drawing/2014/main" id="{F3220D42-CE5E-491B-98FD-975C2BE57521}"/>
+              </a:ext>
+            </a:extLst>
+          </p:cNvPr>
+          <p:cNvGraphicFramePr/>
+          <p:nvPr>
+            <p:extLst>
+              <p:ext uri="{D42A27DB-BD31-4B8C-83A1-F6EECF244321}">
+                <p14:modId xmlns:p14="http://schemas.microsoft.com/office/powerpoint/2010/main" val="2946467629"/>
+              </p:ext>
+            </p:extLst>
+          </p:nvPr>
+        </p:nvGraphicFramePr>
+        <p:xfrm>
+          <a:off x="2423843" y="724958"/>
+          <a:ext cx="8128000" cy="5418667"/>
+        </p:xfrm>
+        <a:graphic>
+          <a:graphicData uri="http://schemas.openxmlformats.org/drawingml/2006/diagram">
+            <dgm:relIds xmlns:dgm="http://schemas.openxmlformats.org/drawingml/2006/diagram" xmlns:r="http://schemas.openxmlformats.org/officeDocument/2006/relationships" r:dm="rId2" r:lo="rId3" r:qs="rId4" r:cs="rId5"/>
+          </a:graphicData>
+        </a:graphic>
+      </p:graphicFrame>
+    </p:spTree>
+    <p:extLst>
+      <p:ext uri="{BB962C8B-B14F-4D97-AF65-F5344CB8AC3E}">
+        <p14:creationId xmlns:p14="http://schemas.microsoft.com/office/powerpoint/2010/main" val="2392951674"/>
+      </p:ext>
+    </p:extLst>
+  </p:cSld>
+  <p:clrMapOvr>
+    <a:masterClrMapping/>
+  </p:clrMapOvr>
+</p:sld>
+</file>
+
+<file path=ppt/slides/slide20.xml><?xml version="1.0" encoding="utf-8"?>
+<p:sld xmlns:a="http://schemas.openxmlformats.org/drawingml/2006/main" xmlns:r="http://schemas.openxmlformats.org/officeDocument/2006/relationships" xmlns:p="http://schemas.openxmlformats.org/presentationml/2006/main">
+  <p:cSld>
+    <p:spTree>
+      <p:nvGrpSpPr>
+        <p:cNvPr id="1" name=""/>
+        <p:cNvGrpSpPr/>
+        <p:nvPr/>
+      </p:nvGrpSpPr>
+      <p:grpSpPr>
+        <a:xfrm>
+          <a:off x="0" y="0"/>
+          <a:ext cx="0" cy="0"/>
+          <a:chOff x="0" y="0"/>
+          <a:chExt cx="0" cy="0"/>
+        </a:xfrm>
+      </p:grpSpPr>
+      <p:sp>
+        <p:nvSpPr>
+          <p:cNvPr id="2" name="Title 1">
+            <a:extLst>
+              <a:ext uri="{FF2B5EF4-FFF2-40B4-BE49-F238E27FC236}">
+                <a16:creationId xmlns:a16="http://schemas.microsoft.com/office/drawing/2014/main" id="{6806FBA4-537C-4226-9D3A-758C7B787D79}"/>
+              </a:ext>
+            </a:extLst>
+          </p:cNvPr>
+          <p:cNvSpPr>
+            <a:spLocks noGrp="1"/>
+          </p:cNvSpPr>
+          <p:nvPr>
+            <p:ph type="title"/>
+          </p:nvPr>
+        </p:nvSpPr>
+        <p:spPr/>
+        <p:txBody>
+          <a:bodyPr/>
+          <a:lstStyle/>
+          <a:p>
+            <a:r>
+              <a:rPr lang="de-DE" b="1" dirty="0"/>
+              <a:t>Pre-Processing</a:t>
+            </a:r>
+            <a:endParaRPr lang="en-US" b="1" dirty="0"/>
+          </a:p>
+        </p:txBody>
+      </p:sp>
+      <p:sp>
+        <p:nvSpPr>
+          <p:cNvPr id="5" name="Footer Placeholder 4">
+            <a:extLst>
+              <a:ext uri="{FF2B5EF4-FFF2-40B4-BE49-F238E27FC236}">
+                <a16:creationId xmlns:a16="http://schemas.microsoft.com/office/drawing/2014/main" id="{707C4F70-832A-416B-9491-EE86347B2812}"/>
+              </a:ext>
+            </a:extLst>
+          </p:cNvPr>
+          <p:cNvSpPr>
+            <a:spLocks noGrp="1"/>
+          </p:cNvSpPr>
+          <p:nvPr>
+            <p:ph type="ftr" sz="quarter" idx="11"/>
+          </p:nvPr>
+        </p:nvSpPr>
+        <p:spPr/>
+        <p:txBody>
+          <a:bodyPr/>
+          <a:lstStyle/>
+          <a:p>
+            <a:r>
+              <a:rPr lang="en-US"/>
+              <a:t>jennifer.neumaier@t-online.de</a:t>
+            </a:r>
+            <a:endParaRPr lang="en-US" dirty="0"/>
+          </a:p>
+        </p:txBody>
+      </p:sp>
+      <p:sp>
+        <p:nvSpPr>
+          <p:cNvPr id="6" name="Slide Number Placeholder 5">
+            <a:extLst>
+              <a:ext uri="{FF2B5EF4-FFF2-40B4-BE49-F238E27FC236}">
+                <a16:creationId xmlns:a16="http://schemas.microsoft.com/office/drawing/2014/main" id="{1028CB34-29B5-49CB-99E4-E945C3D78896}"/>
+              </a:ext>
+            </a:extLst>
+          </p:cNvPr>
+          <p:cNvSpPr>
+            <a:spLocks noGrp="1"/>
+          </p:cNvSpPr>
+          <p:nvPr>
+            <p:ph type="sldNum" sz="quarter" idx="12"/>
+          </p:nvPr>
+        </p:nvSpPr>
+        <p:spPr/>
+        <p:txBody>
+          <a:bodyPr/>
+          <a:lstStyle/>
+          <a:p>
+            <a:fld id="{D57F1E4F-1CFF-5643-939E-217C01CDF565}" type="slidenum">
+              <a:rPr lang="en-US" smtClean="0"/>
+              <a:pPr/>
+              <a:t>20</a:t>
+            </a:fld>
+            <a:endParaRPr lang="en-US" dirty="0"/>
+          </a:p>
+        </p:txBody>
+      </p:sp>
+      <p:sp>
+        <p:nvSpPr>
+          <p:cNvPr id="26" name="TextBox 25">
+            <a:extLst>
+              <a:ext uri="{FF2B5EF4-FFF2-40B4-BE49-F238E27FC236}">
+                <a16:creationId xmlns:a16="http://schemas.microsoft.com/office/drawing/2014/main" id="{CC7BEBFF-3D20-441C-B1B2-0CE34904FDE4}"/>
+              </a:ext>
+            </a:extLst>
+          </p:cNvPr>
+          <p:cNvSpPr txBox="1"/>
+          <p:nvPr/>
+        </p:nvSpPr>
+        <p:spPr>
+          <a:xfrm>
+            <a:off x="1698819" y="1152907"/>
+            <a:ext cx="3654858" cy="400110"/>
+          </a:xfrm>
+          <a:prstGeom prst="rect">
+            <a:avLst/>
+          </a:prstGeom>
+          <a:noFill/>
+        </p:spPr>
+        <p:txBody>
+          <a:bodyPr wrap="square" rtlCol="0">
+            <a:spAutoFit/>
+          </a:bodyPr>
+          <a:lstStyle/>
+          <a:p>
+            <a:r>
+              <a:rPr lang="de-DE" sz="2000" i="1" dirty="0"/>
+              <a:t>Problems and Notes</a:t>
+            </a:r>
+          </a:p>
+        </p:txBody>
+      </p:sp>
+      <p:sp>
+        <p:nvSpPr>
+          <p:cNvPr id="7" name="TextBox 6">
+            <a:extLst>
+              <a:ext uri="{FF2B5EF4-FFF2-40B4-BE49-F238E27FC236}">
+                <a16:creationId xmlns:a16="http://schemas.microsoft.com/office/drawing/2014/main" id="{B43BF96F-7A11-4087-9B01-CF6AACD20E04}"/>
+              </a:ext>
+            </a:extLst>
+          </p:cNvPr>
+          <p:cNvSpPr txBox="1"/>
+          <p:nvPr/>
+        </p:nvSpPr>
+        <p:spPr>
+          <a:xfrm>
+            <a:off x="1698819" y="1834296"/>
+            <a:ext cx="7102549" cy="1754326"/>
+          </a:xfrm>
+          <a:prstGeom prst="rect">
+            <a:avLst/>
+          </a:prstGeom>
+          <a:noFill/>
+        </p:spPr>
+        <p:txBody>
+          <a:bodyPr wrap="square" rtlCol="0">
+            <a:spAutoFit/>
+          </a:bodyPr>
+          <a:lstStyle/>
+          <a:p>
+            <a:r>
+              <a:rPr lang="de-DE" u="sng" dirty="0"/>
+              <a:t>CRC</a:t>
+            </a:r>
+            <a:r>
+              <a:rPr lang="de-DE" dirty="0"/>
+              <a:t>:</a:t>
+            </a:r>
+          </a:p>
+          <a:p>
+            <a:pPr marL="285750" indent="-285750">
+              <a:buFontTx/>
+              <a:buChar char="-"/>
+            </a:pPr>
+            <a:r>
+              <a:rPr lang="de-DE" dirty="0"/>
+              <a:t>128 rows removed due to NA in BMI</a:t>
+            </a:r>
+          </a:p>
+          <a:p>
+            <a:pPr marL="285750" indent="-285750">
+              <a:buFontTx/>
+              <a:buChar char="-"/>
+            </a:pPr>
+            <a:r>
+              <a:rPr lang="de-DE" dirty="0"/>
+              <a:t>DE saved separately as holdout </a:t>
+            </a:r>
+          </a:p>
+          <a:p>
+            <a:pPr marL="285750" indent="-285750">
+              <a:buFontTx/>
+              <a:buChar char="-"/>
+            </a:pPr>
+            <a:r>
+              <a:rPr lang="de-DE" dirty="0"/>
+              <a:t>All tests were done with country sets: USA, China, Austria, France</a:t>
+            </a:r>
+          </a:p>
+          <a:p>
+            <a:pPr marL="285750" indent="-285750">
+              <a:buFontTx/>
+              <a:buChar char="-"/>
+            </a:pPr>
+            <a:endParaRPr lang="de-DE" dirty="0"/>
+          </a:p>
+        </p:txBody>
+      </p:sp>
+      <p:sp>
+        <p:nvSpPr>
+          <p:cNvPr id="29" name="TextBox 28">
+            <a:extLst>
+              <a:ext uri="{FF2B5EF4-FFF2-40B4-BE49-F238E27FC236}">
+                <a16:creationId xmlns:a16="http://schemas.microsoft.com/office/drawing/2014/main" id="{FD214281-F802-4F96-A098-F69D765E4AFA}"/>
+              </a:ext>
+            </a:extLst>
+          </p:cNvPr>
+          <p:cNvSpPr txBox="1"/>
+          <p:nvPr/>
+        </p:nvSpPr>
+        <p:spPr>
+          <a:xfrm>
+            <a:off x="6199935" y="93132"/>
+            <a:ext cx="6097772" cy="1815882"/>
+          </a:xfrm>
+          <a:prstGeom prst="rect">
+            <a:avLst/>
+          </a:prstGeom>
+          <a:noFill/>
+        </p:spPr>
+        <p:txBody>
+          <a:bodyPr wrap="square">
+            <a:spAutoFit/>
+          </a:bodyPr>
+          <a:lstStyle/>
+          <a:p>
+            <a:r>
+              <a:rPr lang="de-DE" sz="1400" u="sng" dirty="0"/>
+              <a:t>Imputation</a:t>
+            </a:r>
+            <a:r>
+              <a:rPr lang="de-DE" sz="1400" dirty="0"/>
+              <a:t>:</a:t>
+            </a:r>
+          </a:p>
+          <a:p>
+            <a:pPr marL="285750" indent="-285750">
+              <a:buFontTx/>
+              <a:buChar char="-"/>
+            </a:pPr>
+            <a:r>
+              <a:rPr lang="de-DE" sz="1400" dirty="0"/>
+              <a:t>mbImpute needs phylogenetic tree -&gt; ignored for now </a:t>
+            </a:r>
+          </a:p>
+          <a:p>
+            <a:pPr marL="285750" indent="-285750">
+              <a:buFontTx/>
+              <a:buChar char="-"/>
+            </a:pPr>
+            <a:r>
+              <a:rPr lang="de-DE" sz="1400" dirty="0"/>
+              <a:t>EstMB dataset: pseudocount inserts decimal values between 0 and 1</a:t>
+            </a:r>
+          </a:p>
+          <a:p>
+            <a:pPr marL="742950" lvl="1" indent="-285750">
+              <a:buFontTx/>
+              <a:buChar char="-"/>
+            </a:pPr>
+            <a:r>
+              <a:rPr lang="de-DE" sz="1400" dirty="0"/>
+              <a:t>Solution for now: all these values were rounded up to 1</a:t>
+            </a:r>
+          </a:p>
+          <a:p>
+            <a:pPr marL="742950" lvl="1" indent="-285750">
+              <a:buFontTx/>
+              <a:buChar char="-"/>
+            </a:pPr>
+            <a:r>
+              <a:rPr lang="de-DE" sz="1400" dirty="0"/>
+              <a:t>Possibly in a later run keep decimal values, because some papers suggest sensitivity to pseudocount in machine learning models </a:t>
+            </a:r>
+          </a:p>
+        </p:txBody>
+      </p:sp>
+      <p:sp>
+        <p:nvSpPr>
+          <p:cNvPr id="8" name="TextBox 7">
+            <a:extLst>
+              <a:ext uri="{FF2B5EF4-FFF2-40B4-BE49-F238E27FC236}">
+                <a16:creationId xmlns:a16="http://schemas.microsoft.com/office/drawing/2014/main" id="{20ADFB58-875E-4AAE-BDAE-D861E7F9DC27}"/>
+              </a:ext>
+            </a:extLst>
+          </p:cNvPr>
+          <p:cNvSpPr txBox="1"/>
+          <p:nvPr/>
+        </p:nvSpPr>
+        <p:spPr>
+          <a:xfrm>
+            <a:off x="1720971" y="3408432"/>
+            <a:ext cx="7102549" cy="1200329"/>
+          </a:xfrm>
+          <a:prstGeom prst="rect">
+            <a:avLst/>
+          </a:prstGeom>
+          <a:noFill/>
+        </p:spPr>
+        <p:txBody>
+          <a:bodyPr wrap="square" rtlCol="0">
+            <a:spAutoFit/>
+          </a:bodyPr>
+          <a:lstStyle/>
+          <a:p>
+            <a:r>
+              <a:rPr lang="de-DE" u="sng" dirty="0"/>
+              <a:t>PCOS</a:t>
+            </a:r>
+            <a:r>
+              <a:rPr lang="de-DE" dirty="0"/>
+              <a:t>:</a:t>
+            </a:r>
+          </a:p>
+          <a:p>
+            <a:pPr marL="285750" indent="-285750">
+              <a:buFontTx/>
+              <a:buChar char="-"/>
+            </a:pPr>
+            <a:r>
+              <a:rPr lang="de-DE" dirty="0"/>
+              <a:t>6 rows removed in abundance table because they were not included in metadata</a:t>
+            </a:r>
+          </a:p>
+          <a:p>
+            <a:pPr marL="285750" indent="-285750">
+              <a:buFontTx/>
+              <a:buChar char="-"/>
+            </a:pPr>
+            <a:endParaRPr lang="de-DE" dirty="0"/>
+          </a:p>
+        </p:txBody>
+      </p:sp>
+      <p:sp>
+        <p:nvSpPr>
+          <p:cNvPr id="9" name="TextBox 8">
+            <a:extLst>
+              <a:ext uri="{FF2B5EF4-FFF2-40B4-BE49-F238E27FC236}">
+                <a16:creationId xmlns:a16="http://schemas.microsoft.com/office/drawing/2014/main" id="{C84548D0-C361-4108-B284-1351D54B8DFD}"/>
+              </a:ext>
+            </a:extLst>
+          </p:cNvPr>
+          <p:cNvSpPr txBox="1"/>
+          <p:nvPr/>
+        </p:nvSpPr>
+        <p:spPr>
+          <a:xfrm>
+            <a:off x="1720971" y="4717667"/>
+            <a:ext cx="7102549" cy="1200329"/>
+          </a:xfrm>
+          <a:prstGeom prst="rect">
+            <a:avLst/>
+          </a:prstGeom>
+          <a:noFill/>
+        </p:spPr>
+        <p:txBody>
+          <a:bodyPr wrap="square" rtlCol="0">
+            <a:spAutoFit/>
+          </a:bodyPr>
+          <a:lstStyle/>
+          <a:p>
+            <a:r>
+              <a:rPr lang="de-DE" u="sng" dirty="0"/>
+              <a:t>EstMB</a:t>
+            </a:r>
+            <a:r>
+              <a:rPr lang="de-DE" dirty="0"/>
+              <a:t>:</a:t>
+            </a:r>
+          </a:p>
+          <a:p>
+            <a:pPr marL="285750" indent="-285750">
+              <a:buFontTx/>
+              <a:buChar char="-"/>
+            </a:pPr>
+            <a:r>
+              <a:rPr lang="de-DE" dirty="0"/>
+              <a:t>21 rows removed in metadata due to NA</a:t>
+            </a:r>
+          </a:p>
+          <a:p>
+            <a:pPr marL="285750" indent="-285750">
+              <a:buFontTx/>
+              <a:buChar char="-"/>
+            </a:pPr>
+            <a:r>
+              <a:rPr lang="de-DE" dirty="0"/>
+              <a:t>21 patients cut out of abundance table due to metadata</a:t>
+            </a:r>
+          </a:p>
+          <a:p>
+            <a:pPr marL="285750" indent="-285750">
+              <a:buFontTx/>
+              <a:buChar char="-"/>
+            </a:pPr>
+            <a:endParaRPr lang="de-DE" dirty="0"/>
+          </a:p>
+        </p:txBody>
+      </p:sp>
+    </p:spTree>
+    <p:extLst>
+      <p:ext uri="{BB962C8B-B14F-4D97-AF65-F5344CB8AC3E}">
+        <p14:creationId xmlns:p14="http://schemas.microsoft.com/office/powerpoint/2010/main" val="3215538767"/>
       </p:ext>
     </p:extLst>
   </p:cSld>
@@ -19830,7 +20218,7 @@
           <a:p>
             <a:r>
               <a:rPr lang="de-DE" b="1" dirty="0"/>
-              <a:t>Pre-Processing</a:t>
+              <a:t>Transformations</a:t>
             </a:r>
             <a:endParaRPr lang="en-US" b="1" dirty="0"/>
           </a:p>
@@ -19858,10 +20246,9 @@
           <a:lstStyle/>
           <a:p>
             <a:r>
-              <a:rPr lang="en-US"/>
+              <a:rPr lang="en-US" dirty="0"/>
               <a:t>jennifer.neumaier@t-online.de</a:t>
             </a:r>
-            <a:endParaRPr lang="en-US" dirty="0"/>
           </a:p>
         </p:txBody>
       </p:sp>
@@ -19944,8 +20331,8 @@
         </p:nvSpPr>
         <p:spPr>
           <a:xfrm>
-            <a:off x="1698819" y="1834296"/>
-            <a:ext cx="7102549" cy="1754326"/>
+            <a:off x="2589212" y="1742696"/>
+            <a:ext cx="7102549" cy="1477328"/>
           </a:xfrm>
           <a:prstGeom prst="rect">
             <a:avLst/>
@@ -19960,7 +20347,7 @@
           <a:p>
             <a:r>
               <a:rPr lang="de-DE" u="sng" dirty="0"/>
-              <a:t>CRC</a:t>
+              <a:t>CLR/ALR</a:t>
             </a:r>
             <a:r>
               <a:rPr lang="de-DE" dirty="0"/>
@@ -19974,7 +20361,7 @@
             </a:pPr>
             <a:r>
               <a:rPr lang="de-DE" dirty="0"/>
-              <a:t>128 rows removed due to NA in BMI</a:t>
+              <a:t>What to do with LR.wt?</a:t>
             </a:r>
           </a:p>
           <a:p>
@@ -19984,7 +20371,7 @@
             </a:pPr>
             <a:r>
               <a:rPr lang="de-DE" dirty="0"/>
-              <a:t>DE saved separately as holdout </a:t>
+              <a:t>What to do with part.names and part.wt?</a:t>
             </a:r>
           </a:p>
           <a:p>
@@ -19994,24 +20381,20 @@
             </a:pPr>
             <a:r>
               <a:rPr lang="de-DE" dirty="0"/>
-              <a:t>All tests were done with country sets: USA, China, Austria, France</a:t>
-            </a:r>
-          </a:p>
-          <a:p>
-            <a:pPr marL="285750" indent="-285750">
-              <a:buFontTx/>
-              <a:buChar char="-"/>
-            </a:pPr>
+              <a:t>Column names ALR?</a:t>
+            </a:r>
+          </a:p>
+          <a:p>
             <a:endParaRPr lang="de-DE" dirty="0"/>
           </a:p>
         </p:txBody>
       </p:sp>
       <p:sp>
         <p:nvSpPr>
-          <p:cNvPr id="29" name="TextBox 28">
+          <p:cNvPr id="8" name="TextBox 7">
             <a:extLst>
               <a:ext uri="{FF2B5EF4-FFF2-40B4-BE49-F238E27FC236}">
-                <a16:creationId xmlns:a16="http://schemas.microsoft.com/office/drawing/2014/main" id="{FD214281-F802-4F96-A098-F69D765E4AFA}"/>
+                <a16:creationId xmlns:a16="http://schemas.microsoft.com/office/drawing/2014/main" id="{42B7B4AF-462B-468E-AAF9-0BB332281A81}"/>
               </a:ext>
             </a:extLst>
           </p:cNvPr>
@@ -20020,8 +20403,8 @@
         </p:nvSpPr>
         <p:spPr>
           <a:xfrm>
-            <a:off x="6199935" y="93132"/>
-            <a:ext cx="6097772" cy="1815882"/>
+            <a:off x="2589212" y="3278973"/>
+            <a:ext cx="7102549" cy="923330"/>
           </a:xfrm>
           <a:prstGeom prst="rect">
             <a:avLst/>
@@ -20029,19 +20412,16 @@
           <a:noFill/>
         </p:spPr>
         <p:txBody>
-          <a:bodyPr wrap="square">
+          <a:bodyPr wrap="square" rtlCol="0">
             <a:spAutoFit/>
           </a:bodyPr>
           <a:lstStyle/>
           <a:p>
             <a:r>
-              <a:rPr lang="de-DE" sz="1400" u="sng" dirty="0"/>
-              <a:t>Imputation</a:t>
-            </a:r>
-            <a:r>
-              <a:rPr lang="de-DE" sz="1400" dirty="0"/>
-              <a:t>:</a:t>
-            </a:r>
+              <a:rPr lang="de-DE" u="sng" dirty="0"/>
+              <a:t>EstMB:</a:t>
+            </a:r>
+            <a:endParaRPr lang="de-DE" dirty="0"/>
           </a:p>
           <a:p>
             <a:pPr marL="285750" indent="-285750">
@@ -20049,150 +20429,11 @@
               <a:buChar char="-"/>
             </a:pPr>
             <a:r>
-              <a:rPr lang="de-DE" sz="1400" dirty="0"/>
-              <a:t>mbImpute needs phylogenetic tree -&gt; ignored for now </a:t>
-            </a:r>
-          </a:p>
-          <a:p>
-            <a:pPr marL="285750" indent="-285750">
-              <a:buFontTx/>
-              <a:buChar char="-"/>
-            </a:pPr>
-            <a:r>
-              <a:rPr lang="de-DE" sz="1400" dirty="0"/>
-              <a:t>EstMB dataset: pseudocount inserts decimal values between 0 and 1</a:t>
-            </a:r>
-          </a:p>
-          <a:p>
-            <a:pPr marL="742950" lvl="1" indent="-285750">
-              <a:buFontTx/>
-              <a:buChar char="-"/>
-            </a:pPr>
-            <a:r>
-              <a:rPr lang="de-DE" sz="1400" dirty="0"/>
-              <a:t>Solution for now: all these values were rounded up to 1</a:t>
-            </a:r>
-          </a:p>
-          <a:p>
-            <a:pPr marL="742950" lvl="1" indent="-285750">
-              <a:buFontTx/>
-              <a:buChar char="-"/>
-            </a:pPr>
-            <a:r>
-              <a:rPr lang="de-DE" sz="1400" dirty="0"/>
-              <a:t>Possibly in a later run keep decimal values, because some papers suggest sensitivity to pseudocount in machine learning models </a:t>
-            </a:r>
-          </a:p>
-        </p:txBody>
-      </p:sp>
-      <p:sp>
-        <p:nvSpPr>
-          <p:cNvPr id="8" name="TextBox 7">
-            <a:extLst>
-              <a:ext uri="{FF2B5EF4-FFF2-40B4-BE49-F238E27FC236}">
-                <a16:creationId xmlns:a16="http://schemas.microsoft.com/office/drawing/2014/main" id="{20ADFB58-875E-4AAE-BDAE-D861E7F9DC27}"/>
-              </a:ext>
-            </a:extLst>
-          </p:cNvPr>
-          <p:cNvSpPr txBox="1"/>
-          <p:nvPr/>
-        </p:nvSpPr>
-        <p:spPr>
-          <a:xfrm>
-            <a:off x="1720971" y="3408432"/>
-            <a:ext cx="7102549" cy="1200329"/>
-          </a:xfrm>
-          <a:prstGeom prst="rect">
-            <a:avLst/>
-          </a:prstGeom>
-          <a:noFill/>
-        </p:spPr>
-        <p:txBody>
-          <a:bodyPr wrap="square" rtlCol="0">
-            <a:spAutoFit/>
-          </a:bodyPr>
-          <a:lstStyle/>
-          <a:p>
-            <a:r>
-              <a:rPr lang="de-DE" u="sng" dirty="0"/>
-              <a:t>PCOS</a:t>
-            </a:r>
-            <a:r>
               <a:rPr lang="de-DE" dirty="0"/>
-              <a:t>:</a:t>
-            </a:r>
-          </a:p>
-          <a:p>
-            <a:pPr marL="285750" indent="-285750">
-              <a:buFontTx/>
-              <a:buChar char="-"/>
-            </a:pPr>
-            <a:r>
-              <a:rPr lang="de-DE" dirty="0"/>
-              <a:t>6 rows removed in abundance table because they were not included in metadata</a:t>
-            </a:r>
-          </a:p>
-          <a:p>
-            <a:pPr marL="285750" indent="-285750">
-              <a:buFontTx/>
-              <a:buChar char="-"/>
-            </a:pPr>
-            <a:endParaRPr lang="de-DE" dirty="0"/>
-          </a:p>
-        </p:txBody>
-      </p:sp>
-      <p:sp>
-        <p:nvSpPr>
-          <p:cNvPr id="9" name="TextBox 8">
-            <a:extLst>
-              <a:ext uri="{FF2B5EF4-FFF2-40B4-BE49-F238E27FC236}">
-                <a16:creationId xmlns:a16="http://schemas.microsoft.com/office/drawing/2014/main" id="{C84548D0-C361-4108-B284-1351D54B8DFD}"/>
-              </a:ext>
-            </a:extLst>
-          </p:cNvPr>
-          <p:cNvSpPr txBox="1"/>
-          <p:nvPr/>
-        </p:nvSpPr>
-        <p:spPr>
-          <a:xfrm>
-            <a:off x="1720971" y="4717667"/>
-            <a:ext cx="7102549" cy="1200329"/>
-          </a:xfrm>
-          <a:prstGeom prst="rect">
-            <a:avLst/>
-          </a:prstGeom>
-          <a:noFill/>
-        </p:spPr>
-        <p:txBody>
-          <a:bodyPr wrap="square" rtlCol="0">
-            <a:spAutoFit/>
-          </a:bodyPr>
-          <a:lstStyle/>
-          <a:p>
-            <a:r>
-              <a:rPr lang="de-DE" u="sng" dirty="0"/>
-              <a:t>EstMB</a:t>
-            </a:r>
-            <a:r>
-              <a:rPr lang="de-DE" dirty="0"/>
-              <a:t>:</a:t>
-            </a:r>
-          </a:p>
-          <a:p>
-            <a:pPr marL="285750" indent="-285750">
-              <a:buFontTx/>
-              <a:buChar char="-"/>
-            </a:pPr>
-            <a:r>
-              <a:rPr lang="de-DE" dirty="0"/>
-              <a:t>6 rows removed in abundance table because they were not included in metadata</a:t>
-            </a:r>
-          </a:p>
-          <a:p>
-            <a:pPr marL="285750" indent="-285750">
-              <a:buFontTx/>
-              <a:buChar char="-"/>
-            </a:pPr>
+              <a:t>Needs a lot of time for ALR -&gt; solved in HPC?</a:t>
+            </a:r>
+          </a:p>
+          <a:p>
             <a:endParaRPr lang="de-DE" dirty="0"/>
           </a:p>
         </p:txBody>
@@ -20200,7 +20441,7 @@
     </p:spTree>
     <p:extLst>
       <p:ext uri="{BB962C8B-B14F-4D97-AF65-F5344CB8AC3E}">
-        <p14:creationId xmlns:p14="http://schemas.microsoft.com/office/powerpoint/2010/main" val="3215538767"/>
+        <p14:creationId xmlns:p14="http://schemas.microsoft.com/office/powerpoint/2010/main" val="3441935650"/>
       </p:ext>
     </p:extLst>
   </p:cSld>
@@ -20250,7 +20491,7 @@
           <a:p>
             <a:r>
               <a:rPr lang="de-DE" b="1" dirty="0"/>
-              <a:t>Transformations</a:t>
+              <a:t>Hierarchy dimensionality reduction</a:t>
             </a:r>
             <a:endParaRPr lang="en-US" b="1" dirty="0"/>
           </a:p>
@@ -20278,9 +20519,10 @@
           <a:lstStyle/>
           <a:p>
             <a:r>
-              <a:rPr lang="en-US" dirty="0"/>
+              <a:rPr lang="en-US"/>
               <a:t>jennifer.neumaier@t-online.de</a:t>
             </a:r>
+            <a:endParaRPr lang="en-US" dirty="0"/>
           </a:p>
         </p:txBody>
       </p:sp>
@@ -20364,7 +20606,7 @@
         <p:spPr>
           <a:xfrm>
             <a:off x="2589212" y="1742696"/>
-            <a:ext cx="7102549" cy="1477328"/>
+            <a:ext cx="7102549" cy="1754326"/>
           </a:xfrm>
           <a:prstGeom prst="rect">
             <a:avLst/>
@@ -20379,7 +20621,7 @@
           <a:p>
             <a:r>
               <a:rPr lang="de-DE" u="sng" dirty="0"/>
-              <a:t>CLR/ALR</a:t>
+              <a:t>PCA</a:t>
             </a:r>
             <a:r>
               <a:rPr lang="de-DE" dirty="0"/>
@@ -20393,7 +20635,7 @@
             </a:pPr>
             <a:r>
               <a:rPr lang="de-DE" dirty="0"/>
-              <a:t>What to do with LR.wt?</a:t>
+              <a:t>Microbiome Preprocessing Machine Learning Pipeline (2021)</a:t>
             </a:r>
           </a:p>
           <a:p>
@@ -20403,7 +20645,7 @@
             </a:pPr>
             <a:r>
               <a:rPr lang="de-DE" dirty="0"/>
-              <a:t>What to do with part.names and part.wt?</a:t>
+              <a:t>Proposes to use PCA as hierarchy reduction </a:t>
             </a:r>
           </a:p>
           <a:p>
@@ -20413,56 +20655,7 @@
             </a:pPr>
             <a:r>
               <a:rPr lang="de-DE" dirty="0"/>
-              <a:t>Column names ALR?</a:t>
-            </a:r>
-          </a:p>
-          <a:p>
-            <a:endParaRPr lang="de-DE" dirty="0"/>
-          </a:p>
-        </p:txBody>
-      </p:sp>
-      <p:sp>
-        <p:nvSpPr>
-          <p:cNvPr id="8" name="TextBox 7">
-            <a:extLst>
-              <a:ext uri="{FF2B5EF4-FFF2-40B4-BE49-F238E27FC236}">
-                <a16:creationId xmlns:a16="http://schemas.microsoft.com/office/drawing/2014/main" id="{42B7B4AF-462B-468E-AAF9-0BB332281A81}"/>
-              </a:ext>
-            </a:extLst>
-          </p:cNvPr>
-          <p:cNvSpPr txBox="1"/>
-          <p:nvPr/>
-        </p:nvSpPr>
-        <p:spPr>
-          <a:xfrm>
-            <a:off x="2589212" y="3278973"/>
-            <a:ext cx="7102549" cy="923330"/>
-          </a:xfrm>
-          <a:prstGeom prst="rect">
-            <a:avLst/>
-          </a:prstGeom>
-          <a:noFill/>
-        </p:spPr>
-        <p:txBody>
-          <a:bodyPr wrap="square" rtlCol="0">
-            <a:spAutoFit/>
-          </a:bodyPr>
-          <a:lstStyle/>
-          <a:p>
-            <a:r>
-              <a:rPr lang="de-DE" u="sng" dirty="0"/>
-              <a:t>EstMB:</a:t>
-            </a:r>
-            <a:endParaRPr lang="de-DE" dirty="0"/>
-          </a:p>
-          <a:p>
-            <a:pPr marL="285750" indent="-285750">
-              <a:buFontTx/>
-              <a:buChar char="-"/>
-            </a:pPr>
-            <a:r>
-              <a:rPr lang="de-DE" dirty="0"/>
-              <a:t>Needs a lot of time for ALR -&gt; solved in HPC?</a:t>
+              <a:t>Families can be clustered and genus is not necessary</a:t>
             </a:r>
           </a:p>
           <a:p>
@@ -20473,7 +20666,7 @@
     </p:spTree>
     <p:extLst>
       <p:ext uri="{BB962C8B-B14F-4D97-AF65-F5344CB8AC3E}">
-        <p14:creationId xmlns:p14="http://schemas.microsoft.com/office/powerpoint/2010/main" val="3441935650"/>
+        <p14:creationId xmlns:p14="http://schemas.microsoft.com/office/powerpoint/2010/main" val="2182919606"/>
       </p:ext>
     </p:extLst>
   </p:cSld>
@@ -20518,43 +20711,16 @@
         </p:nvSpPr>
         <p:spPr/>
         <p:txBody>
-          <a:bodyPr/>
+          <a:bodyPr>
+            <a:normAutofit/>
+          </a:bodyPr>
           <a:lstStyle/>
           <a:p>
             <a:r>
-              <a:rPr lang="de-DE" b="1" dirty="0"/>
-              <a:t>Hierarchy dimensionality reduction</a:t>
-            </a:r>
-            <a:endParaRPr lang="en-US" b="1" dirty="0"/>
-          </a:p>
-        </p:txBody>
-      </p:sp>
-      <p:sp>
-        <p:nvSpPr>
-          <p:cNvPr id="5" name="Footer Placeholder 4">
-            <a:extLst>
-              <a:ext uri="{FF2B5EF4-FFF2-40B4-BE49-F238E27FC236}">
-                <a16:creationId xmlns:a16="http://schemas.microsoft.com/office/drawing/2014/main" id="{707C4F70-832A-416B-9491-EE86347B2812}"/>
-              </a:ext>
-            </a:extLst>
-          </p:cNvPr>
-          <p:cNvSpPr>
-            <a:spLocks noGrp="1"/>
-          </p:cNvSpPr>
-          <p:nvPr>
-            <p:ph type="ftr" sz="quarter" idx="11"/>
-          </p:nvPr>
-        </p:nvSpPr>
-        <p:spPr/>
-        <p:txBody>
-          <a:bodyPr/>
-          <a:lstStyle/>
-          <a:p>
-            <a:r>
-              <a:rPr lang="en-US"/>
-              <a:t>jennifer.neumaier@t-online.de</a:t>
-            </a:r>
-            <a:endParaRPr lang="en-US" dirty="0"/>
+              <a:rPr lang="de-DE" sz="3200" b="1" dirty="0"/>
+              <a:t>mikropml</a:t>
+            </a:r>
+            <a:endParaRPr lang="en-US" sz="3200" b="1" dirty="0"/>
           </a:p>
         </p:txBody>
       </p:sp>
@@ -20590,10 +20756,10 @@
       </p:sp>
       <p:sp>
         <p:nvSpPr>
-          <p:cNvPr id="26" name="TextBox 25">
+          <p:cNvPr id="8" name="TextBox 7">
             <a:extLst>
               <a:ext uri="{FF2B5EF4-FFF2-40B4-BE49-F238E27FC236}">
-                <a16:creationId xmlns:a16="http://schemas.microsoft.com/office/drawing/2014/main" id="{CC7BEBFF-3D20-441C-B1B2-0CE34904FDE4}"/>
+                <a16:creationId xmlns:a16="http://schemas.microsoft.com/office/drawing/2014/main" id="{C9FAD4F5-81D5-4890-8BB5-F06C93EDD254}"/>
               </a:ext>
             </a:extLst>
           </p:cNvPr>
@@ -20602,8 +20768,8 @@
         </p:nvSpPr>
         <p:spPr>
           <a:xfrm>
-            <a:off x="1698819" y="1152907"/>
-            <a:ext cx="3654858" cy="400110"/>
+            <a:off x="1392866" y="1268569"/>
+            <a:ext cx="8753253" cy="5509200"/>
           </a:xfrm>
           <a:prstGeom prst="rect">
             <a:avLst/>
@@ -20611,94 +20777,172 @@
           <a:noFill/>
         </p:spPr>
         <p:txBody>
-          <a:bodyPr wrap="square" rtlCol="0">
+          <a:bodyPr wrap="square">
             <a:spAutoFit/>
           </a:bodyPr>
           <a:lstStyle/>
           <a:p>
             <a:r>
-              <a:rPr lang="de-DE" sz="2000" i="1" dirty="0"/>
-              <a:t>Problems and Notes</a:t>
-            </a:r>
-          </a:p>
-        </p:txBody>
-      </p:sp>
-      <p:sp>
-        <p:nvSpPr>
-          <p:cNvPr id="7" name="TextBox 6">
-            <a:extLst>
-              <a:ext uri="{FF2B5EF4-FFF2-40B4-BE49-F238E27FC236}">
-                <a16:creationId xmlns:a16="http://schemas.microsoft.com/office/drawing/2014/main" id="{B43BF96F-7A11-4087-9B01-CF6AACD20E04}"/>
-              </a:ext>
-            </a:extLst>
-          </p:cNvPr>
-          <p:cNvSpPr txBox="1"/>
-          <p:nvPr/>
-        </p:nvSpPr>
-        <p:spPr>
-          <a:xfrm>
-            <a:off x="2589212" y="1742696"/>
-            <a:ext cx="7102549" cy="1754326"/>
-          </a:xfrm>
-          <a:prstGeom prst="rect">
-            <a:avLst/>
-          </a:prstGeom>
-          <a:noFill/>
-        </p:spPr>
-        <p:txBody>
-          <a:bodyPr wrap="square" rtlCol="0">
-            <a:spAutoFit/>
-          </a:bodyPr>
-          <a:lstStyle/>
-          <a:p>
-            <a:r>
-              <a:rPr lang="de-DE" u="sng" dirty="0"/>
-              <a:t>PCA</a:t>
-            </a:r>
-            <a:r>
-              <a:rPr lang="de-DE" dirty="0"/>
-              <a:t>:</a:t>
-            </a:r>
-          </a:p>
-          <a:p>
-            <a:pPr marL="285750" indent="-285750">
-              <a:buFontTx/>
-              <a:buChar char="-"/>
-            </a:pPr>
-            <a:r>
-              <a:rPr lang="de-DE" dirty="0"/>
-              <a:t>Microbiome Preprocessing Machine Learning Pipeline (2021)</a:t>
-            </a:r>
-          </a:p>
-          <a:p>
-            <a:pPr marL="285750" indent="-285750">
-              <a:buFontTx/>
-              <a:buChar char="-"/>
-            </a:pPr>
-            <a:r>
-              <a:rPr lang="de-DE" dirty="0"/>
-              <a:t>Proposes to use PCA as hierarchy reduction </a:t>
-            </a:r>
-          </a:p>
-          <a:p>
-            <a:pPr marL="285750" indent="-285750">
-              <a:buFontTx/>
-              <a:buChar char="-"/>
-            </a:pPr>
-            <a:r>
-              <a:rPr lang="de-DE" dirty="0"/>
-              <a:t>Families can be clustered and genus is not necessary</a:t>
-            </a:r>
-          </a:p>
-          <a:p>
-            <a:endParaRPr lang="de-DE" dirty="0"/>
+              <a:rPr lang="de-DE" sz="1100" dirty="0"/>
+              <a:t>Testing out mikropml as it already has a function run_ml() that incorporates nested cross-validation for several standard supervised machine learning models:</a:t>
+            </a:r>
+          </a:p>
+          <a:p>
+            <a:endParaRPr lang="de-DE" sz="1100" dirty="0"/>
+          </a:p>
+          <a:p>
+            <a:r>
+              <a:rPr lang="de-DE" sz="1100" dirty="0"/>
+              <a:t>    Logistic/multiclass/linear regression ("glmnet")</a:t>
+            </a:r>
+          </a:p>
+          <a:p>
+            <a:r>
+              <a:rPr lang="de-DE" sz="1100" dirty="0"/>
+              <a:t>    Random forest ("rf")</a:t>
+            </a:r>
+          </a:p>
+          <a:p>
+            <a:r>
+              <a:rPr lang="de-DE" sz="1100" dirty="0"/>
+              <a:t>    Decision tree ("rpart2")</a:t>
+            </a:r>
+          </a:p>
+          <a:p>
+            <a:r>
+              <a:rPr lang="de-DE" sz="1100" dirty="0"/>
+              <a:t>    Support vector machine with a radial basis kernel ("svmRadial")</a:t>
+            </a:r>
+          </a:p>
+          <a:p>
+            <a:r>
+              <a:rPr lang="de-DE" sz="1100" dirty="0"/>
+              <a:t>    xgboost ("xgbTree")</a:t>
+            </a:r>
+          </a:p>
+          <a:p>
+            <a:endParaRPr lang="de-DE" sz="1100" dirty="0"/>
+          </a:p>
+          <a:p>
+            <a:r>
+              <a:rPr lang="de-DE" sz="1100" dirty="0"/>
+              <a:t>Test it here for linear regression and xgboost.</a:t>
+            </a:r>
+          </a:p>
+          <a:p>
+            <a:r>
+              <a:rPr lang="de-DE" sz="1100" dirty="0"/>
+              <a:t>Function run_ml has several parameters:</a:t>
+            </a:r>
+          </a:p>
+          <a:p>
+            <a:r>
+              <a:rPr lang="de-DE" sz="1100" dirty="0"/>
+              <a:t>           dataset,</a:t>
+            </a:r>
+          </a:p>
+          <a:p>
+            <a:r>
+              <a:rPr lang="de-DE" sz="1100" dirty="0"/>
+              <a:t>           method,</a:t>
+            </a:r>
+          </a:p>
+          <a:p>
+            <a:r>
+              <a:rPr lang="de-DE" sz="1100" dirty="0"/>
+              <a:t>           outcome_colname = NULL, (standardized the first column)</a:t>
+            </a:r>
+          </a:p>
+          <a:p>
+            <a:r>
+              <a:rPr lang="de-DE" sz="1100" dirty="0"/>
+              <a:t>           hyperparameters = NULL,</a:t>
+            </a:r>
+          </a:p>
+          <a:p>
+            <a:r>
+              <a:rPr lang="de-DE" sz="1100" dirty="0"/>
+              <a:t>           find_feature_importance = FALSE, (`TRUE` is recommended if you would like to identify features important for predicting your                                                outcome, but it is resource-intensive.</a:t>
+            </a:r>
+          </a:p>
+          <a:p>
+            <a:r>
+              <a:rPr lang="de-DE" sz="1100" dirty="0"/>
+              <a:t>           calculate_performance = TRUE,</a:t>
+            </a:r>
+          </a:p>
+          <a:p>
+            <a:r>
+              <a:rPr lang="de-DE" sz="1100" dirty="0"/>
+              <a:t>           kfold = 5, (standard at 5)</a:t>
+            </a:r>
+          </a:p>
+          <a:p>
+            <a:r>
+              <a:rPr lang="de-DE" sz="1100" dirty="0"/>
+              <a:t>           cv_times = 100, (standard at 100)</a:t>
+            </a:r>
+          </a:p>
+          <a:p>
+            <a:r>
+              <a:rPr lang="de-DE" sz="1100" dirty="0"/>
+              <a:t>           cross_val = NULL, (cross_val a custom cross-validation scheme from `caret::trainControl()` (default: `NULL`, uses `kfold` cross                              validation repeated `cv_times`). `kfold` and `cv_times` are ignored if the user provides a custom                                          cross-validation scheme.)</a:t>
+            </a:r>
+          </a:p>
+          <a:p>
+            <a:r>
+              <a:rPr lang="de-DE" sz="1100" dirty="0"/>
+              <a:t>           training_frac = 0.8, (standard at 0.8)</a:t>
+            </a:r>
+          </a:p>
+          <a:p>
+            <a:r>
+              <a:rPr lang="de-DE" sz="1100" dirty="0"/>
+              <a:t>           perf_metric_function = NULL,</a:t>
+            </a:r>
+          </a:p>
+          <a:p>
+            <a:r>
+              <a:rPr lang="de-DE" sz="1100" dirty="0"/>
+              <a:t>           perf_metric_name = NULL,</a:t>
+            </a:r>
+          </a:p>
+          <a:p>
+            <a:r>
+              <a:rPr lang="de-DE" sz="1100" dirty="0"/>
+              <a:t>           groups = NULL,</a:t>
+            </a:r>
+          </a:p>
+          <a:p>
+            <a:r>
+              <a:rPr lang="de-DE" sz="1100" dirty="0"/>
+              <a:t>           group_partitions = NULL,</a:t>
+            </a:r>
+          </a:p>
+          <a:p>
+            <a:r>
+              <a:rPr lang="de-DE" sz="1100" dirty="0"/>
+              <a:t>           corr_thresh = 1,</a:t>
+            </a:r>
+          </a:p>
+          <a:p>
+            <a:r>
+              <a:rPr lang="de-DE" sz="1100" dirty="0"/>
+              <a:t>           ntree = 1000, (For random forest, how many trees to use (default: `1000`). Caret doesn't allow this hyperparameter to be tuned)</a:t>
+            </a:r>
+          </a:p>
+          <a:p>
+            <a:r>
+              <a:rPr lang="de-DE" sz="1100" dirty="0"/>
+              <a:t>           seed = NA (set seed for reproducibility)</a:t>
+            </a:r>
           </a:p>
         </p:txBody>
       </p:sp>
     </p:spTree>
     <p:extLst>
       <p:ext uri="{BB962C8B-B14F-4D97-AF65-F5344CB8AC3E}">
-        <p14:creationId xmlns:p14="http://schemas.microsoft.com/office/powerpoint/2010/main" val="2182919606"/>
+        <p14:creationId xmlns:p14="http://schemas.microsoft.com/office/powerpoint/2010/main" val="3541464901"/>
       </p:ext>
     </p:extLst>
   </p:cSld>
@@ -20850,7 +21094,7 @@
           <a:p>
             <a:fld id="{5A2DBB50-F561-45B0-9BE5-95A455D2CD8B}" type="datetime1">
               <a:rPr lang="en-US" smtClean="0"/>
-              <a:t>4/14/2022</a:t>
+              <a:t>4/16/2022</a:t>
             </a:fld>
             <a:endParaRPr lang="en-US" dirty="0"/>
           </a:p>
@@ -21043,7 +21287,7 @@
           <a:p>
             <a:fld id="{BDD716FE-4A5D-4A13-A8EE-37F9C34BE666}" type="datetime1">
               <a:rPr lang="en-US" smtClean="0"/>
-              <a:t>4/14/2022</a:t>
+              <a:t>4/16/2022</a:t>
             </a:fld>
             <a:endParaRPr lang="en-US" dirty="0"/>
           </a:p>
@@ -21319,7 +21563,7 @@
           <a:p>
             <a:fld id="{5A2DBB50-F561-45B0-9BE5-95A455D2CD8B}" type="datetime1">
               <a:rPr lang="en-US" smtClean="0"/>
-              <a:t>4/14/2022</a:t>
+              <a:t>4/16/2022</a:t>
             </a:fld>
             <a:endParaRPr lang="en-US" dirty="0"/>
           </a:p>
@@ -21527,7 +21771,7 @@
           <a:p>
             <a:fld id="{5A2DBB50-F561-45B0-9BE5-95A455D2CD8B}" type="datetime1">
               <a:rPr lang="en-US" smtClean="0"/>
-              <a:t>4/14/2022</a:t>
+              <a:t>4/16/2022</a:t>
             </a:fld>
             <a:endParaRPr lang="en-US" dirty="0"/>
           </a:p>
@@ -21775,7 +22019,7 @@
             <a:fld id="{36D18B76-5E8B-4456-8722-FC5B14B0F354}" type="datetime1">
               <a:rPr lang="en-US" smtClean="0"/>
               <a:pPr/>
-              <a:t>4/14/2022</a:t>
+              <a:t>4/16/2022</a:t>
             </a:fld>
             <a:endParaRPr lang="en-US" dirty="0"/>
           </a:p>
@@ -21979,7 +22223,7 @@
           <a:p>
             <a:fld id="{93673764-947C-4E64-9BD5-474B9E9D9329}" type="datetime1">
               <a:rPr lang="en-US" smtClean="0"/>
-              <a:t>4/14/2022</a:t>
+              <a:t>4/16/2022</a:t>
             </a:fld>
             <a:endParaRPr lang="en-US" dirty="0"/>
           </a:p>
@@ -22131,7 +22375,7 @@
           <a:p>
             <a:fld id="{BCCEB706-B4FB-4DF7-BDF7-514AEA7F06D0}" type="datetime1">
               <a:rPr lang="en-US" smtClean="0"/>
-              <a:t>4/14/2022</a:t>
+              <a:t>4/16/2022</a:t>
             </a:fld>
             <a:endParaRPr lang="en-US" dirty="0"/>
           </a:p>
@@ -25192,7 +25436,7 @@
           <a:p>
             <a:fld id="{524BA6AA-761D-44D9-9696-AC66CE044BF5}" type="datetime1">
               <a:rPr lang="en-US" smtClean="0"/>
-              <a:t>4/14/2022</a:t>
+              <a:t>4/16/2022</a:t>
             </a:fld>
             <a:endParaRPr lang="en-US" dirty="0"/>
           </a:p>
@@ -25379,7 +25623,7 @@
           <a:p>
             <a:fld id="{7BB4AFEC-4BE7-4504-8846-4BF0CCFD9721}" type="datetime1">
               <a:rPr lang="en-US" smtClean="0"/>
-              <a:t>4/14/2022</a:t>
+              <a:t>4/16/2022</a:t>
             </a:fld>
             <a:endParaRPr lang="en-US" dirty="0"/>
           </a:p>
@@ -25556,7 +25800,7 @@
             <a:fld id="{36D18B76-5E8B-4456-8722-FC5B14B0F354}" type="datetime1">
               <a:rPr lang="en-US" smtClean="0"/>
               <a:pPr/>
-              <a:t>4/14/2022</a:t>
+              <a:t>4/16/2022</a:t>
             </a:fld>
             <a:endParaRPr lang="en-US" dirty="0"/>
           </a:p>
@@ -25687,6 +25931,225 @@
             <a:r>
               <a:rPr lang="de-DE" i="1" dirty="0"/>
               <a:t>https://wiki.ut.ee/pages/viewpage.action?pageId=17105590</a:t>
+            </a:r>
+          </a:p>
+        </p:txBody>
+      </p:sp>
+      <p:sp>
+        <p:nvSpPr>
+          <p:cNvPr id="9" name="TextBox 8">
+            <a:extLst>
+              <a:ext uri="{FF2B5EF4-FFF2-40B4-BE49-F238E27FC236}">
+                <a16:creationId xmlns:a16="http://schemas.microsoft.com/office/drawing/2014/main" id="{0248CD27-F473-4017-9292-92C549603E85}"/>
+              </a:ext>
+            </a:extLst>
+          </p:cNvPr>
+          <p:cNvSpPr txBox="1"/>
+          <p:nvPr/>
+        </p:nvSpPr>
+        <p:spPr>
+          <a:xfrm>
+            <a:off x="359072" y="3574900"/>
+            <a:ext cx="6097904" cy="646331"/>
+          </a:xfrm>
+          <a:prstGeom prst="rect">
+            <a:avLst/>
+          </a:prstGeom>
+          <a:noFill/>
+        </p:spPr>
+        <p:txBody>
+          <a:bodyPr wrap="square">
+            <a:spAutoFit/>
+          </a:bodyPr>
+          <a:lstStyle/>
+          <a:p>
+            <a:r>
+              <a:rPr lang="en-US" b="0" i="0" dirty="0" err="1">
+                <a:effectLst/>
+                <a:latin typeface="Slack-Lato"/>
+              </a:rPr>
+              <a:t>MAin</a:t>
+            </a:r>
+            <a:r>
+              <a:rPr lang="en-US" b="0" i="0" dirty="0">
+                <a:effectLst/>
+                <a:latin typeface="Slack-Lato"/>
+              </a:rPr>
+              <a:t> command for running codes in server:</a:t>
+            </a:r>
+            <a:br>
+              <a:rPr lang="en-US" dirty="0"/>
+            </a:br>
+            <a:r>
+              <a:rPr lang="en-US" b="0" i="0" dirty="0">
+                <a:effectLst/>
+                <a:latin typeface="Slack-Lato"/>
+              </a:rPr>
+              <a:t>R --slave --vanilla --</a:t>
+            </a:r>
+            <a:r>
+              <a:rPr lang="en-US" b="0" i="0" dirty="0" err="1">
+                <a:effectLst/>
+                <a:latin typeface="Slack-Lato"/>
+              </a:rPr>
+              <a:t>args</a:t>
+            </a:r>
+            <a:r>
+              <a:rPr lang="en-US" b="0" i="0" dirty="0">
+                <a:effectLst/>
+                <a:latin typeface="Slack-Lato"/>
+              </a:rPr>
+              <a:t> arg1 arg2 &lt; </a:t>
+            </a:r>
+            <a:r>
+              <a:rPr lang="en-US" b="0" i="0" dirty="0" err="1">
+                <a:effectLst/>
+                <a:latin typeface="Slack-Lato"/>
+              </a:rPr>
+              <a:t>script_name.R</a:t>
+            </a:r>
+            <a:r>
+              <a:rPr lang="en-US" b="0" i="0" dirty="0">
+                <a:effectLst/>
+                <a:latin typeface="Slack-Lato"/>
+              </a:rPr>
+              <a:t> &amp;</a:t>
+            </a:r>
+            <a:endParaRPr lang="de-DE" dirty="0"/>
+          </a:p>
+        </p:txBody>
+      </p:sp>
+      <p:sp>
+        <p:nvSpPr>
+          <p:cNvPr id="11" name="TextBox 10">
+            <a:extLst>
+              <a:ext uri="{FF2B5EF4-FFF2-40B4-BE49-F238E27FC236}">
+                <a16:creationId xmlns:a16="http://schemas.microsoft.com/office/drawing/2014/main" id="{F5D63806-4477-427B-9A97-12C7EF82A101}"/>
+              </a:ext>
+            </a:extLst>
+          </p:cNvPr>
+          <p:cNvSpPr txBox="1"/>
+          <p:nvPr/>
+        </p:nvSpPr>
+        <p:spPr>
+          <a:xfrm>
+            <a:off x="359072" y="4578355"/>
+            <a:ext cx="6097904" cy="1200329"/>
+          </a:xfrm>
+          <a:prstGeom prst="rect">
+            <a:avLst/>
+          </a:prstGeom>
+          <a:noFill/>
+        </p:spPr>
+        <p:txBody>
+          <a:bodyPr wrap="square">
+            <a:spAutoFit/>
+          </a:bodyPr>
+          <a:lstStyle/>
+          <a:p>
+            <a:pPr algn="l"/>
+            <a:r>
+              <a:rPr lang="en-US" b="0" i="0" dirty="0">
+                <a:effectLst/>
+                <a:latin typeface="Slack-Lato"/>
+              </a:rPr>
+              <a:t>"top" - to look at the server load</a:t>
+            </a:r>
+            <a:br>
+              <a:rPr lang="en-US" b="0" i="0" dirty="0">
+                <a:effectLst/>
+                <a:latin typeface="Slack-Lato"/>
+              </a:rPr>
+            </a:br>
+            <a:r>
+              <a:rPr lang="en-US" b="0" i="0" dirty="0">
+                <a:effectLst/>
+                <a:latin typeface="Slack-Lato"/>
+              </a:rPr>
+              <a:t>"q" to exit</a:t>
+            </a:r>
+          </a:p>
+          <a:p>
+            <a:pPr algn="r"/>
+            <a:r>
+              <a:rPr lang="en-US" b="0" i="0" u="none" strike="noStrike" dirty="0">
+                <a:solidFill>
+                  <a:srgbClr val="8E58B6"/>
+                </a:solidFill>
+                <a:effectLst/>
+                <a:latin typeface="Slack-Lato"/>
+                <a:hlinkClick r:id="rId3">
+                  <a:extLst>
+                    <a:ext uri="{A12FA001-AC4F-418D-AE19-62706E023703}">
+                      <ahyp:hlinkClr xmlns:ahyp="http://schemas.microsoft.com/office/drawing/2018/hyperlinkcolor" val="tx"/>
+                    </a:ext>
+                  </a:extLst>
+                </a:hlinkClick>
+              </a:rPr>
+              <a:t>14:00 </a:t>
+            </a:r>
+            <a:r>
+              <a:rPr lang="en-US" b="0" i="0" u="none" strike="noStrike" dirty="0" err="1">
+                <a:effectLst/>
+                <a:latin typeface="Slack-Lato"/>
+                <a:hlinkClick r:id="rId3">
+                  <a:extLst>
+                    <a:ext uri="{A12FA001-AC4F-418D-AE19-62706E023703}">
+                      <ahyp:hlinkClr xmlns:ahyp="http://schemas.microsoft.com/office/drawing/2018/hyperlinkcolor" val="tx"/>
+                    </a:ext>
+                  </a:extLst>
+                </a:hlinkClick>
+              </a:rPr>
+              <a:t>Uhr</a:t>
+            </a:r>
+            <a:endParaRPr lang="en-US" b="0" i="0" dirty="0">
+              <a:effectLst/>
+              <a:latin typeface="Slack-Lato"/>
+            </a:endParaRPr>
+          </a:p>
+          <a:p>
+            <a:pPr algn="l"/>
+            <a:r>
+              <a:rPr lang="en-US" b="0" i="0" dirty="0">
+                <a:effectLst/>
+                <a:latin typeface="Slack-Lato"/>
+              </a:rPr>
+              <a:t>Use "logout" to exit the session</a:t>
+            </a:r>
+          </a:p>
+        </p:txBody>
+      </p:sp>
+      <p:sp>
+        <p:nvSpPr>
+          <p:cNvPr id="13" name="TextBox 12">
+            <a:extLst>
+              <a:ext uri="{FF2B5EF4-FFF2-40B4-BE49-F238E27FC236}">
+                <a16:creationId xmlns:a16="http://schemas.microsoft.com/office/drawing/2014/main" id="{4EDF7AD9-8FD4-4D61-AB63-F291F22FDF16}"/>
+              </a:ext>
+            </a:extLst>
+          </p:cNvPr>
+          <p:cNvSpPr txBox="1"/>
+          <p:nvPr/>
+        </p:nvSpPr>
+        <p:spPr>
+          <a:xfrm>
+            <a:off x="301307" y="1421242"/>
+            <a:ext cx="6097904" cy="369332"/>
+          </a:xfrm>
+          <a:prstGeom prst="rect">
+            <a:avLst/>
+          </a:prstGeom>
+          <a:noFill/>
+        </p:spPr>
+        <p:txBody>
+          <a:bodyPr wrap="square">
+            <a:spAutoFit/>
+          </a:bodyPr>
+          <a:lstStyle/>
+          <a:p>
+            <a:r>
+              <a:rPr lang="de-DE" dirty="0"/>
+              <a:t>https://linuxize.com/post/how-to-use-linux-screen/</a:t>
             </a:r>
           </a:p>
         </p:txBody>
@@ -25778,7 +26241,7 @@
           <a:p>
             <a:fld id="{1F2A6BD5-D000-45AE-BE81-365EBD12526C}" type="datetime1">
               <a:rPr lang="en-US" smtClean="0"/>
-              <a:t>4/14/2022</a:t>
+              <a:t>4/16/2022</a:t>
             </a:fld>
             <a:endParaRPr lang="en-US" dirty="0"/>
           </a:p>
@@ -26224,7 +26687,7 @@
           <a:p>
             <a:fld id="{A70B3D3E-FC47-4E47-BC37-6E33025EDD36}" type="datetime1">
               <a:rPr lang="en-US" smtClean="0"/>
-              <a:t>4/14/2022</a:t>
+              <a:t>4/16/2022</a:t>
             </a:fld>
             <a:endParaRPr lang="en-US" dirty="0"/>
           </a:p>

</xml_diff>

<commit_message>
compared leaky and nonleaky preprocessing
</commit_message>
<xml_diff>
--- a/doc/Project_structure_notes.pptx
+++ b/doc/Project_structure_notes.pptx
@@ -5,7 +5,7 @@
     <p:sldMasterId id="2147483702" r:id="rId1"/>
   </p:sldMasterIdLst>
   <p:notesMasterIdLst>
-    <p:notesMasterId r:id="rId32"/>
+    <p:notesMasterId r:id="rId35"/>
   </p:notesMasterIdLst>
   <p:sldIdLst>
     <p:sldId id="256" r:id="rId2"/>
@@ -27,17 +27,20 @@
     <p:sldId id="286" r:id="rId18"/>
     <p:sldId id="288" r:id="rId19"/>
     <p:sldId id="289" r:id="rId20"/>
-    <p:sldId id="277" r:id="rId21"/>
-    <p:sldId id="279" r:id="rId22"/>
-    <p:sldId id="278" r:id="rId23"/>
-    <p:sldId id="290" r:id="rId24"/>
-    <p:sldId id="269" r:id="rId25"/>
-    <p:sldId id="263" r:id="rId26"/>
-    <p:sldId id="258" r:id="rId27"/>
-    <p:sldId id="270" r:id="rId28"/>
-    <p:sldId id="284" r:id="rId29"/>
-    <p:sldId id="257" r:id="rId30"/>
-    <p:sldId id="268" r:id="rId31"/>
+    <p:sldId id="291" r:id="rId21"/>
+    <p:sldId id="292" r:id="rId22"/>
+    <p:sldId id="293" r:id="rId23"/>
+    <p:sldId id="277" r:id="rId24"/>
+    <p:sldId id="279" r:id="rId25"/>
+    <p:sldId id="278" r:id="rId26"/>
+    <p:sldId id="290" r:id="rId27"/>
+    <p:sldId id="269" r:id="rId28"/>
+    <p:sldId id="263" r:id="rId29"/>
+    <p:sldId id="258" r:id="rId30"/>
+    <p:sldId id="270" r:id="rId31"/>
+    <p:sldId id="284" r:id="rId32"/>
+    <p:sldId id="257" r:id="rId33"/>
+    <p:sldId id="268" r:id="rId34"/>
   </p:sldIdLst>
   <p:sldSz cx="12192000" cy="6858000"/>
   <p:notesSz cx="6858000" cy="9144000"/>
@@ -172,6 +175,13 @@
             <p14:sldId id="286"/>
             <p14:sldId id="288"/>
             <p14:sldId id="289"/>
+          </p14:sldIdLst>
+        </p14:section>
+        <p14:section name="Transformation and leaky data" id="{A9654551-66A8-46E1-A952-47B22CF6C4D7}">
+          <p14:sldIdLst>
+            <p14:sldId id="291"/>
+            <p14:sldId id="292"/>
+            <p14:sldId id="293"/>
           </p14:sldIdLst>
         </p14:section>
         <p14:section name="Notes" id="{BD5F37D2-34EC-4962-982B-3F5187946EDA}">
@@ -7182,7 +7192,7 @@
           <a:p>
             <a:fld id="{0D3712C0-BD94-4EDD-81B8-404EF18DF498}" type="datetimeFigureOut">
               <a:rPr lang="en-US" smtClean="0"/>
-              <a:t>4/16/2022</a:t>
+              <a:t>4/20/2022</a:t>
             </a:fld>
             <a:endParaRPr lang="en-US"/>
           </a:p>
@@ -7637,7 +7647,7 @@
           <a:p>
             <a:fld id="{843A20DD-8926-4B91-8D72-D1DC7F5C31EF}" type="datetime1">
               <a:rPr lang="en-US" smtClean="0"/>
-              <a:t>4/16/2022</a:t>
+              <a:t>4/20/2022</a:t>
             </a:fld>
             <a:endParaRPr lang="en-US" dirty="0"/>
           </a:p>
@@ -7980,7 +7990,7 @@
           <a:p>
             <a:fld id="{D2DD2B10-BCB9-40E5-8141-F17001376370}" type="datetime1">
               <a:rPr lang="en-US" smtClean="0"/>
-              <a:t>4/16/2022</a:t>
+              <a:t>4/20/2022</a:t>
             </a:fld>
             <a:endParaRPr lang="en-US" dirty="0"/>
           </a:p>
@@ -8386,7 +8396,7 @@
           <a:p>
             <a:fld id="{927FFA6D-4E8C-437E-BCA1-3CF73EB8B252}" type="datetime1">
               <a:rPr lang="en-US" smtClean="0"/>
-              <a:t>4/16/2022</a:t>
+              <a:t>4/20/2022</a:t>
             </a:fld>
             <a:endParaRPr lang="en-US" dirty="0"/>
           </a:p>
@@ -8727,7 +8737,7 @@
           <a:p>
             <a:fld id="{A2C7F92B-2A35-4C09-8346-C40AAA997302}" type="datetime1">
               <a:rPr lang="en-US" smtClean="0"/>
-              <a:t>4/16/2022</a:t>
+              <a:t>4/20/2022</a:t>
             </a:fld>
             <a:endParaRPr lang="en-US" dirty="0"/>
           </a:p>
@@ -9053,7 +9063,7 @@
           <a:p>
             <a:fld id="{A2C7F92B-2A35-4C09-8346-C40AAA997302}" type="datetime1">
               <a:rPr lang="en-US" smtClean="0"/>
-              <a:t>4/16/2022</a:t>
+              <a:t>4/20/2022</a:t>
             </a:fld>
             <a:endParaRPr lang="en-US" dirty="0"/>
           </a:p>
@@ -9455,7 +9465,7 @@
           <a:p>
             <a:fld id="{A2C7F92B-2A35-4C09-8346-C40AAA997302}" type="datetime1">
               <a:rPr lang="en-US" smtClean="0"/>
-              <a:t>4/16/2022</a:t>
+              <a:t>4/20/2022</a:t>
             </a:fld>
             <a:endParaRPr lang="en-US" dirty="0"/>
           </a:p>
@@ -9718,7 +9728,7 @@
           <a:p>
             <a:fld id="{8A427DC1-41D9-41ED-AAB7-DF919DFB0B7D}" type="datetime1">
               <a:rPr lang="en-US" smtClean="0"/>
-              <a:t>4/16/2022</a:t>
+              <a:t>4/20/2022</a:t>
             </a:fld>
             <a:endParaRPr lang="en-US" dirty="0"/>
           </a:p>
@@ -9985,7 +9995,7 @@
           <a:p>
             <a:fld id="{49530F64-B6F9-41E5-8499-9B56B7F93996}" type="datetime1">
               <a:rPr lang="en-US" smtClean="0"/>
-              <a:t>4/16/2022</a:t>
+              <a:t>4/20/2022</a:t>
             </a:fld>
             <a:endParaRPr lang="en-US" dirty="0"/>
           </a:p>
@@ -10256,7 +10266,7 @@
             <a:fld id="{36D18B76-5E8B-4456-8722-FC5B14B0F354}" type="datetime1">
               <a:rPr lang="en-US" smtClean="0"/>
               <a:pPr/>
-              <a:t>4/16/2022</a:t>
+              <a:t>4/20/2022</a:t>
             </a:fld>
             <a:endParaRPr lang="en-US" dirty="0"/>
           </a:p>
@@ -10594,7 +10604,7 @@
           <a:p>
             <a:fld id="{3E914A3D-A565-477F-8682-1AE6EFE36557}" type="datetime1">
               <a:rPr lang="en-US" smtClean="0"/>
-              <a:t>4/16/2022</a:t>
+              <a:t>4/20/2022</a:t>
             </a:fld>
             <a:endParaRPr lang="en-US" dirty="0"/>
           </a:p>
@@ -10922,7 +10932,7 @@
           <a:p>
             <a:fld id="{D45A6A21-0914-4A46-BCF1-163E9A00E688}" type="datetime1">
               <a:rPr lang="en-US" smtClean="0"/>
-              <a:t>4/16/2022</a:t>
+              <a:t>4/20/2022</a:t>
             </a:fld>
             <a:endParaRPr lang="en-US" dirty="0"/>
           </a:p>
@@ -11384,7 +11394,7 @@
           <a:p>
             <a:fld id="{6BDD7FCB-B1A7-4982-8C8B-674E644B14B0}" type="datetime1">
               <a:rPr lang="en-US" smtClean="0"/>
-              <a:t>4/16/2022</a:t>
+              <a:t>4/20/2022</a:t>
             </a:fld>
             <a:endParaRPr lang="en-US" dirty="0"/>
           </a:p>
@@ -11604,7 +11614,7 @@
             <a:fld id="{4C731089-17FC-4C04-87B1-2157F67F0117}" type="datetime1">
               <a:rPr lang="en-US" smtClean="0"/>
               <a:pPr/>
-              <a:t>4/16/2022</a:t>
+              <a:t>4/20/2022</a:t>
             </a:fld>
             <a:endParaRPr lang="en-US" dirty="0"/>
           </a:p>
@@ -11790,7 +11800,7 @@
           <a:p>
             <a:fld id="{1278D66F-D6E5-4434-B311-7DA25CA81F5A}" type="datetime1">
               <a:rPr lang="en-US" smtClean="0"/>
-              <a:t>4/16/2022</a:t>
+              <a:t>4/20/2022</a:t>
             </a:fld>
             <a:endParaRPr lang="en-US" dirty="0"/>
           </a:p>
@@ -12128,7 +12138,7 @@
           <a:p>
             <a:fld id="{2253374B-0B0C-42C0-A0DF-1550CE3AA116}" type="datetime1">
               <a:rPr lang="en-US" smtClean="0"/>
-              <a:t>4/16/2022</a:t>
+              <a:t>4/20/2022</a:t>
             </a:fld>
             <a:endParaRPr lang="en-US" dirty="0"/>
           </a:p>
@@ -12478,7 +12488,7 @@
           <a:p>
             <a:fld id="{F589A7BC-DDDD-4FB0-A8E7-5046A2EF84B8}" type="datetime1">
               <a:rPr lang="en-US" smtClean="0"/>
-              <a:t>4/16/2022</a:t>
+              <a:t>4/20/2022</a:t>
             </a:fld>
             <a:endParaRPr lang="en-US" dirty="0"/>
           </a:p>
@@ -14600,7 +14610,7 @@
           <a:p>
             <a:fld id="{A2C7F92B-2A35-4C09-8346-C40AAA997302}" type="datetime1">
               <a:rPr lang="en-US" smtClean="0"/>
-              <a:t>4/16/2022</a:t>
+              <a:t>4/20/2022</a:t>
             </a:fld>
             <a:endParaRPr lang="en-US" dirty="0"/>
           </a:p>
@@ -15218,7 +15228,7 @@
           <a:p>
             <a:fld id="{EFFFF5E6-438B-4B86-AF1B-DB82D6C33C1C}" type="datetime1">
               <a:rPr lang="en-US" smtClean="0"/>
-              <a:t>4/16/2022</a:t>
+              <a:t>4/20/2022</a:t>
             </a:fld>
             <a:endParaRPr lang="en-US" dirty="0"/>
           </a:p>
@@ -15588,7 +15598,7 @@
             <a:fld id="{36D18B76-5E8B-4456-8722-FC5B14B0F354}" type="datetime1">
               <a:rPr lang="en-US" smtClean="0"/>
               <a:pPr/>
-              <a:t>4/16/2022</a:t>
+              <a:t>4/20/2022</a:t>
             </a:fld>
             <a:endParaRPr lang="en-US" dirty="0"/>
           </a:p>
@@ -16716,7 +16726,7 @@
             <a:fld id="{36D18B76-5E8B-4456-8722-FC5B14B0F354}" type="datetime1">
               <a:rPr lang="en-US" smtClean="0"/>
               <a:pPr/>
-              <a:t>4/16/2022</a:t>
+              <a:t>4/20/2022</a:t>
             </a:fld>
             <a:endParaRPr lang="en-US" dirty="0"/>
           </a:p>
@@ -19642,7 +19652,7 @@
           <a:p>
             <a:fld id="{1278D66F-D6E5-4434-B311-7DA25CA81F5A}" type="datetime1">
               <a:rPr lang="en-US" smtClean="0"/>
-              <a:t>4/16/2022</a:t>
+              <a:t>4/20/2022</a:t>
             </a:fld>
             <a:endParaRPr lang="en-US" dirty="0"/>
           </a:p>
@@ -19783,14 +19793,16 @@
         </p:nvSpPr>
         <p:spPr/>
         <p:txBody>
-          <a:bodyPr/>
+          <a:bodyPr>
+            <a:normAutofit/>
+          </a:bodyPr>
           <a:lstStyle/>
           <a:p>
             <a:r>
-              <a:rPr lang="de-DE" b="1" dirty="0"/>
-              <a:t>Pre-Processing</a:t>
-            </a:r>
-            <a:endParaRPr lang="en-US" b="1" dirty="0"/>
+              <a:rPr lang="de-DE" sz="3200" b="1" dirty="0"/>
+              <a:t>IDEA</a:t>
+            </a:r>
+            <a:endParaRPr lang="en-US" sz="3200" b="1" dirty="0"/>
           </a:p>
         </p:txBody>
       </p:sp>
@@ -19855,10 +19867,10 @@
       </p:sp>
       <p:sp>
         <p:nvSpPr>
-          <p:cNvPr id="26" name="TextBox 25">
+          <p:cNvPr id="10" name="TextBox 9">
             <a:extLst>
               <a:ext uri="{FF2B5EF4-FFF2-40B4-BE49-F238E27FC236}">
-                <a16:creationId xmlns:a16="http://schemas.microsoft.com/office/drawing/2014/main" id="{CC7BEBFF-3D20-441C-B1B2-0CE34904FDE4}"/>
+                <a16:creationId xmlns:a16="http://schemas.microsoft.com/office/drawing/2014/main" id="{8551B3F8-69A7-4DCB-910B-1046E03BF7CF}"/>
               </a:ext>
             </a:extLst>
           </p:cNvPr>
@@ -19867,8 +19879,8 @@
         </p:nvSpPr>
         <p:spPr>
           <a:xfrm>
-            <a:off x="1698819" y="1152907"/>
-            <a:ext cx="3654858" cy="400110"/>
+            <a:off x="1698819" y="1834296"/>
+            <a:ext cx="7102549" cy="3693319"/>
           </a:xfrm>
           <a:prstGeom prst="rect">
             <a:avLst/>
@@ -19881,58 +19893,13 @@
           </a:bodyPr>
           <a:lstStyle/>
           <a:p>
-            <a:r>
-              <a:rPr lang="de-DE" sz="2000" i="1" dirty="0"/>
-              <a:t>Problems and Notes</a:t>
-            </a:r>
-          </a:p>
-        </p:txBody>
-      </p:sp>
-      <p:sp>
-        <p:nvSpPr>
-          <p:cNvPr id="7" name="TextBox 6">
-            <a:extLst>
-              <a:ext uri="{FF2B5EF4-FFF2-40B4-BE49-F238E27FC236}">
-                <a16:creationId xmlns:a16="http://schemas.microsoft.com/office/drawing/2014/main" id="{B43BF96F-7A11-4087-9B01-CF6AACD20E04}"/>
-              </a:ext>
-            </a:extLst>
-          </p:cNvPr>
-          <p:cNvSpPr txBox="1"/>
-          <p:nvPr/>
-        </p:nvSpPr>
-        <p:spPr>
-          <a:xfrm>
-            <a:off x="1698819" y="1834296"/>
-            <a:ext cx="7102549" cy="1754326"/>
-          </a:xfrm>
-          <a:prstGeom prst="rect">
-            <a:avLst/>
-          </a:prstGeom>
-          <a:noFill/>
-        </p:spPr>
-        <p:txBody>
-          <a:bodyPr wrap="square" rtlCol="0">
-            <a:spAutoFit/>
-          </a:bodyPr>
-          <a:lstStyle/>
-          <a:p>
-            <a:r>
-              <a:rPr lang="de-DE" u="sng" dirty="0"/>
-              <a:t>CRC</a:t>
-            </a:r>
-            <a:r>
-              <a:rPr lang="de-DE" dirty="0"/>
-              <a:t>:</a:t>
-            </a:r>
-          </a:p>
-          <a:p>
             <a:pPr marL="285750" indent="-285750">
               <a:buFontTx/>
               <a:buChar char="-"/>
             </a:pPr>
             <a:r>
               <a:rPr lang="de-DE" dirty="0"/>
-              <a:t>128 rows removed due to NA in BMI</a:t>
+              <a:t>Direct comparison if transformations are a big influence on leaky data</a:t>
             </a:r>
           </a:p>
           <a:p>
@@ -19942,7 +19909,7 @@
             </a:pPr>
             <a:r>
               <a:rPr lang="de-DE" dirty="0"/>
-              <a:t>DE saved separately as holdout </a:t>
+              <a:t>Take CRC data set as it has clear correlations and gives nice control over test set via country codes</a:t>
             </a:r>
           </a:p>
           <a:p>
@@ -19952,7 +19919,27 @@
             </a:pPr>
             <a:r>
               <a:rPr lang="de-DE" dirty="0"/>
-              <a:t>All tests were done with country sets: USA, China, Austria, France</a:t>
+              <a:t>Compare glmnet models with transformation separate on test/train set and on full data set</a:t>
+            </a:r>
+          </a:p>
+          <a:p>
+            <a:pPr marL="285750" indent="-285750">
+              <a:buFontTx/>
+              <a:buChar char="-"/>
+            </a:pPr>
+            <a:r>
+              <a:rPr lang="de-DE" dirty="0"/>
+              <a:t>Test first with two countries and TSS/CLR/ALR</a:t>
+            </a:r>
+          </a:p>
+          <a:p>
+            <a:pPr marL="285750" indent="-285750">
+              <a:buFontTx/>
+              <a:buChar char="-"/>
+            </a:pPr>
+            <a:r>
+              <a:rPr lang="de-DE" dirty="0"/>
+              <a:t>Main interest in ALR </a:t>
             </a:r>
           </a:p>
           <a:p>
@@ -19962,213 +19949,26 @@
             </a:pPr>
             <a:endParaRPr lang="de-DE" dirty="0"/>
           </a:p>
-        </p:txBody>
-      </p:sp>
-      <p:sp>
-        <p:nvSpPr>
-          <p:cNvPr id="29" name="TextBox 28">
-            <a:extLst>
-              <a:ext uri="{FF2B5EF4-FFF2-40B4-BE49-F238E27FC236}">
-                <a16:creationId xmlns:a16="http://schemas.microsoft.com/office/drawing/2014/main" id="{FD214281-F802-4F96-A098-F69D765E4AFA}"/>
-              </a:ext>
-            </a:extLst>
-          </p:cNvPr>
-          <p:cNvSpPr txBox="1"/>
-          <p:nvPr/>
-        </p:nvSpPr>
-        <p:spPr>
-          <a:xfrm>
-            <a:off x="6199935" y="93132"/>
-            <a:ext cx="6097772" cy="1815882"/>
-          </a:xfrm>
-          <a:prstGeom prst="rect">
-            <a:avLst/>
-          </a:prstGeom>
-          <a:noFill/>
-        </p:spPr>
-        <p:txBody>
-          <a:bodyPr wrap="square">
-            <a:spAutoFit/>
-          </a:bodyPr>
-          <a:lstStyle/>
-          <a:p>
-            <a:r>
-              <a:rPr lang="de-DE" sz="1400" u="sng" dirty="0"/>
-              <a:t>Imputation</a:t>
-            </a:r>
-            <a:r>
-              <a:rPr lang="de-DE" sz="1400" dirty="0"/>
-              <a:t>:</a:t>
-            </a:r>
-          </a:p>
           <a:p>
             <a:pPr marL="285750" indent="-285750">
               <a:buFontTx/>
               <a:buChar char="-"/>
             </a:pPr>
             <a:r>
-              <a:rPr lang="de-DE" sz="1400" dirty="0"/>
-              <a:t>mbImpute needs phylogenetic tree -&gt; ignored for now </a:t>
-            </a:r>
-          </a:p>
-          <a:p>
-            <a:pPr marL="285750" indent="-285750">
-              <a:buFontTx/>
-              <a:buChar char="-"/>
-            </a:pPr>
-            <a:r>
-              <a:rPr lang="de-DE" sz="1400" dirty="0"/>
-              <a:t>EstMB dataset: pseudocount inserts decimal values between 0 and 1</a:t>
-            </a:r>
-          </a:p>
-          <a:p>
-            <a:pPr marL="742950" lvl="1" indent="-285750">
-              <a:buFontTx/>
-              <a:buChar char="-"/>
-            </a:pPr>
-            <a:r>
-              <a:rPr lang="de-DE" sz="1400" dirty="0"/>
-              <a:t>Solution for now: all these values were rounded up to 1</a:t>
-            </a:r>
-          </a:p>
-          <a:p>
-            <a:pPr marL="742950" lvl="1" indent="-285750">
-              <a:buFontTx/>
-              <a:buChar char="-"/>
-            </a:pPr>
-            <a:r>
-              <a:rPr lang="de-DE" sz="1400" dirty="0"/>
-              <a:t>Possibly in a later run keep decimal values, because some papers suggest sensitivity to pseudocount in machine learning models </a:t>
-            </a:r>
-          </a:p>
-        </p:txBody>
-      </p:sp>
-      <p:sp>
-        <p:nvSpPr>
-          <p:cNvPr id="8" name="TextBox 7">
-            <a:extLst>
-              <a:ext uri="{FF2B5EF4-FFF2-40B4-BE49-F238E27FC236}">
-                <a16:creationId xmlns:a16="http://schemas.microsoft.com/office/drawing/2014/main" id="{20ADFB58-875E-4AAE-BDAE-D861E7F9DC27}"/>
-              </a:ext>
-            </a:extLst>
-          </p:cNvPr>
-          <p:cNvSpPr txBox="1"/>
-          <p:nvPr/>
-        </p:nvSpPr>
-        <p:spPr>
-          <a:xfrm>
-            <a:off x="1720971" y="3408432"/>
-            <a:ext cx="7102549" cy="1200329"/>
-          </a:xfrm>
-          <a:prstGeom prst="rect">
-            <a:avLst/>
-          </a:prstGeom>
-          <a:noFill/>
-        </p:spPr>
-        <p:txBody>
-          <a:bodyPr wrap="square" rtlCol="0">
-            <a:spAutoFit/>
-          </a:bodyPr>
-          <a:lstStyle/>
-          <a:p>
-            <a:r>
-              <a:rPr lang="de-DE" u="sng" dirty="0"/>
-              <a:t>PCOS</a:t>
-            </a:r>
-            <a:r>
               <a:rPr lang="de-DE" dirty="0"/>
-              <a:t>:</a:t>
-            </a:r>
-          </a:p>
-          <a:p>
-            <a:pPr marL="285750" indent="-285750">
-              <a:buFontTx/>
-              <a:buChar char="-"/>
-            </a:pPr>
-            <a:r>
-              <a:rPr lang="de-DE" dirty="0"/>
-              <a:t>6 rows removed in abundance table because they were not included in metadata</a:t>
-            </a:r>
-          </a:p>
-          <a:p>
-            <a:pPr marL="285750" indent="-285750">
-              <a:buFontTx/>
-              <a:buChar char="-"/>
-            </a:pPr>
-            <a:endParaRPr lang="de-DE" dirty="0"/>
-          </a:p>
-        </p:txBody>
-      </p:sp>
-      <p:sp>
-        <p:nvSpPr>
-          <p:cNvPr id="9" name="TextBox 8">
-            <a:extLst>
-              <a:ext uri="{FF2B5EF4-FFF2-40B4-BE49-F238E27FC236}">
-                <a16:creationId xmlns:a16="http://schemas.microsoft.com/office/drawing/2014/main" id="{C84548D0-C361-4108-B284-1351D54B8DFD}"/>
-              </a:ext>
-            </a:extLst>
-          </p:cNvPr>
-          <p:cNvSpPr txBox="1"/>
-          <p:nvPr/>
-        </p:nvSpPr>
-        <p:spPr>
-          <a:xfrm>
-            <a:off x="1720971" y="4717667"/>
-            <a:ext cx="7102549" cy="1200329"/>
-          </a:xfrm>
-          <a:prstGeom prst="rect">
-            <a:avLst/>
-          </a:prstGeom>
-          <a:noFill/>
-        </p:spPr>
-        <p:txBody>
-          <a:bodyPr wrap="square" rtlCol="0">
-            <a:spAutoFit/>
-          </a:bodyPr>
-          <a:lstStyle/>
-          <a:p>
-            <a:r>
-              <a:rPr lang="de-DE" u="sng" dirty="0"/>
-              <a:t>EstMB</a:t>
-            </a:r>
-            <a:r>
-              <a:rPr lang="de-DE" dirty="0"/>
-              <a:t>:</a:t>
-            </a:r>
-          </a:p>
-          <a:p>
-            <a:pPr marL="285750" indent="-285750">
-              <a:buFontTx/>
-              <a:buChar char="-"/>
-            </a:pPr>
-            <a:r>
-              <a:rPr lang="de-DE" dirty="0"/>
-              <a:t>21 rows removed in metadata due to NA</a:t>
-            </a:r>
-          </a:p>
-          <a:p>
-            <a:pPr marL="285750" indent="-285750">
-              <a:buFontTx/>
-              <a:buChar char="-"/>
-            </a:pPr>
-            <a:r>
-              <a:rPr lang="de-DE" dirty="0"/>
-              <a:t>21 patients cut out of abundance table due to metadata</a:t>
-            </a:r>
-          </a:p>
-          <a:p>
-            <a:pPr marL="285750" indent="-285750">
-              <a:buFontTx/>
-              <a:buChar char="-"/>
-            </a:pPr>
-            <a:endParaRPr lang="de-DE" dirty="0"/>
+              <a:t>Note: possibility that different denominator is chosen for test set and train set -&gt; code needs to adjust for that -&gt; especially later in PCOS? </a:t>
+            </a:r>
+            <a:r>
+              <a:rPr lang="de-DE"/>
+              <a:t>-&gt; both denominators should be discarded from data set!</a:t>
+            </a:r>
           </a:p>
         </p:txBody>
       </p:sp>
     </p:spTree>
     <p:extLst>
       <p:ext uri="{BB962C8B-B14F-4D97-AF65-F5344CB8AC3E}">
-        <p14:creationId xmlns:p14="http://schemas.microsoft.com/office/powerpoint/2010/main" val="3215538767"/>
+        <p14:creationId xmlns:p14="http://schemas.microsoft.com/office/powerpoint/2010/main" val="914682635"/>
       </p:ext>
     </p:extLst>
   </p:cSld>
@@ -20200,7 +20000,7 @@
           <p:cNvPr id="2" name="Title 1">
             <a:extLst>
               <a:ext uri="{FF2B5EF4-FFF2-40B4-BE49-F238E27FC236}">
-                <a16:creationId xmlns:a16="http://schemas.microsoft.com/office/drawing/2014/main" id="{6806FBA4-537C-4226-9D3A-758C7B787D79}"/>
+                <a16:creationId xmlns:a16="http://schemas.microsoft.com/office/drawing/2014/main" id="{5C6C0D5D-1A09-42DA-AAA6-CB769F97AAFD}"/>
               </a:ext>
             </a:extLst>
           </p:cNvPr>
@@ -20217,10 +20017,39 @@
           <a:lstStyle/>
           <a:p>
             <a:r>
-              <a:rPr lang="de-DE" b="1" dirty="0"/>
-              <a:t>Transformations</a:t>
-            </a:r>
-            <a:endParaRPr lang="en-US" b="1" dirty="0"/>
+              <a:rPr lang="de-DE" dirty="0"/>
+              <a:t>CRC</a:t>
+            </a:r>
+          </a:p>
+        </p:txBody>
+      </p:sp>
+      <p:sp>
+        <p:nvSpPr>
+          <p:cNvPr id="4" name="Date Placeholder 3">
+            <a:extLst>
+              <a:ext uri="{FF2B5EF4-FFF2-40B4-BE49-F238E27FC236}">
+                <a16:creationId xmlns:a16="http://schemas.microsoft.com/office/drawing/2014/main" id="{D931F9AA-9EEE-479B-9E4B-F880DD6927F9}"/>
+              </a:ext>
+            </a:extLst>
+          </p:cNvPr>
+          <p:cNvSpPr>
+            <a:spLocks noGrp="1"/>
+          </p:cNvSpPr>
+          <p:nvPr>
+            <p:ph type="dt" sz="half" idx="10"/>
+          </p:nvPr>
+        </p:nvSpPr>
+        <p:spPr/>
+        <p:txBody>
+          <a:bodyPr/>
+          <a:lstStyle/>
+          <a:p>
+            <a:fld id="{36D18B76-5E8B-4456-8722-FC5B14B0F354}" type="datetime1">
+              <a:rPr lang="en-US" smtClean="0"/>
+              <a:pPr/>
+              <a:t>4/20/2022</a:t>
+            </a:fld>
+            <a:endParaRPr lang="en-US" dirty="0"/>
           </a:p>
         </p:txBody>
       </p:sp>
@@ -20229,7 +20058,7 @@
           <p:cNvPr id="5" name="Footer Placeholder 4">
             <a:extLst>
               <a:ext uri="{FF2B5EF4-FFF2-40B4-BE49-F238E27FC236}">
-                <a16:creationId xmlns:a16="http://schemas.microsoft.com/office/drawing/2014/main" id="{707C4F70-832A-416B-9491-EE86347B2812}"/>
+                <a16:creationId xmlns:a16="http://schemas.microsoft.com/office/drawing/2014/main" id="{20341FFA-1CC5-4E6A-9383-BD2A101627FE}"/>
               </a:ext>
             </a:extLst>
           </p:cNvPr>
@@ -20246,9 +20075,10 @@
           <a:lstStyle/>
           <a:p>
             <a:r>
-              <a:rPr lang="en-US" dirty="0"/>
+              <a:rPr lang="en-US"/>
               <a:t>jennifer.neumaier@t-online.de</a:t>
             </a:r>
+            <a:endParaRPr lang="en-US" dirty="0"/>
           </a:p>
         </p:txBody>
       </p:sp>
@@ -20257,7 +20087,7 @@
           <p:cNvPr id="6" name="Slide Number Placeholder 5">
             <a:extLst>
               <a:ext uri="{FF2B5EF4-FFF2-40B4-BE49-F238E27FC236}">
-                <a16:creationId xmlns:a16="http://schemas.microsoft.com/office/drawing/2014/main" id="{1028CB34-29B5-49CB-99E4-E945C3D78896}"/>
+                <a16:creationId xmlns:a16="http://schemas.microsoft.com/office/drawing/2014/main" id="{6B829FC6-6F02-4361-A6FE-C769EAA86509}"/>
               </a:ext>
             </a:extLst>
           </p:cNvPr>
@@ -20284,10 +20114,10 @@
       </p:sp>
       <p:sp>
         <p:nvSpPr>
-          <p:cNvPr id="26" name="TextBox 25">
+          <p:cNvPr id="9" name="TextBox 8">
             <a:extLst>
               <a:ext uri="{FF2B5EF4-FFF2-40B4-BE49-F238E27FC236}">
-                <a16:creationId xmlns:a16="http://schemas.microsoft.com/office/drawing/2014/main" id="{CC7BEBFF-3D20-441C-B1B2-0CE34904FDE4}"/>
+                <a16:creationId xmlns:a16="http://schemas.microsoft.com/office/drawing/2014/main" id="{56A23E1A-23FA-4F87-8E6B-B6FB46A737F3}"/>
               </a:ext>
             </a:extLst>
           </p:cNvPr>
@@ -20296,8 +20126,8 @@
         </p:nvSpPr>
         <p:spPr>
           <a:xfrm>
-            <a:off x="1698819" y="1152907"/>
-            <a:ext cx="3654858" cy="400110"/>
+            <a:off x="8746081" y="58580"/>
+            <a:ext cx="3611524" cy="1200329"/>
           </a:xfrm>
           <a:prstGeom prst="rect">
             <a:avLst/>
@@ -20311,137 +20141,56 @@
           <a:lstStyle/>
           <a:p>
             <a:r>
-              <a:rPr lang="de-DE" sz="2000" i="1" dirty="0"/>
-              <a:t>Problems and Notes</a:t>
-            </a:r>
-          </a:p>
-        </p:txBody>
-      </p:sp>
-      <p:sp>
-        <p:nvSpPr>
-          <p:cNvPr id="7" name="TextBox 6">
+              <a:rPr lang="de-DE" b="1" i="1" dirty="0"/>
+              <a:t>CRC used</a:t>
+            </a:r>
+          </a:p>
+          <a:p>
+            <a:r>
+              <a:rPr lang="de-DE" b="1" i="1" dirty="0"/>
+              <a:t>Predicted once on GER and once on FRA and then combined</a:t>
+            </a:r>
+          </a:p>
+        </p:txBody>
+      </p:sp>
+      <p:pic>
+        <p:nvPicPr>
+          <p:cNvPr id="13" name="Content Placeholder 12" descr="Chart, waterfall chart&#10;&#10;Description automatically generated">
             <a:extLst>
               <a:ext uri="{FF2B5EF4-FFF2-40B4-BE49-F238E27FC236}">
-                <a16:creationId xmlns:a16="http://schemas.microsoft.com/office/drawing/2014/main" id="{B43BF96F-7A11-4087-9B01-CF6AACD20E04}"/>
+                <a16:creationId xmlns:a16="http://schemas.microsoft.com/office/drawing/2014/main" id="{CC20B67A-D525-49B2-A082-2756D9651111}"/>
               </a:ext>
             </a:extLst>
           </p:cNvPr>
-          <p:cNvSpPr txBox="1"/>
-          <p:nvPr/>
-        </p:nvSpPr>
+          <p:cNvPicPr>
+            <a:picLocks noGrp="1" noChangeAspect="1"/>
+          </p:cNvPicPr>
+          <p:nvPr>
+            <p:ph idx="1"/>
+          </p:nvPr>
+        </p:nvPicPr>
+        <p:blipFill>
+          <a:blip r:embed="rId2"/>
+          <a:stretch>
+            <a:fillRect/>
+          </a:stretch>
+        </p:blipFill>
         <p:spPr>
           <a:xfrm>
-            <a:off x="2589212" y="1742696"/>
-            <a:ext cx="7102549" cy="1477328"/>
+            <a:off x="1718896" y="1305370"/>
+            <a:ext cx="8754205" cy="4825067"/>
           </a:xfrm>
-          <a:prstGeom prst="rect">
-            <a:avLst/>
-          </a:prstGeom>
-          <a:noFill/>
+          <a:ln>
+            <a:solidFill>
+              <a:schemeClr val="tx1"/>
+            </a:solidFill>
+          </a:ln>
         </p:spPr>
-        <p:txBody>
-          <a:bodyPr wrap="square" rtlCol="0">
-            <a:spAutoFit/>
-          </a:bodyPr>
-          <a:lstStyle/>
-          <a:p>
-            <a:r>
-              <a:rPr lang="de-DE" u="sng" dirty="0"/>
-              <a:t>CLR/ALR</a:t>
-            </a:r>
-            <a:r>
-              <a:rPr lang="de-DE" dirty="0"/>
-              <a:t>:</a:t>
-            </a:r>
-          </a:p>
-          <a:p>
-            <a:pPr marL="285750" indent="-285750">
-              <a:buFontTx/>
-              <a:buChar char="-"/>
-            </a:pPr>
-            <a:r>
-              <a:rPr lang="de-DE" dirty="0"/>
-              <a:t>What to do with LR.wt?</a:t>
-            </a:r>
-          </a:p>
-          <a:p>
-            <a:pPr marL="285750" indent="-285750">
-              <a:buFontTx/>
-              <a:buChar char="-"/>
-            </a:pPr>
-            <a:r>
-              <a:rPr lang="de-DE" dirty="0"/>
-              <a:t>What to do with part.names and part.wt?</a:t>
-            </a:r>
-          </a:p>
-          <a:p>
-            <a:pPr marL="285750" indent="-285750">
-              <a:buFontTx/>
-              <a:buChar char="-"/>
-            </a:pPr>
-            <a:r>
-              <a:rPr lang="de-DE" dirty="0"/>
-              <a:t>Column names ALR?</a:t>
-            </a:r>
-          </a:p>
-          <a:p>
-            <a:endParaRPr lang="de-DE" dirty="0"/>
-          </a:p>
-        </p:txBody>
-      </p:sp>
-      <p:sp>
-        <p:nvSpPr>
-          <p:cNvPr id="8" name="TextBox 7">
-            <a:extLst>
-              <a:ext uri="{FF2B5EF4-FFF2-40B4-BE49-F238E27FC236}">
-                <a16:creationId xmlns:a16="http://schemas.microsoft.com/office/drawing/2014/main" id="{42B7B4AF-462B-468E-AAF9-0BB332281A81}"/>
-              </a:ext>
-            </a:extLst>
-          </p:cNvPr>
-          <p:cNvSpPr txBox="1"/>
-          <p:nvPr/>
-        </p:nvSpPr>
-        <p:spPr>
-          <a:xfrm>
-            <a:off x="2589212" y="3278973"/>
-            <a:ext cx="7102549" cy="923330"/>
-          </a:xfrm>
-          <a:prstGeom prst="rect">
-            <a:avLst/>
-          </a:prstGeom>
-          <a:noFill/>
-        </p:spPr>
-        <p:txBody>
-          <a:bodyPr wrap="square" rtlCol="0">
-            <a:spAutoFit/>
-          </a:bodyPr>
-          <a:lstStyle/>
-          <a:p>
-            <a:r>
-              <a:rPr lang="de-DE" u="sng" dirty="0"/>
-              <a:t>EstMB:</a:t>
-            </a:r>
-            <a:endParaRPr lang="de-DE" dirty="0"/>
-          </a:p>
-          <a:p>
-            <a:pPr marL="285750" indent="-285750">
-              <a:buFontTx/>
-              <a:buChar char="-"/>
-            </a:pPr>
-            <a:r>
-              <a:rPr lang="de-DE" dirty="0"/>
-              <a:t>Needs a lot of time for ALR -&gt; solved in HPC?</a:t>
-            </a:r>
-          </a:p>
-          <a:p>
-            <a:endParaRPr lang="de-DE" dirty="0"/>
-          </a:p>
-        </p:txBody>
-      </p:sp>
+      </p:pic>
     </p:spTree>
     <p:extLst>
       <p:ext uri="{BB962C8B-B14F-4D97-AF65-F5344CB8AC3E}">
-        <p14:creationId xmlns:p14="http://schemas.microsoft.com/office/powerpoint/2010/main" val="3441935650"/>
+        <p14:creationId xmlns:p14="http://schemas.microsoft.com/office/powerpoint/2010/main" val="3654203187"/>
       </p:ext>
     </p:extLst>
   </p:cSld>
@@ -20473,7 +20222,7 @@
           <p:cNvPr id="2" name="Title 1">
             <a:extLst>
               <a:ext uri="{FF2B5EF4-FFF2-40B4-BE49-F238E27FC236}">
-                <a16:creationId xmlns:a16="http://schemas.microsoft.com/office/drawing/2014/main" id="{6806FBA4-537C-4226-9D3A-758C7B787D79}"/>
+                <a16:creationId xmlns:a16="http://schemas.microsoft.com/office/drawing/2014/main" id="{5C6C0D5D-1A09-42DA-AAA6-CB769F97AAFD}"/>
               </a:ext>
             </a:extLst>
           </p:cNvPr>
@@ -20490,10 +20239,39 @@
           <a:lstStyle/>
           <a:p>
             <a:r>
-              <a:rPr lang="de-DE" b="1" dirty="0"/>
-              <a:t>Hierarchy dimensionality reduction</a:t>
-            </a:r>
-            <a:endParaRPr lang="en-US" b="1" dirty="0"/>
+              <a:rPr lang="de-DE" dirty="0"/>
+              <a:t>PCOS</a:t>
+            </a:r>
+          </a:p>
+        </p:txBody>
+      </p:sp>
+      <p:sp>
+        <p:nvSpPr>
+          <p:cNvPr id="4" name="Date Placeholder 3">
+            <a:extLst>
+              <a:ext uri="{FF2B5EF4-FFF2-40B4-BE49-F238E27FC236}">
+                <a16:creationId xmlns:a16="http://schemas.microsoft.com/office/drawing/2014/main" id="{D931F9AA-9EEE-479B-9E4B-F880DD6927F9}"/>
+              </a:ext>
+            </a:extLst>
+          </p:cNvPr>
+          <p:cNvSpPr>
+            <a:spLocks noGrp="1"/>
+          </p:cNvSpPr>
+          <p:nvPr>
+            <p:ph type="dt" sz="half" idx="10"/>
+          </p:nvPr>
+        </p:nvSpPr>
+        <p:spPr/>
+        <p:txBody>
+          <a:bodyPr/>
+          <a:lstStyle/>
+          <a:p>
+            <a:fld id="{36D18B76-5E8B-4456-8722-FC5B14B0F354}" type="datetime1">
+              <a:rPr lang="en-US" smtClean="0"/>
+              <a:pPr/>
+              <a:t>4/20/2022</a:t>
+            </a:fld>
+            <a:endParaRPr lang="en-US" dirty="0"/>
           </a:p>
         </p:txBody>
       </p:sp>
@@ -20502,7 +20280,7 @@
           <p:cNvPr id="5" name="Footer Placeholder 4">
             <a:extLst>
               <a:ext uri="{FF2B5EF4-FFF2-40B4-BE49-F238E27FC236}">
-                <a16:creationId xmlns:a16="http://schemas.microsoft.com/office/drawing/2014/main" id="{707C4F70-832A-416B-9491-EE86347B2812}"/>
+                <a16:creationId xmlns:a16="http://schemas.microsoft.com/office/drawing/2014/main" id="{20341FFA-1CC5-4E6A-9383-BD2A101627FE}"/>
               </a:ext>
             </a:extLst>
           </p:cNvPr>
@@ -20531,7 +20309,7 @@
           <p:cNvPr id="6" name="Slide Number Placeholder 5">
             <a:extLst>
               <a:ext uri="{FF2B5EF4-FFF2-40B4-BE49-F238E27FC236}">
-                <a16:creationId xmlns:a16="http://schemas.microsoft.com/office/drawing/2014/main" id="{1028CB34-29B5-49CB-99E4-E945C3D78896}"/>
+                <a16:creationId xmlns:a16="http://schemas.microsoft.com/office/drawing/2014/main" id="{6B829FC6-6F02-4361-A6FE-C769EAA86509}"/>
               </a:ext>
             </a:extLst>
           </p:cNvPr>
@@ -20556,117 +20334,44 @@
           </a:p>
         </p:txBody>
       </p:sp>
-      <p:sp>
-        <p:nvSpPr>
-          <p:cNvPr id="26" name="TextBox 25">
+      <p:pic>
+        <p:nvPicPr>
+          <p:cNvPr id="15" name="Content Placeholder 14" descr="Chart&#10;&#10;Description automatically generated">
             <a:extLst>
               <a:ext uri="{FF2B5EF4-FFF2-40B4-BE49-F238E27FC236}">
-                <a16:creationId xmlns:a16="http://schemas.microsoft.com/office/drawing/2014/main" id="{CC7BEBFF-3D20-441C-B1B2-0CE34904FDE4}"/>
+                <a16:creationId xmlns:a16="http://schemas.microsoft.com/office/drawing/2014/main" id="{8CED1E73-1D1F-4F14-A29C-485C75E7601D}"/>
               </a:ext>
             </a:extLst>
           </p:cNvPr>
-          <p:cNvSpPr txBox="1"/>
-          <p:nvPr/>
-        </p:nvSpPr>
+          <p:cNvPicPr>
+            <a:picLocks noGrp="1" noChangeAspect="1"/>
+          </p:cNvPicPr>
+          <p:nvPr>
+            <p:ph idx="1"/>
+          </p:nvPr>
+        </p:nvPicPr>
+        <p:blipFill>
+          <a:blip r:embed="rId2"/>
+          <a:stretch>
+            <a:fillRect/>
+          </a:stretch>
+        </p:blipFill>
         <p:spPr>
           <a:xfrm>
-            <a:off x="1698819" y="1152907"/>
-            <a:ext cx="3654858" cy="400110"/>
+            <a:off x="2873660" y="1268569"/>
+            <a:ext cx="8634235" cy="4758943"/>
           </a:xfrm>
-          <a:prstGeom prst="rect">
-            <a:avLst/>
-          </a:prstGeom>
-          <a:noFill/>
+          <a:ln>
+            <a:solidFill>
+              <a:schemeClr val="tx1"/>
+            </a:solidFill>
+          </a:ln>
         </p:spPr>
-        <p:txBody>
-          <a:bodyPr wrap="square" rtlCol="0">
-            <a:spAutoFit/>
-          </a:bodyPr>
-          <a:lstStyle/>
-          <a:p>
-            <a:r>
-              <a:rPr lang="de-DE" sz="2000" i="1" dirty="0"/>
-              <a:t>Problems and Notes</a:t>
-            </a:r>
-          </a:p>
-        </p:txBody>
-      </p:sp>
-      <p:sp>
-        <p:nvSpPr>
-          <p:cNvPr id="7" name="TextBox 6">
-            <a:extLst>
-              <a:ext uri="{FF2B5EF4-FFF2-40B4-BE49-F238E27FC236}">
-                <a16:creationId xmlns:a16="http://schemas.microsoft.com/office/drawing/2014/main" id="{B43BF96F-7A11-4087-9B01-CF6AACD20E04}"/>
-              </a:ext>
-            </a:extLst>
-          </p:cNvPr>
-          <p:cNvSpPr txBox="1"/>
-          <p:nvPr/>
-        </p:nvSpPr>
-        <p:spPr>
-          <a:xfrm>
-            <a:off x="2589212" y="1742696"/>
-            <a:ext cx="7102549" cy="1754326"/>
-          </a:xfrm>
-          <a:prstGeom prst="rect">
-            <a:avLst/>
-          </a:prstGeom>
-          <a:noFill/>
-        </p:spPr>
-        <p:txBody>
-          <a:bodyPr wrap="square" rtlCol="0">
-            <a:spAutoFit/>
-          </a:bodyPr>
-          <a:lstStyle/>
-          <a:p>
-            <a:r>
-              <a:rPr lang="de-DE" u="sng" dirty="0"/>
-              <a:t>PCA</a:t>
-            </a:r>
-            <a:r>
-              <a:rPr lang="de-DE" dirty="0"/>
-              <a:t>:</a:t>
-            </a:r>
-          </a:p>
-          <a:p>
-            <a:pPr marL="285750" indent="-285750">
-              <a:buFontTx/>
-              <a:buChar char="-"/>
-            </a:pPr>
-            <a:r>
-              <a:rPr lang="de-DE" dirty="0"/>
-              <a:t>Microbiome Preprocessing Machine Learning Pipeline (2021)</a:t>
-            </a:r>
-          </a:p>
-          <a:p>
-            <a:pPr marL="285750" indent="-285750">
-              <a:buFontTx/>
-              <a:buChar char="-"/>
-            </a:pPr>
-            <a:r>
-              <a:rPr lang="de-DE" dirty="0"/>
-              <a:t>Proposes to use PCA as hierarchy reduction </a:t>
-            </a:r>
-          </a:p>
-          <a:p>
-            <a:pPr marL="285750" indent="-285750">
-              <a:buFontTx/>
-              <a:buChar char="-"/>
-            </a:pPr>
-            <a:r>
-              <a:rPr lang="de-DE" dirty="0"/>
-              <a:t>Families can be clustered and genus is not necessary</a:t>
-            </a:r>
-          </a:p>
-          <a:p>
-            <a:endParaRPr lang="de-DE" dirty="0"/>
-          </a:p>
-        </p:txBody>
-      </p:sp>
+      </p:pic>
     </p:spTree>
     <p:extLst>
       <p:ext uri="{BB962C8B-B14F-4D97-AF65-F5344CB8AC3E}">
-        <p14:creationId xmlns:p14="http://schemas.microsoft.com/office/powerpoint/2010/main" val="2182919606"/>
+        <p14:creationId xmlns:p14="http://schemas.microsoft.com/office/powerpoint/2010/main" val="2460614687"/>
       </p:ext>
     </p:extLst>
   </p:cSld>
@@ -20711,16 +20416,43 @@
         </p:nvSpPr>
         <p:spPr/>
         <p:txBody>
-          <a:bodyPr>
-            <a:normAutofit/>
-          </a:bodyPr>
+          <a:bodyPr/>
           <a:lstStyle/>
           <a:p>
             <a:r>
-              <a:rPr lang="de-DE" sz="3200" b="1" dirty="0"/>
-              <a:t>mikropml</a:t>
-            </a:r>
-            <a:endParaRPr lang="en-US" sz="3200" b="1" dirty="0"/>
+              <a:rPr lang="de-DE" b="1" dirty="0"/>
+              <a:t>Pre-Processing</a:t>
+            </a:r>
+            <a:endParaRPr lang="en-US" b="1" dirty="0"/>
+          </a:p>
+        </p:txBody>
+      </p:sp>
+      <p:sp>
+        <p:nvSpPr>
+          <p:cNvPr id="5" name="Footer Placeholder 4">
+            <a:extLst>
+              <a:ext uri="{FF2B5EF4-FFF2-40B4-BE49-F238E27FC236}">
+                <a16:creationId xmlns:a16="http://schemas.microsoft.com/office/drawing/2014/main" id="{707C4F70-832A-416B-9491-EE86347B2812}"/>
+              </a:ext>
+            </a:extLst>
+          </p:cNvPr>
+          <p:cNvSpPr>
+            <a:spLocks noGrp="1"/>
+          </p:cNvSpPr>
+          <p:nvPr>
+            <p:ph type="ftr" sz="quarter" idx="11"/>
+          </p:nvPr>
+        </p:nvSpPr>
+        <p:spPr/>
+        <p:txBody>
+          <a:bodyPr/>
+          <a:lstStyle/>
+          <a:p>
+            <a:r>
+              <a:rPr lang="en-US"/>
+              <a:t>jennifer.neumaier@t-online.de</a:t>
+            </a:r>
+            <a:endParaRPr lang="en-US" dirty="0"/>
           </a:p>
         </p:txBody>
       </p:sp>
@@ -20756,10 +20488,10 @@
       </p:sp>
       <p:sp>
         <p:nvSpPr>
-          <p:cNvPr id="8" name="TextBox 7">
+          <p:cNvPr id="26" name="TextBox 25">
             <a:extLst>
               <a:ext uri="{FF2B5EF4-FFF2-40B4-BE49-F238E27FC236}">
-                <a16:creationId xmlns:a16="http://schemas.microsoft.com/office/drawing/2014/main" id="{C9FAD4F5-81D5-4890-8BB5-F06C93EDD254}"/>
+                <a16:creationId xmlns:a16="http://schemas.microsoft.com/office/drawing/2014/main" id="{CC7BEBFF-3D20-441C-B1B2-0CE34904FDE4}"/>
               </a:ext>
             </a:extLst>
           </p:cNvPr>
@@ -20768,8 +20500,8 @@
         </p:nvSpPr>
         <p:spPr>
           <a:xfrm>
-            <a:off x="1392866" y="1268569"/>
-            <a:ext cx="8753253" cy="5509200"/>
+            <a:off x="1698819" y="1152907"/>
+            <a:ext cx="3654858" cy="400110"/>
           </a:xfrm>
           <a:prstGeom prst="rect">
             <a:avLst/>
@@ -20777,172 +20509,299 @@
           <a:noFill/>
         </p:spPr>
         <p:txBody>
+          <a:bodyPr wrap="square" rtlCol="0">
+            <a:spAutoFit/>
+          </a:bodyPr>
+          <a:lstStyle/>
+          <a:p>
+            <a:r>
+              <a:rPr lang="de-DE" sz="2000" i="1" dirty="0"/>
+              <a:t>Problems and Notes</a:t>
+            </a:r>
+          </a:p>
+        </p:txBody>
+      </p:sp>
+      <p:sp>
+        <p:nvSpPr>
+          <p:cNvPr id="7" name="TextBox 6">
+            <a:extLst>
+              <a:ext uri="{FF2B5EF4-FFF2-40B4-BE49-F238E27FC236}">
+                <a16:creationId xmlns:a16="http://schemas.microsoft.com/office/drawing/2014/main" id="{B43BF96F-7A11-4087-9B01-CF6AACD20E04}"/>
+              </a:ext>
+            </a:extLst>
+          </p:cNvPr>
+          <p:cNvSpPr txBox="1"/>
+          <p:nvPr/>
+        </p:nvSpPr>
+        <p:spPr>
+          <a:xfrm>
+            <a:off x="1698819" y="1834296"/>
+            <a:ext cx="7102549" cy="1754326"/>
+          </a:xfrm>
+          <a:prstGeom prst="rect">
+            <a:avLst/>
+          </a:prstGeom>
+          <a:noFill/>
+        </p:spPr>
+        <p:txBody>
+          <a:bodyPr wrap="square" rtlCol="0">
+            <a:spAutoFit/>
+          </a:bodyPr>
+          <a:lstStyle/>
+          <a:p>
+            <a:r>
+              <a:rPr lang="de-DE" u="sng" dirty="0"/>
+              <a:t>CRC</a:t>
+            </a:r>
+            <a:r>
+              <a:rPr lang="de-DE" dirty="0"/>
+              <a:t>:</a:t>
+            </a:r>
+          </a:p>
+          <a:p>
+            <a:pPr marL="285750" indent="-285750">
+              <a:buFontTx/>
+              <a:buChar char="-"/>
+            </a:pPr>
+            <a:r>
+              <a:rPr lang="de-DE" dirty="0"/>
+              <a:t>128 rows removed due to NA in BMI</a:t>
+            </a:r>
+          </a:p>
+          <a:p>
+            <a:pPr marL="285750" indent="-285750">
+              <a:buFontTx/>
+              <a:buChar char="-"/>
+            </a:pPr>
+            <a:r>
+              <a:rPr lang="de-DE" dirty="0"/>
+              <a:t>DE saved separately as holdout </a:t>
+            </a:r>
+          </a:p>
+          <a:p>
+            <a:pPr marL="285750" indent="-285750">
+              <a:buFontTx/>
+              <a:buChar char="-"/>
+            </a:pPr>
+            <a:r>
+              <a:rPr lang="de-DE" dirty="0"/>
+              <a:t>All tests were done with country sets: USA, China, Austria, France</a:t>
+            </a:r>
+          </a:p>
+          <a:p>
+            <a:pPr marL="285750" indent="-285750">
+              <a:buFontTx/>
+              <a:buChar char="-"/>
+            </a:pPr>
+            <a:endParaRPr lang="de-DE" dirty="0"/>
+          </a:p>
+        </p:txBody>
+      </p:sp>
+      <p:sp>
+        <p:nvSpPr>
+          <p:cNvPr id="29" name="TextBox 28">
+            <a:extLst>
+              <a:ext uri="{FF2B5EF4-FFF2-40B4-BE49-F238E27FC236}">
+                <a16:creationId xmlns:a16="http://schemas.microsoft.com/office/drawing/2014/main" id="{FD214281-F802-4F96-A098-F69D765E4AFA}"/>
+              </a:ext>
+            </a:extLst>
+          </p:cNvPr>
+          <p:cNvSpPr txBox="1"/>
+          <p:nvPr/>
+        </p:nvSpPr>
+        <p:spPr>
+          <a:xfrm>
+            <a:off x="6199935" y="93132"/>
+            <a:ext cx="6097772" cy="1815882"/>
+          </a:xfrm>
+          <a:prstGeom prst="rect">
+            <a:avLst/>
+          </a:prstGeom>
+          <a:noFill/>
+        </p:spPr>
+        <p:txBody>
           <a:bodyPr wrap="square">
             <a:spAutoFit/>
           </a:bodyPr>
           <a:lstStyle/>
           <a:p>
             <a:r>
-              <a:rPr lang="de-DE" sz="1100" dirty="0"/>
-              <a:t>Testing out mikropml as it already has a function run_ml() that incorporates nested cross-validation for several standard supervised machine learning models:</a:t>
-            </a:r>
-          </a:p>
-          <a:p>
-            <a:endParaRPr lang="de-DE" sz="1100" dirty="0"/>
-          </a:p>
-          <a:p>
-            <a:r>
-              <a:rPr lang="de-DE" sz="1100" dirty="0"/>
-              <a:t>    Logistic/multiclass/linear regression ("glmnet")</a:t>
-            </a:r>
-          </a:p>
-          <a:p>
-            <a:r>
-              <a:rPr lang="de-DE" sz="1100" dirty="0"/>
-              <a:t>    Random forest ("rf")</a:t>
-            </a:r>
-          </a:p>
-          <a:p>
-            <a:r>
-              <a:rPr lang="de-DE" sz="1100" dirty="0"/>
-              <a:t>    Decision tree ("rpart2")</a:t>
-            </a:r>
-          </a:p>
-          <a:p>
-            <a:r>
-              <a:rPr lang="de-DE" sz="1100" dirty="0"/>
-              <a:t>    Support vector machine with a radial basis kernel ("svmRadial")</a:t>
-            </a:r>
-          </a:p>
-          <a:p>
-            <a:r>
-              <a:rPr lang="de-DE" sz="1100" dirty="0"/>
-              <a:t>    xgboost ("xgbTree")</a:t>
-            </a:r>
-          </a:p>
-          <a:p>
-            <a:endParaRPr lang="de-DE" sz="1100" dirty="0"/>
-          </a:p>
-          <a:p>
-            <a:r>
-              <a:rPr lang="de-DE" sz="1100" dirty="0"/>
-              <a:t>Test it here for linear regression and xgboost.</a:t>
-            </a:r>
-          </a:p>
-          <a:p>
-            <a:r>
-              <a:rPr lang="de-DE" sz="1100" dirty="0"/>
-              <a:t>Function run_ml has several parameters:</a:t>
-            </a:r>
-          </a:p>
-          <a:p>
-            <a:r>
-              <a:rPr lang="de-DE" sz="1100" dirty="0"/>
-              <a:t>           dataset,</a:t>
-            </a:r>
-          </a:p>
-          <a:p>
-            <a:r>
-              <a:rPr lang="de-DE" sz="1100" dirty="0"/>
-              <a:t>           method,</a:t>
-            </a:r>
-          </a:p>
-          <a:p>
-            <a:r>
-              <a:rPr lang="de-DE" sz="1100" dirty="0"/>
-              <a:t>           outcome_colname = NULL, (standardized the first column)</a:t>
-            </a:r>
-          </a:p>
-          <a:p>
-            <a:r>
-              <a:rPr lang="de-DE" sz="1100" dirty="0"/>
-              <a:t>           hyperparameters = NULL,</a:t>
-            </a:r>
-          </a:p>
-          <a:p>
-            <a:r>
-              <a:rPr lang="de-DE" sz="1100" dirty="0"/>
-              <a:t>           find_feature_importance = FALSE, (`TRUE` is recommended if you would like to identify features important for predicting your                                                outcome, but it is resource-intensive.</a:t>
-            </a:r>
-          </a:p>
-          <a:p>
-            <a:r>
-              <a:rPr lang="de-DE" sz="1100" dirty="0"/>
-              <a:t>           calculate_performance = TRUE,</a:t>
-            </a:r>
-          </a:p>
-          <a:p>
-            <a:r>
-              <a:rPr lang="de-DE" sz="1100" dirty="0"/>
-              <a:t>           kfold = 5, (standard at 5)</a:t>
-            </a:r>
-          </a:p>
-          <a:p>
-            <a:r>
-              <a:rPr lang="de-DE" sz="1100" dirty="0"/>
-              <a:t>           cv_times = 100, (standard at 100)</a:t>
-            </a:r>
-          </a:p>
-          <a:p>
-            <a:r>
-              <a:rPr lang="de-DE" sz="1100" dirty="0"/>
-              <a:t>           cross_val = NULL, (cross_val a custom cross-validation scheme from `caret::trainControl()` (default: `NULL`, uses `kfold` cross                              validation repeated `cv_times`). `kfold` and `cv_times` are ignored if the user provides a custom                                          cross-validation scheme.)</a:t>
-            </a:r>
-          </a:p>
-          <a:p>
-            <a:r>
-              <a:rPr lang="de-DE" sz="1100" dirty="0"/>
-              <a:t>           training_frac = 0.8, (standard at 0.8)</a:t>
-            </a:r>
-          </a:p>
-          <a:p>
-            <a:r>
-              <a:rPr lang="de-DE" sz="1100" dirty="0"/>
-              <a:t>           perf_metric_function = NULL,</a:t>
-            </a:r>
-          </a:p>
-          <a:p>
-            <a:r>
-              <a:rPr lang="de-DE" sz="1100" dirty="0"/>
-              <a:t>           perf_metric_name = NULL,</a:t>
-            </a:r>
-          </a:p>
-          <a:p>
-            <a:r>
-              <a:rPr lang="de-DE" sz="1100" dirty="0"/>
-              <a:t>           groups = NULL,</a:t>
-            </a:r>
-          </a:p>
-          <a:p>
-            <a:r>
-              <a:rPr lang="de-DE" sz="1100" dirty="0"/>
-              <a:t>           group_partitions = NULL,</a:t>
-            </a:r>
-          </a:p>
-          <a:p>
-            <a:r>
-              <a:rPr lang="de-DE" sz="1100" dirty="0"/>
-              <a:t>           corr_thresh = 1,</a:t>
-            </a:r>
-          </a:p>
-          <a:p>
-            <a:r>
-              <a:rPr lang="de-DE" sz="1100" dirty="0"/>
-              <a:t>           ntree = 1000, (For random forest, how many trees to use (default: `1000`). Caret doesn't allow this hyperparameter to be tuned)</a:t>
-            </a:r>
-          </a:p>
-          <a:p>
-            <a:r>
-              <a:rPr lang="de-DE" sz="1100" dirty="0"/>
-              <a:t>           seed = NA (set seed for reproducibility)</a:t>
-            </a:r>
+              <a:rPr lang="de-DE" sz="1400" u="sng" dirty="0"/>
+              <a:t>Imputation</a:t>
+            </a:r>
+            <a:r>
+              <a:rPr lang="de-DE" sz="1400" dirty="0"/>
+              <a:t>:</a:t>
+            </a:r>
+          </a:p>
+          <a:p>
+            <a:pPr marL="285750" indent="-285750">
+              <a:buFontTx/>
+              <a:buChar char="-"/>
+            </a:pPr>
+            <a:r>
+              <a:rPr lang="de-DE" sz="1400" dirty="0"/>
+              <a:t>mbImpute needs phylogenetic tree -&gt; ignored for now </a:t>
+            </a:r>
+          </a:p>
+          <a:p>
+            <a:pPr marL="285750" indent="-285750">
+              <a:buFontTx/>
+              <a:buChar char="-"/>
+            </a:pPr>
+            <a:r>
+              <a:rPr lang="de-DE" sz="1400" dirty="0"/>
+              <a:t>EstMB dataset: pseudocount inserts decimal values between 0 and 1</a:t>
+            </a:r>
+          </a:p>
+          <a:p>
+            <a:pPr marL="742950" lvl="1" indent="-285750">
+              <a:buFontTx/>
+              <a:buChar char="-"/>
+            </a:pPr>
+            <a:r>
+              <a:rPr lang="de-DE" sz="1400" dirty="0"/>
+              <a:t>Solution for now: all these values were rounded up to 1</a:t>
+            </a:r>
+          </a:p>
+          <a:p>
+            <a:pPr marL="742950" lvl="1" indent="-285750">
+              <a:buFontTx/>
+              <a:buChar char="-"/>
+            </a:pPr>
+            <a:r>
+              <a:rPr lang="de-DE" sz="1400" dirty="0"/>
+              <a:t>Possibly in a later run keep decimal values, because some papers suggest sensitivity to pseudocount in machine learning models </a:t>
+            </a:r>
+          </a:p>
+        </p:txBody>
+      </p:sp>
+      <p:sp>
+        <p:nvSpPr>
+          <p:cNvPr id="8" name="TextBox 7">
+            <a:extLst>
+              <a:ext uri="{FF2B5EF4-FFF2-40B4-BE49-F238E27FC236}">
+                <a16:creationId xmlns:a16="http://schemas.microsoft.com/office/drawing/2014/main" id="{20ADFB58-875E-4AAE-BDAE-D861E7F9DC27}"/>
+              </a:ext>
+            </a:extLst>
+          </p:cNvPr>
+          <p:cNvSpPr txBox="1"/>
+          <p:nvPr/>
+        </p:nvSpPr>
+        <p:spPr>
+          <a:xfrm>
+            <a:off x="1720971" y="3408432"/>
+            <a:ext cx="7102549" cy="1200329"/>
+          </a:xfrm>
+          <a:prstGeom prst="rect">
+            <a:avLst/>
+          </a:prstGeom>
+          <a:noFill/>
+        </p:spPr>
+        <p:txBody>
+          <a:bodyPr wrap="square" rtlCol="0">
+            <a:spAutoFit/>
+          </a:bodyPr>
+          <a:lstStyle/>
+          <a:p>
+            <a:r>
+              <a:rPr lang="de-DE" u="sng" dirty="0"/>
+              <a:t>PCOS</a:t>
+            </a:r>
+            <a:r>
+              <a:rPr lang="de-DE" dirty="0"/>
+              <a:t>:</a:t>
+            </a:r>
+          </a:p>
+          <a:p>
+            <a:pPr marL="285750" indent="-285750">
+              <a:buFontTx/>
+              <a:buChar char="-"/>
+            </a:pPr>
+            <a:r>
+              <a:rPr lang="de-DE" dirty="0"/>
+              <a:t>6 rows removed in abundance table because they were not included in metadata</a:t>
+            </a:r>
+          </a:p>
+          <a:p>
+            <a:pPr marL="285750" indent="-285750">
+              <a:buFontTx/>
+              <a:buChar char="-"/>
+            </a:pPr>
+            <a:endParaRPr lang="de-DE" dirty="0"/>
+          </a:p>
+        </p:txBody>
+      </p:sp>
+      <p:sp>
+        <p:nvSpPr>
+          <p:cNvPr id="9" name="TextBox 8">
+            <a:extLst>
+              <a:ext uri="{FF2B5EF4-FFF2-40B4-BE49-F238E27FC236}">
+                <a16:creationId xmlns:a16="http://schemas.microsoft.com/office/drawing/2014/main" id="{C84548D0-C361-4108-B284-1351D54B8DFD}"/>
+              </a:ext>
+            </a:extLst>
+          </p:cNvPr>
+          <p:cNvSpPr txBox="1"/>
+          <p:nvPr/>
+        </p:nvSpPr>
+        <p:spPr>
+          <a:xfrm>
+            <a:off x="1720971" y="4717667"/>
+            <a:ext cx="7102549" cy="1200329"/>
+          </a:xfrm>
+          <a:prstGeom prst="rect">
+            <a:avLst/>
+          </a:prstGeom>
+          <a:noFill/>
+        </p:spPr>
+        <p:txBody>
+          <a:bodyPr wrap="square" rtlCol="0">
+            <a:spAutoFit/>
+          </a:bodyPr>
+          <a:lstStyle/>
+          <a:p>
+            <a:r>
+              <a:rPr lang="de-DE" u="sng" dirty="0"/>
+              <a:t>EstMB</a:t>
+            </a:r>
+            <a:r>
+              <a:rPr lang="de-DE" dirty="0"/>
+              <a:t>:</a:t>
+            </a:r>
+          </a:p>
+          <a:p>
+            <a:pPr marL="285750" indent="-285750">
+              <a:buFontTx/>
+              <a:buChar char="-"/>
+            </a:pPr>
+            <a:r>
+              <a:rPr lang="de-DE" dirty="0"/>
+              <a:t>21 rows removed in metadata due to NA</a:t>
+            </a:r>
+          </a:p>
+          <a:p>
+            <a:pPr marL="285750" indent="-285750">
+              <a:buFontTx/>
+              <a:buChar char="-"/>
+            </a:pPr>
+            <a:r>
+              <a:rPr lang="de-DE" dirty="0"/>
+              <a:t>21 patients cut out of abundance table due to metadata</a:t>
+            </a:r>
+          </a:p>
+          <a:p>
+            <a:pPr marL="285750" indent="-285750">
+              <a:buFontTx/>
+              <a:buChar char="-"/>
+            </a:pPr>
+            <a:endParaRPr lang="de-DE" dirty="0"/>
           </a:p>
         </p:txBody>
       </p:sp>
     </p:spTree>
     <p:extLst>
       <p:ext uri="{BB962C8B-B14F-4D97-AF65-F5344CB8AC3E}">
-        <p14:creationId xmlns:p14="http://schemas.microsoft.com/office/powerpoint/2010/main" val="3541464901"/>
+        <p14:creationId xmlns:p14="http://schemas.microsoft.com/office/powerpoint/2010/main" val="3215538767"/>
       </p:ext>
     </p:extLst>
   </p:cSld>
@@ -20974,7 +20833,7 @@
           <p:cNvPr id="2" name="Title 1">
             <a:extLst>
               <a:ext uri="{FF2B5EF4-FFF2-40B4-BE49-F238E27FC236}">
-                <a16:creationId xmlns:a16="http://schemas.microsoft.com/office/drawing/2014/main" id="{169D9D37-B637-4D74-BB75-639D51A491FB}"/>
+                <a16:creationId xmlns:a16="http://schemas.microsoft.com/office/drawing/2014/main" id="{6806FBA4-537C-4226-9D3A-758C7B787D79}"/>
               </a:ext>
             </a:extLst>
           </p:cNvPr>
@@ -20985,118 +20844,16 @@
             <p:ph type="title"/>
           </p:nvPr>
         </p:nvSpPr>
-        <p:spPr>
-          <a:xfrm>
-            <a:off x="1640156" y="628124"/>
-            <a:ext cx="8911687" cy="1280890"/>
-          </a:xfrm>
-        </p:spPr>
+        <p:spPr/>
         <p:txBody>
           <a:bodyPr/>
           <a:lstStyle/>
           <a:p>
             <a:r>
               <a:rPr lang="de-DE" b="1" dirty="0"/>
-              <a:t>Data set</a:t>
+              <a:t>Transformations</a:t>
             </a:r>
             <a:endParaRPr lang="en-US" b="1" dirty="0"/>
-          </a:p>
-        </p:txBody>
-      </p:sp>
-      <p:sp>
-        <p:nvSpPr>
-          <p:cNvPr id="3" name="Content Placeholder 2">
-            <a:extLst>
-              <a:ext uri="{FF2B5EF4-FFF2-40B4-BE49-F238E27FC236}">
-                <a16:creationId xmlns:a16="http://schemas.microsoft.com/office/drawing/2014/main" id="{D4D56813-9DF8-4D28-B156-1DE48E95DBC2}"/>
-              </a:ext>
-            </a:extLst>
-          </p:cNvPr>
-          <p:cNvSpPr>
-            <a:spLocks noGrp="1"/>
-          </p:cNvSpPr>
-          <p:nvPr>
-            <p:ph idx="1"/>
-          </p:nvPr>
-        </p:nvSpPr>
-        <p:spPr>
-          <a:xfrm>
-            <a:off x="2592495" y="1317171"/>
-            <a:ext cx="8915400" cy="4369465"/>
-          </a:xfrm>
-        </p:spPr>
-        <p:txBody>
-          <a:bodyPr>
-            <a:normAutofit/>
-          </a:bodyPr>
-          <a:lstStyle/>
-          <a:p>
-            <a:r>
-              <a:rPr lang="de-DE" dirty="0"/>
-              <a:t>Compare what Thomas P. Quinn uses (13 datasets) and take out from estonian biobank</a:t>
-            </a:r>
-          </a:p>
-          <a:p>
-            <a:r>
-              <a:rPr lang="de-DE" dirty="0"/>
-              <a:t> prediction/classification tasks</a:t>
-            </a:r>
-          </a:p>
-          <a:p>
-            <a:r>
-              <a:rPr lang="de-DE" dirty="0"/>
-              <a:t>One with continuous and one with discrete variables</a:t>
-            </a:r>
-          </a:p>
-          <a:p>
-            <a:r>
-              <a:rPr lang="de-DE" dirty="0"/>
-              <a:t>one with high correlation and one with low to microbiomes</a:t>
-            </a:r>
-          </a:p>
-          <a:p>
-            <a:r>
-              <a:rPr lang="de-DE" dirty="0"/>
-              <a:t>one small and one large data set</a:t>
-            </a:r>
-          </a:p>
-          <a:p>
-            <a:r>
-              <a:rPr lang="de-DE" dirty="0"/>
-              <a:t>EstMB, colorectal cancer, PCOS</a:t>
-            </a:r>
-          </a:p>
-          <a:p>
-            <a:endParaRPr lang="de-DE" dirty="0"/>
-          </a:p>
-        </p:txBody>
-      </p:sp>
-      <p:sp>
-        <p:nvSpPr>
-          <p:cNvPr id="4" name="Date Placeholder 3">
-            <a:extLst>
-              <a:ext uri="{FF2B5EF4-FFF2-40B4-BE49-F238E27FC236}">
-                <a16:creationId xmlns:a16="http://schemas.microsoft.com/office/drawing/2014/main" id="{D53DB4F4-84EC-4588-88E6-8D8519D6A1E8}"/>
-              </a:ext>
-            </a:extLst>
-          </p:cNvPr>
-          <p:cNvSpPr>
-            <a:spLocks noGrp="1"/>
-          </p:cNvSpPr>
-          <p:nvPr>
-            <p:ph type="dt" sz="half" idx="10"/>
-          </p:nvPr>
-        </p:nvSpPr>
-        <p:spPr/>
-        <p:txBody>
-          <a:bodyPr/>
-          <a:lstStyle/>
-          <a:p>
-            <a:fld id="{5A2DBB50-F561-45B0-9BE5-95A455D2CD8B}" type="datetime1">
-              <a:rPr lang="en-US" smtClean="0"/>
-              <a:t>4/16/2022</a:t>
-            </a:fld>
-            <a:endParaRPr lang="en-US" dirty="0"/>
           </a:p>
         </p:txBody>
       </p:sp>
@@ -21105,7 +20862,7 @@
           <p:cNvPr id="5" name="Footer Placeholder 4">
             <a:extLst>
               <a:ext uri="{FF2B5EF4-FFF2-40B4-BE49-F238E27FC236}">
-                <a16:creationId xmlns:a16="http://schemas.microsoft.com/office/drawing/2014/main" id="{A7F3346A-3F24-484B-A6D3-55D66520C917}"/>
+                <a16:creationId xmlns:a16="http://schemas.microsoft.com/office/drawing/2014/main" id="{707C4F70-832A-416B-9491-EE86347B2812}"/>
               </a:ext>
             </a:extLst>
           </p:cNvPr>
@@ -21122,10 +20879,9 @@
           <a:lstStyle/>
           <a:p>
             <a:r>
-              <a:rPr lang="en-US"/>
+              <a:rPr lang="en-US" dirty="0"/>
               <a:t>jennifer.neumaier@t-online.de</a:t>
             </a:r>
-            <a:endParaRPr lang="en-US" dirty="0"/>
           </a:p>
         </p:txBody>
       </p:sp>
@@ -21134,7 +20890,7 @@
           <p:cNvPr id="6" name="Slide Number Placeholder 5">
             <a:extLst>
               <a:ext uri="{FF2B5EF4-FFF2-40B4-BE49-F238E27FC236}">
-                <a16:creationId xmlns:a16="http://schemas.microsoft.com/office/drawing/2014/main" id="{C4B3B4A6-E708-4F88-8CA2-BDE8FCF0C0AC}"/>
+                <a16:creationId xmlns:a16="http://schemas.microsoft.com/office/drawing/2014/main" id="{1028CB34-29B5-49CB-99E4-E945C3D78896}"/>
               </a:ext>
             </a:extLst>
           </p:cNvPr>
@@ -21161,10 +20917,10 @@
       </p:sp>
       <p:sp>
         <p:nvSpPr>
-          <p:cNvPr id="8" name="TextBox 7">
+          <p:cNvPr id="26" name="TextBox 25">
             <a:extLst>
               <a:ext uri="{FF2B5EF4-FFF2-40B4-BE49-F238E27FC236}">
-                <a16:creationId xmlns:a16="http://schemas.microsoft.com/office/drawing/2014/main" id="{6A373959-7937-4239-AAA7-0B90CAF1A620}"/>
+                <a16:creationId xmlns:a16="http://schemas.microsoft.com/office/drawing/2014/main" id="{CC7BEBFF-3D20-441C-B1B2-0CE34904FDE4}"/>
               </a:ext>
             </a:extLst>
           </p:cNvPr>
@@ -21173,8 +20929,8 @@
         </p:nvSpPr>
         <p:spPr>
           <a:xfrm>
-            <a:off x="2260283" y="4487322"/>
-            <a:ext cx="6097904" cy="923330"/>
+            <a:off x="1698819" y="1152907"/>
+            <a:ext cx="3654858" cy="400110"/>
           </a:xfrm>
           <a:prstGeom prst="rect">
             <a:avLst/>
@@ -21182,28 +20938,143 @@
           <a:noFill/>
         </p:spPr>
         <p:txBody>
-          <a:bodyPr wrap="square">
+          <a:bodyPr wrap="square" rtlCol="0">
             <a:spAutoFit/>
           </a:bodyPr>
           <a:lstStyle/>
           <a:p>
             <a:r>
-              <a:rPr lang="de-DE" b="1" dirty="0"/>
-              <a:t>CRC data set preparation and models:</a:t>
-            </a:r>
-          </a:p>
-          <a:p>
+              <a:rPr lang="de-DE" sz="2000" i="1" dirty="0"/>
+              <a:t>Problems and Notes</a:t>
+            </a:r>
+          </a:p>
+        </p:txBody>
+      </p:sp>
+      <p:sp>
+        <p:nvSpPr>
+          <p:cNvPr id="7" name="TextBox 6">
+            <a:extLst>
+              <a:ext uri="{FF2B5EF4-FFF2-40B4-BE49-F238E27FC236}">
+                <a16:creationId xmlns:a16="http://schemas.microsoft.com/office/drawing/2014/main" id="{B43BF96F-7A11-4087-9B01-CF6AACD20E04}"/>
+              </a:ext>
+            </a:extLst>
+          </p:cNvPr>
+          <p:cNvSpPr txBox="1"/>
+          <p:nvPr/>
+        </p:nvSpPr>
+        <p:spPr>
+          <a:xfrm>
+            <a:off x="2589212" y="1742696"/>
+            <a:ext cx="7102549" cy="1477328"/>
+          </a:xfrm>
+          <a:prstGeom prst="rect">
+            <a:avLst/>
+          </a:prstGeom>
+          <a:noFill/>
+        </p:spPr>
+        <p:txBody>
+          <a:bodyPr wrap="square" rtlCol="0">
+            <a:spAutoFit/>
+          </a:bodyPr>
+          <a:lstStyle/>
+          <a:p>
+            <a:r>
+              <a:rPr lang="de-DE" u="sng" dirty="0"/>
+              <a:t>CLR/ALR</a:t>
+            </a:r>
             <a:r>
               <a:rPr lang="de-DE" dirty="0"/>
-              <a:t>https://github.com/zellerlab/crc_meta/blob/master/src/prepare_data.R</a:t>
-            </a:r>
+              <a:t>:</a:t>
+            </a:r>
+          </a:p>
+          <a:p>
+            <a:pPr marL="285750" indent="-285750">
+              <a:buFontTx/>
+              <a:buChar char="-"/>
+            </a:pPr>
+            <a:r>
+              <a:rPr lang="de-DE" dirty="0"/>
+              <a:t>What to do with LR.wt?</a:t>
+            </a:r>
+          </a:p>
+          <a:p>
+            <a:pPr marL="285750" indent="-285750">
+              <a:buFontTx/>
+              <a:buChar char="-"/>
+            </a:pPr>
+            <a:r>
+              <a:rPr lang="de-DE" dirty="0"/>
+              <a:t>What to do with part.names and part.wt?</a:t>
+            </a:r>
+          </a:p>
+          <a:p>
+            <a:pPr marL="285750" indent="-285750">
+              <a:buFontTx/>
+              <a:buChar char="-"/>
+            </a:pPr>
+            <a:r>
+              <a:rPr lang="de-DE" dirty="0"/>
+              <a:t>Column names ALR?</a:t>
+            </a:r>
+          </a:p>
+          <a:p>
+            <a:endParaRPr lang="de-DE" dirty="0"/>
+          </a:p>
+        </p:txBody>
+      </p:sp>
+      <p:sp>
+        <p:nvSpPr>
+          <p:cNvPr id="8" name="TextBox 7">
+            <a:extLst>
+              <a:ext uri="{FF2B5EF4-FFF2-40B4-BE49-F238E27FC236}">
+                <a16:creationId xmlns:a16="http://schemas.microsoft.com/office/drawing/2014/main" id="{42B7B4AF-462B-468E-AAF9-0BB332281A81}"/>
+              </a:ext>
+            </a:extLst>
+          </p:cNvPr>
+          <p:cNvSpPr txBox="1"/>
+          <p:nvPr/>
+        </p:nvSpPr>
+        <p:spPr>
+          <a:xfrm>
+            <a:off x="2589212" y="3278973"/>
+            <a:ext cx="7102549" cy="923330"/>
+          </a:xfrm>
+          <a:prstGeom prst="rect">
+            <a:avLst/>
+          </a:prstGeom>
+          <a:noFill/>
+        </p:spPr>
+        <p:txBody>
+          <a:bodyPr wrap="square" rtlCol="0">
+            <a:spAutoFit/>
+          </a:bodyPr>
+          <a:lstStyle/>
+          <a:p>
+            <a:r>
+              <a:rPr lang="de-DE" u="sng" dirty="0"/>
+              <a:t>EstMB:</a:t>
+            </a:r>
+            <a:endParaRPr lang="de-DE" dirty="0"/>
+          </a:p>
+          <a:p>
+            <a:pPr marL="285750" indent="-285750">
+              <a:buFontTx/>
+              <a:buChar char="-"/>
+            </a:pPr>
+            <a:r>
+              <a:rPr lang="de-DE" dirty="0"/>
+              <a:t>Needs a lot of time for ALR -&gt; solved in HPC?</a:t>
+            </a:r>
+          </a:p>
+          <a:p>
+            <a:endParaRPr lang="de-DE" dirty="0"/>
           </a:p>
         </p:txBody>
       </p:sp>
     </p:spTree>
     <p:extLst>
       <p:ext uri="{BB962C8B-B14F-4D97-AF65-F5344CB8AC3E}">
-        <p14:creationId xmlns:p14="http://schemas.microsoft.com/office/powerpoint/2010/main" val="4097922265"/>
+        <p14:creationId xmlns:p14="http://schemas.microsoft.com/office/powerpoint/2010/main" val="3441935650"/>
       </p:ext>
     </p:extLst>
   </p:cSld>
@@ -21235,6 +21106,768 @@
           <p:cNvPr id="2" name="Title 1">
             <a:extLst>
               <a:ext uri="{FF2B5EF4-FFF2-40B4-BE49-F238E27FC236}">
+                <a16:creationId xmlns:a16="http://schemas.microsoft.com/office/drawing/2014/main" id="{6806FBA4-537C-4226-9D3A-758C7B787D79}"/>
+              </a:ext>
+            </a:extLst>
+          </p:cNvPr>
+          <p:cNvSpPr>
+            <a:spLocks noGrp="1"/>
+          </p:cNvSpPr>
+          <p:nvPr>
+            <p:ph type="title"/>
+          </p:nvPr>
+        </p:nvSpPr>
+        <p:spPr/>
+        <p:txBody>
+          <a:bodyPr/>
+          <a:lstStyle/>
+          <a:p>
+            <a:r>
+              <a:rPr lang="de-DE" b="1" dirty="0"/>
+              <a:t>Hierarchy dimensionality reduction</a:t>
+            </a:r>
+            <a:endParaRPr lang="en-US" b="1" dirty="0"/>
+          </a:p>
+        </p:txBody>
+      </p:sp>
+      <p:sp>
+        <p:nvSpPr>
+          <p:cNvPr id="5" name="Footer Placeholder 4">
+            <a:extLst>
+              <a:ext uri="{FF2B5EF4-FFF2-40B4-BE49-F238E27FC236}">
+                <a16:creationId xmlns:a16="http://schemas.microsoft.com/office/drawing/2014/main" id="{707C4F70-832A-416B-9491-EE86347B2812}"/>
+              </a:ext>
+            </a:extLst>
+          </p:cNvPr>
+          <p:cNvSpPr>
+            <a:spLocks noGrp="1"/>
+          </p:cNvSpPr>
+          <p:nvPr>
+            <p:ph type="ftr" sz="quarter" idx="11"/>
+          </p:nvPr>
+        </p:nvSpPr>
+        <p:spPr/>
+        <p:txBody>
+          <a:bodyPr/>
+          <a:lstStyle/>
+          <a:p>
+            <a:r>
+              <a:rPr lang="en-US"/>
+              <a:t>jennifer.neumaier@t-online.de</a:t>
+            </a:r>
+            <a:endParaRPr lang="en-US" dirty="0"/>
+          </a:p>
+        </p:txBody>
+      </p:sp>
+      <p:sp>
+        <p:nvSpPr>
+          <p:cNvPr id="6" name="Slide Number Placeholder 5">
+            <a:extLst>
+              <a:ext uri="{FF2B5EF4-FFF2-40B4-BE49-F238E27FC236}">
+                <a16:creationId xmlns:a16="http://schemas.microsoft.com/office/drawing/2014/main" id="{1028CB34-29B5-49CB-99E4-E945C3D78896}"/>
+              </a:ext>
+            </a:extLst>
+          </p:cNvPr>
+          <p:cNvSpPr>
+            <a:spLocks noGrp="1"/>
+          </p:cNvSpPr>
+          <p:nvPr>
+            <p:ph type="sldNum" sz="quarter" idx="12"/>
+          </p:nvPr>
+        </p:nvSpPr>
+        <p:spPr/>
+        <p:txBody>
+          <a:bodyPr/>
+          <a:lstStyle/>
+          <a:p>
+            <a:fld id="{D57F1E4F-1CFF-5643-939E-217C01CDF565}" type="slidenum">
+              <a:rPr lang="en-US" smtClean="0"/>
+              <a:pPr/>
+              <a:t>25</a:t>
+            </a:fld>
+            <a:endParaRPr lang="en-US" dirty="0"/>
+          </a:p>
+        </p:txBody>
+      </p:sp>
+      <p:sp>
+        <p:nvSpPr>
+          <p:cNvPr id="26" name="TextBox 25">
+            <a:extLst>
+              <a:ext uri="{FF2B5EF4-FFF2-40B4-BE49-F238E27FC236}">
+                <a16:creationId xmlns:a16="http://schemas.microsoft.com/office/drawing/2014/main" id="{CC7BEBFF-3D20-441C-B1B2-0CE34904FDE4}"/>
+              </a:ext>
+            </a:extLst>
+          </p:cNvPr>
+          <p:cNvSpPr txBox="1"/>
+          <p:nvPr/>
+        </p:nvSpPr>
+        <p:spPr>
+          <a:xfrm>
+            <a:off x="1698819" y="1152907"/>
+            <a:ext cx="3654858" cy="400110"/>
+          </a:xfrm>
+          <a:prstGeom prst="rect">
+            <a:avLst/>
+          </a:prstGeom>
+          <a:noFill/>
+        </p:spPr>
+        <p:txBody>
+          <a:bodyPr wrap="square" rtlCol="0">
+            <a:spAutoFit/>
+          </a:bodyPr>
+          <a:lstStyle/>
+          <a:p>
+            <a:r>
+              <a:rPr lang="de-DE" sz="2000" i="1" dirty="0"/>
+              <a:t>Problems and Notes</a:t>
+            </a:r>
+          </a:p>
+        </p:txBody>
+      </p:sp>
+      <p:sp>
+        <p:nvSpPr>
+          <p:cNvPr id="7" name="TextBox 6">
+            <a:extLst>
+              <a:ext uri="{FF2B5EF4-FFF2-40B4-BE49-F238E27FC236}">
+                <a16:creationId xmlns:a16="http://schemas.microsoft.com/office/drawing/2014/main" id="{B43BF96F-7A11-4087-9B01-CF6AACD20E04}"/>
+              </a:ext>
+            </a:extLst>
+          </p:cNvPr>
+          <p:cNvSpPr txBox="1"/>
+          <p:nvPr/>
+        </p:nvSpPr>
+        <p:spPr>
+          <a:xfrm>
+            <a:off x="2589212" y="1742696"/>
+            <a:ext cx="7102549" cy="1754326"/>
+          </a:xfrm>
+          <a:prstGeom prst="rect">
+            <a:avLst/>
+          </a:prstGeom>
+          <a:noFill/>
+        </p:spPr>
+        <p:txBody>
+          <a:bodyPr wrap="square" rtlCol="0">
+            <a:spAutoFit/>
+          </a:bodyPr>
+          <a:lstStyle/>
+          <a:p>
+            <a:r>
+              <a:rPr lang="de-DE" u="sng" dirty="0"/>
+              <a:t>PCA</a:t>
+            </a:r>
+            <a:r>
+              <a:rPr lang="de-DE" dirty="0"/>
+              <a:t>:</a:t>
+            </a:r>
+          </a:p>
+          <a:p>
+            <a:pPr marL="285750" indent="-285750">
+              <a:buFontTx/>
+              <a:buChar char="-"/>
+            </a:pPr>
+            <a:r>
+              <a:rPr lang="de-DE" dirty="0"/>
+              <a:t>Microbiome Preprocessing Machine Learning Pipeline (2021)</a:t>
+            </a:r>
+          </a:p>
+          <a:p>
+            <a:pPr marL="285750" indent="-285750">
+              <a:buFontTx/>
+              <a:buChar char="-"/>
+            </a:pPr>
+            <a:r>
+              <a:rPr lang="de-DE" dirty="0"/>
+              <a:t>Proposes to use PCA as hierarchy reduction </a:t>
+            </a:r>
+          </a:p>
+          <a:p>
+            <a:pPr marL="285750" indent="-285750">
+              <a:buFontTx/>
+              <a:buChar char="-"/>
+            </a:pPr>
+            <a:r>
+              <a:rPr lang="de-DE" dirty="0"/>
+              <a:t>Families can be clustered and genus is not necessary</a:t>
+            </a:r>
+          </a:p>
+          <a:p>
+            <a:endParaRPr lang="de-DE" dirty="0"/>
+          </a:p>
+        </p:txBody>
+      </p:sp>
+    </p:spTree>
+    <p:extLst>
+      <p:ext uri="{BB962C8B-B14F-4D97-AF65-F5344CB8AC3E}">
+        <p14:creationId xmlns:p14="http://schemas.microsoft.com/office/powerpoint/2010/main" val="2182919606"/>
+      </p:ext>
+    </p:extLst>
+  </p:cSld>
+  <p:clrMapOvr>
+    <a:masterClrMapping/>
+  </p:clrMapOvr>
+</p:sld>
+</file>
+
+<file path=ppt/slides/slide26.xml><?xml version="1.0" encoding="utf-8"?>
+<p:sld xmlns:a="http://schemas.openxmlformats.org/drawingml/2006/main" xmlns:r="http://schemas.openxmlformats.org/officeDocument/2006/relationships" xmlns:p="http://schemas.openxmlformats.org/presentationml/2006/main">
+  <p:cSld>
+    <p:spTree>
+      <p:nvGrpSpPr>
+        <p:cNvPr id="1" name=""/>
+        <p:cNvGrpSpPr/>
+        <p:nvPr/>
+      </p:nvGrpSpPr>
+      <p:grpSpPr>
+        <a:xfrm>
+          <a:off x="0" y="0"/>
+          <a:ext cx="0" cy="0"/>
+          <a:chOff x="0" y="0"/>
+          <a:chExt cx="0" cy="0"/>
+        </a:xfrm>
+      </p:grpSpPr>
+      <p:sp>
+        <p:nvSpPr>
+          <p:cNvPr id="2" name="Title 1">
+            <a:extLst>
+              <a:ext uri="{FF2B5EF4-FFF2-40B4-BE49-F238E27FC236}">
+                <a16:creationId xmlns:a16="http://schemas.microsoft.com/office/drawing/2014/main" id="{6806FBA4-537C-4226-9D3A-758C7B787D79}"/>
+              </a:ext>
+            </a:extLst>
+          </p:cNvPr>
+          <p:cNvSpPr>
+            <a:spLocks noGrp="1"/>
+          </p:cNvSpPr>
+          <p:nvPr>
+            <p:ph type="title"/>
+          </p:nvPr>
+        </p:nvSpPr>
+        <p:spPr/>
+        <p:txBody>
+          <a:bodyPr>
+            <a:normAutofit/>
+          </a:bodyPr>
+          <a:lstStyle/>
+          <a:p>
+            <a:r>
+              <a:rPr lang="de-DE" sz="3200" b="1" dirty="0"/>
+              <a:t>mikropml</a:t>
+            </a:r>
+            <a:endParaRPr lang="en-US" sz="3200" b="1" dirty="0"/>
+          </a:p>
+        </p:txBody>
+      </p:sp>
+      <p:sp>
+        <p:nvSpPr>
+          <p:cNvPr id="6" name="Slide Number Placeholder 5">
+            <a:extLst>
+              <a:ext uri="{FF2B5EF4-FFF2-40B4-BE49-F238E27FC236}">
+                <a16:creationId xmlns:a16="http://schemas.microsoft.com/office/drawing/2014/main" id="{1028CB34-29B5-49CB-99E4-E945C3D78896}"/>
+              </a:ext>
+            </a:extLst>
+          </p:cNvPr>
+          <p:cNvSpPr>
+            <a:spLocks noGrp="1"/>
+          </p:cNvSpPr>
+          <p:nvPr>
+            <p:ph type="sldNum" sz="quarter" idx="12"/>
+          </p:nvPr>
+        </p:nvSpPr>
+        <p:spPr/>
+        <p:txBody>
+          <a:bodyPr/>
+          <a:lstStyle/>
+          <a:p>
+            <a:fld id="{D57F1E4F-1CFF-5643-939E-217C01CDF565}" type="slidenum">
+              <a:rPr lang="en-US" smtClean="0"/>
+              <a:pPr/>
+              <a:t>26</a:t>
+            </a:fld>
+            <a:endParaRPr lang="en-US" dirty="0"/>
+          </a:p>
+        </p:txBody>
+      </p:sp>
+      <p:sp>
+        <p:nvSpPr>
+          <p:cNvPr id="8" name="TextBox 7">
+            <a:extLst>
+              <a:ext uri="{FF2B5EF4-FFF2-40B4-BE49-F238E27FC236}">
+                <a16:creationId xmlns:a16="http://schemas.microsoft.com/office/drawing/2014/main" id="{C9FAD4F5-81D5-4890-8BB5-F06C93EDD254}"/>
+              </a:ext>
+            </a:extLst>
+          </p:cNvPr>
+          <p:cNvSpPr txBox="1"/>
+          <p:nvPr/>
+        </p:nvSpPr>
+        <p:spPr>
+          <a:xfrm>
+            <a:off x="1392866" y="1268569"/>
+            <a:ext cx="8753253" cy="5509200"/>
+          </a:xfrm>
+          <a:prstGeom prst="rect">
+            <a:avLst/>
+          </a:prstGeom>
+          <a:noFill/>
+        </p:spPr>
+        <p:txBody>
+          <a:bodyPr wrap="square">
+            <a:spAutoFit/>
+          </a:bodyPr>
+          <a:lstStyle/>
+          <a:p>
+            <a:r>
+              <a:rPr lang="de-DE" sz="1100" dirty="0"/>
+              <a:t>Testing out mikropml as it already has a function run_ml() that incorporates nested cross-validation for several standard supervised machine learning models:</a:t>
+            </a:r>
+          </a:p>
+          <a:p>
+            <a:endParaRPr lang="de-DE" sz="1100" dirty="0"/>
+          </a:p>
+          <a:p>
+            <a:r>
+              <a:rPr lang="de-DE" sz="1100" dirty="0"/>
+              <a:t>    Logistic/multiclass/linear regression ("glmnet")</a:t>
+            </a:r>
+          </a:p>
+          <a:p>
+            <a:r>
+              <a:rPr lang="de-DE" sz="1100" dirty="0"/>
+              <a:t>    Random forest ("rf")</a:t>
+            </a:r>
+          </a:p>
+          <a:p>
+            <a:r>
+              <a:rPr lang="de-DE" sz="1100" dirty="0"/>
+              <a:t>    Decision tree ("rpart2")</a:t>
+            </a:r>
+          </a:p>
+          <a:p>
+            <a:r>
+              <a:rPr lang="de-DE" sz="1100" dirty="0"/>
+              <a:t>    Support vector machine with a radial basis kernel ("svmRadial")</a:t>
+            </a:r>
+          </a:p>
+          <a:p>
+            <a:r>
+              <a:rPr lang="de-DE" sz="1100" dirty="0"/>
+              <a:t>    xgboost ("xgbTree")</a:t>
+            </a:r>
+          </a:p>
+          <a:p>
+            <a:endParaRPr lang="de-DE" sz="1100" dirty="0"/>
+          </a:p>
+          <a:p>
+            <a:r>
+              <a:rPr lang="de-DE" sz="1100" dirty="0"/>
+              <a:t>Test it here for linear regression and xgboost.</a:t>
+            </a:r>
+          </a:p>
+          <a:p>
+            <a:r>
+              <a:rPr lang="de-DE" sz="1100" dirty="0"/>
+              <a:t>Function run_ml has several parameters:</a:t>
+            </a:r>
+          </a:p>
+          <a:p>
+            <a:r>
+              <a:rPr lang="de-DE" sz="1100" dirty="0"/>
+              <a:t>           dataset,</a:t>
+            </a:r>
+          </a:p>
+          <a:p>
+            <a:r>
+              <a:rPr lang="de-DE" sz="1100" dirty="0"/>
+              <a:t>           method,</a:t>
+            </a:r>
+          </a:p>
+          <a:p>
+            <a:r>
+              <a:rPr lang="de-DE" sz="1100" dirty="0"/>
+              <a:t>           outcome_colname = NULL, (standardized the first column)</a:t>
+            </a:r>
+          </a:p>
+          <a:p>
+            <a:r>
+              <a:rPr lang="de-DE" sz="1100" dirty="0"/>
+              <a:t>           hyperparameters = NULL,</a:t>
+            </a:r>
+          </a:p>
+          <a:p>
+            <a:r>
+              <a:rPr lang="de-DE" sz="1100" dirty="0"/>
+              <a:t>           find_feature_importance = FALSE, (`TRUE` is recommended if you would like to identify features important for predicting your                                                outcome, but it is resource-intensive.</a:t>
+            </a:r>
+          </a:p>
+          <a:p>
+            <a:r>
+              <a:rPr lang="de-DE" sz="1100" dirty="0"/>
+              <a:t>           calculate_performance = TRUE,</a:t>
+            </a:r>
+          </a:p>
+          <a:p>
+            <a:r>
+              <a:rPr lang="de-DE" sz="1100" dirty="0"/>
+              <a:t>           kfold = 5, (standard at 5)</a:t>
+            </a:r>
+          </a:p>
+          <a:p>
+            <a:r>
+              <a:rPr lang="de-DE" sz="1100" dirty="0"/>
+              <a:t>           cv_times = 100, (standard at 100)</a:t>
+            </a:r>
+          </a:p>
+          <a:p>
+            <a:r>
+              <a:rPr lang="de-DE" sz="1100" dirty="0"/>
+              <a:t>           cross_val = NULL, (cross_val a custom cross-validation scheme from `caret::trainControl()` (default: `NULL`, uses `kfold` cross                              validation repeated `cv_times`). `kfold` and `cv_times` are ignored if the user provides a custom                                          cross-validation scheme.)</a:t>
+            </a:r>
+          </a:p>
+          <a:p>
+            <a:r>
+              <a:rPr lang="de-DE" sz="1100" dirty="0"/>
+              <a:t>           training_frac = 0.8, (standard at 0.8)</a:t>
+            </a:r>
+          </a:p>
+          <a:p>
+            <a:r>
+              <a:rPr lang="de-DE" sz="1100" dirty="0"/>
+              <a:t>           perf_metric_function = NULL,</a:t>
+            </a:r>
+          </a:p>
+          <a:p>
+            <a:r>
+              <a:rPr lang="de-DE" sz="1100" dirty="0"/>
+              <a:t>           perf_metric_name = NULL,</a:t>
+            </a:r>
+          </a:p>
+          <a:p>
+            <a:r>
+              <a:rPr lang="de-DE" sz="1100" dirty="0"/>
+              <a:t>           groups = NULL,</a:t>
+            </a:r>
+          </a:p>
+          <a:p>
+            <a:r>
+              <a:rPr lang="de-DE" sz="1100" dirty="0"/>
+              <a:t>           group_partitions = NULL,</a:t>
+            </a:r>
+          </a:p>
+          <a:p>
+            <a:r>
+              <a:rPr lang="de-DE" sz="1100" dirty="0"/>
+              <a:t>           corr_thresh = 1,</a:t>
+            </a:r>
+          </a:p>
+          <a:p>
+            <a:r>
+              <a:rPr lang="de-DE" sz="1100" dirty="0"/>
+              <a:t>           ntree = 1000, (For random forest, how many trees to use (default: `1000`). Caret doesn't allow this hyperparameter to be tuned)</a:t>
+            </a:r>
+          </a:p>
+          <a:p>
+            <a:r>
+              <a:rPr lang="de-DE" sz="1100" dirty="0"/>
+              <a:t>           seed = NA (set seed for reproducibility)</a:t>
+            </a:r>
+          </a:p>
+        </p:txBody>
+      </p:sp>
+    </p:spTree>
+    <p:extLst>
+      <p:ext uri="{BB962C8B-B14F-4D97-AF65-F5344CB8AC3E}">
+        <p14:creationId xmlns:p14="http://schemas.microsoft.com/office/powerpoint/2010/main" val="3541464901"/>
+      </p:ext>
+    </p:extLst>
+  </p:cSld>
+  <p:clrMapOvr>
+    <a:masterClrMapping/>
+  </p:clrMapOvr>
+</p:sld>
+</file>
+
+<file path=ppt/slides/slide27.xml><?xml version="1.0" encoding="utf-8"?>
+<p:sld xmlns:a="http://schemas.openxmlformats.org/drawingml/2006/main" xmlns:r="http://schemas.openxmlformats.org/officeDocument/2006/relationships" xmlns:p="http://schemas.openxmlformats.org/presentationml/2006/main">
+  <p:cSld>
+    <p:spTree>
+      <p:nvGrpSpPr>
+        <p:cNvPr id="1" name=""/>
+        <p:cNvGrpSpPr/>
+        <p:nvPr/>
+      </p:nvGrpSpPr>
+      <p:grpSpPr>
+        <a:xfrm>
+          <a:off x="0" y="0"/>
+          <a:ext cx="0" cy="0"/>
+          <a:chOff x="0" y="0"/>
+          <a:chExt cx="0" cy="0"/>
+        </a:xfrm>
+      </p:grpSpPr>
+      <p:sp>
+        <p:nvSpPr>
+          <p:cNvPr id="2" name="Title 1">
+            <a:extLst>
+              <a:ext uri="{FF2B5EF4-FFF2-40B4-BE49-F238E27FC236}">
+                <a16:creationId xmlns:a16="http://schemas.microsoft.com/office/drawing/2014/main" id="{169D9D37-B637-4D74-BB75-639D51A491FB}"/>
+              </a:ext>
+            </a:extLst>
+          </p:cNvPr>
+          <p:cNvSpPr>
+            <a:spLocks noGrp="1"/>
+          </p:cNvSpPr>
+          <p:nvPr>
+            <p:ph type="title"/>
+          </p:nvPr>
+        </p:nvSpPr>
+        <p:spPr>
+          <a:xfrm>
+            <a:off x="1640156" y="628124"/>
+            <a:ext cx="8911687" cy="1280890"/>
+          </a:xfrm>
+        </p:spPr>
+        <p:txBody>
+          <a:bodyPr/>
+          <a:lstStyle/>
+          <a:p>
+            <a:r>
+              <a:rPr lang="de-DE" b="1" dirty="0"/>
+              <a:t>Data set</a:t>
+            </a:r>
+            <a:endParaRPr lang="en-US" b="1" dirty="0"/>
+          </a:p>
+        </p:txBody>
+      </p:sp>
+      <p:sp>
+        <p:nvSpPr>
+          <p:cNvPr id="3" name="Content Placeholder 2">
+            <a:extLst>
+              <a:ext uri="{FF2B5EF4-FFF2-40B4-BE49-F238E27FC236}">
+                <a16:creationId xmlns:a16="http://schemas.microsoft.com/office/drawing/2014/main" id="{D4D56813-9DF8-4D28-B156-1DE48E95DBC2}"/>
+              </a:ext>
+            </a:extLst>
+          </p:cNvPr>
+          <p:cNvSpPr>
+            <a:spLocks noGrp="1"/>
+          </p:cNvSpPr>
+          <p:nvPr>
+            <p:ph idx="1"/>
+          </p:nvPr>
+        </p:nvSpPr>
+        <p:spPr>
+          <a:xfrm>
+            <a:off x="2592495" y="1317171"/>
+            <a:ext cx="8915400" cy="4369465"/>
+          </a:xfrm>
+        </p:spPr>
+        <p:txBody>
+          <a:bodyPr>
+            <a:normAutofit/>
+          </a:bodyPr>
+          <a:lstStyle/>
+          <a:p>
+            <a:r>
+              <a:rPr lang="de-DE" dirty="0"/>
+              <a:t>Compare what Thomas P. Quinn uses (13 datasets) and take out from estonian biobank</a:t>
+            </a:r>
+          </a:p>
+          <a:p>
+            <a:r>
+              <a:rPr lang="de-DE" dirty="0"/>
+              <a:t> prediction/classification tasks</a:t>
+            </a:r>
+          </a:p>
+          <a:p>
+            <a:r>
+              <a:rPr lang="de-DE" dirty="0"/>
+              <a:t>One with continuous and one with discrete variables</a:t>
+            </a:r>
+          </a:p>
+          <a:p>
+            <a:r>
+              <a:rPr lang="de-DE" dirty="0"/>
+              <a:t>one with high correlation and one with low to microbiomes</a:t>
+            </a:r>
+          </a:p>
+          <a:p>
+            <a:r>
+              <a:rPr lang="de-DE" dirty="0"/>
+              <a:t>one small and one large data set</a:t>
+            </a:r>
+          </a:p>
+          <a:p>
+            <a:r>
+              <a:rPr lang="de-DE" dirty="0"/>
+              <a:t>EstMB, colorectal cancer, PCOS</a:t>
+            </a:r>
+          </a:p>
+          <a:p>
+            <a:endParaRPr lang="de-DE" dirty="0"/>
+          </a:p>
+        </p:txBody>
+      </p:sp>
+      <p:sp>
+        <p:nvSpPr>
+          <p:cNvPr id="4" name="Date Placeholder 3">
+            <a:extLst>
+              <a:ext uri="{FF2B5EF4-FFF2-40B4-BE49-F238E27FC236}">
+                <a16:creationId xmlns:a16="http://schemas.microsoft.com/office/drawing/2014/main" id="{D53DB4F4-84EC-4588-88E6-8D8519D6A1E8}"/>
+              </a:ext>
+            </a:extLst>
+          </p:cNvPr>
+          <p:cNvSpPr>
+            <a:spLocks noGrp="1"/>
+          </p:cNvSpPr>
+          <p:nvPr>
+            <p:ph type="dt" sz="half" idx="10"/>
+          </p:nvPr>
+        </p:nvSpPr>
+        <p:spPr/>
+        <p:txBody>
+          <a:bodyPr/>
+          <a:lstStyle/>
+          <a:p>
+            <a:fld id="{5A2DBB50-F561-45B0-9BE5-95A455D2CD8B}" type="datetime1">
+              <a:rPr lang="en-US" smtClean="0"/>
+              <a:t>4/20/2022</a:t>
+            </a:fld>
+            <a:endParaRPr lang="en-US" dirty="0"/>
+          </a:p>
+        </p:txBody>
+      </p:sp>
+      <p:sp>
+        <p:nvSpPr>
+          <p:cNvPr id="5" name="Footer Placeholder 4">
+            <a:extLst>
+              <a:ext uri="{FF2B5EF4-FFF2-40B4-BE49-F238E27FC236}">
+                <a16:creationId xmlns:a16="http://schemas.microsoft.com/office/drawing/2014/main" id="{A7F3346A-3F24-484B-A6D3-55D66520C917}"/>
+              </a:ext>
+            </a:extLst>
+          </p:cNvPr>
+          <p:cNvSpPr>
+            <a:spLocks noGrp="1"/>
+          </p:cNvSpPr>
+          <p:nvPr>
+            <p:ph type="ftr" sz="quarter" idx="11"/>
+          </p:nvPr>
+        </p:nvSpPr>
+        <p:spPr/>
+        <p:txBody>
+          <a:bodyPr/>
+          <a:lstStyle/>
+          <a:p>
+            <a:r>
+              <a:rPr lang="en-US"/>
+              <a:t>jennifer.neumaier@t-online.de</a:t>
+            </a:r>
+            <a:endParaRPr lang="en-US" dirty="0"/>
+          </a:p>
+        </p:txBody>
+      </p:sp>
+      <p:sp>
+        <p:nvSpPr>
+          <p:cNvPr id="6" name="Slide Number Placeholder 5">
+            <a:extLst>
+              <a:ext uri="{FF2B5EF4-FFF2-40B4-BE49-F238E27FC236}">
+                <a16:creationId xmlns:a16="http://schemas.microsoft.com/office/drawing/2014/main" id="{C4B3B4A6-E708-4F88-8CA2-BDE8FCF0C0AC}"/>
+              </a:ext>
+            </a:extLst>
+          </p:cNvPr>
+          <p:cNvSpPr>
+            <a:spLocks noGrp="1"/>
+          </p:cNvSpPr>
+          <p:nvPr>
+            <p:ph type="sldNum" sz="quarter" idx="12"/>
+          </p:nvPr>
+        </p:nvSpPr>
+        <p:spPr/>
+        <p:txBody>
+          <a:bodyPr/>
+          <a:lstStyle/>
+          <a:p>
+            <a:fld id="{D57F1E4F-1CFF-5643-939E-217C01CDF565}" type="slidenum">
+              <a:rPr lang="en-US" smtClean="0"/>
+              <a:pPr/>
+              <a:t>27</a:t>
+            </a:fld>
+            <a:endParaRPr lang="en-US" dirty="0"/>
+          </a:p>
+        </p:txBody>
+      </p:sp>
+      <p:sp>
+        <p:nvSpPr>
+          <p:cNvPr id="8" name="TextBox 7">
+            <a:extLst>
+              <a:ext uri="{FF2B5EF4-FFF2-40B4-BE49-F238E27FC236}">
+                <a16:creationId xmlns:a16="http://schemas.microsoft.com/office/drawing/2014/main" id="{6A373959-7937-4239-AAA7-0B90CAF1A620}"/>
+              </a:ext>
+            </a:extLst>
+          </p:cNvPr>
+          <p:cNvSpPr txBox="1"/>
+          <p:nvPr/>
+        </p:nvSpPr>
+        <p:spPr>
+          <a:xfrm>
+            <a:off x="2260283" y="4487322"/>
+            <a:ext cx="6097904" cy="923330"/>
+          </a:xfrm>
+          <a:prstGeom prst="rect">
+            <a:avLst/>
+          </a:prstGeom>
+          <a:noFill/>
+        </p:spPr>
+        <p:txBody>
+          <a:bodyPr wrap="square">
+            <a:spAutoFit/>
+          </a:bodyPr>
+          <a:lstStyle/>
+          <a:p>
+            <a:r>
+              <a:rPr lang="de-DE" b="1" dirty="0"/>
+              <a:t>CRC data set preparation and models:</a:t>
+            </a:r>
+          </a:p>
+          <a:p>
+            <a:r>
+              <a:rPr lang="de-DE" dirty="0"/>
+              <a:t>https://github.com/zellerlab/crc_meta/blob/master/src/prepare_data.R</a:t>
+            </a:r>
+          </a:p>
+        </p:txBody>
+      </p:sp>
+    </p:spTree>
+    <p:extLst>
+      <p:ext uri="{BB962C8B-B14F-4D97-AF65-F5344CB8AC3E}">
+        <p14:creationId xmlns:p14="http://schemas.microsoft.com/office/powerpoint/2010/main" val="4097922265"/>
+      </p:ext>
+    </p:extLst>
+  </p:cSld>
+  <p:clrMapOvr>
+    <a:masterClrMapping/>
+  </p:clrMapOvr>
+</p:sld>
+</file>
+
+<file path=ppt/slides/slide28.xml><?xml version="1.0" encoding="utf-8"?>
+<p:sld xmlns:a="http://schemas.openxmlformats.org/drawingml/2006/main" xmlns:r="http://schemas.openxmlformats.org/officeDocument/2006/relationships" xmlns:p="http://schemas.openxmlformats.org/presentationml/2006/main">
+  <p:cSld>
+    <p:spTree>
+      <p:nvGrpSpPr>
+        <p:cNvPr id="1" name=""/>
+        <p:cNvGrpSpPr/>
+        <p:nvPr/>
+      </p:nvGrpSpPr>
+      <p:grpSpPr>
+        <a:xfrm>
+          <a:off x="0" y="0"/>
+          <a:ext cx="0" cy="0"/>
+          <a:chOff x="0" y="0"/>
+          <a:chExt cx="0" cy="0"/>
+        </a:xfrm>
+      </p:grpSpPr>
+      <p:sp>
+        <p:nvSpPr>
+          <p:cNvPr id="2" name="Title 1">
+            <a:extLst>
+              <a:ext uri="{FF2B5EF4-FFF2-40B4-BE49-F238E27FC236}">
                 <a16:creationId xmlns:a16="http://schemas.microsoft.com/office/drawing/2014/main" id="{150EAB59-F93C-4B56-AD7E-A9B5BD800221}"/>
               </a:ext>
             </a:extLst>
@@ -21287,7 +21920,7 @@
           <a:p>
             <a:fld id="{BDD716FE-4A5D-4A13-A8EE-37F9C34BE666}" type="datetime1">
               <a:rPr lang="en-US" smtClean="0"/>
-              <a:t>4/16/2022</a:t>
+              <a:t>4/20/2022</a:t>
             </a:fld>
             <a:endParaRPr lang="en-US" dirty="0"/>
           </a:p>
@@ -21346,7 +21979,7 @@
             <a:fld id="{D57F1E4F-1CFF-5643-939E-217C01CDF565}" type="slidenum">
               <a:rPr lang="en-US" smtClean="0"/>
               <a:pPr/>
-              <a:t>25</a:t>
+              <a:t>28</a:t>
             </a:fld>
             <a:endParaRPr lang="en-US" dirty="0"/>
           </a:p>
@@ -21455,648 +22088,6 @@
 </p:sld>
 </file>
 
-<file path=ppt/slides/slide26.xml><?xml version="1.0" encoding="utf-8"?>
-<p:sld xmlns:a="http://schemas.openxmlformats.org/drawingml/2006/main" xmlns:r="http://schemas.openxmlformats.org/officeDocument/2006/relationships" xmlns:p="http://schemas.openxmlformats.org/presentationml/2006/main">
-  <p:cSld>
-    <p:spTree>
-      <p:nvGrpSpPr>
-        <p:cNvPr id="1" name=""/>
-        <p:cNvGrpSpPr/>
-        <p:nvPr/>
-      </p:nvGrpSpPr>
-      <p:grpSpPr>
-        <a:xfrm>
-          <a:off x="0" y="0"/>
-          <a:ext cx="0" cy="0"/>
-          <a:chOff x="0" y="0"/>
-          <a:chExt cx="0" cy="0"/>
-        </a:xfrm>
-      </p:grpSpPr>
-      <p:sp>
-        <p:nvSpPr>
-          <p:cNvPr id="2" name="Title 1">
-            <a:extLst>
-              <a:ext uri="{FF2B5EF4-FFF2-40B4-BE49-F238E27FC236}">
-                <a16:creationId xmlns:a16="http://schemas.microsoft.com/office/drawing/2014/main" id="{169D9D37-B637-4D74-BB75-639D51A491FB}"/>
-              </a:ext>
-            </a:extLst>
-          </p:cNvPr>
-          <p:cNvSpPr>
-            <a:spLocks noGrp="1"/>
-          </p:cNvSpPr>
-          <p:nvPr>
-            <p:ph type="title"/>
-          </p:nvPr>
-        </p:nvSpPr>
-        <p:spPr>
-          <a:xfrm>
-            <a:off x="1640156" y="628124"/>
-            <a:ext cx="8911687" cy="1280890"/>
-          </a:xfrm>
-        </p:spPr>
-        <p:txBody>
-          <a:bodyPr/>
-          <a:lstStyle/>
-          <a:p>
-            <a:r>
-              <a:rPr lang="de-DE" b="1" dirty="0"/>
-              <a:t>Problems</a:t>
-            </a:r>
-            <a:endParaRPr lang="en-US" b="1" dirty="0"/>
-          </a:p>
-        </p:txBody>
-      </p:sp>
-      <p:sp>
-        <p:nvSpPr>
-          <p:cNvPr id="3" name="Content Placeholder 2">
-            <a:extLst>
-              <a:ext uri="{FF2B5EF4-FFF2-40B4-BE49-F238E27FC236}">
-                <a16:creationId xmlns:a16="http://schemas.microsoft.com/office/drawing/2014/main" id="{D4D56813-9DF8-4D28-B156-1DE48E95DBC2}"/>
-              </a:ext>
-            </a:extLst>
-          </p:cNvPr>
-          <p:cNvSpPr>
-            <a:spLocks noGrp="1"/>
-          </p:cNvSpPr>
-          <p:nvPr>
-            <p:ph idx="1"/>
-          </p:nvPr>
-        </p:nvSpPr>
-        <p:spPr/>
-        <p:txBody>
-          <a:bodyPr/>
-          <a:lstStyle/>
-          <a:p>
-            <a:r>
-              <a:rPr lang="de-DE" dirty="0"/>
-              <a:t>Microbial features are not independent </a:t>
-            </a:r>
-          </a:p>
-          <a:p>
-            <a:r>
-              <a:rPr lang="de-DE" dirty="0"/>
-              <a:t>Some microbial features are found in correlation!</a:t>
-            </a:r>
-          </a:p>
-        </p:txBody>
-      </p:sp>
-      <p:sp>
-        <p:nvSpPr>
-          <p:cNvPr id="4" name="Date Placeholder 3">
-            <a:extLst>
-              <a:ext uri="{FF2B5EF4-FFF2-40B4-BE49-F238E27FC236}">
-                <a16:creationId xmlns:a16="http://schemas.microsoft.com/office/drawing/2014/main" id="{D53DB4F4-84EC-4588-88E6-8D8519D6A1E8}"/>
-              </a:ext>
-            </a:extLst>
-          </p:cNvPr>
-          <p:cNvSpPr>
-            <a:spLocks noGrp="1"/>
-          </p:cNvSpPr>
-          <p:nvPr>
-            <p:ph type="dt" sz="half" idx="10"/>
-          </p:nvPr>
-        </p:nvSpPr>
-        <p:spPr/>
-        <p:txBody>
-          <a:bodyPr/>
-          <a:lstStyle/>
-          <a:p>
-            <a:fld id="{5A2DBB50-F561-45B0-9BE5-95A455D2CD8B}" type="datetime1">
-              <a:rPr lang="en-US" smtClean="0"/>
-              <a:t>4/16/2022</a:t>
-            </a:fld>
-            <a:endParaRPr lang="en-US" dirty="0"/>
-          </a:p>
-        </p:txBody>
-      </p:sp>
-      <p:sp>
-        <p:nvSpPr>
-          <p:cNvPr id="5" name="Footer Placeholder 4">
-            <a:extLst>
-              <a:ext uri="{FF2B5EF4-FFF2-40B4-BE49-F238E27FC236}">
-                <a16:creationId xmlns:a16="http://schemas.microsoft.com/office/drawing/2014/main" id="{A7F3346A-3F24-484B-A6D3-55D66520C917}"/>
-              </a:ext>
-            </a:extLst>
-          </p:cNvPr>
-          <p:cNvSpPr>
-            <a:spLocks noGrp="1"/>
-          </p:cNvSpPr>
-          <p:nvPr>
-            <p:ph type="ftr" sz="quarter" idx="11"/>
-          </p:nvPr>
-        </p:nvSpPr>
-        <p:spPr/>
-        <p:txBody>
-          <a:bodyPr/>
-          <a:lstStyle/>
-          <a:p>
-            <a:r>
-              <a:rPr lang="en-US"/>
-              <a:t>jennifer.neumaier@t-online.de</a:t>
-            </a:r>
-            <a:endParaRPr lang="en-US" dirty="0"/>
-          </a:p>
-        </p:txBody>
-      </p:sp>
-      <p:sp>
-        <p:nvSpPr>
-          <p:cNvPr id="6" name="Slide Number Placeholder 5">
-            <a:extLst>
-              <a:ext uri="{FF2B5EF4-FFF2-40B4-BE49-F238E27FC236}">
-                <a16:creationId xmlns:a16="http://schemas.microsoft.com/office/drawing/2014/main" id="{C4B3B4A6-E708-4F88-8CA2-BDE8FCF0C0AC}"/>
-              </a:ext>
-            </a:extLst>
-          </p:cNvPr>
-          <p:cNvSpPr>
-            <a:spLocks noGrp="1"/>
-          </p:cNvSpPr>
-          <p:nvPr>
-            <p:ph type="sldNum" sz="quarter" idx="12"/>
-          </p:nvPr>
-        </p:nvSpPr>
-        <p:spPr/>
-        <p:txBody>
-          <a:bodyPr/>
-          <a:lstStyle/>
-          <a:p>
-            <a:fld id="{D57F1E4F-1CFF-5643-939E-217C01CDF565}" type="slidenum">
-              <a:rPr lang="en-US" smtClean="0"/>
-              <a:pPr/>
-              <a:t>26</a:t>
-            </a:fld>
-            <a:endParaRPr lang="en-US" dirty="0"/>
-          </a:p>
-        </p:txBody>
-      </p:sp>
-    </p:spTree>
-    <p:extLst>
-      <p:ext uri="{BB962C8B-B14F-4D97-AF65-F5344CB8AC3E}">
-        <p14:creationId xmlns:p14="http://schemas.microsoft.com/office/powerpoint/2010/main" val="1795355039"/>
-      </p:ext>
-    </p:extLst>
-  </p:cSld>
-  <p:clrMapOvr>
-    <a:masterClrMapping/>
-  </p:clrMapOvr>
-</p:sld>
-</file>
-
-<file path=ppt/slides/slide27.xml><?xml version="1.0" encoding="utf-8"?>
-<p:sld xmlns:a="http://schemas.openxmlformats.org/drawingml/2006/main" xmlns:r="http://schemas.openxmlformats.org/officeDocument/2006/relationships" xmlns:p="http://schemas.openxmlformats.org/presentationml/2006/main">
-  <p:cSld>
-    <p:spTree>
-      <p:nvGrpSpPr>
-        <p:cNvPr id="1" name=""/>
-        <p:cNvGrpSpPr/>
-        <p:nvPr/>
-      </p:nvGrpSpPr>
-      <p:grpSpPr>
-        <a:xfrm>
-          <a:off x="0" y="0"/>
-          <a:ext cx="0" cy="0"/>
-          <a:chOff x="0" y="0"/>
-          <a:chExt cx="0" cy="0"/>
-        </a:xfrm>
-      </p:grpSpPr>
-      <p:sp>
-        <p:nvSpPr>
-          <p:cNvPr id="2" name="Title 1">
-            <a:extLst>
-              <a:ext uri="{FF2B5EF4-FFF2-40B4-BE49-F238E27FC236}">
-                <a16:creationId xmlns:a16="http://schemas.microsoft.com/office/drawing/2014/main" id="{169D9D37-B637-4D74-BB75-639D51A491FB}"/>
-              </a:ext>
-            </a:extLst>
-          </p:cNvPr>
-          <p:cNvSpPr>
-            <a:spLocks noGrp="1"/>
-          </p:cNvSpPr>
-          <p:nvPr>
-            <p:ph type="title"/>
-          </p:nvPr>
-        </p:nvSpPr>
-        <p:spPr>
-          <a:xfrm>
-            <a:off x="1640156" y="628124"/>
-            <a:ext cx="8911687" cy="1280890"/>
-          </a:xfrm>
-        </p:spPr>
-        <p:txBody>
-          <a:bodyPr/>
-          <a:lstStyle/>
-          <a:p>
-            <a:r>
-              <a:rPr lang="de-DE" b="1" dirty="0"/>
-              <a:t>Notes 30.01. meeting</a:t>
-            </a:r>
-            <a:endParaRPr lang="en-US" b="1" dirty="0"/>
-          </a:p>
-        </p:txBody>
-      </p:sp>
-      <p:sp>
-        <p:nvSpPr>
-          <p:cNvPr id="3" name="Content Placeholder 2">
-            <a:extLst>
-              <a:ext uri="{FF2B5EF4-FFF2-40B4-BE49-F238E27FC236}">
-                <a16:creationId xmlns:a16="http://schemas.microsoft.com/office/drawing/2014/main" id="{D4D56813-9DF8-4D28-B156-1DE48E95DBC2}"/>
-              </a:ext>
-            </a:extLst>
-          </p:cNvPr>
-          <p:cNvSpPr>
-            <a:spLocks noGrp="1"/>
-          </p:cNvSpPr>
-          <p:nvPr>
-            <p:ph idx="1"/>
-          </p:nvPr>
-        </p:nvSpPr>
-        <p:spPr/>
-        <p:txBody>
-          <a:bodyPr/>
-          <a:lstStyle/>
-          <a:p>
-            <a:r>
-              <a:rPr lang="de-DE" dirty="0"/>
-              <a:t>Review paper ML for microbiome paper</a:t>
-            </a:r>
-          </a:p>
-          <a:p>
-            <a:r>
-              <a:rPr lang="de-DE" dirty="0"/>
-              <a:t>COST action paper</a:t>
-            </a:r>
-          </a:p>
-          <a:p>
-            <a:r>
-              <a:rPr lang="de-DE"/>
-              <a:t>Confidentiality form, sign, scan and send to Elin</a:t>
-            </a:r>
-            <a:endParaRPr lang="de-DE" dirty="0"/>
-          </a:p>
-          <a:p>
-            <a:r>
-              <a:rPr lang="de-DE" dirty="0"/>
-              <a:t>Meeting Oliver Friday, 4th February</a:t>
-            </a:r>
-          </a:p>
-          <a:p>
-            <a:r>
-              <a:rPr lang="de-DE" dirty="0"/>
-              <a:t>Literature Review: ~10-20 pages, include Figures and Tables, equations for major transformations, write for biologists</a:t>
-            </a:r>
-          </a:p>
-          <a:p>
-            <a:endParaRPr lang="de-DE" dirty="0"/>
-          </a:p>
-        </p:txBody>
-      </p:sp>
-      <p:sp>
-        <p:nvSpPr>
-          <p:cNvPr id="4" name="Date Placeholder 3">
-            <a:extLst>
-              <a:ext uri="{FF2B5EF4-FFF2-40B4-BE49-F238E27FC236}">
-                <a16:creationId xmlns:a16="http://schemas.microsoft.com/office/drawing/2014/main" id="{D53DB4F4-84EC-4588-88E6-8D8519D6A1E8}"/>
-              </a:ext>
-            </a:extLst>
-          </p:cNvPr>
-          <p:cNvSpPr>
-            <a:spLocks noGrp="1"/>
-          </p:cNvSpPr>
-          <p:nvPr>
-            <p:ph type="dt" sz="half" idx="10"/>
-          </p:nvPr>
-        </p:nvSpPr>
-        <p:spPr/>
-        <p:txBody>
-          <a:bodyPr/>
-          <a:lstStyle/>
-          <a:p>
-            <a:fld id="{5A2DBB50-F561-45B0-9BE5-95A455D2CD8B}" type="datetime1">
-              <a:rPr lang="en-US" smtClean="0"/>
-              <a:t>4/16/2022</a:t>
-            </a:fld>
-            <a:endParaRPr lang="en-US" dirty="0"/>
-          </a:p>
-        </p:txBody>
-      </p:sp>
-      <p:sp>
-        <p:nvSpPr>
-          <p:cNvPr id="5" name="Footer Placeholder 4">
-            <a:extLst>
-              <a:ext uri="{FF2B5EF4-FFF2-40B4-BE49-F238E27FC236}">
-                <a16:creationId xmlns:a16="http://schemas.microsoft.com/office/drawing/2014/main" id="{A7F3346A-3F24-484B-A6D3-55D66520C917}"/>
-              </a:ext>
-            </a:extLst>
-          </p:cNvPr>
-          <p:cNvSpPr>
-            <a:spLocks noGrp="1"/>
-          </p:cNvSpPr>
-          <p:nvPr>
-            <p:ph type="ftr" sz="quarter" idx="11"/>
-          </p:nvPr>
-        </p:nvSpPr>
-        <p:spPr/>
-        <p:txBody>
-          <a:bodyPr/>
-          <a:lstStyle/>
-          <a:p>
-            <a:r>
-              <a:rPr lang="en-US"/>
-              <a:t>jennifer.neumaier@t-online.de</a:t>
-            </a:r>
-            <a:endParaRPr lang="en-US" dirty="0"/>
-          </a:p>
-        </p:txBody>
-      </p:sp>
-      <p:sp>
-        <p:nvSpPr>
-          <p:cNvPr id="6" name="Slide Number Placeholder 5">
-            <a:extLst>
-              <a:ext uri="{FF2B5EF4-FFF2-40B4-BE49-F238E27FC236}">
-                <a16:creationId xmlns:a16="http://schemas.microsoft.com/office/drawing/2014/main" id="{C4B3B4A6-E708-4F88-8CA2-BDE8FCF0C0AC}"/>
-              </a:ext>
-            </a:extLst>
-          </p:cNvPr>
-          <p:cNvSpPr>
-            <a:spLocks noGrp="1"/>
-          </p:cNvSpPr>
-          <p:nvPr>
-            <p:ph type="sldNum" sz="quarter" idx="12"/>
-          </p:nvPr>
-        </p:nvSpPr>
-        <p:spPr/>
-        <p:txBody>
-          <a:bodyPr/>
-          <a:lstStyle/>
-          <a:p>
-            <a:fld id="{D57F1E4F-1CFF-5643-939E-217C01CDF565}" type="slidenum">
-              <a:rPr lang="en-US" smtClean="0"/>
-              <a:pPr/>
-              <a:t>27</a:t>
-            </a:fld>
-            <a:endParaRPr lang="en-US" dirty="0"/>
-          </a:p>
-        </p:txBody>
-      </p:sp>
-    </p:spTree>
-    <p:extLst>
-      <p:ext uri="{BB962C8B-B14F-4D97-AF65-F5344CB8AC3E}">
-        <p14:creationId xmlns:p14="http://schemas.microsoft.com/office/powerpoint/2010/main" val="3993456640"/>
-      </p:ext>
-    </p:extLst>
-  </p:cSld>
-  <p:clrMapOvr>
-    <a:masterClrMapping/>
-  </p:clrMapOvr>
-</p:sld>
-</file>
-
-<file path=ppt/slides/slide28.xml><?xml version="1.0" encoding="utf-8"?>
-<p:sld xmlns:a="http://schemas.openxmlformats.org/drawingml/2006/main" xmlns:r="http://schemas.openxmlformats.org/officeDocument/2006/relationships" xmlns:p="http://schemas.openxmlformats.org/presentationml/2006/main">
-  <p:cSld>
-    <p:spTree>
-      <p:nvGrpSpPr>
-        <p:cNvPr id="1" name=""/>
-        <p:cNvGrpSpPr/>
-        <p:nvPr/>
-      </p:nvGrpSpPr>
-      <p:grpSpPr>
-        <a:xfrm>
-          <a:off x="0" y="0"/>
-          <a:ext cx="0" cy="0"/>
-          <a:chOff x="0" y="0"/>
-          <a:chExt cx="0" cy="0"/>
-        </a:xfrm>
-      </p:grpSpPr>
-      <p:sp>
-        <p:nvSpPr>
-          <p:cNvPr id="2" name="Title 1">
-            <a:extLst>
-              <a:ext uri="{FF2B5EF4-FFF2-40B4-BE49-F238E27FC236}">
-                <a16:creationId xmlns:a16="http://schemas.microsoft.com/office/drawing/2014/main" id="{D63F1953-0627-4313-9F69-D3CE525D057A}"/>
-              </a:ext>
-            </a:extLst>
-          </p:cNvPr>
-          <p:cNvSpPr>
-            <a:spLocks noGrp="1"/>
-          </p:cNvSpPr>
-          <p:nvPr>
-            <p:ph type="title"/>
-          </p:nvPr>
-        </p:nvSpPr>
-        <p:spPr/>
-        <p:txBody>
-          <a:bodyPr/>
-          <a:lstStyle/>
-          <a:p>
-            <a:r>
-              <a:rPr lang="de-DE" b="1" dirty="0"/>
-              <a:t>Notes: 01.04. meeting</a:t>
-            </a:r>
-          </a:p>
-        </p:txBody>
-      </p:sp>
-      <p:sp>
-        <p:nvSpPr>
-          <p:cNvPr id="3" name="Content Placeholder 2">
-            <a:extLst>
-              <a:ext uri="{FF2B5EF4-FFF2-40B4-BE49-F238E27FC236}">
-                <a16:creationId xmlns:a16="http://schemas.microsoft.com/office/drawing/2014/main" id="{10F6F84D-370D-481F-BDA8-9BEF48EC1F3D}"/>
-              </a:ext>
-            </a:extLst>
-          </p:cNvPr>
-          <p:cNvSpPr>
-            <a:spLocks noGrp="1"/>
-          </p:cNvSpPr>
-          <p:nvPr>
-            <p:ph idx="1"/>
-          </p:nvPr>
-        </p:nvSpPr>
-        <p:spPr/>
-        <p:txBody>
-          <a:bodyPr/>
-          <a:lstStyle/>
-          <a:p>
-            <a:r>
-              <a:rPr lang="de-DE" dirty="0"/>
-              <a:t>Pipeline:</a:t>
-            </a:r>
-          </a:p>
-          <a:p>
-            <a:pPr lvl="1"/>
-            <a:r>
-              <a:rPr lang="de-DE" dirty="0"/>
-              <a:t>Test models and codacore on the same training&amp;test split (and set seed)</a:t>
-            </a:r>
-          </a:p>
-          <a:p>
-            <a:pPr lvl="1"/>
-            <a:r>
-              <a:rPr lang="de-DE" dirty="0"/>
-              <a:t>Take out training and test split from run_ml?</a:t>
-            </a:r>
-          </a:p>
-          <a:p>
-            <a:pPr lvl="1"/>
-            <a:r>
-              <a:rPr lang="de-DE" dirty="0"/>
-              <a:t>K_folds and CV_folds don‘t have to be the same for every data set</a:t>
-            </a:r>
-          </a:p>
-          <a:p>
-            <a:pPr lvl="1"/>
-            <a:r>
-              <a:rPr lang="de-DE" dirty="0"/>
-              <a:t>Time comparison?</a:t>
-            </a:r>
-          </a:p>
-          <a:p>
-            <a:r>
-              <a:rPr lang="de-DE" dirty="0"/>
-              <a:t>CRC:</a:t>
-            </a:r>
-          </a:p>
-          <a:p>
-            <a:pPr lvl="1"/>
-            <a:r>
-              <a:rPr lang="de-DE" dirty="0"/>
-              <a:t>Keep one country cohorts for extra validation </a:t>
-            </a:r>
-          </a:p>
-          <a:p>
-            <a:pPr lvl="1"/>
-            <a:r>
-              <a:rPr lang="de-DE" dirty="0"/>
-              <a:t>BMI as outcome_column for continuous</a:t>
-            </a:r>
-          </a:p>
-          <a:p>
-            <a:pPr lvl="1"/>
-            <a:r>
-              <a:rPr lang="de-DE" dirty="0"/>
-              <a:t>GROUP for classification </a:t>
-            </a:r>
-          </a:p>
-          <a:p>
-            <a:pPr marL="457200" lvl="1" indent="0">
-              <a:buNone/>
-            </a:pPr>
-            <a:endParaRPr lang="de-DE" dirty="0"/>
-          </a:p>
-          <a:p>
-            <a:pPr lvl="1"/>
-            <a:endParaRPr lang="de-DE" dirty="0"/>
-          </a:p>
-          <a:p>
-            <a:pPr lvl="1"/>
-            <a:endParaRPr lang="de-DE" dirty="0"/>
-          </a:p>
-          <a:p>
-            <a:pPr lvl="1"/>
-            <a:endParaRPr lang="de-DE" dirty="0"/>
-          </a:p>
-        </p:txBody>
-      </p:sp>
-      <p:sp>
-        <p:nvSpPr>
-          <p:cNvPr id="4" name="Date Placeholder 3">
-            <a:extLst>
-              <a:ext uri="{FF2B5EF4-FFF2-40B4-BE49-F238E27FC236}">
-                <a16:creationId xmlns:a16="http://schemas.microsoft.com/office/drawing/2014/main" id="{DBF0C8DB-9090-4B20-AED9-6E2044F98AC2}"/>
-              </a:ext>
-            </a:extLst>
-          </p:cNvPr>
-          <p:cNvSpPr>
-            <a:spLocks noGrp="1"/>
-          </p:cNvSpPr>
-          <p:nvPr>
-            <p:ph type="dt" sz="half" idx="10"/>
-          </p:nvPr>
-        </p:nvSpPr>
-        <p:spPr/>
-        <p:txBody>
-          <a:bodyPr/>
-          <a:lstStyle/>
-          <a:p>
-            <a:fld id="{36D18B76-5E8B-4456-8722-FC5B14B0F354}" type="datetime1">
-              <a:rPr lang="en-US" smtClean="0"/>
-              <a:pPr/>
-              <a:t>4/16/2022</a:t>
-            </a:fld>
-            <a:endParaRPr lang="en-US" dirty="0"/>
-          </a:p>
-        </p:txBody>
-      </p:sp>
-      <p:sp>
-        <p:nvSpPr>
-          <p:cNvPr id="5" name="Footer Placeholder 4">
-            <a:extLst>
-              <a:ext uri="{FF2B5EF4-FFF2-40B4-BE49-F238E27FC236}">
-                <a16:creationId xmlns:a16="http://schemas.microsoft.com/office/drawing/2014/main" id="{DA6DF03D-2B74-42A5-8C31-B3A7B6D53ABB}"/>
-              </a:ext>
-            </a:extLst>
-          </p:cNvPr>
-          <p:cNvSpPr>
-            <a:spLocks noGrp="1"/>
-          </p:cNvSpPr>
-          <p:nvPr>
-            <p:ph type="ftr" sz="quarter" idx="11"/>
-          </p:nvPr>
-        </p:nvSpPr>
-        <p:spPr/>
-        <p:txBody>
-          <a:bodyPr/>
-          <a:lstStyle/>
-          <a:p>
-            <a:r>
-              <a:rPr lang="en-US"/>
-              <a:t>jennifer.neumaier@t-online.de</a:t>
-            </a:r>
-            <a:endParaRPr lang="en-US" dirty="0"/>
-          </a:p>
-        </p:txBody>
-      </p:sp>
-      <p:sp>
-        <p:nvSpPr>
-          <p:cNvPr id="6" name="Slide Number Placeholder 5">
-            <a:extLst>
-              <a:ext uri="{FF2B5EF4-FFF2-40B4-BE49-F238E27FC236}">
-                <a16:creationId xmlns:a16="http://schemas.microsoft.com/office/drawing/2014/main" id="{EB397826-F4D6-4DDE-B171-FF032CD952B6}"/>
-              </a:ext>
-            </a:extLst>
-          </p:cNvPr>
-          <p:cNvSpPr>
-            <a:spLocks noGrp="1"/>
-          </p:cNvSpPr>
-          <p:nvPr>
-            <p:ph type="sldNum" sz="quarter" idx="12"/>
-          </p:nvPr>
-        </p:nvSpPr>
-        <p:spPr/>
-        <p:txBody>
-          <a:bodyPr/>
-          <a:lstStyle/>
-          <a:p>
-            <a:fld id="{D57F1E4F-1CFF-5643-939E-217C01CDF565}" type="slidenum">
-              <a:rPr lang="en-US" smtClean="0"/>
-              <a:pPr/>
-              <a:t>28</a:t>
-            </a:fld>
-            <a:endParaRPr lang="en-US" dirty="0"/>
-          </a:p>
-        </p:txBody>
-      </p:sp>
-    </p:spTree>
-    <p:extLst>
-      <p:ext uri="{BB962C8B-B14F-4D97-AF65-F5344CB8AC3E}">
-        <p14:creationId xmlns:p14="http://schemas.microsoft.com/office/powerpoint/2010/main" val="1848759324"/>
-      </p:ext>
-    </p:extLst>
-  </p:cSld>
-  <p:clrMapOvr>
-    <a:masterClrMapping/>
-  </p:clrMapOvr>
-</p:sld>
-</file>
-
 <file path=ppt/slides/slide29.xml><?xml version="1.0" encoding="utf-8"?>
 <p:sld xmlns:a="http://schemas.openxmlformats.org/drawingml/2006/main" xmlns:r="http://schemas.openxmlformats.org/officeDocument/2006/relationships" xmlns:p="http://schemas.openxmlformats.org/presentationml/2006/main">
   <p:cSld>
@@ -22119,7 +22110,7 @@
           <p:cNvPr id="2" name="Title 1">
             <a:extLst>
               <a:ext uri="{FF2B5EF4-FFF2-40B4-BE49-F238E27FC236}">
-                <a16:creationId xmlns:a16="http://schemas.microsoft.com/office/drawing/2014/main" id="{B0A21C35-E073-46BF-B8BA-AD632020DA6A}"/>
+                <a16:creationId xmlns:a16="http://schemas.microsoft.com/office/drawing/2014/main" id="{169D9D37-B637-4D74-BB75-639D51A491FB}"/>
               </a:ext>
             </a:extLst>
           </p:cNvPr>
@@ -22132,7 +22123,7 @@
         </p:nvSpPr>
         <p:spPr>
           <a:xfrm>
-            <a:off x="1743839" y="628124"/>
+            <a:off x="1640156" y="628124"/>
             <a:ext cx="8911687" cy="1280890"/>
           </a:xfrm>
         </p:spPr>
@@ -22142,7 +22133,7 @@
           <a:p>
             <a:r>
               <a:rPr lang="de-DE" b="1" dirty="0"/>
-              <a:t>Literature</a:t>
+              <a:t>Problems</a:t>
             </a:r>
             <a:endParaRPr lang="en-US" b="1" dirty="0"/>
           </a:p>
@@ -22153,7 +22144,7 @@
           <p:cNvPr id="3" name="Content Placeholder 2">
             <a:extLst>
               <a:ext uri="{FF2B5EF4-FFF2-40B4-BE49-F238E27FC236}">
-                <a16:creationId xmlns:a16="http://schemas.microsoft.com/office/drawing/2014/main" id="{47101FB2-294E-49F4-830F-4590B2616321}"/>
+                <a16:creationId xmlns:a16="http://schemas.microsoft.com/office/drawing/2014/main" id="{D4D56813-9DF8-4D28-B156-1DE48E95DBC2}"/>
               </a:ext>
             </a:extLst>
           </p:cNvPr>
@@ -22170,33 +22161,15 @@
           <a:lstStyle/>
           <a:p>
             <a:r>
-              <a:rPr lang="en-US" dirty="0">
-                <a:hlinkClick r:id="rId2"/>
-              </a:rPr>
-              <a:t>https://www.youtube.com/watch?v=j1IbfQrT2Cs</a:t>
-            </a:r>
-            <a:r>
-              <a:rPr lang="en-US" dirty="0"/>
-              <a:t> (12.01.2022)</a:t>
-            </a:r>
-          </a:p>
-          <a:p>
-            <a:r>
-              <a:rPr lang="en-US">
-                <a:hlinkClick r:id="rId3"/>
-              </a:rPr>
-              <a:t>https://www.youtube.com/watch?v=fQPCeV4MUe4</a:t>
-            </a:r>
-            <a:r>
-              <a:rPr lang="en-US"/>
-              <a:t> (12.01.2022)</a:t>
-            </a:r>
-          </a:p>
-          <a:p>
-            <a:endParaRPr lang="en-US"/>
-          </a:p>
-          <a:p>
-            <a:endParaRPr lang="en-US" dirty="0"/>
+              <a:rPr lang="de-DE" dirty="0"/>
+              <a:t>Microbial features are not independent </a:t>
+            </a:r>
+          </a:p>
+          <a:p>
+            <a:r>
+              <a:rPr lang="de-DE" dirty="0"/>
+              <a:t>Some microbial features are found in correlation!</a:t>
+            </a:r>
           </a:p>
         </p:txBody>
       </p:sp>
@@ -22205,7 +22178,7 @@
           <p:cNvPr id="4" name="Date Placeholder 3">
             <a:extLst>
               <a:ext uri="{FF2B5EF4-FFF2-40B4-BE49-F238E27FC236}">
-                <a16:creationId xmlns:a16="http://schemas.microsoft.com/office/drawing/2014/main" id="{6EC31B32-BDB7-4E4F-ABF6-074F07CBA3EE}"/>
+                <a16:creationId xmlns:a16="http://schemas.microsoft.com/office/drawing/2014/main" id="{D53DB4F4-84EC-4588-88E6-8D8519D6A1E8}"/>
               </a:ext>
             </a:extLst>
           </p:cNvPr>
@@ -22221,9 +22194,9 @@
           <a:bodyPr/>
           <a:lstStyle/>
           <a:p>
-            <a:fld id="{93673764-947C-4E64-9BD5-474B9E9D9329}" type="datetime1">
+            <a:fld id="{5A2DBB50-F561-45B0-9BE5-95A455D2CD8B}" type="datetime1">
               <a:rPr lang="en-US" smtClean="0"/>
-              <a:t>4/16/2022</a:t>
+              <a:t>4/20/2022</a:t>
             </a:fld>
             <a:endParaRPr lang="en-US" dirty="0"/>
           </a:p>
@@ -22234,7 +22207,7 @@
           <p:cNvPr id="5" name="Footer Placeholder 4">
             <a:extLst>
               <a:ext uri="{FF2B5EF4-FFF2-40B4-BE49-F238E27FC236}">
-                <a16:creationId xmlns:a16="http://schemas.microsoft.com/office/drawing/2014/main" id="{B58E6EF9-C928-441B-8DAA-81DBD51CC12C}"/>
+                <a16:creationId xmlns:a16="http://schemas.microsoft.com/office/drawing/2014/main" id="{A7F3346A-3F24-484B-A6D3-55D66520C917}"/>
               </a:ext>
             </a:extLst>
           </p:cNvPr>
@@ -22263,7 +22236,7 @@
           <p:cNvPr id="6" name="Slide Number Placeholder 5">
             <a:extLst>
               <a:ext uri="{FF2B5EF4-FFF2-40B4-BE49-F238E27FC236}">
-                <a16:creationId xmlns:a16="http://schemas.microsoft.com/office/drawing/2014/main" id="{60FA85C6-0C31-406E-9635-38232E74BF73}"/>
+                <a16:creationId xmlns:a16="http://schemas.microsoft.com/office/drawing/2014/main" id="{C4B3B4A6-E708-4F88-8CA2-BDE8FCF0C0AC}"/>
               </a:ext>
             </a:extLst>
           </p:cNvPr>
@@ -22291,7 +22264,7 @@
     </p:spTree>
     <p:extLst>
       <p:ext uri="{BB962C8B-B14F-4D97-AF65-F5344CB8AC3E}">
-        <p14:creationId xmlns:p14="http://schemas.microsoft.com/office/powerpoint/2010/main" val="2900572126"/>
+        <p14:creationId xmlns:p14="http://schemas.microsoft.com/office/powerpoint/2010/main" val="1795355039"/>
       </p:ext>
     </p:extLst>
   </p:cSld>
@@ -22375,7 +22348,7 @@
           <a:p>
             <a:fld id="{BCCEB706-B4FB-4DF7-BDF7-514AEA7F06D0}" type="datetime1">
               <a:rPr lang="en-US" smtClean="0"/>
-              <a:t>4/16/2022</a:t>
+              <a:t>4/20/2022</a:t>
             </a:fld>
             <a:endParaRPr lang="en-US" dirty="0"/>
           </a:p>
@@ -25086,6 +25059,666 @@
           <a:chExt cx="0" cy="0"/>
         </a:xfrm>
       </p:grpSpPr>
+      <p:sp>
+        <p:nvSpPr>
+          <p:cNvPr id="2" name="Title 1">
+            <a:extLst>
+              <a:ext uri="{FF2B5EF4-FFF2-40B4-BE49-F238E27FC236}">
+                <a16:creationId xmlns:a16="http://schemas.microsoft.com/office/drawing/2014/main" id="{169D9D37-B637-4D74-BB75-639D51A491FB}"/>
+              </a:ext>
+            </a:extLst>
+          </p:cNvPr>
+          <p:cNvSpPr>
+            <a:spLocks noGrp="1"/>
+          </p:cNvSpPr>
+          <p:nvPr>
+            <p:ph type="title"/>
+          </p:nvPr>
+        </p:nvSpPr>
+        <p:spPr>
+          <a:xfrm>
+            <a:off x="1640156" y="628124"/>
+            <a:ext cx="8911687" cy="1280890"/>
+          </a:xfrm>
+        </p:spPr>
+        <p:txBody>
+          <a:bodyPr/>
+          <a:lstStyle/>
+          <a:p>
+            <a:r>
+              <a:rPr lang="de-DE" b="1" dirty="0"/>
+              <a:t>Notes 30.01. meeting</a:t>
+            </a:r>
+            <a:endParaRPr lang="en-US" b="1" dirty="0"/>
+          </a:p>
+        </p:txBody>
+      </p:sp>
+      <p:sp>
+        <p:nvSpPr>
+          <p:cNvPr id="3" name="Content Placeholder 2">
+            <a:extLst>
+              <a:ext uri="{FF2B5EF4-FFF2-40B4-BE49-F238E27FC236}">
+                <a16:creationId xmlns:a16="http://schemas.microsoft.com/office/drawing/2014/main" id="{D4D56813-9DF8-4D28-B156-1DE48E95DBC2}"/>
+              </a:ext>
+            </a:extLst>
+          </p:cNvPr>
+          <p:cNvSpPr>
+            <a:spLocks noGrp="1"/>
+          </p:cNvSpPr>
+          <p:nvPr>
+            <p:ph idx="1"/>
+          </p:nvPr>
+        </p:nvSpPr>
+        <p:spPr/>
+        <p:txBody>
+          <a:bodyPr/>
+          <a:lstStyle/>
+          <a:p>
+            <a:r>
+              <a:rPr lang="de-DE" dirty="0"/>
+              <a:t>Review paper ML for microbiome paper</a:t>
+            </a:r>
+          </a:p>
+          <a:p>
+            <a:r>
+              <a:rPr lang="de-DE" dirty="0"/>
+              <a:t>COST action paper</a:t>
+            </a:r>
+          </a:p>
+          <a:p>
+            <a:r>
+              <a:rPr lang="de-DE"/>
+              <a:t>Confidentiality form, sign, scan and send to Elin</a:t>
+            </a:r>
+            <a:endParaRPr lang="de-DE" dirty="0"/>
+          </a:p>
+          <a:p>
+            <a:r>
+              <a:rPr lang="de-DE" dirty="0"/>
+              <a:t>Meeting Oliver Friday, 4th February</a:t>
+            </a:r>
+          </a:p>
+          <a:p>
+            <a:r>
+              <a:rPr lang="de-DE" dirty="0"/>
+              <a:t>Literature Review: ~10-20 pages, include Figures and Tables, equations for major transformations, write for biologists</a:t>
+            </a:r>
+          </a:p>
+          <a:p>
+            <a:endParaRPr lang="de-DE" dirty="0"/>
+          </a:p>
+        </p:txBody>
+      </p:sp>
+      <p:sp>
+        <p:nvSpPr>
+          <p:cNvPr id="4" name="Date Placeholder 3">
+            <a:extLst>
+              <a:ext uri="{FF2B5EF4-FFF2-40B4-BE49-F238E27FC236}">
+                <a16:creationId xmlns:a16="http://schemas.microsoft.com/office/drawing/2014/main" id="{D53DB4F4-84EC-4588-88E6-8D8519D6A1E8}"/>
+              </a:ext>
+            </a:extLst>
+          </p:cNvPr>
+          <p:cNvSpPr>
+            <a:spLocks noGrp="1"/>
+          </p:cNvSpPr>
+          <p:nvPr>
+            <p:ph type="dt" sz="half" idx="10"/>
+          </p:nvPr>
+        </p:nvSpPr>
+        <p:spPr/>
+        <p:txBody>
+          <a:bodyPr/>
+          <a:lstStyle/>
+          <a:p>
+            <a:fld id="{5A2DBB50-F561-45B0-9BE5-95A455D2CD8B}" type="datetime1">
+              <a:rPr lang="en-US" smtClean="0"/>
+              <a:t>4/20/2022</a:t>
+            </a:fld>
+            <a:endParaRPr lang="en-US" dirty="0"/>
+          </a:p>
+        </p:txBody>
+      </p:sp>
+      <p:sp>
+        <p:nvSpPr>
+          <p:cNvPr id="5" name="Footer Placeholder 4">
+            <a:extLst>
+              <a:ext uri="{FF2B5EF4-FFF2-40B4-BE49-F238E27FC236}">
+                <a16:creationId xmlns:a16="http://schemas.microsoft.com/office/drawing/2014/main" id="{A7F3346A-3F24-484B-A6D3-55D66520C917}"/>
+              </a:ext>
+            </a:extLst>
+          </p:cNvPr>
+          <p:cNvSpPr>
+            <a:spLocks noGrp="1"/>
+          </p:cNvSpPr>
+          <p:nvPr>
+            <p:ph type="ftr" sz="quarter" idx="11"/>
+          </p:nvPr>
+        </p:nvSpPr>
+        <p:spPr/>
+        <p:txBody>
+          <a:bodyPr/>
+          <a:lstStyle/>
+          <a:p>
+            <a:r>
+              <a:rPr lang="en-US"/>
+              <a:t>jennifer.neumaier@t-online.de</a:t>
+            </a:r>
+            <a:endParaRPr lang="en-US" dirty="0"/>
+          </a:p>
+        </p:txBody>
+      </p:sp>
+      <p:sp>
+        <p:nvSpPr>
+          <p:cNvPr id="6" name="Slide Number Placeholder 5">
+            <a:extLst>
+              <a:ext uri="{FF2B5EF4-FFF2-40B4-BE49-F238E27FC236}">
+                <a16:creationId xmlns:a16="http://schemas.microsoft.com/office/drawing/2014/main" id="{C4B3B4A6-E708-4F88-8CA2-BDE8FCF0C0AC}"/>
+              </a:ext>
+            </a:extLst>
+          </p:cNvPr>
+          <p:cNvSpPr>
+            <a:spLocks noGrp="1"/>
+          </p:cNvSpPr>
+          <p:nvPr>
+            <p:ph type="sldNum" sz="quarter" idx="12"/>
+          </p:nvPr>
+        </p:nvSpPr>
+        <p:spPr/>
+        <p:txBody>
+          <a:bodyPr/>
+          <a:lstStyle/>
+          <a:p>
+            <a:fld id="{D57F1E4F-1CFF-5643-939E-217C01CDF565}" type="slidenum">
+              <a:rPr lang="en-US" smtClean="0"/>
+              <a:pPr/>
+              <a:t>30</a:t>
+            </a:fld>
+            <a:endParaRPr lang="en-US" dirty="0"/>
+          </a:p>
+        </p:txBody>
+      </p:sp>
+    </p:spTree>
+    <p:extLst>
+      <p:ext uri="{BB962C8B-B14F-4D97-AF65-F5344CB8AC3E}">
+        <p14:creationId xmlns:p14="http://schemas.microsoft.com/office/powerpoint/2010/main" val="3993456640"/>
+      </p:ext>
+    </p:extLst>
+  </p:cSld>
+  <p:clrMapOvr>
+    <a:masterClrMapping/>
+  </p:clrMapOvr>
+</p:sld>
+</file>
+
+<file path=ppt/slides/slide31.xml><?xml version="1.0" encoding="utf-8"?>
+<p:sld xmlns:a="http://schemas.openxmlformats.org/drawingml/2006/main" xmlns:r="http://schemas.openxmlformats.org/officeDocument/2006/relationships" xmlns:p="http://schemas.openxmlformats.org/presentationml/2006/main">
+  <p:cSld>
+    <p:spTree>
+      <p:nvGrpSpPr>
+        <p:cNvPr id="1" name=""/>
+        <p:cNvGrpSpPr/>
+        <p:nvPr/>
+      </p:nvGrpSpPr>
+      <p:grpSpPr>
+        <a:xfrm>
+          <a:off x="0" y="0"/>
+          <a:ext cx="0" cy="0"/>
+          <a:chOff x="0" y="0"/>
+          <a:chExt cx="0" cy="0"/>
+        </a:xfrm>
+      </p:grpSpPr>
+      <p:sp>
+        <p:nvSpPr>
+          <p:cNvPr id="2" name="Title 1">
+            <a:extLst>
+              <a:ext uri="{FF2B5EF4-FFF2-40B4-BE49-F238E27FC236}">
+                <a16:creationId xmlns:a16="http://schemas.microsoft.com/office/drawing/2014/main" id="{D63F1953-0627-4313-9F69-D3CE525D057A}"/>
+              </a:ext>
+            </a:extLst>
+          </p:cNvPr>
+          <p:cNvSpPr>
+            <a:spLocks noGrp="1"/>
+          </p:cNvSpPr>
+          <p:nvPr>
+            <p:ph type="title"/>
+          </p:nvPr>
+        </p:nvSpPr>
+        <p:spPr/>
+        <p:txBody>
+          <a:bodyPr/>
+          <a:lstStyle/>
+          <a:p>
+            <a:r>
+              <a:rPr lang="de-DE" b="1" dirty="0"/>
+              <a:t>Notes: 01.04. meeting</a:t>
+            </a:r>
+          </a:p>
+        </p:txBody>
+      </p:sp>
+      <p:sp>
+        <p:nvSpPr>
+          <p:cNvPr id="3" name="Content Placeholder 2">
+            <a:extLst>
+              <a:ext uri="{FF2B5EF4-FFF2-40B4-BE49-F238E27FC236}">
+                <a16:creationId xmlns:a16="http://schemas.microsoft.com/office/drawing/2014/main" id="{10F6F84D-370D-481F-BDA8-9BEF48EC1F3D}"/>
+              </a:ext>
+            </a:extLst>
+          </p:cNvPr>
+          <p:cNvSpPr>
+            <a:spLocks noGrp="1"/>
+          </p:cNvSpPr>
+          <p:nvPr>
+            <p:ph idx="1"/>
+          </p:nvPr>
+        </p:nvSpPr>
+        <p:spPr/>
+        <p:txBody>
+          <a:bodyPr/>
+          <a:lstStyle/>
+          <a:p>
+            <a:r>
+              <a:rPr lang="de-DE" dirty="0"/>
+              <a:t>Pipeline:</a:t>
+            </a:r>
+          </a:p>
+          <a:p>
+            <a:pPr lvl="1"/>
+            <a:r>
+              <a:rPr lang="de-DE" dirty="0"/>
+              <a:t>Test models and codacore on the same training&amp;test split (and set seed)</a:t>
+            </a:r>
+          </a:p>
+          <a:p>
+            <a:pPr lvl="1"/>
+            <a:r>
+              <a:rPr lang="de-DE" dirty="0"/>
+              <a:t>Take out training and test split from run_ml?</a:t>
+            </a:r>
+          </a:p>
+          <a:p>
+            <a:pPr lvl="1"/>
+            <a:r>
+              <a:rPr lang="de-DE" dirty="0"/>
+              <a:t>K_folds and CV_folds don‘t have to be the same for every data set</a:t>
+            </a:r>
+          </a:p>
+          <a:p>
+            <a:pPr lvl="1"/>
+            <a:r>
+              <a:rPr lang="de-DE" dirty="0"/>
+              <a:t>Time comparison?</a:t>
+            </a:r>
+          </a:p>
+          <a:p>
+            <a:r>
+              <a:rPr lang="de-DE" dirty="0"/>
+              <a:t>CRC:</a:t>
+            </a:r>
+          </a:p>
+          <a:p>
+            <a:pPr lvl="1"/>
+            <a:r>
+              <a:rPr lang="de-DE" dirty="0"/>
+              <a:t>Keep one country cohorts for extra validation </a:t>
+            </a:r>
+          </a:p>
+          <a:p>
+            <a:pPr lvl="1"/>
+            <a:r>
+              <a:rPr lang="de-DE" dirty="0"/>
+              <a:t>BMI as outcome_column for continuous</a:t>
+            </a:r>
+          </a:p>
+          <a:p>
+            <a:pPr lvl="1"/>
+            <a:r>
+              <a:rPr lang="de-DE" dirty="0"/>
+              <a:t>GROUP for classification </a:t>
+            </a:r>
+          </a:p>
+          <a:p>
+            <a:pPr marL="457200" lvl="1" indent="0">
+              <a:buNone/>
+            </a:pPr>
+            <a:endParaRPr lang="de-DE" dirty="0"/>
+          </a:p>
+          <a:p>
+            <a:pPr lvl="1"/>
+            <a:endParaRPr lang="de-DE" dirty="0"/>
+          </a:p>
+          <a:p>
+            <a:pPr lvl="1"/>
+            <a:endParaRPr lang="de-DE" dirty="0"/>
+          </a:p>
+          <a:p>
+            <a:pPr lvl="1"/>
+            <a:endParaRPr lang="de-DE" dirty="0"/>
+          </a:p>
+        </p:txBody>
+      </p:sp>
+      <p:sp>
+        <p:nvSpPr>
+          <p:cNvPr id="4" name="Date Placeholder 3">
+            <a:extLst>
+              <a:ext uri="{FF2B5EF4-FFF2-40B4-BE49-F238E27FC236}">
+                <a16:creationId xmlns:a16="http://schemas.microsoft.com/office/drawing/2014/main" id="{DBF0C8DB-9090-4B20-AED9-6E2044F98AC2}"/>
+              </a:ext>
+            </a:extLst>
+          </p:cNvPr>
+          <p:cNvSpPr>
+            <a:spLocks noGrp="1"/>
+          </p:cNvSpPr>
+          <p:nvPr>
+            <p:ph type="dt" sz="half" idx="10"/>
+          </p:nvPr>
+        </p:nvSpPr>
+        <p:spPr/>
+        <p:txBody>
+          <a:bodyPr/>
+          <a:lstStyle/>
+          <a:p>
+            <a:fld id="{36D18B76-5E8B-4456-8722-FC5B14B0F354}" type="datetime1">
+              <a:rPr lang="en-US" smtClean="0"/>
+              <a:pPr/>
+              <a:t>4/20/2022</a:t>
+            </a:fld>
+            <a:endParaRPr lang="en-US" dirty="0"/>
+          </a:p>
+        </p:txBody>
+      </p:sp>
+      <p:sp>
+        <p:nvSpPr>
+          <p:cNvPr id="5" name="Footer Placeholder 4">
+            <a:extLst>
+              <a:ext uri="{FF2B5EF4-FFF2-40B4-BE49-F238E27FC236}">
+                <a16:creationId xmlns:a16="http://schemas.microsoft.com/office/drawing/2014/main" id="{DA6DF03D-2B74-42A5-8C31-B3A7B6D53ABB}"/>
+              </a:ext>
+            </a:extLst>
+          </p:cNvPr>
+          <p:cNvSpPr>
+            <a:spLocks noGrp="1"/>
+          </p:cNvSpPr>
+          <p:nvPr>
+            <p:ph type="ftr" sz="quarter" idx="11"/>
+          </p:nvPr>
+        </p:nvSpPr>
+        <p:spPr/>
+        <p:txBody>
+          <a:bodyPr/>
+          <a:lstStyle/>
+          <a:p>
+            <a:r>
+              <a:rPr lang="en-US"/>
+              <a:t>jennifer.neumaier@t-online.de</a:t>
+            </a:r>
+            <a:endParaRPr lang="en-US" dirty="0"/>
+          </a:p>
+        </p:txBody>
+      </p:sp>
+      <p:sp>
+        <p:nvSpPr>
+          <p:cNvPr id="6" name="Slide Number Placeholder 5">
+            <a:extLst>
+              <a:ext uri="{FF2B5EF4-FFF2-40B4-BE49-F238E27FC236}">
+                <a16:creationId xmlns:a16="http://schemas.microsoft.com/office/drawing/2014/main" id="{EB397826-F4D6-4DDE-B171-FF032CD952B6}"/>
+              </a:ext>
+            </a:extLst>
+          </p:cNvPr>
+          <p:cNvSpPr>
+            <a:spLocks noGrp="1"/>
+          </p:cNvSpPr>
+          <p:nvPr>
+            <p:ph type="sldNum" sz="quarter" idx="12"/>
+          </p:nvPr>
+        </p:nvSpPr>
+        <p:spPr/>
+        <p:txBody>
+          <a:bodyPr/>
+          <a:lstStyle/>
+          <a:p>
+            <a:fld id="{D57F1E4F-1CFF-5643-939E-217C01CDF565}" type="slidenum">
+              <a:rPr lang="en-US" smtClean="0"/>
+              <a:pPr/>
+              <a:t>31</a:t>
+            </a:fld>
+            <a:endParaRPr lang="en-US" dirty="0"/>
+          </a:p>
+        </p:txBody>
+      </p:sp>
+    </p:spTree>
+    <p:extLst>
+      <p:ext uri="{BB962C8B-B14F-4D97-AF65-F5344CB8AC3E}">
+        <p14:creationId xmlns:p14="http://schemas.microsoft.com/office/powerpoint/2010/main" val="1848759324"/>
+      </p:ext>
+    </p:extLst>
+  </p:cSld>
+  <p:clrMapOvr>
+    <a:masterClrMapping/>
+  </p:clrMapOvr>
+</p:sld>
+</file>
+
+<file path=ppt/slides/slide32.xml><?xml version="1.0" encoding="utf-8"?>
+<p:sld xmlns:a="http://schemas.openxmlformats.org/drawingml/2006/main" xmlns:r="http://schemas.openxmlformats.org/officeDocument/2006/relationships" xmlns:p="http://schemas.openxmlformats.org/presentationml/2006/main">
+  <p:cSld>
+    <p:spTree>
+      <p:nvGrpSpPr>
+        <p:cNvPr id="1" name=""/>
+        <p:cNvGrpSpPr/>
+        <p:nvPr/>
+      </p:nvGrpSpPr>
+      <p:grpSpPr>
+        <a:xfrm>
+          <a:off x="0" y="0"/>
+          <a:ext cx="0" cy="0"/>
+          <a:chOff x="0" y="0"/>
+          <a:chExt cx="0" cy="0"/>
+        </a:xfrm>
+      </p:grpSpPr>
+      <p:sp>
+        <p:nvSpPr>
+          <p:cNvPr id="2" name="Title 1">
+            <a:extLst>
+              <a:ext uri="{FF2B5EF4-FFF2-40B4-BE49-F238E27FC236}">
+                <a16:creationId xmlns:a16="http://schemas.microsoft.com/office/drawing/2014/main" id="{B0A21C35-E073-46BF-B8BA-AD632020DA6A}"/>
+              </a:ext>
+            </a:extLst>
+          </p:cNvPr>
+          <p:cNvSpPr>
+            <a:spLocks noGrp="1"/>
+          </p:cNvSpPr>
+          <p:nvPr>
+            <p:ph type="title"/>
+          </p:nvPr>
+        </p:nvSpPr>
+        <p:spPr>
+          <a:xfrm>
+            <a:off x="1743839" y="628124"/>
+            <a:ext cx="8911687" cy="1280890"/>
+          </a:xfrm>
+        </p:spPr>
+        <p:txBody>
+          <a:bodyPr/>
+          <a:lstStyle/>
+          <a:p>
+            <a:r>
+              <a:rPr lang="de-DE" b="1" dirty="0"/>
+              <a:t>Literature</a:t>
+            </a:r>
+            <a:endParaRPr lang="en-US" b="1" dirty="0"/>
+          </a:p>
+        </p:txBody>
+      </p:sp>
+      <p:sp>
+        <p:nvSpPr>
+          <p:cNvPr id="3" name="Content Placeholder 2">
+            <a:extLst>
+              <a:ext uri="{FF2B5EF4-FFF2-40B4-BE49-F238E27FC236}">
+                <a16:creationId xmlns:a16="http://schemas.microsoft.com/office/drawing/2014/main" id="{47101FB2-294E-49F4-830F-4590B2616321}"/>
+              </a:ext>
+            </a:extLst>
+          </p:cNvPr>
+          <p:cNvSpPr>
+            <a:spLocks noGrp="1"/>
+          </p:cNvSpPr>
+          <p:nvPr>
+            <p:ph idx="1"/>
+          </p:nvPr>
+        </p:nvSpPr>
+        <p:spPr/>
+        <p:txBody>
+          <a:bodyPr/>
+          <a:lstStyle/>
+          <a:p>
+            <a:r>
+              <a:rPr lang="en-US" dirty="0">
+                <a:hlinkClick r:id="rId2"/>
+              </a:rPr>
+              <a:t>https://www.youtube.com/watch?v=j1IbfQrT2Cs</a:t>
+            </a:r>
+            <a:r>
+              <a:rPr lang="en-US" dirty="0"/>
+              <a:t> (12.01.2022)</a:t>
+            </a:r>
+          </a:p>
+          <a:p>
+            <a:r>
+              <a:rPr lang="en-US">
+                <a:hlinkClick r:id="rId3"/>
+              </a:rPr>
+              <a:t>https://www.youtube.com/watch?v=fQPCeV4MUe4</a:t>
+            </a:r>
+            <a:r>
+              <a:rPr lang="en-US"/>
+              <a:t> (12.01.2022)</a:t>
+            </a:r>
+          </a:p>
+          <a:p>
+            <a:endParaRPr lang="en-US"/>
+          </a:p>
+          <a:p>
+            <a:endParaRPr lang="en-US" dirty="0"/>
+          </a:p>
+        </p:txBody>
+      </p:sp>
+      <p:sp>
+        <p:nvSpPr>
+          <p:cNvPr id="4" name="Date Placeholder 3">
+            <a:extLst>
+              <a:ext uri="{FF2B5EF4-FFF2-40B4-BE49-F238E27FC236}">
+                <a16:creationId xmlns:a16="http://schemas.microsoft.com/office/drawing/2014/main" id="{6EC31B32-BDB7-4E4F-ABF6-074F07CBA3EE}"/>
+              </a:ext>
+            </a:extLst>
+          </p:cNvPr>
+          <p:cNvSpPr>
+            <a:spLocks noGrp="1"/>
+          </p:cNvSpPr>
+          <p:nvPr>
+            <p:ph type="dt" sz="half" idx="10"/>
+          </p:nvPr>
+        </p:nvSpPr>
+        <p:spPr/>
+        <p:txBody>
+          <a:bodyPr/>
+          <a:lstStyle/>
+          <a:p>
+            <a:fld id="{93673764-947C-4E64-9BD5-474B9E9D9329}" type="datetime1">
+              <a:rPr lang="en-US" smtClean="0"/>
+              <a:t>4/20/2022</a:t>
+            </a:fld>
+            <a:endParaRPr lang="en-US" dirty="0"/>
+          </a:p>
+        </p:txBody>
+      </p:sp>
+      <p:sp>
+        <p:nvSpPr>
+          <p:cNvPr id="5" name="Footer Placeholder 4">
+            <a:extLst>
+              <a:ext uri="{FF2B5EF4-FFF2-40B4-BE49-F238E27FC236}">
+                <a16:creationId xmlns:a16="http://schemas.microsoft.com/office/drawing/2014/main" id="{B58E6EF9-C928-441B-8DAA-81DBD51CC12C}"/>
+              </a:ext>
+            </a:extLst>
+          </p:cNvPr>
+          <p:cNvSpPr>
+            <a:spLocks noGrp="1"/>
+          </p:cNvSpPr>
+          <p:nvPr>
+            <p:ph type="ftr" sz="quarter" idx="11"/>
+          </p:nvPr>
+        </p:nvSpPr>
+        <p:spPr/>
+        <p:txBody>
+          <a:bodyPr/>
+          <a:lstStyle/>
+          <a:p>
+            <a:r>
+              <a:rPr lang="en-US"/>
+              <a:t>jennifer.neumaier@t-online.de</a:t>
+            </a:r>
+            <a:endParaRPr lang="en-US" dirty="0"/>
+          </a:p>
+        </p:txBody>
+      </p:sp>
+      <p:sp>
+        <p:nvSpPr>
+          <p:cNvPr id="6" name="Slide Number Placeholder 5">
+            <a:extLst>
+              <a:ext uri="{FF2B5EF4-FFF2-40B4-BE49-F238E27FC236}">
+                <a16:creationId xmlns:a16="http://schemas.microsoft.com/office/drawing/2014/main" id="{60FA85C6-0C31-406E-9635-38232E74BF73}"/>
+              </a:ext>
+            </a:extLst>
+          </p:cNvPr>
+          <p:cNvSpPr>
+            <a:spLocks noGrp="1"/>
+          </p:cNvSpPr>
+          <p:nvPr>
+            <p:ph type="sldNum" sz="quarter" idx="12"/>
+          </p:nvPr>
+        </p:nvSpPr>
+        <p:spPr/>
+        <p:txBody>
+          <a:bodyPr/>
+          <a:lstStyle/>
+          <a:p>
+            <a:fld id="{D57F1E4F-1CFF-5643-939E-217C01CDF565}" type="slidenum">
+              <a:rPr lang="en-US" smtClean="0"/>
+              <a:pPr/>
+              <a:t>32</a:t>
+            </a:fld>
+            <a:endParaRPr lang="en-US" dirty="0"/>
+          </a:p>
+        </p:txBody>
+      </p:sp>
+    </p:spTree>
+    <p:extLst>
+      <p:ext uri="{BB962C8B-B14F-4D97-AF65-F5344CB8AC3E}">
+        <p14:creationId xmlns:p14="http://schemas.microsoft.com/office/powerpoint/2010/main" val="2900572126"/>
+      </p:ext>
+    </p:extLst>
+  </p:cSld>
+  <p:clrMapOvr>
+    <a:masterClrMapping/>
+  </p:clrMapOvr>
+</p:sld>
+</file>
+
+<file path=ppt/slides/slide33.xml><?xml version="1.0" encoding="utf-8"?>
+<p:sld xmlns:a="http://schemas.openxmlformats.org/drawingml/2006/main" xmlns:r="http://schemas.openxmlformats.org/officeDocument/2006/relationships" xmlns:p="http://schemas.openxmlformats.org/presentationml/2006/main">
+  <p:cSld>
+    <p:spTree>
+      <p:nvGrpSpPr>
+        <p:cNvPr id="1" name=""/>
+        <p:cNvGrpSpPr/>
+        <p:nvPr/>
+      </p:nvGrpSpPr>
+      <p:grpSpPr>
+        <a:xfrm>
+          <a:off x="0" y="0"/>
+          <a:ext cx="0" cy="0"/>
+          <a:chOff x="0" y="0"/>
+          <a:chExt cx="0" cy="0"/>
+        </a:xfrm>
+      </p:grpSpPr>
       <p:pic>
         <p:nvPicPr>
           <p:cNvPr id="7" name="Graphic 6" descr="Address Book with solid fill">
@@ -25436,7 +26069,7 @@
           <a:p>
             <a:fld id="{524BA6AA-761D-44D9-9696-AC66CE044BF5}" type="datetime1">
               <a:rPr lang="en-US" smtClean="0"/>
-              <a:t>4/16/2022</a:t>
+              <a:t>4/20/2022</a:t>
             </a:fld>
             <a:endParaRPr lang="en-US" dirty="0"/>
           </a:p>
@@ -25494,7 +26127,7 @@
             <a:fld id="{D57F1E4F-1CFF-5643-939E-217C01CDF565}" type="slidenum">
               <a:rPr lang="en-US" smtClean="0"/>
               <a:pPr/>
-              <a:t>30</a:t>
+              <a:t>33</a:t>
             </a:fld>
             <a:endParaRPr lang="en-US" dirty="0"/>
           </a:p>
@@ -25623,7 +26256,7 @@
           <a:p>
             <a:fld id="{7BB4AFEC-4BE7-4504-8846-4BF0CCFD9721}" type="datetime1">
               <a:rPr lang="en-US" smtClean="0"/>
-              <a:t>4/16/2022</a:t>
+              <a:t>4/20/2022</a:t>
             </a:fld>
             <a:endParaRPr lang="en-US" dirty="0"/>
           </a:p>
@@ -25800,7 +26433,7 @@
             <a:fld id="{36D18B76-5E8B-4456-8722-FC5B14B0F354}" type="datetime1">
               <a:rPr lang="en-US" smtClean="0"/>
               <a:pPr/>
-              <a:t>4/16/2022</a:t>
+              <a:t>4/20/2022</a:t>
             </a:fld>
             <a:endParaRPr lang="en-US" dirty="0"/>
           </a:p>
@@ -26241,7 +26874,7 @@
           <a:p>
             <a:fld id="{1F2A6BD5-D000-45AE-BE81-365EBD12526C}" type="datetime1">
               <a:rPr lang="en-US" smtClean="0"/>
-              <a:t>4/16/2022</a:t>
+              <a:t>4/20/2022</a:t>
             </a:fld>
             <a:endParaRPr lang="en-US" dirty="0"/>
           </a:p>
@@ -26687,7 +27320,7 @@
           <a:p>
             <a:fld id="{A70B3D3E-FC47-4E47-BC37-6E33025EDD36}" type="datetime1">
               <a:rPr lang="en-US" smtClean="0"/>
-              <a:t>4/16/2022</a:t>
+              <a:t>4/20/2022</a:t>
             </a:fld>
             <a:endParaRPr lang="en-US" dirty="0"/>
           </a:p>

</xml_diff>

<commit_message>
created master thesis v2
</commit_message>
<xml_diff>
--- a/doc/Project_structure_notes.pptx
+++ b/doc/Project_structure_notes.pptx
@@ -5,7 +5,7 @@
     <p:sldMasterId id="2147483702" r:id="rId1"/>
   </p:sldMasterIdLst>
   <p:notesMasterIdLst>
-    <p:notesMasterId r:id="rId70"/>
+    <p:notesMasterId r:id="rId72"/>
   </p:notesMasterIdLst>
   <p:sldIdLst>
     <p:sldId id="256" r:id="rId2"/>
@@ -65,17 +65,19 @@
     <p:sldId id="315" r:id="rId56"/>
     <p:sldId id="334" r:id="rId57"/>
     <p:sldId id="335" r:id="rId58"/>
-    <p:sldId id="277" r:id="rId59"/>
-    <p:sldId id="279" r:id="rId60"/>
-    <p:sldId id="278" r:id="rId61"/>
-    <p:sldId id="290" r:id="rId62"/>
-    <p:sldId id="269" r:id="rId63"/>
-    <p:sldId id="263" r:id="rId64"/>
-    <p:sldId id="258" r:id="rId65"/>
-    <p:sldId id="270" r:id="rId66"/>
-    <p:sldId id="284" r:id="rId67"/>
-    <p:sldId id="257" r:id="rId68"/>
-    <p:sldId id="268" r:id="rId69"/>
+    <p:sldId id="337" r:id="rId59"/>
+    <p:sldId id="277" r:id="rId60"/>
+    <p:sldId id="279" r:id="rId61"/>
+    <p:sldId id="336" r:id="rId62"/>
+    <p:sldId id="278" r:id="rId63"/>
+    <p:sldId id="290" r:id="rId64"/>
+    <p:sldId id="269" r:id="rId65"/>
+    <p:sldId id="263" r:id="rId66"/>
+    <p:sldId id="258" r:id="rId67"/>
+    <p:sldId id="270" r:id="rId68"/>
+    <p:sldId id="284" r:id="rId69"/>
+    <p:sldId id="257" r:id="rId70"/>
+    <p:sldId id="268" r:id="rId71"/>
   </p:sldIdLst>
   <p:sldSz cx="12192000" cy="6858000"/>
   <p:notesSz cx="6858000" cy="9144000"/>
@@ -187,11 +189,11 @@
             <p14:sldId id="272"/>
             <p14:sldId id="267"/>
             <p14:sldId id="266"/>
-            <p14:sldId id="285"/>
           </p14:sldIdLst>
         </p14:section>
         <p14:section name="background" id="{734442C7-9DFA-4163-AB0C-F6E41907FEF9}">
           <p14:sldIdLst>
+            <p14:sldId id="285"/>
             <p14:sldId id="260"/>
             <p14:sldId id="275"/>
             <p14:sldId id="261"/>
@@ -278,10 +280,16 @@
             <p14:sldId id="335"/>
           </p14:sldIdLst>
         </p14:section>
+        <p14:section name="Ternary Plots" id="{BC8584DF-CA48-4976-BD2D-13825CA00330}">
+          <p14:sldIdLst>
+            <p14:sldId id="337"/>
+          </p14:sldIdLst>
+        </p14:section>
         <p14:section name="Notes" id="{BD5F37D2-34EC-4962-982B-3F5187946EDA}">
           <p14:sldIdLst>
             <p14:sldId id="277"/>
             <p14:sldId id="279"/>
+            <p14:sldId id="336"/>
             <p14:sldId id="278"/>
             <p14:sldId id="290"/>
             <p14:sldId id="269"/>
@@ -7286,7 +7294,7 @@
           <a:p>
             <a:fld id="{0D3712C0-BD94-4EDD-81B8-404EF18DF498}" type="datetimeFigureOut">
               <a:rPr lang="en-US" smtClean="0"/>
-              <a:t>5/13/2022</a:t>
+              <a:t>5/19/2022</a:t>
             </a:fld>
             <a:endParaRPr lang="en-US"/>
           </a:p>
@@ -10011,6 +10019,298 @@
 </p:notes>
 </file>
 
+<file path=ppt/notesSlides/notesSlide34.xml><?xml version="1.0" encoding="utf-8"?>
+<p:notes xmlns:a="http://schemas.openxmlformats.org/drawingml/2006/main" xmlns:r="http://schemas.openxmlformats.org/officeDocument/2006/relationships" xmlns:p="http://schemas.openxmlformats.org/presentationml/2006/main">
+  <p:cSld>
+    <p:spTree>
+      <p:nvGrpSpPr>
+        <p:cNvPr id="1" name=""/>
+        <p:cNvGrpSpPr/>
+        <p:nvPr/>
+      </p:nvGrpSpPr>
+      <p:grpSpPr>
+        <a:xfrm>
+          <a:off x="0" y="0"/>
+          <a:ext cx="0" cy="0"/>
+          <a:chOff x="0" y="0"/>
+          <a:chExt cx="0" cy="0"/>
+        </a:xfrm>
+      </p:grpSpPr>
+      <p:sp>
+        <p:nvSpPr>
+          <p:cNvPr id="2" name="Slide Image Placeholder 1"/>
+          <p:cNvSpPr>
+            <a:spLocks noGrp="1" noRot="1" noChangeAspect="1"/>
+          </p:cNvSpPr>
+          <p:nvPr>
+            <p:ph type="sldImg"/>
+          </p:nvPr>
+        </p:nvSpPr>
+        <p:spPr/>
+      </p:sp>
+      <p:sp>
+        <p:nvSpPr>
+          <p:cNvPr id="3" name="Notes Placeholder 2"/>
+          <p:cNvSpPr>
+            <a:spLocks noGrp="1"/>
+          </p:cNvSpPr>
+          <p:nvPr>
+            <p:ph type="body" idx="1"/>
+          </p:nvPr>
+        </p:nvSpPr>
+        <p:spPr/>
+        <p:txBody>
+          <a:bodyPr/>
+          <a:lstStyle/>
+          <a:p>
+            <a:endParaRPr lang="de-DE" dirty="0"/>
+          </a:p>
+        </p:txBody>
+      </p:sp>
+      <p:sp>
+        <p:nvSpPr>
+          <p:cNvPr id="4" name="Slide Number Placeholder 3"/>
+          <p:cNvSpPr>
+            <a:spLocks noGrp="1"/>
+          </p:cNvSpPr>
+          <p:nvPr>
+            <p:ph type="sldNum" sz="quarter" idx="5"/>
+          </p:nvPr>
+        </p:nvSpPr>
+        <p:spPr/>
+        <p:txBody>
+          <a:bodyPr/>
+          <a:lstStyle/>
+          <a:p>
+            <a:fld id="{14E34CAD-DC0B-4EB4-812C-D77F8E7D39DE}" type="slidenum">
+              <a:rPr lang="en-US" smtClean="0"/>
+              <a:t>58</a:t>
+            </a:fld>
+            <a:endParaRPr lang="en-US"/>
+          </a:p>
+        </p:txBody>
+      </p:sp>
+    </p:spTree>
+    <p:extLst>
+      <p:ext uri="{BB962C8B-B14F-4D97-AF65-F5344CB8AC3E}">
+        <p14:creationId xmlns:p14="http://schemas.microsoft.com/office/powerpoint/2010/main" val="619959005"/>
+      </p:ext>
+    </p:extLst>
+  </p:cSld>
+  <p:clrMapOvr>
+    <a:masterClrMapping/>
+  </p:clrMapOvr>
+</p:notes>
+</file>
+
+<file path=ppt/notesSlides/notesSlide35.xml><?xml version="1.0" encoding="utf-8"?>
+<p:notes xmlns:a="http://schemas.openxmlformats.org/drawingml/2006/main" xmlns:r="http://schemas.openxmlformats.org/officeDocument/2006/relationships" xmlns:p="http://schemas.openxmlformats.org/presentationml/2006/main">
+  <p:cSld>
+    <p:spTree>
+      <p:nvGrpSpPr>
+        <p:cNvPr id="1" name=""/>
+        <p:cNvGrpSpPr/>
+        <p:nvPr/>
+      </p:nvGrpSpPr>
+      <p:grpSpPr>
+        <a:xfrm>
+          <a:off x="0" y="0"/>
+          <a:ext cx="0" cy="0"/>
+          <a:chOff x="0" y="0"/>
+          <a:chExt cx="0" cy="0"/>
+        </a:xfrm>
+      </p:grpSpPr>
+      <p:sp>
+        <p:nvSpPr>
+          <p:cNvPr id="2" name="Slide Image Placeholder 1"/>
+          <p:cNvSpPr>
+            <a:spLocks noGrp="1" noRot="1" noChangeAspect="1"/>
+          </p:cNvSpPr>
+          <p:nvPr>
+            <p:ph type="sldImg"/>
+          </p:nvPr>
+        </p:nvSpPr>
+        <p:spPr/>
+      </p:sp>
+      <p:sp>
+        <p:nvSpPr>
+          <p:cNvPr id="3" name="Notes Placeholder 2"/>
+          <p:cNvSpPr>
+            <a:spLocks noGrp="1"/>
+          </p:cNvSpPr>
+          <p:nvPr>
+            <p:ph type="body" idx="1"/>
+          </p:nvPr>
+        </p:nvSpPr>
+        <p:spPr/>
+        <p:txBody>
+          <a:bodyPr/>
+          <a:lstStyle/>
+          <a:p>
+            <a:pPr marL="0" marR="0" algn="just">
+              <a:lnSpc>
+                <a:spcPct val="150000"/>
+              </a:lnSpc>
+              <a:spcBef>
+                <a:spcPts val="500"/>
+              </a:spcBef>
+              <a:spcAft>
+                <a:spcPts val="1000"/>
+              </a:spcAft>
+            </a:pPr>
+            <a:r>
+              <a:rPr lang="en-US" sz="1800" u="sng" dirty="0">
+                <a:solidFill>
+                  <a:srgbClr val="8E58B6"/>
+                </a:solidFill>
+                <a:effectLst/>
+                <a:latin typeface="Arial" panose="020B0604020202020204" pitchFamily="34" charset="0"/>
+                <a:ea typeface="Times New Roman" panose="02020603050405020304" pitchFamily="18" charset="0"/>
+                <a:cs typeface="Times New Roman" panose="02020603050405020304" pitchFamily="18" charset="0"/>
+                <a:hlinkClick r:id="rId3"/>
+              </a:rPr>
+              <a:t>https://leadertutor.com/equivalence-relations-composition/</a:t>
+            </a:r>
+            <a:endParaRPr lang="de-DE" sz="1800" dirty="0">
+              <a:effectLst/>
+              <a:latin typeface="Arial" panose="020B0604020202020204" pitchFamily="34" charset="0"/>
+              <a:ea typeface="Times New Roman" panose="02020603050405020304" pitchFamily="18" charset="0"/>
+              <a:cs typeface="Times New Roman" panose="02020603050405020304" pitchFamily="18" charset="0"/>
+            </a:endParaRPr>
+          </a:p>
+          <a:p>
+            <a:pPr marL="0" marR="0" algn="just">
+              <a:lnSpc>
+                <a:spcPct val="150000"/>
+              </a:lnSpc>
+              <a:spcBef>
+                <a:spcPts val="500"/>
+              </a:spcBef>
+              <a:spcAft>
+                <a:spcPts val="1000"/>
+              </a:spcAft>
+            </a:pPr>
+            <a:r>
+              <a:rPr lang="en-US" sz="1800" u="sng" dirty="0">
+                <a:solidFill>
+                  <a:srgbClr val="8E58B6"/>
+                </a:solidFill>
+                <a:effectLst/>
+                <a:latin typeface="Arial" panose="020B0604020202020204" pitchFamily="34" charset="0"/>
+                <a:ea typeface="Times New Roman" panose="02020603050405020304" pitchFamily="18" charset="0"/>
+                <a:cs typeface="Times New Roman" panose="02020603050405020304" pitchFamily="18" charset="0"/>
+                <a:hlinkClick r:id="rId4"/>
+              </a:rPr>
+              <a:t>https://math.stackexchange.com/questions/600978/equivalence-relation-composition-problem</a:t>
+            </a:r>
+            <a:endParaRPr lang="de-DE" sz="1800" dirty="0">
+              <a:effectLst/>
+              <a:latin typeface="Arial" panose="020B0604020202020204" pitchFamily="34" charset="0"/>
+              <a:ea typeface="Times New Roman" panose="02020603050405020304" pitchFamily="18" charset="0"/>
+              <a:cs typeface="Times New Roman" panose="02020603050405020304" pitchFamily="18" charset="0"/>
+            </a:endParaRPr>
+          </a:p>
+          <a:p>
+            <a:pPr marL="0" marR="0" algn="just">
+              <a:lnSpc>
+                <a:spcPct val="150000"/>
+              </a:lnSpc>
+              <a:spcBef>
+                <a:spcPts val="500"/>
+              </a:spcBef>
+              <a:spcAft>
+                <a:spcPts val="1000"/>
+              </a:spcAft>
+            </a:pPr>
+            <a:r>
+              <a:rPr lang="en-US" sz="1800" dirty="0">
+                <a:effectLst/>
+                <a:latin typeface="Arial" panose="020B0604020202020204" pitchFamily="34" charset="0"/>
+                <a:ea typeface="Times New Roman" panose="02020603050405020304" pitchFamily="18" charset="0"/>
+                <a:cs typeface="Times New Roman" panose="02020603050405020304" pitchFamily="18" charset="0"/>
+              </a:rPr>
+              <a:t>https://laboratoriomatematicas.uniandes.edu.co/cursocoda/04-Vera-geometry.pdf</a:t>
+            </a:r>
+            <a:endParaRPr lang="de-DE" sz="1800" dirty="0">
+              <a:effectLst/>
+              <a:latin typeface="Arial" panose="020B0604020202020204" pitchFamily="34" charset="0"/>
+              <a:ea typeface="Times New Roman" panose="02020603050405020304" pitchFamily="18" charset="0"/>
+              <a:cs typeface="Times New Roman" panose="02020603050405020304" pitchFamily="18" charset="0"/>
+            </a:endParaRPr>
+          </a:p>
+          <a:p>
+            <a:pPr marL="0" marR="0" algn="just">
+              <a:lnSpc>
+                <a:spcPct val="150000"/>
+              </a:lnSpc>
+              <a:spcBef>
+                <a:spcPts val="500"/>
+              </a:spcBef>
+              <a:spcAft>
+                <a:spcPts val="1000"/>
+              </a:spcAft>
+            </a:pPr>
+            <a:r>
+              <a:rPr lang="en-US" sz="1800" u="sng" dirty="0">
+                <a:solidFill>
+                  <a:srgbClr val="8E58B6"/>
+                </a:solidFill>
+                <a:effectLst/>
+                <a:latin typeface="Arial" panose="020B0604020202020204" pitchFamily="34" charset="0"/>
+                <a:ea typeface="Times New Roman" panose="02020603050405020304" pitchFamily="18" charset="0"/>
+                <a:cs typeface="Times New Roman" panose="02020603050405020304" pitchFamily="18" charset="0"/>
+                <a:hlinkClick r:id="rId5"/>
+              </a:rPr>
+              <a:t>https://hal.archives-ouvertes.fr/hal-03379935v2/document</a:t>
+            </a:r>
+            <a:endParaRPr lang="de-DE" sz="1800" dirty="0">
+              <a:effectLst/>
+              <a:latin typeface="Arial" panose="020B0604020202020204" pitchFamily="34" charset="0"/>
+              <a:ea typeface="Times New Roman" panose="02020603050405020304" pitchFamily="18" charset="0"/>
+              <a:cs typeface="Times New Roman" panose="02020603050405020304" pitchFamily="18" charset="0"/>
+            </a:endParaRPr>
+          </a:p>
+          <a:p>
+            <a:endParaRPr lang="de-DE" dirty="0"/>
+          </a:p>
+        </p:txBody>
+      </p:sp>
+      <p:sp>
+        <p:nvSpPr>
+          <p:cNvPr id="4" name="Slide Number Placeholder 3"/>
+          <p:cNvSpPr>
+            <a:spLocks noGrp="1"/>
+          </p:cNvSpPr>
+          <p:nvPr>
+            <p:ph type="sldNum" sz="quarter" idx="5"/>
+          </p:nvPr>
+        </p:nvSpPr>
+        <p:spPr/>
+        <p:txBody>
+          <a:bodyPr/>
+          <a:lstStyle/>
+          <a:p>
+            <a:fld id="{14E34CAD-DC0B-4EB4-812C-D77F8E7D39DE}" type="slidenum">
+              <a:rPr lang="en-US" smtClean="0"/>
+              <a:t>61</a:t>
+            </a:fld>
+            <a:endParaRPr lang="en-US"/>
+          </a:p>
+        </p:txBody>
+      </p:sp>
+    </p:spTree>
+    <p:extLst>
+      <p:ext uri="{BB962C8B-B14F-4D97-AF65-F5344CB8AC3E}">
+        <p14:creationId xmlns:p14="http://schemas.microsoft.com/office/powerpoint/2010/main" val="889365130"/>
+      </p:ext>
+    </p:extLst>
+  </p:cSld>
+  <p:clrMapOvr>
+    <a:masterClrMapping/>
+  </p:clrMapOvr>
+</p:notes>
+</file>
+
 <file path=ppt/notesSlides/notesSlide4.xml><?xml version="1.0" encoding="utf-8"?>
 <p:notes xmlns:a="http://schemas.openxmlformats.org/drawingml/2006/main" xmlns:r="http://schemas.openxmlformats.org/officeDocument/2006/relationships" xmlns:p="http://schemas.openxmlformats.org/presentationml/2006/main">
   <p:cSld>
@@ -10731,7 +11031,7 @@
           <a:p>
             <a:fld id="{843A20DD-8926-4B91-8D72-D1DC7F5C31EF}" type="datetime1">
               <a:rPr lang="en-US" smtClean="0"/>
-              <a:t>5/13/2022</a:t>
+              <a:t>5/19/2022</a:t>
             </a:fld>
             <a:endParaRPr lang="en-US" dirty="0"/>
           </a:p>
@@ -11074,7 +11374,7 @@
           <a:p>
             <a:fld id="{D2DD2B10-BCB9-40E5-8141-F17001376370}" type="datetime1">
               <a:rPr lang="en-US" smtClean="0"/>
-              <a:t>5/13/2022</a:t>
+              <a:t>5/19/2022</a:t>
             </a:fld>
             <a:endParaRPr lang="en-US" dirty="0"/>
           </a:p>
@@ -11480,7 +11780,7 @@
           <a:p>
             <a:fld id="{927FFA6D-4E8C-437E-BCA1-3CF73EB8B252}" type="datetime1">
               <a:rPr lang="en-US" smtClean="0"/>
-              <a:t>5/13/2022</a:t>
+              <a:t>5/19/2022</a:t>
             </a:fld>
             <a:endParaRPr lang="en-US" dirty="0"/>
           </a:p>
@@ -11821,7 +12121,7 @@
           <a:p>
             <a:fld id="{A2C7F92B-2A35-4C09-8346-C40AAA997302}" type="datetime1">
               <a:rPr lang="en-US" smtClean="0"/>
-              <a:t>5/13/2022</a:t>
+              <a:t>5/19/2022</a:t>
             </a:fld>
             <a:endParaRPr lang="en-US" dirty="0"/>
           </a:p>
@@ -12147,7 +12447,7 @@
           <a:p>
             <a:fld id="{A2C7F92B-2A35-4C09-8346-C40AAA997302}" type="datetime1">
               <a:rPr lang="en-US" smtClean="0"/>
-              <a:t>5/13/2022</a:t>
+              <a:t>5/19/2022</a:t>
             </a:fld>
             <a:endParaRPr lang="en-US" dirty="0"/>
           </a:p>
@@ -12549,7 +12849,7 @@
           <a:p>
             <a:fld id="{A2C7F92B-2A35-4C09-8346-C40AAA997302}" type="datetime1">
               <a:rPr lang="en-US" smtClean="0"/>
-              <a:t>5/13/2022</a:t>
+              <a:t>5/19/2022</a:t>
             </a:fld>
             <a:endParaRPr lang="en-US" dirty="0"/>
           </a:p>
@@ -12812,7 +13112,7 @@
           <a:p>
             <a:fld id="{8A427DC1-41D9-41ED-AAB7-DF919DFB0B7D}" type="datetime1">
               <a:rPr lang="en-US" smtClean="0"/>
-              <a:t>5/13/2022</a:t>
+              <a:t>5/19/2022</a:t>
             </a:fld>
             <a:endParaRPr lang="en-US" dirty="0"/>
           </a:p>
@@ -13079,7 +13379,7 @@
           <a:p>
             <a:fld id="{49530F64-B6F9-41E5-8499-9B56B7F93996}" type="datetime1">
               <a:rPr lang="en-US" smtClean="0"/>
-              <a:t>5/13/2022</a:t>
+              <a:t>5/19/2022</a:t>
             </a:fld>
             <a:endParaRPr lang="en-US" dirty="0"/>
           </a:p>
@@ -13350,7 +13650,7 @@
             <a:fld id="{36D18B76-5E8B-4456-8722-FC5B14B0F354}" type="datetime1">
               <a:rPr lang="en-US" smtClean="0"/>
               <a:pPr/>
-              <a:t>5/13/2022</a:t>
+              <a:t>5/19/2022</a:t>
             </a:fld>
             <a:endParaRPr lang="en-US" dirty="0"/>
           </a:p>
@@ -13688,7 +13988,7 @@
           <a:p>
             <a:fld id="{3E914A3D-A565-477F-8682-1AE6EFE36557}" type="datetime1">
               <a:rPr lang="en-US" smtClean="0"/>
-              <a:t>5/13/2022</a:t>
+              <a:t>5/19/2022</a:t>
             </a:fld>
             <a:endParaRPr lang="en-US" dirty="0"/>
           </a:p>
@@ -14016,7 +14316,7 @@
           <a:p>
             <a:fld id="{D45A6A21-0914-4A46-BCF1-163E9A00E688}" type="datetime1">
               <a:rPr lang="en-US" smtClean="0"/>
-              <a:t>5/13/2022</a:t>
+              <a:t>5/19/2022</a:t>
             </a:fld>
             <a:endParaRPr lang="en-US" dirty="0"/>
           </a:p>
@@ -14478,7 +14778,7 @@
           <a:p>
             <a:fld id="{6BDD7FCB-B1A7-4982-8C8B-674E644B14B0}" type="datetime1">
               <a:rPr lang="en-US" smtClean="0"/>
-              <a:t>5/13/2022</a:t>
+              <a:t>5/19/2022</a:t>
             </a:fld>
             <a:endParaRPr lang="en-US" dirty="0"/>
           </a:p>
@@ -14698,7 +14998,7 @@
             <a:fld id="{4C731089-17FC-4C04-87B1-2157F67F0117}" type="datetime1">
               <a:rPr lang="en-US" smtClean="0"/>
               <a:pPr/>
-              <a:t>5/13/2022</a:t>
+              <a:t>5/19/2022</a:t>
             </a:fld>
             <a:endParaRPr lang="en-US" dirty="0"/>
           </a:p>
@@ -14884,7 +15184,7 @@
           <a:p>
             <a:fld id="{1278D66F-D6E5-4434-B311-7DA25CA81F5A}" type="datetime1">
               <a:rPr lang="en-US" smtClean="0"/>
-              <a:t>5/13/2022</a:t>
+              <a:t>5/19/2022</a:t>
             </a:fld>
             <a:endParaRPr lang="en-US" dirty="0"/>
           </a:p>
@@ -15222,7 +15522,7 @@
           <a:p>
             <a:fld id="{2253374B-0B0C-42C0-A0DF-1550CE3AA116}" type="datetime1">
               <a:rPr lang="en-US" smtClean="0"/>
-              <a:t>5/13/2022</a:t>
+              <a:t>5/19/2022</a:t>
             </a:fld>
             <a:endParaRPr lang="en-US" dirty="0"/>
           </a:p>
@@ -15572,7 +15872,7 @@
           <a:p>
             <a:fld id="{F589A7BC-DDDD-4FB0-A8E7-5046A2EF84B8}" type="datetime1">
               <a:rPr lang="en-US" smtClean="0"/>
-              <a:t>5/13/2022</a:t>
+              <a:t>5/19/2022</a:t>
             </a:fld>
             <a:endParaRPr lang="en-US" dirty="0"/>
           </a:p>
@@ -17694,7 +17994,7 @@
           <a:p>
             <a:fld id="{A2C7F92B-2A35-4C09-8346-C40AAA997302}" type="datetime1">
               <a:rPr lang="en-US" smtClean="0"/>
-              <a:t>5/13/2022</a:t>
+              <a:t>5/19/2022</a:t>
             </a:fld>
             <a:endParaRPr lang="en-US" dirty="0"/>
           </a:p>
@@ -18312,7 +18612,7 @@
           <a:p>
             <a:fld id="{EFFFF5E6-438B-4B86-AF1B-DB82D6C33C1C}" type="datetime1">
               <a:rPr lang="en-US" smtClean="0"/>
-              <a:t>5/13/2022</a:t>
+              <a:t>5/19/2022</a:t>
             </a:fld>
             <a:endParaRPr lang="en-US" dirty="0"/>
           </a:p>
@@ -18682,7 +18982,7 @@
             <a:fld id="{36D18B76-5E8B-4456-8722-FC5B14B0F354}" type="datetime1">
               <a:rPr lang="en-US" smtClean="0"/>
               <a:pPr/>
-              <a:t>5/13/2022</a:t>
+              <a:t>5/19/2022</a:t>
             </a:fld>
             <a:endParaRPr lang="en-US" dirty="0"/>
           </a:p>
@@ -19810,7 +20110,7 @@
             <a:fld id="{36D18B76-5E8B-4456-8722-FC5B14B0F354}" type="datetime1">
               <a:rPr lang="en-US" smtClean="0"/>
               <a:pPr/>
-              <a:t>5/13/2022</a:t>
+              <a:t>5/19/2022</a:t>
             </a:fld>
             <a:endParaRPr lang="en-US" dirty="0"/>
           </a:p>
@@ -22725,7 +23025,7 @@
           <a:p>
             <a:fld id="{1278D66F-D6E5-4434-B311-7DA25CA81F5A}" type="datetime1">
               <a:rPr lang="en-US" smtClean="0"/>
-              <a:t>5/13/2022</a:t>
+              <a:t>5/19/2022</a:t>
             </a:fld>
             <a:endParaRPr lang="en-US" dirty="0"/>
           </a:p>
@@ -25930,7 +26230,7 @@
           <a:p>
             <a:fld id="{BCCEB706-B4FB-4DF7-BDF7-514AEA7F06D0}" type="datetime1">
               <a:rPr lang="en-US" smtClean="0"/>
-              <a:t>5/13/2022</a:t>
+              <a:t>5/19/2022</a:t>
             </a:fld>
             <a:endParaRPr lang="en-US" dirty="0"/>
           </a:p>
@@ -31299,7 +31599,7 @@
           <a:p>
             <a:fld id="{7BB4AFEC-4BE7-4504-8846-4BF0CCFD9721}" type="datetime1">
               <a:rPr lang="en-US" smtClean="0"/>
-              <a:t>5/13/2022</a:t>
+              <a:t>5/19/2022</a:t>
             </a:fld>
             <a:endParaRPr lang="en-US" dirty="0"/>
           </a:p>
@@ -33058,7 +33358,7 @@
             <a:fld id="{36D18B76-5E8B-4456-8722-FC5B14B0F354}" type="datetime1">
               <a:rPr lang="en-US" smtClean="0"/>
               <a:pPr/>
-              <a:t>5/13/2022</a:t>
+              <a:t>5/19/2022</a:t>
             </a:fld>
             <a:endParaRPr lang="en-US" dirty="0"/>
           </a:p>
@@ -33357,7 +33657,7 @@
             <a:fld id="{36D18B76-5E8B-4456-8722-FC5B14B0F354}" type="datetime1">
               <a:rPr lang="en-US" smtClean="0"/>
               <a:pPr/>
-              <a:t>5/13/2022</a:t>
+              <a:t>5/19/2022</a:t>
             </a:fld>
             <a:endParaRPr lang="en-US" dirty="0"/>
           </a:p>
@@ -34476,7 +34776,7 @@
             <a:fld id="{36D18B76-5E8B-4456-8722-FC5B14B0F354}" type="datetime1">
               <a:rPr lang="en-US" smtClean="0"/>
               <a:pPr/>
-              <a:t>5/13/2022</a:t>
+              <a:t>5/19/2022</a:t>
             </a:fld>
             <a:endParaRPr lang="en-US" dirty="0"/>
           </a:p>
@@ -34656,7 +34956,7 @@
             <a:fld id="{36D18B76-5E8B-4456-8722-FC5B14B0F354}" type="datetime1">
               <a:rPr lang="en-US" smtClean="0"/>
               <a:pPr/>
-              <a:t>5/13/2022</a:t>
+              <a:t>5/19/2022</a:t>
             </a:fld>
             <a:endParaRPr lang="en-US" dirty="0"/>
           </a:p>
@@ -34837,7 +35137,7 @@
             <a:fld id="{36D18B76-5E8B-4456-8722-FC5B14B0F354}" type="datetime1">
               <a:rPr lang="en-US" smtClean="0"/>
               <a:pPr/>
-              <a:t>5/13/2022</a:t>
+              <a:t>5/19/2022</a:t>
             </a:fld>
             <a:endParaRPr lang="en-US" dirty="0"/>
           </a:p>
@@ -35074,7 +35374,7 @@
             <a:fld id="{36D18B76-5E8B-4456-8722-FC5B14B0F354}" type="datetime1">
               <a:rPr lang="en-US" smtClean="0"/>
               <a:pPr/>
-              <a:t>5/13/2022</a:t>
+              <a:t>5/19/2022</a:t>
             </a:fld>
             <a:endParaRPr lang="en-US" dirty="0"/>
           </a:p>
@@ -35515,7 +35815,7 @@
             <a:fld id="{36D18B76-5E8B-4456-8722-FC5B14B0F354}" type="datetime1">
               <a:rPr lang="en-US" smtClean="0"/>
               <a:pPr/>
-              <a:t>5/13/2022</a:t>
+              <a:t>5/19/2022</a:t>
             </a:fld>
             <a:endParaRPr lang="en-US" dirty="0"/>
           </a:p>
@@ -35926,7 +36226,7 @@
             <a:fld id="{36D18B76-5E8B-4456-8722-FC5B14B0F354}" type="datetime1">
               <a:rPr lang="en-US" smtClean="0"/>
               <a:pPr/>
-              <a:t>5/13/2022</a:t>
+              <a:t>5/19/2022</a:t>
             </a:fld>
             <a:endParaRPr lang="en-US" dirty="0"/>
           </a:p>
@@ -36338,7 +36638,7 @@
             <a:fld id="{36D18B76-5E8B-4456-8722-FC5B14B0F354}" type="datetime1">
               <a:rPr lang="en-US" smtClean="0"/>
               <a:pPr/>
-              <a:t>5/13/2022</a:t>
+              <a:t>5/19/2022</a:t>
             </a:fld>
             <a:endParaRPr lang="en-US" dirty="0"/>
           </a:p>
@@ -36750,7 +37050,7 @@
             <a:fld id="{36D18B76-5E8B-4456-8722-FC5B14B0F354}" type="datetime1">
               <a:rPr lang="en-US" smtClean="0"/>
               <a:pPr/>
-              <a:t>5/13/2022</a:t>
+              <a:t>5/19/2022</a:t>
             </a:fld>
             <a:endParaRPr lang="en-US" dirty="0"/>
           </a:p>
@@ -37129,7 +37429,7 @@
             <a:fld id="{36D18B76-5E8B-4456-8722-FC5B14B0F354}" type="datetime1">
               <a:rPr lang="en-US" smtClean="0"/>
               <a:pPr/>
-              <a:t>5/13/2022</a:t>
+              <a:t>5/19/2022</a:t>
             </a:fld>
             <a:endParaRPr lang="en-US" dirty="0"/>
           </a:p>
@@ -38114,10 +38414,10 @@
       </p:grpSpPr>
       <p:sp>
         <p:nvSpPr>
-          <p:cNvPr id="2" name="Title 1">
-            <a:extLst>
-              <a:ext uri="{FF2B5EF4-FFF2-40B4-BE49-F238E27FC236}">
-                <a16:creationId xmlns:a16="http://schemas.microsoft.com/office/drawing/2014/main" id="{6806FBA4-537C-4226-9D3A-758C7B787D79}"/>
+          <p:cNvPr id="4" name="Title 1">
+            <a:extLst>
+              <a:ext uri="{FF2B5EF4-FFF2-40B4-BE49-F238E27FC236}">
+                <a16:creationId xmlns:a16="http://schemas.microsoft.com/office/drawing/2014/main" id="{2F1D8065-A4B4-C104-8577-208ABB85FEB6}"/>
               </a:ext>
             </a:extLst>
           </p:cNvPr>
@@ -38128,404 +38428,96 @@
             <p:ph type="title"/>
           </p:nvPr>
         </p:nvSpPr>
-        <p:spPr/>
-        <p:txBody>
-          <a:bodyPr/>
-          <a:lstStyle/>
-          <a:p>
-            <a:r>
-              <a:rPr lang="de-DE" b="1" dirty="0"/>
-              <a:t>Pre-Processing</a:t>
-            </a:r>
-            <a:endParaRPr lang="en-US" b="1" dirty="0"/>
-          </a:p>
-        </p:txBody>
-      </p:sp>
-      <p:sp>
-        <p:nvSpPr>
-          <p:cNvPr id="5" name="Footer Placeholder 4">
-            <a:extLst>
-              <a:ext uri="{FF2B5EF4-FFF2-40B4-BE49-F238E27FC236}">
-                <a16:creationId xmlns:a16="http://schemas.microsoft.com/office/drawing/2014/main" id="{707C4F70-832A-416B-9491-EE86347B2812}"/>
-              </a:ext>
-            </a:extLst>
-          </p:cNvPr>
-          <p:cNvSpPr>
-            <a:spLocks noGrp="1"/>
-          </p:cNvSpPr>
-          <p:nvPr>
-            <p:ph type="ftr" sz="quarter" idx="11"/>
-          </p:nvPr>
-        </p:nvSpPr>
-        <p:spPr/>
-        <p:txBody>
-          <a:bodyPr/>
-          <a:lstStyle/>
-          <a:p>
-            <a:r>
-              <a:rPr lang="en-US"/>
-              <a:t>jennifer.neumaier@t-online.de</a:t>
-            </a:r>
-            <a:endParaRPr lang="en-US" dirty="0"/>
-          </a:p>
-        </p:txBody>
-      </p:sp>
-      <p:sp>
-        <p:nvSpPr>
-          <p:cNvPr id="6" name="Slide Number Placeholder 5">
-            <a:extLst>
-              <a:ext uri="{FF2B5EF4-FFF2-40B4-BE49-F238E27FC236}">
-                <a16:creationId xmlns:a16="http://schemas.microsoft.com/office/drawing/2014/main" id="{1028CB34-29B5-49CB-99E4-E945C3D78896}"/>
-              </a:ext>
-            </a:extLst>
-          </p:cNvPr>
-          <p:cNvSpPr>
-            <a:spLocks noGrp="1"/>
-          </p:cNvSpPr>
-          <p:nvPr>
-            <p:ph type="sldNum" sz="quarter" idx="12"/>
-          </p:nvPr>
-        </p:nvSpPr>
-        <p:spPr/>
-        <p:txBody>
-          <a:bodyPr/>
-          <a:lstStyle/>
-          <a:p>
-            <a:fld id="{D57F1E4F-1CFF-5643-939E-217C01CDF565}" type="slidenum">
-              <a:rPr lang="en-US" smtClean="0"/>
-              <a:pPr/>
-              <a:t>58</a:t>
-            </a:fld>
-            <a:endParaRPr lang="en-US" dirty="0"/>
-          </a:p>
-        </p:txBody>
-      </p:sp>
-      <p:sp>
-        <p:nvSpPr>
-          <p:cNvPr id="26" name="TextBox 25">
-            <a:extLst>
-              <a:ext uri="{FF2B5EF4-FFF2-40B4-BE49-F238E27FC236}">
-                <a16:creationId xmlns:a16="http://schemas.microsoft.com/office/drawing/2014/main" id="{CC7BEBFF-3D20-441C-B1B2-0CE34904FDE4}"/>
-              </a:ext>
-            </a:extLst>
-          </p:cNvPr>
-          <p:cNvSpPr txBox="1"/>
-          <p:nvPr/>
-        </p:nvSpPr>
         <p:spPr>
           <a:xfrm>
-            <a:off x="1698819" y="1152907"/>
-            <a:ext cx="3654858" cy="400110"/>
+            <a:off x="1639915" y="660729"/>
+            <a:ext cx="10172616" cy="772108"/>
+          </a:xfrm>
+        </p:spPr>
+        <p:txBody>
+          <a:bodyPr/>
+          <a:lstStyle/>
+          <a:p>
+            <a:r>
+              <a:rPr lang="de-DE" b="1" dirty="0"/>
+              <a:t>EstMB E11 healthy</a:t>
+            </a:r>
+          </a:p>
+        </p:txBody>
+      </p:sp>
+      <p:pic>
+        <p:nvPicPr>
+          <p:cNvPr id="7" name="Picture 6" descr="Chart, scatter chart&#10;&#10;Description automatically generated">
+            <a:extLst>
+              <a:ext uri="{FF2B5EF4-FFF2-40B4-BE49-F238E27FC236}">
+                <a16:creationId xmlns:a16="http://schemas.microsoft.com/office/drawing/2014/main" id="{AF9804BA-AF16-6AE8-31B4-9ED75DBB2E6A}"/>
+              </a:ext>
+            </a:extLst>
+          </p:cNvPr>
+          <p:cNvPicPr>
+            <a:picLocks noChangeAspect="1"/>
+          </p:cNvPicPr>
+          <p:nvPr/>
+        </p:nvPicPr>
+        <p:blipFill>
+          <a:blip r:embed="rId3"/>
+          <a:stretch>
+            <a:fillRect/>
+          </a:stretch>
+        </p:blipFill>
+        <p:spPr>
+          <a:xfrm>
+            <a:off x="6096000" y="1435606"/>
+            <a:ext cx="5983685" cy="5048734"/>
           </a:xfrm>
           <a:prstGeom prst="rect">
             <a:avLst/>
           </a:prstGeom>
-          <a:noFill/>
+          <a:ln>
+            <a:solidFill>
+              <a:schemeClr val="tx1"/>
+            </a:solidFill>
+          </a:ln>
         </p:spPr>
-        <p:txBody>
-          <a:bodyPr wrap="square" rtlCol="0">
-            <a:spAutoFit/>
-          </a:bodyPr>
-          <a:lstStyle/>
-          <a:p>
-            <a:r>
-              <a:rPr lang="de-DE" sz="2000" i="1" dirty="0"/>
-              <a:t>Problems and Notes</a:t>
-            </a:r>
-          </a:p>
-        </p:txBody>
-      </p:sp>
-      <p:sp>
-        <p:nvSpPr>
-          <p:cNvPr id="7" name="TextBox 6">
-            <a:extLst>
-              <a:ext uri="{FF2B5EF4-FFF2-40B4-BE49-F238E27FC236}">
-                <a16:creationId xmlns:a16="http://schemas.microsoft.com/office/drawing/2014/main" id="{B43BF96F-7A11-4087-9B01-CF6AACD20E04}"/>
-              </a:ext>
-            </a:extLst>
-          </p:cNvPr>
-          <p:cNvSpPr txBox="1"/>
+      </p:pic>
+      <p:pic>
+        <p:nvPicPr>
+          <p:cNvPr id="13" name="Picture 12" descr="Chart, scatter chart&#10;&#10;Description automatically generated">
+            <a:extLst>
+              <a:ext uri="{FF2B5EF4-FFF2-40B4-BE49-F238E27FC236}">
+                <a16:creationId xmlns:a16="http://schemas.microsoft.com/office/drawing/2014/main" id="{88695E40-2D14-FEB9-A034-548FCB88CAAF}"/>
+              </a:ext>
+            </a:extLst>
+          </p:cNvPr>
+          <p:cNvPicPr>
+            <a:picLocks noChangeAspect="1"/>
+          </p:cNvPicPr>
           <p:nvPr/>
-        </p:nvSpPr>
+        </p:nvPicPr>
+        <p:blipFill rotWithShape="1">
+          <a:blip r:embed="rId4"/>
+          <a:srcRect l="23638" t="17219" r="20274" b="15047"/>
+          <a:stretch/>
+        </p:blipFill>
         <p:spPr>
           <a:xfrm>
-            <a:off x="1698819" y="1834296"/>
-            <a:ext cx="7102549" cy="1754326"/>
+            <a:off x="446651" y="1435606"/>
+            <a:ext cx="5649349" cy="5051503"/>
           </a:xfrm>
           <a:prstGeom prst="rect">
             <a:avLst/>
           </a:prstGeom>
-          <a:noFill/>
+          <a:ln>
+            <a:solidFill>
+              <a:schemeClr val="tx1"/>
+            </a:solidFill>
+          </a:ln>
         </p:spPr>
-        <p:txBody>
-          <a:bodyPr wrap="square" rtlCol="0">
-            <a:spAutoFit/>
-          </a:bodyPr>
-          <a:lstStyle/>
-          <a:p>
-            <a:r>
-              <a:rPr lang="de-DE" u="sng" dirty="0"/>
-              <a:t>CRC</a:t>
-            </a:r>
-            <a:r>
-              <a:rPr lang="de-DE" dirty="0"/>
-              <a:t>:</a:t>
-            </a:r>
-          </a:p>
-          <a:p>
-            <a:pPr marL="285750" indent="-285750">
-              <a:buFontTx/>
-              <a:buChar char="-"/>
-            </a:pPr>
-            <a:r>
-              <a:rPr lang="de-DE" dirty="0"/>
-              <a:t>128 rows removed due to NA in BMI</a:t>
-            </a:r>
-          </a:p>
-          <a:p>
-            <a:pPr marL="285750" indent="-285750">
-              <a:buFontTx/>
-              <a:buChar char="-"/>
-            </a:pPr>
-            <a:r>
-              <a:rPr lang="de-DE" dirty="0"/>
-              <a:t>DE saved separately as holdout </a:t>
-            </a:r>
-          </a:p>
-          <a:p>
-            <a:pPr marL="285750" indent="-285750">
-              <a:buFontTx/>
-              <a:buChar char="-"/>
-            </a:pPr>
-            <a:r>
-              <a:rPr lang="de-DE" dirty="0"/>
-              <a:t>All tests were done with country sets: USA, China, Austria, France</a:t>
-            </a:r>
-          </a:p>
-          <a:p>
-            <a:pPr marL="285750" indent="-285750">
-              <a:buFontTx/>
-              <a:buChar char="-"/>
-            </a:pPr>
-            <a:endParaRPr lang="de-DE" dirty="0"/>
-          </a:p>
-        </p:txBody>
-      </p:sp>
-      <p:sp>
-        <p:nvSpPr>
-          <p:cNvPr id="29" name="TextBox 28">
-            <a:extLst>
-              <a:ext uri="{FF2B5EF4-FFF2-40B4-BE49-F238E27FC236}">
-                <a16:creationId xmlns:a16="http://schemas.microsoft.com/office/drawing/2014/main" id="{FD214281-F802-4F96-A098-F69D765E4AFA}"/>
-              </a:ext>
-            </a:extLst>
-          </p:cNvPr>
-          <p:cNvSpPr txBox="1"/>
-          <p:nvPr/>
-        </p:nvSpPr>
-        <p:spPr>
-          <a:xfrm>
-            <a:off x="6199935" y="93132"/>
-            <a:ext cx="6097772" cy="1815882"/>
-          </a:xfrm>
-          <a:prstGeom prst="rect">
-            <a:avLst/>
-          </a:prstGeom>
-          <a:noFill/>
-        </p:spPr>
-        <p:txBody>
-          <a:bodyPr wrap="square">
-            <a:spAutoFit/>
-          </a:bodyPr>
-          <a:lstStyle/>
-          <a:p>
-            <a:r>
-              <a:rPr lang="de-DE" sz="1400" u="sng" dirty="0"/>
-              <a:t>Imputation</a:t>
-            </a:r>
-            <a:r>
-              <a:rPr lang="de-DE" sz="1400" dirty="0"/>
-              <a:t>:</a:t>
-            </a:r>
-          </a:p>
-          <a:p>
-            <a:pPr marL="285750" indent="-285750">
-              <a:buFontTx/>
-              <a:buChar char="-"/>
-            </a:pPr>
-            <a:r>
-              <a:rPr lang="de-DE" sz="1400" dirty="0"/>
-              <a:t>mbImpute needs phylogenetic tree -&gt; ignored for now </a:t>
-            </a:r>
-          </a:p>
-          <a:p>
-            <a:pPr marL="285750" indent="-285750">
-              <a:buFontTx/>
-              <a:buChar char="-"/>
-            </a:pPr>
-            <a:r>
-              <a:rPr lang="de-DE" sz="1400" dirty="0"/>
-              <a:t>EstMB dataset: pseudocount inserts decimal values between 0 and 1</a:t>
-            </a:r>
-          </a:p>
-          <a:p>
-            <a:pPr marL="742950" lvl="1" indent="-285750">
-              <a:buFontTx/>
-              <a:buChar char="-"/>
-            </a:pPr>
-            <a:r>
-              <a:rPr lang="de-DE" sz="1400" dirty="0"/>
-              <a:t>Solution for now: all these values were rounded up to 1</a:t>
-            </a:r>
-          </a:p>
-          <a:p>
-            <a:pPr marL="742950" lvl="1" indent="-285750">
-              <a:buFontTx/>
-              <a:buChar char="-"/>
-            </a:pPr>
-            <a:r>
-              <a:rPr lang="de-DE" sz="1400" dirty="0"/>
-              <a:t>Possibly in a later run keep decimal values, because some papers suggest sensitivity to pseudocount in machine learning models </a:t>
-            </a:r>
-          </a:p>
-        </p:txBody>
-      </p:sp>
-      <p:sp>
-        <p:nvSpPr>
-          <p:cNvPr id="8" name="TextBox 7">
-            <a:extLst>
-              <a:ext uri="{FF2B5EF4-FFF2-40B4-BE49-F238E27FC236}">
-                <a16:creationId xmlns:a16="http://schemas.microsoft.com/office/drawing/2014/main" id="{20ADFB58-875E-4AAE-BDAE-D861E7F9DC27}"/>
-              </a:ext>
-            </a:extLst>
-          </p:cNvPr>
-          <p:cNvSpPr txBox="1"/>
-          <p:nvPr/>
-        </p:nvSpPr>
-        <p:spPr>
-          <a:xfrm>
-            <a:off x="1720971" y="3408432"/>
-            <a:ext cx="7102549" cy="1200329"/>
-          </a:xfrm>
-          <a:prstGeom prst="rect">
-            <a:avLst/>
-          </a:prstGeom>
-          <a:noFill/>
-        </p:spPr>
-        <p:txBody>
-          <a:bodyPr wrap="square" rtlCol="0">
-            <a:spAutoFit/>
-          </a:bodyPr>
-          <a:lstStyle/>
-          <a:p>
-            <a:r>
-              <a:rPr lang="de-DE" u="sng" dirty="0"/>
-              <a:t>PCOS</a:t>
-            </a:r>
-            <a:r>
-              <a:rPr lang="de-DE" dirty="0"/>
-              <a:t>:</a:t>
-            </a:r>
-          </a:p>
-          <a:p>
-            <a:pPr marL="285750" indent="-285750">
-              <a:buFontTx/>
-              <a:buChar char="-"/>
-            </a:pPr>
-            <a:r>
-              <a:rPr lang="de-DE" dirty="0"/>
-              <a:t>6 rows removed in abundance table because they were not included in metadata</a:t>
-            </a:r>
-          </a:p>
-          <a:p>
-            <a:pPr marL="285750" indent="-285750">
-              <a:buFontTx/>
-              <a:buChar char="-"/>
-            </a:pPr>
-            <a:endParaRPr lang="de-DE" dirty="0"/>
-          </a:p>
-        </p:txBody>
-      </p:sp>
-      <p:sp>
-        <p:nvSpPr>
-          <p:cNvPr id="9" name="TextBox 8">
-            <a:extLst>
-              <a:ext uri="{FF2B5EF4-FFF2-40B4-BE49-F238E27FC236}">
-                <a16:creationId xmlns:a16="http://schemas.microsoft.com/office/drawing/2014/main" id="{C84548D0-C361-4108-B284-1351D54B8DFD}"/>
-              </a:ext>
-            </a:extLst>
-          </p:cNvPr>
-          <p:cNvSpPr txBox="1"/>
-          <p:nvPr/>
-        </p:nvSpPr>
-        <p:spPr>
-          <a:xfrm>
-            <a:off x="1720971" y="4717667"/>
-            <a:ext cx="7102549" cy="1754326"/>
-          </a:xfrm>
-          <a:prstGeom prst="rect">
-            <a:avLst/>
-          </a:prstGeom>
-          <a:noFill/>
-        </p:spPr>
-        <p:txBody>
-          <a:bodyPr wrap="square" rtlCol="0">
-            <a:spAutoFit/>
-          </a:bodyPr>
-          <a:lstStyle/>
-          <a:p>
-            <a:r>
-              <a:rPr lang="de-DE" u="sng" dirty="0"/>
-              <a:t>EstMB</a:t>
-            </a:r>
-            <a:r>
-              <a:rPr lang="de-DE" dirty="0"/>
-              <a:t>:</a:t>
-            </a:r>
-          </a:p>
-          <a:p>
-            <a:pPr marL="285750" indent="-285750">
-              <a:buFontTx/>
-              <a:buChar char="-"/>
-            </a:pPr>
-            <a:r>
-              <a:rPr lang="de-DE" dirty="0"/>
-              <a:t>21 rows removed in metadata due to NA</a:t>
-            </a:r>
-          </a:p>
-          <a:p>
-            <a:pPr marL="285750" indent="-285750">
-              <a:buFontTx/>
-              <a:buChar char="-"/>
-            </a:pPr>
-            <a:r>
-              <a:rPr lang="de-DE" dirty="0"/>
-              <a:t>21 patients cut out of abundance table due to metadata</a:t>
-            </a:r>
-          </a:p>
-          <a:p>
-            <a:pPr marL="285750" indent="-285750">
-              <a:buFontTx/>
-              <a:buChar char="-"/>
-            </a:pPr>
-            <a:r>
-              <a:rPr lang="de-DE" dirty="0"/>
-              <a:t>Added 75% abundance filter as data was otherwise not practically processable</a:t>
-            </a:r>
-          </a:p>
-          <a:p>
-            <a:pPr marL="285750" indent="-285750">
-              <a:buFontTx/>
-              <a:buChar char="-"/>
-            </a:pPr>
-            <a:endParaRPr lang="de-DE" dirty="0"/>
-          </a:p>
-        </p:txBody>
-      </p:sp>
+      </p:pic>
     </p:spTree>
     <p:extLst>
       <p:ext uri="{BB962C8B-B14F-4D97-AF65-F5344CB8AC3E}">
-        <p14:creationId xmlns:p14="http://schemas.microsoft.com/office/powerpoint/2010/main" val="3215538767"/>
+        <p14:creationId xmlns:p14="http://schemas.microsoft.com/office/powerpoint/2010/main" val="2984881787"/>
       </p:ext>
     </p:extLst>
   </p:cSld>
@@ -38575,7 +38567,7 @@
           <a:p>
             <a:r>
               <a:rPr lang="de-DE" b="1" dirty="0"/>
-              <a:t>Transformations</a:t>
+              <a:t>Pre-Processing</a:t>
             </a:r>
             <a:endParaRPr lang="en-US" b="1" dirty="0"/>
           </a:p>
@@ -38603,9 +38595,10 @@
           <a:lstStyle/>
           <a:p>
             <a:r>
-              <a:rPr lang="en-US" dirty="0"/>
+              <a:rPr lang="en-US"/>
               <a:t>jennifer.neumaier@t-online.de</a:t>
             </a:r>
+            <a:endParaRPr lang="en-US" dirty="0"/>
           </a:p>
         </p:txBody>
       </p:sp>
@@ -38688,8 +38681,8 @@
         </p:nvSpPr>
         <p:spPr>
           <a:xfrm>
-            <a:off x="2589212" y="1742696"/>
-            <a:ext cx="7102549" cy="1477328"/>
+            <a:off x="1698819" y="1834296"/>
+            <a:ext cx="7102549" cy="1754326"/>
           </a:xfrm>
           <a:prstGeom prst="rect">
             <a:avLst/>
@@ -38704,7 +38697,7 @@
           <a:p>
             <a:r>
               <a:rPr lang="de-DE" u="sng" dirty="0"/>
-              <a:t>CLR/ALR</a:t>
+              <a:t>CRC</a:t>
             </a:r>
             <a:r>
               <a:rPr lang="de-DE" dirty="0"/>
@@ -38718,7 +38711,7 @@
             </a:pPr>
             <a:r>
               <a:rPr lang="de-DE" dirty="0"/>
-              <a:t>What to do with LR.wt?</a:t>
+              <a:t>128 rows removed due to NA in BMI</a:t>
             </a:r>
           </a:p>
           <a:p>
@@ -38728,7 +38721,7 @@
             </a:pPr>
             <a:r>
               <a:rPr lang="de-DE" dirty="0"/>
-              <a:t>What to do with part.names and part.wt?</a:t>
+              <a:t>DE saved separately as holdout </a:t>
             </a:r>
           </a:p>
           <a:p>
@@ -38738,20 +38731,24 @@
             </a:pPr>
             <a:r>
               <a:rPr lang="de-DE" dirty="0"/>
-              <a:t>Column names ALR?</a:t>
-            </a:r>
-          </a:p>
-          <a:p>
+              <a:t>All tests were done with country sets: USA, China, Austria, France</a:t>
+            </a:r>
+          </a:p>
+          <a:p>
+            <a:pPr marL="285750" indent="-285750">
+              <a:buFontTx/>
+              <a:buChar char="-"/>
+            </a:pPr>
             <a:endParaRPr lang="de-DE" dirty="0"/>
           </a:p>
         </p:txBody>
       </p:sp>
       <p:sp>
         <p:nvSpPr>
-          <p:cNvPr id="8" name="TextBox 7">
-            <a:extLst>
-              <a:ext uri="{FF2B5EF4-FFF2-40B4-BE49-F238E27FC236}">
-                <a16:creationId xmlns:a16="http://schemas.microsoft.com/office/drawing/2014/main" id="{42B7B4AF-462B-468E-AAF9-0BB332281A81}"/>
+          <p:cNvPr id="29" name="TextBox 28">
+            <a:extLst>
+              <a:ext uri="{FF2B5EF4-FFF2-40B4-BE49-F238E27FC236}">
+                <a16:creationId xmlns:a16="http://schemas.microsoft.com/office/drawing/2014/main" id="{FD214281-F802-4F96-A098-F69D765E4AFA}"/>
               </a:ext>
             </a:extLst>
           </p:cNvPr>
@@ -38760,8 +38757,8 @@
         </p:nvSpPr>
         <p:spPr>
           <a:xfrm>
-            <a:off x="2589212" y="3278973"/>
-            <a:ext cx="7102549" cy="923330"/>
+            <a:off x="6199935" y="93132"/>
+            <a:ext cx="6097772" cy="1815882"/>
           </a:xfrm>
           <a:prstGeom prst="rect">
             <a:avLst/>
@@ -38769,16 +38766,19 @@
           <a:noFill/>
         </p:spPr>
         <p:txBody>
-          <a:bodyPr wrap="square" rtlCol="0">
+          <a:bodyPr wrap="square">
             <a:spAutoFit/>
           </a:bodyPr>
           <a:lstStyle/>
           <a:p>
             <a:r>
-              <a:rPr lang="de-DE" u="sng" dirty="0"/>
-              <a:t>EstMB:</a:t>
-            </a:r>
-            <a:endParaRPr lang="de-DE" dirty="0"/>
+              <a:rPr lang="de-DE" sz="1400" u="sng" dirty="0"/>
+              <a:t>Imputation</a:t>
+            </a:r>
+            <a:r>
+              <a:rPr lang="de-DE" sz="1400" dirty="0"/>
+              <a:t>:</a:t>
+            </a:r>
           </a:p>
           <a:p>
             <a:pPr marL="285750" indent="-285750">
@@ -38786,11 +38786,170 @@
               <a:buChar char="-"/>
             </a:pPr>
             <a:r>
+              <a:rPr lang="de-DE" sz="1400" dirty="0"/>
+              <a:t>mbImpute needs phylogenetic tree -&gt; ignored for now </a:t>
+            </a:r>
+          </a:p>
+          <a:p>
+            <a:pPr marL="285750" indent="-285750">
+              <a:buFontTx/>
+              <a:buChar char="-"/>
+            </a:pPr>
+            <a:r>
+              <a:rPr lang="de-DE" sz="1400" dirty="0"/>
+              <a:t>EstMB dataset: pseudocount inserts decimal values between 0 and 1</a:t>
+            </a:r>
+          </a:p>
+          <a:p>
+            <a:pPr marL="742950" lvl="1" indent="-285750">
+              <a:buFontTx/>
+              <a:buChar char="-"/>
+            </a:pPr>
+            <a:r>
+              <a:rPr lang="de-DE" sz="1400" dirty="0"/>
+              <a:t>Solution for now: all these values were rounded up to 1</a:t>
+            </a:r>
+          </a:p>
+          <a:p>
+            <a:pPr marL="742950" lvl="1" indent="-285750">
+              <a:buFontTx/>
+              <a:buChar char="-"/>
+            </a:pPr>
+            <a:r>
+              <a:rPr lang="de-DE" sz="1400" dirty="0"/>
+              <a:t>Possibly in a later run keep decimal values, because some papers suggest sensitivity to pseudocount in machine learning models </a:t>
+            </a:r>
+          </a:p>
+        </p:txBody>
+      </p:sp>
+      <p:sp>
+        <p:nvSpPr>
+          <p:cNvPr id="8" name="TextBox 7">
+            <a:extLst>
+              <a:ext uri="{FF2B5EF4-FFF2-40B4-BE49-F238E27FC236}">
+                <a16:creationId xmlns:a16="http://schemas.microsoft.com/office/drawing/2014/main" id="{20ADFB58-875E-4AAE-BDAE-D861E7F9DC27}"/>
+              </a:ext>
+            </a:extLst>
+          </p:cNvPr>
+          <p:cNvSpPr txBox="1"/>
+          <p:nvPr/>
+        </p:nvSpPr>
+        <p:spPr>
+          <a:xfrm>
+            <a:off x="1720971" y="3408432"/>
+            <a:ext cx="7102549" cy="1200329"/>
+          </a:xfrm>
+          <a:prstGeom prst="rect">
+            <a:avLst/>
+          </a:prstGeom>
+          <a:noFill/>
+        </p:spPr>
+        <p:txBody>
+          <a:bodyPr wrap="square" rtlCol="0">
+            <a:spAutoFit/>
+          </a:bodyPr>
+          <a:lstStyle/>
+          <a:p>
+            <a:r>
+              <a:rPr lang="de-DE" u="sng" dirty="0"/>
+              <a:t>PCOS</a:t>
+            </a:r>
+            <a:r>
               <a:rPr lang="de-DE" dirty="0"/>
-              <a:t>Needs a lot of time for ALR -&gt; solved in HPC?</a:t>
-            </a:r>
-          </a:p>
-          <a:p>
+              <a:t>:</a:t>
+            </a:r>
+          </a:p>
+          <a:p>
+            <a:pPr marL="285750" indent="-285750">
+              <a:buFontTx/>
+              <a:buChar char="-"/>
+            </a:pPr>
+            <a:r>
+              <a:rPr lang="de-DE" dirty="0"/>
+              <a:t>6 rows removed in abundance table because they were not included in metadata</a:t>
+            </a:r>
+          </a:p>
+          <a:p>
+            <a:pPr marL="285750" indent="-285750">
+              <a:buFontTx/>
+              <a:buChar char="-"/>
+            </a:pPr>
+            <a:endParaRPr lang="de-DE" dirty="0"/>
+          </a:p>
+        </p:txBody>
+      </p:sp>
+      <p:sp>
+        <p:nvSpPr>
+          <p:cNvPr id="9" name="TextBox 8">
+            <a:extLst>
+              <a:ext uri="{FF2B5EF4-FFF2-40B4-BE49-F238E27FC236}">
+                <a16:creationId xmlns:a16="http://schemas.microsoft.com/office/drawing/2014/main" id="{C84548D0-C361-4108-B284-1351D54B8DFD}"/>
+              </a:ext>
+            </a:extLst>
+          </p:cNvPr>
+          <p:cNvSpPr txBox="1"/>
+          <p:nvPr/>
+        </p:nvSpPr>
+        <p:spPr>
+          <a:xfrm>
+            <a:off x="1720971" y="4717667"/>
+            <a:ext cx="7102549" cy="1754326"/>
+          </a:xfrm>
+          <a:prstGeom prst="rect">
+            <a:avLst/>
+          </a:prstGeom>
+          <a:noFill/>
+        </p:spPr>
+        <p:txBody>
+          <a:bodyPr wrap="square" rtlCol="0">
+            <a:spAutoFit/>
+          </a:bodyPr>
+          <a:lstStyle/>
+          <a:p>
+            <a:r>
+              <a:rPr lang="de-DE" u="sng" dirty="0"/>
+              <a:t>EstMB</a:t>
+            </a:r>
+            <a:r>
+              <a:rPr lang="de-DE" dirty="0"/>
+              <a:t>:</a:t>
+            </a:r>
+          </a:p>
+          <a:p>
+            <a:pPr marL="285750" indent="-285750">
+              <a:buFontTx/>
+              <a:buChar char="-"/>
+            </a:pPr>
+            <a:r>
+              <a:rPr lang="de-DE" dirty="0"/>
+              <a:t>21 rows removed in metadata due to NA</a:t>
+            </a:r>
+          </a:p>
+          <a:p>
+            <a:pPr marL="285750" indent="-285750">
+              <a:buFontTx/>
+              <a:buChar char="-"/>
+            </a:pPr>
+            <a:r>
+              <a:rPr lang="de-DE" dirty="0"/>
+              <a:t>21 patients cut out of abundance table due to metadata</a:t>
+            </a:r>
+          </a:p>
+          <a:p>
+            <a:pPr marL="285750" indent="-285750">
+              <a:buFontTx/>
+              <a:buChar char="-"/>
+            </a:pPr>
+            <a:r>
+              <a:rPr lang="de-DE" dirty="0"/>
+              <a:t>Added 75% abundance filter as data was otherwise not practically processable</a:t>
+            </a:r>
+          </a:p>
+          <a:p>
+            <a:pPr marL="285750" indent="-285750">
+              <a:buFontTx/>
+              <a:buChar char="-"/>
+            </a:pPr>
             <a:endParaRPr lang="de-DE" dirty="0"/>
           </a:p>
         </p:txBody>
@@ -38798,7 +38957,7 @@
     </p:spTree>
     <p:extLst>
       <p:ext uri="{BB962C8B-B14F-4D97-AF65-F5344CB8AC3E}">
-        <p14:creationId xmlns:p14="http://schemas.microsoft.com/office/powerpoint/2010/main" val="3441935650"/>
+        <p14:creationId xmlns:p14="http://schemas.microsoft.com/office/powerpoint/2010/main" val="3215538767"/>
       </p:ext>
     </p:extLst>
   </p:cSld>
@@ -38882,7 +39041,7 @@
           <a:p>
             <a:fld id="{1F2A6BD5-D000-45AE-BE81-365EBD12526C}" type="datetime1">
               <a:rPr lang="en-US" smtClean="0"/>
-              <a:t>5/13/2022</a:t>
+              <a:t>5/19/2022</a:t>
             </a:fld>
             <a:endParaRPr lang="en-US" dirty="0"/>
           </a:p>
@@ -39111,7 +39270,7 @@
           <a:p>
             <a:r>
               <a:rPr lang="de-DE" b="1" dirty="0"/>
-              <a:t>Hierarchy dimensionality reduction</a:t>
+              <a:t>Transformations</a:t>
             </a:r>
             <a:endParaRPr lang="en-US" b="1" dirty="0"/>
           </a:p>
@@ -39139,10 +39298,9 @@
           <a:lstStyle/>
           <a:p>
             <a:r>
-              <a:rPr lang="en-US"/>
+              <a:rPr lang="en-US" dirty="0"/>
               <a:t>jennifer.neumaier@t-online.de</a:t>
             </a:r>
-            <a:endParaRPr lang="en-US" dirty="0"/>
           </a:p>
         </p:txBody>
       </p:sp>
@@ -39226,7 +39384,7 @@
         <p:spPr>
           <a:xfrm>
             <a:off x="2589212" y="1742696"/>
-            <a:ext cx="7102549" cy="1754326"/>
+            <a:ext cx="7102549" cy="1477328"/>
           </a:xfrm>
           <a:prstGeom prst="rect">
             <a:avLst/>
@@ -39241,7 +39399,7 @@
           <a:p>
             <a:r>
               <a:rPr lang="de-DE" u="sng" dirty="0"/>
-              <a:t>PCA</a:t>
+              <a:t>CLR/ALR</a:t>
             </a:r>
             <a:r>
               <a:rPr lang="de-DE" dirty="0"/>
@@ -39255,7 +39413,7 @@
             </a:pPr>
             <a:r>
               <a:rPr lang="de-DE" dirty="0"/>
-              <a:t>Microbiome Preprocessing Machine Learning Pipeline (2021)</a:t>
+              <a:t>What to do with LR.wt?</a:t>
             </a:r>
           </a:p>
           <a:p>
@@ -39265,7 +39423,7 @@
             </a:pPr>
             <a:r>
               <a:rPr lang="de-DE" dirty="0"/>
-              <a:t>Proposes to use PCA as hierarchy reduction </a:t>
+              <a:t>What to do with part.names and part.wt?</a:t>
             </a:r>
           </a:p>
           <a:p>
@@ -39275,18 +39433,124 @@
             </a:pPr>
             <a:r>
               <a:rPr lang="de-DE" dirty="0"/>
-              <a:t>Families can be clustered and genus is not necessary</a:t>
+              <a:t>Column names ALR?</a:t>
             </a:r>
           </a:p>
           <a:p>
             <a:endParaRPr lang="de-DE" dirty="0"/>
+          </a:p>
+        </p:txBody>
+      </p:sp>
+      <p:sp>
+        <p:nvSpPr>
+          <p:cNvPr id="8" name="TextBox 7">
+            <a:extLst>
+              <a:ext uri="{FF2B5EF4-FFF2-40B4-BE49-F238E27FC236}">
+                <a16:creationId xmlns:a16="http://schemas.microsoft.com/office/drawing/2014/main" id="{42B7B4AF-462B-468E-AAF9-0BB332281A81}"/>
+              </a:ext>
+            </a:extLst>
+          </p:cNvPr>
+          <p:cNvSpPr txBox="1"/>
+          <p:nvPr/>
+        </p:nvSpPr>
+        <p:spPr>
+          <a:xfrm>
+            <a:off x="2589212" y="3278973"/>
+            <a:ext cx="7102549" cy="923330"/>
+          </a:xfrm>
+          <a:prstGeom prst="rect">
+            <a:avLst/>
+          </a:prstGeom>
+          <a:noFill/>
+        </p:spPr>
+        <p:txBody>
+          <a:bodyPr wrap="square" rtlCol="0">
+            <a:spAutoFit/>
+          </a:bodyPr>
+          <a:lstStyle/>
+          <a:p>
+            <a:r>
+              <a:rPr lang="de-DE" u="sng" dirty="0"/>
+              <a:t>EstMB:</a:t>
+            </a:r>
+            <a:endParaRPr lang="de-DE" dirty="0"/>
+          </a:p>
+          <a:p>
+            <a:pPr marL="285750" indent="-285750">
+              <a:buFontTx/>
+              <a:buChar char="-"/>
+            </a:pPr>
+            <a:r>
+              <a:rPr lang="de-DE" dirty="0"/>
+              <a:t>Needs a lot of time for ALR -&gt; solved in HPC?</a:t>
+            </a:r>
+          </a:p>
+          <a:p>
+            <a:endParaRPr lang="de-DE" dirty="0"/>
+          </a:p>
+        </p:txBody>
+      </p:sp>
+      <p:sp>
+        <p:nvSpPr>
+          <p:cNvPr id="9" name="TextBox 8">
+            <a:extLst>
+              <a:ext uri="{FF2B5EF4-FFF2-40B4-BE49-F238E27FC236}">
+                <a16:creationId xmlns:a16="http://schemas.microsoft.com/office/drawing/2014/main" id="{1BDC196A-BF95-29CF-EA9D-DA91FF034D94}"/>
+              </a:ext>
+            </a:extLst>
+          </p:cNvPr>
+          <p:cNvSpPr txBox="1"/>
+          <p:nvPr/>
+        </p:nvSpPr>
+        <p:spPr>
+          <a:xfrm>
+            <a:off x="5769552" y="241889"/>
+            <a:ext cx="6094268" cy="3780522"/>
+          </a:xfrm>
+          <a:prstGeom prst="rect">
+            <a:avLst/>
+          </a:prstGeom>
+          <a:noFill/>
+        </p:spPr>
+        <p:txBody>
+          <a:bodyPr wrap="square">
+            <a:spAutoFit/>
+          </a:bodyPr>
+          <a:lstStyle/>
+          <a:p>
+            <a:pPr marL="0" marR="0" algn="just">
+              <a:lnSpc>
+                <a:spcPct val="150000"/>
+              </a:lnSpc>
+              <a:spcBef>
+                <a:spcPts val="500"/>
+              </a:spcBef>
+              <a:spcAft>
+                <a:spcPts val="1000"/>
+              </a:spcAft>
+            </a:pPr>
+            <a:r>
+              <a:rPr lang="en-US" sz="1800" dirty="0">
+                <a:effectLst/>
+                <a:latin typeface="Arial" panose="020B0604020202020204" pitchFamily="34" charset="0"/>
+                <a:ea typeface="Times New Roman" panose="02020603050405020304" pitchFamily="18" charset="0"/>
+                <a:cs typeface="Times New Roman" panose="02020603050405020304" pitchFamily="18" charset="0"/>
+              </a:rPr>
+              <a:t>More complex is ILR (isometric log-ratio), which transforms the data with respect to an orthonormal coordinate system that is constructed from sequential binary partitions of features (Quinn et al. 2018). The ILR-transform maps a composition in the D-part Aitchison-simplex isometrically to a D-1 dimensional Euclidian vector, with clr(x) the centered log-ratio transform and V a matrix which columns form an orthonormal basis of the clr-plane (Greenacre et al. 2022).</a:t>
+            </a:r>
+            <a:endParaRPr lang="de-DE" sz="1400" dirty="0">
+              <a:effectLst/>
+              <a:latin typeface="Arial" panose="020B0604020202020204" pitchFamily="34" charset="0"/>
+              <a:ea typeface="Times New Roman" panose="02020603050405020304" pitchFamily="18" charset="0"/>
+              <a:cs typeface="Times New Roman" panose="02020603050405020304" pitchFamily="18" charset="0"/>
+            </a:endParaRPr>
           </a:p>
         </p:txBody>
       </p:sp>
     </p:spTree>
     <p:extLst>
       <p:ext uri="{BB962C8B-B14F-4D97-AF65-F5344CB8AC3E}">
-        <p14:creationId xmlns:p14="http://schemas.microsoft.com/office/powerpoint/2010/main" val="2182919606"/>
+        <p14:creationId xmlns:p14="http://schemas.microsoft.com/office/powerpoint/2010/main" val="3441935650"/>
       </p:ext>
     </p:extLst>
   </p:cSld>
@@ -39329,18 +39593,49 @@
             <p:ph type="title"/>
           </p:nvPr>
         </p:nvSpPr>
+        <p:spPr>
+          <a:xfrm>
+            <a:off x="1640156" y="628124"/>
+            <a:ext cx="9640988" cy="1280890"/>
+          </a:xfrm>
+        </p:spPr>
+        <p:txBody>
+          <a:bodyPr/>
+          <a:lstStyle/>
+          <a:p>
+            <a:r>
+              <a:rPr lang="de-DE" b="1" dirty="0"/>
+              <a:t>Simplex Space and Compositional Data</a:t>
+            </a:r>
+            <a:endParaRPr lang="en-US" b="1" dirty="0"/>
+          </a:p>
+        </p:txBody>
+      </p:sp>
+      <p:sp>
+        <p:nvSpPr>
+          <p:cNvPr id="5" name="Footer Placeholder 4">
+            <a:extLst>
+              <a:ext uri="{FF2B5EF4-FFF2-40B4-BE49-F238E27FC236}">
+                <a16:creationId xmlns:a16="http://schemas.microsoft.com/office/drawing/2014/main" id="{707C4F70-832A-416B-9491-EE86347B2812}"/>
+              </a:ext>
+            </a:extLst>
+          </p:cNvPr>
+          <p:cNvSpPr>
+            <a:spLocks noGrp="1"/>
+          </p:cNvSpPr>
+          <p:nvPr>
+            <p:ph type="ftr" sz="quarter" idx="11"/>
+          </p:nvPr>
+        </p:nvSpPr>
         <p:spPr/>
         <p:txBody>
-          <a:bodyPr>
-            <a:normAutofit/>
-          </a:bodyPr>
-          <a:lstStyle/>
-          <a:p>
-            <a:r>
-              <a:rPr lang="de-DE" sz="3200" b="1" dirty="0"/>
-              <a:t>mikropml</a:t>
-            </a:r>
-            <a:endParaRPr lang="en-US" sz="3200" b="1" dirty="0"/>
+          <a:bodyPr/>
+          <a:lstStyle/>
+          <a:p>
+            <a:r>
+              <a:rPr lang="en-US" dirty="0"/>
+              <a:t>jennifer.neumaier@t-online.de</a:t>
+            </a:r>
           </a:p>
         </p:txBody>
       </p:sp>
@@ -39376,10 +39671,10 @@
       </p:sp>
       <p:sp>
         <p:nvSpPr>
-          <p:cNvPr id="8" name="TextBox 7">
-            <a:extLst>
-              <a:ext uri="{FF2B5EF4-FFF2-40B4-BE49-F238E27FC236}">
-                <a16:creationId xmlns:a16="http://schemas.microsoft.com/office/drawing/2014/main" id="{C9FAD4F5-81D5-4890-8BB5-F06C93EDD254}"/>
+          <p:cNvPr id="26" name="TextBox 25">
+            <a:extLst>
+              <a:ext uri="{FF2B5EF4-FFF2-40B4-BE49-F238E27FC236}">
+                <a16:creationId xmlns:a16="http://schemas.microsoft.com/office/drawing/2014/main" id="{CC7BEBFF-3D20-441C-B1B2-0CE34904FDE4}"/>
               </a:ext>
             </a:extLst>
           </p:cNvPr>
@@ -39388,8 +39683,8 @@
         </p:nvSpPr>
         <p:spPr>
           <a:xfrm>
-            <a:off x="1392866" y="1268569"/>
-            <a:ext cx="8753253" cy="5509200"/>
+            <a:off x="1698819" y="1152907"/>
+            <a:ext cx="3654858" cy="400110"/>
           </a:xfrm>
           <a:prstGeom prst="rect">
             <a:avLst/>
@@ -39397,172 +39692,554 @@
           <a:noFill/>
         </p:spPr>
         <p:txBody>
+          <a:bodyPr wrap="square" rtlCol="0">
+            <a:spAutoFit/>
+          </a:bodyPr>
+          <a:lstStyle/>
+          <a:p>
+            <a:r>
+              <a:rPr lang="de-DE" sz="2000" i="1" dirty="0"/>
+              <a:t>Problems and Notes</a:t>
+            </a:r>
+          </a:p>
+        </p:txBody>
+      </p:sp>
+      <p:pic>
+        <p:nvPicPr>
+          <p:cNvPr id="9" name="Picture 8" descr="Text, chat or text message&#10;&#10;Description automatically generated">
+            <a:extLst>
+              <a:ext uri="{FF2B5EF4-FFF2-40B4-BE49-F238E27FC236}">
+                <a16:creationId xmlns:a16="http://schemas.microsoft.com/office/drawing/2014/main" id="{95EC87B6-6ACA-0EAE-F471-3C49242CF081}"/>
+              </a:ext>
+            </a:extLst>
+          </p:cNvPr>
+          <p:cNvPicPr>
+            <a:picLocks noChangeAspect="1"/>
+          </p:cNvPicPr>
+          <p:nvPr/>
+        </p:nvPicPr>
+        <p:blipFill>
+          <a:blip r:embed="rId3"/>
+          <a:stretch>
+            <a:fillRect/>
+          </a:stretch>
+        </p:blipFill>
+        <p:spPr>
+          <a:xfrm>
+            <a:off x="921695" y="2077800"/>
+            <a:ext cx="5972810" cy="2375535"/>
+          </a:xfrm>
+          <a:prstGeom prst="rect">
+            <a:avLst/>
+          </a:prstGeom>
+        </p:spPr>
+      </p:pic>
+      <p:sp>
+        <p:nvSpPr>
+          <p:cNvPr id="10" name="TextBox 9">
+            <a:extLst>
+              <a:ext uri="{FF2B5EF4-FFF2-40B4-BE49-F238E27FC236}">
+                <a16:creationId xmlns:a16="http://schemas.microsoft.com/office/drawing/2014/main" id="{B6C08B45-B229-47E4-30F5-3E4C0669305B}"/>
+              </a:ext>
+            </a:extLst>
+          </p:cNvPr>
+          <p:cNvSpPr txBox="1"/>
+          <p:nvPr/>
+        </p:nvSpPr>
+        <p:spPr>
+          <a:xfrm>
+            <a:off x="6894505" y="3900136"/>
+            <a:ext cx="6094070" cy="2329740"/>
+          </a:xfrm>
+          <a:prstGeom prst="rect">
+            <a:avLst/>
+          </a:prstGeom>
+          <a:noFill/>
+        </p:spPr>
+        <p:txBody>
           <a:bodyPr wrap="square">
             <a:spAutoFit/>
           </a:bodyPr>
           <a:lstStyle/>
           <a:p>
-            <a:r>
-              <a:rPr lang="de-DE" sz="1100" dirty="0"/>
-              <a:t>Testing out mikropml as it already has a function run_ml() that incorporates nested cross-validation for several standard supervised machine learning models:</a:t>
-            </a:r>
-          </a:p>
-          <a:p>
-            <a:endParaRPr lang="de-DE" sz="1100" dirty="0"/>
-          </a:p>
-          <a:p>
-            <a:r>
-              <a:rPr lang="de-DE" sz="1100" dirty="0"/>
-              <a:t>    Logistic/multiclass/linear regression ("glmnet")</a:t>
-            </a:r>
-          </a:p>
-          <a:p>
-            <a:r>
-              <a:rPr lang="de-DE" sz="1100" dirty="0"/>
-              <a:t>    Random forest ("rf")</a:t>
-            </a:r>
-          </a:p>
-          <a:p>
-            <a:r>
-              <a:rPr lang="de-DE" sz="1100" dirty="0"/>
-              <a:t>    Decision tree ("rpart2")</a:t>
-            </a:r>
-          </a:p>
-          <a:p>
-            <a:r>
-              <a:rPr lang="de-DE" sz="1100" dirty="0"/>
-              <a:t>    Support vector machine with a radial basis kernel ("svmRadial")</a:t>
-            </a:r>
-          </a:p>
-          <a:p>
-            <a:r>
-              <a:rPr lang="de-DE" sz="1100" dirty="0"/>
-              <a:t>    xgboost ("xgbTree")</a:t>
-            </a:r>
-          </a:p>
-          <a:p>
-            <a:endParaRPr lang="de-DE" sz="1100" dirty="0"/>
-          </a:p>
-          <a:p>
-            <a:r>
-              <a:rPr lang="de-DE" sz="1100" dirty="0"/>
-              <a:t>Test it here for linear regression and xgboost.</a:t>
-            </a:r>
-          </a:p>
-          <a:p>
-            <a:r>
-              <a:rPr lang="de-DE" sz="1100" dirty="0"/>
-              <a:t>Function run_ml has several parameters:</a:t>
-            </a:r>
-          </a:p>
-          <a:p>
-            <a:r>
-              <a:rPr lang="de-DE" sz="1100" dirty="0"/>
-              <a:t>           dataset,</a:t>
-            </a:r>
-          </a:p>
-          <a:p>
-            <a:r>
-              <a:rPr lang="de-DE" sz="1100" dirty="0"/>
-              <a:t>           method,</a:t>
-            </a:r>
-          </a:p>
-          <a:p>
-            <a:r>
-              <a:rPr lang="de-DE" sz="1100" dirty="0"/>
-              <a:t>           outcome_colname = NULL, (standardized the first column)</a:t>
-            </a:r>
-          </a:p>
-          <a:p>
-            <a:r>
-              <a:rPr lang="de-DE" sz="1100" dirty="0"/>
-              <a:t>           hyperparameters = NULL,</a:t>
-            </a:r>
-          </a:p>
-          <a:p>
-            <a:r>
-              <a:rPr lang="de-DE" sz="1100" dirty="0"/>
-              <a:t>           find_feature_importance = FALSE, (`TRUE` is recommended if you would like to identify features important for predicting your                                                outcome, but it is resource-intensive.</a:t>
-            </a:r>
-          </a:p>
-          <a:p>
-            <a:r>
-              <a:rPr lang="de-DE" sz="1100" dirty="0"/>
-              <a:t>           calculate_performance = TRUE,</a:t>
-            </a:r>
-          </a:p>
-          <a:p>
-            <a:r>
-              <a:rPr lang="de-DE" sz="1100" dirty="0"/>
-              <a:t>           kfold = 5, (standard at 5)</a:t>
-            </a:r>
-          </a:p>
-          <a:p>
-            <a:r>
-              <a:rPr lang="de-DE" sz="1100" dirty="0"/>
-              <a:t>           cv_times = 100, (standard at 100)</a:t>
-            </a:r>
-          </a:p>
-          <a:p>
-            <a:r>
-              <a:rPr lang="de-DE" sz="1100" dirty="0"/>
-              <a:t>           cross_val = NULL, (cross_val a custom cross-validation scheme from `caret::trainControl()` (default: `NULL`, uses `kfold` cross                              validation repeated `cv_times`). `kfold` and `cv_times` are ignored if the user provides a custom                                          cross-validation scheme.)</a:t>
-            </a:r>
-          </a:p>
-          <a:p>
-            <a:r>
-              <a:rPr lang="de-DE" sz="1100" dirty="0"/>
-              <a:t>           training_frac = 0.8, (standard at 0.8)</a:t>
-            </a:r>
-          </a:p>
-          <a:p>
-            <a:r>
-              <a:rPr lang="de-DE" sz="1100" dirty="0"/>
-              <a:t>           perf_metric_function = NULL,</a:t>
-            </a:r>
-          </a:p>
-          <a:p>
-            <a:r>
-              <a:rPr lang="de-DE" sz="1100" dirty="0"/>
-              <a:t>           perf_metric_name = NULL,</a:t>
-            </a:r>
-          </a:p>
-          <a:p>
-            <a:r>
-              <a:rPr lang="de-DE" sz="1100" dirty="0"/>
-              <a:t>           groups = NULL,</a:t>
-            </a:r>
-          </a:p>
-          <a:p>
-            <a:r>
-              <a:rPr lang="de-DE" sz="1100" dirty="0"/>
-              <a:t>           group_partitions = NULL,</a:t>
-            </a:r>
-          </a:p>
-          <a:p>
-            <a:r>
-              <a:rPr lang="de-DE" sz="1100" dirty="0"/>
-              <a:t>           corr_thresh = 1,</a:t>
-            </a:r>
-          </a:p>
-          <a:p>
-            <a:r>
-              <a:rPr lang="de-DE" sz="1100" dirty="0"/>
-              <a:t>           ntree = 1000, (For random forest, how many trees to use (default: `1000`). Caret doesn't allow this hyperparameter to be tuned)</a:t>
-            </a:r>
-          </a:p>
-          <a:p>
-            <a:r>
-              <a:rPr lang="de-DE" sz="1100" dirty="0"/>
-              <a:t>           seed = NA (set seed for reproducibility)</a:t>
-            </a:r>
-          </a:p>
-        </p:txBody>
-      </p:sp>
+            <a:pPr marL="0" marR="0">
+              <a:lnSpc>
+                <a:spcPct val="115000"/>
+              </a:lnSpc>
+              <a:spcBef>
+                <a:spcPts val="0"/>
+              </a:spcBef>
+              <a:spcAft>
+                <a:spcPts val="0"/>
+              </a:spcAft>
+            </a:pPr>
+            <a:r>
+              <a:rPr lang="en-US" sz="1100" dirty="0">
+                <a:effectLst/>
+                <a:latin typeface="CMR10"/>
+                <a:ea typeface="Times New Roman" panose="02020603050405020304" pitchFamily="18" charset="0"/>
+                <a:cs typeface="CMR10"/>
+              </a:rPr>
+              <a:t>Comparing the last equation with (15), we see that we would</a:t>
+            </a:r>
+            <a:endParaRPr lang="de-DE" sz="1100" dirty="0">
+              <a:effectLst/>
+              <a:latin typeface="Arial" panose="020B0604020202020204" pitchFamily="34" charset="0"/>
+              <a:ea typeface="Times New Roman" panose="02020603050405020304" pitchFamily="18" charset="0"/>
+              <a:cs typeface="Times New Roman" panose="02020603050405020304" pitchFamily="18" charset="0"/>
+            </a:endParaRPr>
+          </a:p>
+          <a:p>
+            <a:pPr marL="0" marR="0">
+              <a:lnSpc>
+                <a:spcPct val="115000"/>
+              </a:lnSpc>
+              <a:spcBef>
+                <a:spcPts val="0"/>
+              </a:spcBef>
+              <a:spcAft>
+                <a:spcPts val="0"/>
+              </a:spcAft>
+            </a:pPr>
+            <a:r>
+              <a:rPr lang="en-US" sz="1100" dirty="0">
+                <a:effectLst/>
+                <a:latin typeface="CMR10"/>
+                <a:ea typeface="Times New Roman" panose="02020603050405020304" pitchFamily="18" charset="0"/>
+                <a:cs typeface="CMR10"/>
+              </a:rPr>
+              <a:t>get exactly the same expression using the </a:t>
+            </a:r>
+            <a:r>
+              <a:rPr lang="en-US" sz="1100" dirty="0" err="1">
+                <a:effectLst/>
+                <a:latin typeface="CMR10"/>
+                <a:ea typeface="Times New Roman" panose="02020603050405020304" pitchFamily="18" charset="0"/>
+                <a:cs typeface="CMR10"/>
+              </a:rPr>
+              <a:t>modi_ed</a:t>
+            </a:r>
+            <a:r>
+              <a:rPr lang="en-US" sz="1100" dirty="0">
+                <a:effectLst/>
+                <a:latin typeface="CMR10"/>
+                <a:ea typeface="Times New Roman" panose="02020603050405020304" pitchFamily="18" charset="0"/>
+                <a:cs typeface="CMR10"/>
+              </a:rPr>
+              <a:t> </a:t>
+            </a:r>
+            <a:r>
+              <a:rPr lang="en-US" sz="1100" dirty="0" err="1">
+                <a:effectLst/>
+                <a:latin typeface="CMR10"/>
+                <a:ea typeface="Times New Roman" panose="02020603050405020304" pitchFamily="18" charset="0"/>
+                <a:cs typeface="CMR10"/>
+              </a:rPr>
+              <a:t>DeSeq</a:t>
+            </a:r>
+            <a:r>
+              <a:rPr lang="en-US" sz="1100" dirty="0">
+                <a:effectLst/>
+                <a:latin typeface="CMR10"/>
+                <a:ea typeface="Times New Roman" panose="02020603050405020304" pitchFamily="18" charset="0"/>
+                <a:cs typeface="CMR10"/>
+              </a:rPr>
+              <a:t> normalization. The</a:t>
+            </a:r>
+            <a:endParaRPr lang="de-DE" sz="1100" dirty="0">
+              <a:effectLst/>
+              <a:latin typeface="Arial" panose="020B0604020202020204" pitchFamily="34" charset="0"/>
+              <a:ea typeface="Times New Roman" panose="02020603050405020304" pitchFamily="18" charset="0"/>
+              <a:cs typeface="Times New Roman" panose="02020603050405020304" pitchFamily="18" charset="0"/>
+            </a:endParaRPr>
+          </a:p>
+          <a:p>
+            <a:pPr marL="0" marR="0">
+              <a:lnSpc>
+                <a:spcPct val="115000"/>
+              </a:lnSpc>
+              <a:spcBef>
+                <a:spcPts val="0"/>
+              </a:spcBef>
+              <a:spcAft>
+                <a:spcPts val="0"/>
+              </a:spcAft>
+            </a:pPr>
+            <a:r>
+              <a:rPr lang="en-US" sz="1100" dirty="0">
+                <a:effectLst/>
+                <a:latin typeface="CMR10"/>
+                <a:ea typeface="Times New Roman" panose="02020603050405020304" pitchFamily="18" charset="0"/>
+                <a:cs typeface="CMR10"/>
+              </a:rPr>
+              <a:t>median, trimmed mean and geometric mean lead thus to quite similar </a:t>
+            </a:r>
+            <a:r>
+              <a:rPr lang="en-US" sz="1100" dirty="0" err="1">
+                <a:effectLst/>
+                <a:latin typeface="CMR10"/>
+                <a:ea typeface="Times New Roman" panose="02020603050405020304" pitchFamily="18" charset="0"/>
+                <a:cs typeface="CMR10"/>
+              </a:rPr>
+              <a:t>proce</a:t>
+            </a:r>
+            <a:r>
+              <a:rPr lang="en-US" sz="1100" dirty="0">
+                <a:effectLst/>
+                <a:latin typeface="CMR10"/>
+                <a:ea typeface="Times New Roman" panose="02020603050405020304" pitchFamily="18" charset="0"/>
+                <a:cs typeface="CMR10"/>
+              </a:rPr>
+              <a:t>-</a:t>
+            </a:r>
+            <a:endParaRPr lang="de-DE" sz="1100" dirty="0">
+              <a:effectLst/>
+              <a:latin typeface="Arial" panose="020B0604020202020204" pitchFamily="34" charset="0"/>
+              <a:ea typeface="Times New Roman" panose="02020603050405020304" pitchFamily="18" charset="0"/>
+              <a:cs typeface="Times New Roman" panose="02020603050405020304" pitchFamily="18" charset="0"/>
+            </a:endParaRPr>
+          </a:p>
+          <a:p>
+            <a:pPr marL="0" marR="0">
+              <a:lnSpc>
+                <a:spcPct val="115000"/>
+              </a:lnSpc>
+              <a:spcBef>
+                <a:spcPts val="0"/>
+              </a:spcBef>
+              <a:spcAft>
+                <a:spcPts val="0"/>
+              </a:spcAft>
+            </a:pPr>
+            <a:r>
+              <a:rPr lang="en-US" sz="1100" dirty="0" err="1">
+                <a:effectLst/>
+                <a:latin typeface="CMR10"/>
+                <a:ea typeface="Times New Roman" panose="02020603050405020304" pitchFamily="18" charset="0"/>
+                <a:cs typeface="CMR10"/>
+              </a:rPr>
+              <a:t>dures</a:t>
+            </a:r>
+            <a:r>
+              <a:rPr lang="en-US" sz="1100" dirty="0">
+                <a:effectLst/>
+                <a:latin typeface="CMR10"/>
+                <a:ea typeface="Times New Roman" panose="02020603050405020304" pitchFamily="18" charset="0"/>
+                <a:cs typeface="CMR10"/>
+              </a:rPr>
+              <a:t>, making it clear that the clr transformation can be used as a normalization.</a:t>
+            </a:r>
+            <a:endParaRPr lang="de-DE" sz="1100" dirty="0">
+              <a:effectLst/>
+              <a:latin typeface="Arial" panose="020B0604020202020204" pitchFamily="34" charset="0"/>
+              <a:ea typeface="Times New Roman" panose="02020603050405020304" pitchFamily="18" charset="0"/>
+              <a:cs typeface="Times New Roman" panose="02020603050405020304" pitchFamily="18" charset="0"/>
+            </a:endParaRPr>
+          </a:p>
+          <a:p>
+            <a:pPr marL="0" marR="0">
+              <a:lnSpc>
+                <a:spcPct val="115000"/>
+              </a:lnSpc>
+              <a:spcBef>
+                <a:spcPts val="0"/>
+              </a:spcBef>
+              <a:spcAft>
+                <a:spcPts val="0"/>
+              </a:spcAft>
+            </a:pPr>
+            <a:r>
+              <a:rPr lang="en-US" sz="1100" dirty="0">
+                <a:effectLst/>
+                <a:latin typeface="CMR10"/>
+                <a:ea typeface="Times New Roman" panose="02020603050405020304" pitchFamily="18" charset="0"/>
+                <a:cs typeface="CMR10"/>
+              </a:rPr>
+              <a:t>The </a:t>
+            </a:r>
+            <a:r>
+              <a:rPr lang="en-US" sz="1100" dirty="0" err="1">
+                <a:effectLst/>
+                <a:latin typeface="CMR10"/>
+                <a:ea typeface="Times New Roman" panose="02020603050405020304" pitchFamily="18" charset="0"/>
+                <a:cs typeface="CMR10"/>
+              </a:rPr>
+              <a:t>iqlr</a:t>
+            </a:r>
+            <a:r>
+              <a:rPr lang="en-US" sz="1100" dirty="0">
+                <a:effectLst/>
+                <a:latin typeface="CMR10"/>
+                <a:ea typeface="Times New Roman" panose="02020603050405020304" pitchFamily="18" charset="0"/>
+                <a:cs typeface="CMR10"/>
+              </a:rPr>
+              <a:t> transformation [3] as used in ALDEx2 would be even more in spirit</a:t>
+            </a:r>
+            <a:endParaRPr lang="de-DE" sz="1100" dirty="0">
+              <a:effectLst/>
+              <a:latin typeface="Arial" panose="020B0604020202020204" pitchFamily="34" charset="0"/>
+              <a:ea typeface="Times New Roman" panose="02020603050405020304" pitchFamily="18" charset="0"/>
+              <a:cs typeface="Times New Roman" panose="02020603050405020304" pitchFamily="18" charset="0"/>
+            </a:endParaRPr>
+          </a:p>
+          <a:p>
+            <a:pPr marL="0" marR="0">
+              <a:lnSpc>
+                <a:spcPct val="115000"/>
+              </a:lnSpc>
+              <a:spcBef>
+                <a:spcPts val="0"/>
+              </a:spcBef>
+              <a:spcAft>
+                <a:spcPts val="0"/>
+              </a:spcAft>
+            </a:pPr>
+            <a:r>
+              <a:rPr lang="en-US" sz="1100" dirty="0">
+                <a:effectLst/>
+                <a:latin typeface="CMR10"/>
+                <a:ea typeface="Times New Roman" panose="02020603050405020304" pitchFamily="18" charset="0"/>
+                <a:cs typeface="CMR10"/>
+              </a:rPr>
+              <a:t>of the trimmed mean used in </a:t>
+            </a:r>
+            <a:r>
+              <a:rPr lang="en-US" sz="1100" dirty="0" err="1">
+                <a:effectLst/>
+                <a:latin typeface="CMR10"/>
+                <a:ea typeface="Times New Roman" panose="02020603050405020304" pitchFamily="18" charset="0"/>
+                <a:cs typeface="CMR10"/>
+              </a:rPr>
+              <a:t>edgeR</a:t>
+            </a:r>
+            <a:r>
+              <a:rPr lang="en-US" sz="1100" dirty="0">
+                <a:effectLst/>
+                <a:latin typeface="CMR10"/>
+                <a:ea typeface="Times New Roman" panose="02020603050405020304" pitchFamily="18" charset="0"/>
+                <a:cs typeface="CMR10"/>
+              </a:rPr>
+              <a:t>. For a comparison of </a:t>
+            </a:r>
+            <a:r>
+              <a:rPr lang="en-US" sz="1100" dirty="0" err="1">
+                <a:effectLst/>
+                <a:latin typeface="CMR10"/>
+                <a:ea typeface="Times New Roman" panose="02020603050405020304" pitchFamily="18" charset="0"/>
+                <a:cs typeface="CMR10"/>
+              </a:rPr>
+              <a:t>e_ective</a:t>
+            </a:r>
+            <a:r>
+              <a:rPr lang="en-US" sz="1100" dirty="0">
+                <a:effectLst/>
+                <a:latin typeface="CMR10"/>
+                <a:ea typeface="Times New Roman" panose="02020603050405020304" pitchFamily="18" charset="0"/>
+                <a:cs typeface="CMR10"/>
+              </a:rPr>
+              <a:t> library size</a:t>
+            </a:r>
+            <a:endParaRPr lang="de-DE" sz="1100" dirty="0">
+              <a:effectLst/>
+              <a:latin typeface="Arial" panose="020B0604020202020204" pitchFamily="34" charset="0"/>
+              <a:ea typeface="Times New Roman" panose="02020603050405020304" pitchFamily="18" charset="0"/>
+              <a:cs typeface="Times New Roman" panose="02020603050405020304" pitchFamily="18" charset="0"/>
+            </a:endParaRPr>
+          </a:p>
+          <a:p>
+            <a:pPr marL="0" marR="0">
+              <a:lnSpc>
+                <a:spcPct val="115000"/>
+              </a:lnSpc>
+              <a:spcBef>
+                <a:spcPts val="0"/>
+              </a:spcBef>
+              <a:spcAft>
+                <a:spcPts val="0"/>
+              </a:spcAft>
+            </a:pPr>
+            <a:r>
+              <a:rPr lang="en-US" sz="1100" dirty="0">
+                <a:effectLst/>
+                <a:latin typeface="CMR10"/>
+                <a:ea typeface="Times New Roman" panose="02020603050405020304" pitchFamily="18" charset="0"/>
+                <a:cs typeface="CMR10"/>
+              </a:rPr>
+              <a:t>normalization methods, see [4]. It should be emphasized, however, that the</a:t>
+            </a:r>
+            <a:endParaRPr lang="de-DE" sz="1100" dirty="0">
+              <a:effectLst/>
+              <a:latin typeface="Arial" panose="020B0604020202020204" pitchFamily="34" charset="0"/>
+              <a:ea typeface="Times New Roman" panose="02020603050405020304" pitchFamily="18" charset="0"/>
+              <a:cs typeface="Times New Roman" panose="02020603050405020304" pitchFamily="18" charset="0"/>
+            </a:endParaRPr>
+          </a:p>
+          <a:p>
+            <a:pPr marL="0" marR="0">
+              <a:lnSpc>
+                <a:spcPct val="115000"/>
+              </a:lnSpc>
+              <a:spcBef>
+                <a:spcPts val="0"/>
+              </a:spcBef>
+              <a:spcAft>
+                <a:spcPts val="0"/>
+              </a:spcAft>
+            </a:pPr>
+            <a:r>
+              <a:rPr lang="en-US" sz="1100" dirty="0">
+                <a:effectLst/>
+                <a:latin typeface="CMR10"/>
+                <a:ea typeface="Times New Roman" panose="02020603050405020304" pitchFamily="18" charset="0"/>
+                <a:cs typeface="CMR10"/>
+              </a:rPr>
+              <a:t>focus in </a:t>
+            </a:r>
+            <a:r>
+              <a:rPr lang="en-US" sz="1100" dirty="0" err="1">
+                <a:effectLst/>
+                <a:latin typeface="CMR10"/>
+                <a:ea typeface="Times New Roman" panose="02020603050405020304" pitchFamily="18" charset="0"/>
+                <a:cs typeface="CMR10"/>
+              </a:rPr>
+              <a:t>CoDA</a:t>
+            </a:r>
+            <a:r>
+              <a:rPr lang="en-US" sz="1100" dirty="0">
+                <a:effectLst/>
+                <a:latin typeface="CMR10"/>
+                <a:ea typeface="Times New Roman" panose="02020603050405020304" pitchFamily="18" charset="0"/>
+                <a:cs typeface="CMR10"/>
+              </a:rPr>
+              <a:t> is not on scaling parts to become common-scale quantities that</a:t>
+            </a:r>
+            <a:endParaRPr lang="de-DE" sz="1100" dirty="0">
+              <a:effectLst/>
+              <a:latin typeface="Arial" panose="020B0604020202020204" pitchFamily="34" charset="0"/>
+              <a:ea typeface="Times New Roman" panose="02020603050405020304" pitchFamily="18" charset="0"/>
+              <a:cs typeface="Times New Roman" panose="02020603050405020304" pitchFamily="18" charset="0"/>
+            </a:endParaRPr>
+          </a:p>
+          <a:p>
+            <a:pPr marL="0" marR="0">
+              <a:lnSpc>
+                <a:spcPct val="115000"/>
+              </a:lnSpc>
+              <a:spcBef>
+                <a:spcPts val="0"/>
+              </a:spcBef>
+              <a:spcAft>
+                <a:spcPts val="0"/>
+              </a:spcAft>
+            </a:pPr>
+            <a:r>
+              <a:rPr lang="en-US" sz="1100" dirty="0">
+                <a:effectLst/>
+                <a:latin typeface="CMR10"/>
+                <a:ea typeface="Times New Roman" panose="02020603050405020304" pitchFamily="18" charset="0"/>
+                <a:cs typeface="CMR10"/>
+              </a:rPr>
+              <a:t>are comparable on absolute terms. Rather, when the within-sample ratios are</a:t>
+            </a:r>
+            <a:endParaRPr lang="de-DE" sz="1100" dirty="0">
+              <a:effectLst/>
+              <a:latin typeface="Arial" panose="020B0604020202020204" pitchFamily="34" charset="0"/>
+              <a:ea typeface="Times New Roman" panose="02020603050405020304" pitchFamily="18" charset="0"/>
+              <a:cs typeface="Times New Roman" panose="02020603050405020304" pitchFamily="18" charset="0"/>
+            </a:endParaRPr>
+          </a:p>
+          <a:p>
+            <a:pPr marL="0" marR="0">
+              <a:lnSpc>
+                <a:spcPct val="115000"/>
+              </a:lnSpc>
+              <a:spcBef>
+                <a:spcPts val="0"/>
+              </a:spcBef>
+              <a:spcAft>
+                <a:spcPts val="0"/>
+              </a:spcAft>
+            </a:pPr>
+            <a:r>
+              <a:rPr lang="en-US" sz="1100" dirty="0">
+                <a:effectLst/>
+                <a:latin typeface="CMR10"/>
+                <a:ea typeface="Times New Roman" panose="02020603050405020304" pitchFamily="18" charset="0"/>
+                <a:cs typeface="CMR10"/>
+              </a:rPr>
+              <a:t>compared between samples, the denominators in them have to be taken for what</a:t>
+            </a:r>
+            <a:endParaRPr lang="de-DE" sz="1100" dirty="0">
+              <a:effectLst/>
+              <a:latin typeface="Arial" panose="020B0604020202020204" pitchFamily="34" charset="0"/>
+              <a:ea typeface="Times New Roman" panose="02020603050405020304" pitchFamily="18" charset="0"/>
+              <a:cs typeface="Times New Roman" panose="02020603050405020304" pitchFamily="18" charset="0"/>
+            </a:endParaRPr>
+          </a:p>
+          <a:p>
+            <a:pPr marL="0" marR="0" algn="just">
+              <a:lnSpc>
+                <a:spcPct val="150000"/>
+              </a:lnSpc>
+              <a:spcBef>
+                <a:spcPts val="500"/>
+              </a:spcBef>
+              <a:spcAft>
+                <a:spcPts val="1000"/>
+              </a:spcAft>
+            </a:pPr>
+            <a:r>
+              <a:rPr lang="en-US" sz="1100" dirty="0">
+                <a:effectLst/>
+                <a:latin typeface="CMR10"/>
+                <a:ea typeface="Times New Roman" panose="02020603050405020304" pitchFamily="18" charset="0"/>
+                <a:cs typeface="CMR10"/>
+              </a:rPr>
+              <a:t>they are when interpreting results. (supplementary, 2018)</a:t>
+            </a:r>
+            <a:endParaRPr lang="de-DE" sz="1100" dirty="0">
+              <a:effectLst/>
+              <a:latin typeface="Arial" panose="020B0604020202020204" pitchFamily="34" charset="0"/>
+              <a:ea typeface="Times New Roman" panose="02020603050405020304" pitchFamily="18" charset="0"/>
+              <a:cs typeface="Times New Roman" panose="02020603050405020304" pitchFamily="18" charset="0"/>
+            </a:endParaRPr>
+          </a:p>
+        </p:txBody>
+      </p:sp>
+      <p:pic>
+        <p:nvPicPr>
+          <p:cNvPr id="11" name="Picture 10">
+            <a:extLst>
+              <a:ext uri="{FF2B5EF4-FFF2-40B4-BE49-F238E27FC236}">
+                <a16:creationId xmlns:a16="http://schemas.microsoft.com/office/drawing/2014/main" id="{205EF749-2DBE-82D5-4D64-A17FA53BAAB3}"/>
+              </a:ext>
+            </a:extLst>
+          </p:cNvPr>
+          <p:cNvPicPr>
+            <a:picLocks noChangeAspect="1"/>
+          </p:cNvPicPr>
+          <p:nvPr/>
+        </p:nvPicPr>
+        <p:blipFill>
+          <a:blip r:embed="rId4"/>
+          <a:stretch>
+            <a:fillRect/>
+          </a:stretch>
+        </p:blipFill>
+        <p:spPr>
+          <a:xfrm>
+            <a:off x="6982816" y="1222135"/>
+            <a:ext cx="4677372" cy="2509215"/>
+          </a:xfrm>
+          <a:prstGeom prst="rect">
+            <a:avLst/>
+          </a:prstGeom>
+        </p:spPr>
+      </p:pic>
     </p:spTree>
     <p:extLst>
       <p:ext uri="{BB962C8B-B14F-4D97-AF65-F5344CB8AC3E}">
-        <p14:creationId xmlns:p14="http://schemas.microsoft.com/office/powerpoint/2010/main" val="3541464901"/>
+        <p14:creationId xmlns:p14="http://schemas.microsoft.com/office/powerpoint/2010/main" val="1693991023"/>
       </p:ext>
     </p:extLst>
   </p:cSld>
@@ -39594,7 +40271,7 @@
           <p:cNvPr id="2" name="Title 1">
             <a:extLst>
               <a:ext uri="{FF2B5EF4-FFF2-40B4-BE49-F238E27FC236}">
-                <a16:creationId xmlns:a16="http://schemas.microsoft.com/office/drawing/2014/main" id="{169D9D37-B637-4D74-BB75-639D51A491FB}"/>
+                <a16:creationId xmlns:a16="http://schemas.microsoft.com/office/drawing/2014/main" id="{6806FBA4-537C-4226-9D3A-758C7B787D79}"/>
               </a:ext>
             </a:extLst>
           </p:cNvPr>
@@ -39605,19 +40282,14 @@
             <p:ph type="title"/>
           </p:nvPr>
         </p:nvSpPr>
-        <p:spPr>
-          <a:xfrm>
-            <a:off x="1640156" y="628124"/>
-            <a:ext cx="8911687" cy="1280890"/>
-          </a:xfrm>
-        </p:spPr>
+        <p:spPr/>
         <p:txBody>
           <a:bodyPr/>
           <a:lstStyle/>
           <a:p>
             <a:r>
               <a:rPr lang="de-DE" b="1" dirty="0"/>
-              <a:t>Data set</a:t>
+              <a:t>Hierarchy dimensionality reduction</a:t>
             </a:r>
             <a:endParaRPr lang="en-US" b="1" dirty="0"/>
           </a:p>
@@ -39625,10 +40297,10 @@
       </p:sp>
       <p:sp>
         <p:nvSpPr>
-          <p:cNvPr id="3" name="Content Placeholder 2">
-            <a:extLst>
-              <a:ext uri="{FF2B5EF4-FFF2-40B4-BE49-F238E27FC236}">
-                <a16:creationId xmlns:a16="http://schemas.microsoft.com/office/drawing/2014/main" id="{D4D56813-9DF8-4D28-B156-1DE48E95DBC2}"/>
+          <p:cNvPr id="5" name="Footer Placeholder 4">
+            <a:extLst>
+              <a:ext uri="{FF2B5EF4-FFF2-40B4-BE49-F238E27FC236}">
+                <a16:creationId xmlns:a16="http://schemas.microsoft.com/office/drawing/2014/main" id="{707C4F70-832A-416B-9491-EE86347B2812}"/>
               </a:ext>
             </a:extLst>
           </p:cNvPr>
@@ -39636,103 +40308,6 @@
             <a:spLocks noGrp="1"/>
           </p:cNvSpPr>
           <p:nvPr>
-            <p:ph idx="1"/>
-          </p:nvPr>
-        </p:nvSpPr>
-        <p:spPr>
-          <a:xfrm>
-            <a:off x="2592495" y="1317171"/>
-            <a:ext cx="8915400" cy="4369465"/>
-          </a:xfrm>
-        </p:spPr>
-        <p:txBody>
-          <a:bodyPr>
-            <a:normAutofit/>
-          </a:bodyPr>
-          <a:lstStyle/>
-          <a:p>
-            <a:r>
-              <a:rPr lang="de-DE" dirty="0"/>
-              <a:t>Compare what Thomas P. Quinn uses (13 datasets) and take out from estonian biobank</a:t>
-            </a:r>
-          </a:p>
-          <a:p>
-            <a:r>
-              <a:rPr lang="de-DE" dirty="0"/>
-              <a:t> prediction/classification tasks</a:t>
-            </a:r>
-          </a:p>
-          <a:p>
-            <a:r>
-              <a:rPr lang="de-DE" dirty="0"/>
-              <a:t>One with continuous and one with discrete variables</a:t>
-            </a:r>
-          </a:p>
-          <a:p>
-            <a:r>
-              <a:rPr lang="de-DE" dirty="0"/>
-              <a:t>one with high correlation and one with low to microbiomes</a:t>
-            </a:r>
-          </a:p>
-          <a:p>
-            <a:r>
-              <a:rPr lang="de-DE" dirty="0"/>
-              <a:t>one small and one large data set</a:t>
-            </a:r>
-          </a:p>
-          <a:p>
-            <a:r>
-              <a:rPr lang="de-DE" dirty="0"/>
-              <a:t>EstMB, colorectal cancer, PCOS</a:t>
-            </a:r>
-          </a:p>
-          <a:p>
-            <a:endParaRPr lang="de-DE" dirty="0"/>
-          </a:p>
-        </p:txBody>
-      </p:sp>
-      <p:sp>
-        <p:nvSpPr>
-          <p:cNvPr id="4" name="Date Placeholder 3">
-            <a:extLst>
-              <a:ext uri="{FF2B5EF4-FFF2-40B4-BE49-F238E27FC236}">
-                <a16:creationId xmlns:a16="http://schemas.microsoft.com/office/drawing/2014/main" id="{D53DB4F4-84EC-4588-88E6-8D8519D6A1E8}"/>
-              </a:ext>
-            </a:extLst>
-          </p:cNvPr>
-          <p:cNvSpPr>
-            <a:spLocks noGrp="1"/>
-          </p:cNvSpPr>
-          <p:nvPr>
-            <p:ph type="dt" sz="half" idx="10"/>
-          </p:nvPr>
-        </p:nvSpPr>
-        <p:spPr/>
-        <p:txBody>
-          <a:bodyPr/>
-          <a:lstStyle/>
-          <a:p>
-            <a:fld id="{5A2DBB50-F561-45B0-9BE5-95A455D2CD8B}" type="datetime1">
-              <a:rPr lang="en-US" smtClean="0"/>
-              <a:t>5/13/2022</a:t>
-            </a:fld>
-            <a:endParaRPr lang="en-US" dirty="0"/>
-          </a:p>
-        </p:txBody>
-      </p:sp>
-      <p:sp>
-        <p:nvSpPr>
-          <p:cNvPr id="5" name="Footer Placeholder 4">
-            <a:extLst>
-              <a:ext uri="{FF2B5EF4-FFF2-40B4-BE49-F238E27FC236}">
-                <a16:creationId xmlns:a16="http://schemas.microsoft.com/office/drawing/2014/main" id="{A7F3346A-3F24-484B-A6D3-55D66520C917}"/>
-              </a:ext>
-            </a:extLst>
-          </p:cNvPr>
-          <p:cNvSpPr>
-            <a:spLocks noGrp="1"/>
-          </p:cNvSpPr>
-          <p:nvPr>
             <p:ph type="ftr" sz="quarter" idx="11"/>
           </p:nvPr>
         </p:nvSpPr>
@@ -39754,7 +40329,7 @@
           <p:cNvPr id="6" name="Slide Number Placeholder 5">
             <a:extLst>
               <a:ext uri="{FF2B5EF4-FFF2-40B4-BE49-F238E27FC236}">
-                <a16:creationId xmlns:a16="http://schemas.microsoft.com/office/drawing/2014/main" id="{C4B3B4A6-E708-4F88-8CA2-BDE8FCF0C0AC}"/>
+                <a16:creationId xmlns:a16="http://schemas.microsoft.com/office/drawing/2014/main" id="{1028CB34-29B5-49CB-99E4-E945C3D78896}"/>
               </a:ext>
             </a:extLst>
           </p:cNvPr>
@@ -39781,10 +40356,10 @@
       </p:sp>
       <p:sp>
         <p:nvSpPr>
-          <p:cNvPr id="8" name="TextBox 7">
-            <a:extLst>
-              <a:ext uri="{FF2B5EF4-FFF2-40B4-BE49-F238E27FC236}">
-                <a16:creationId xmlns:a16="http://schemas.microsoft.com/office/drawing/2014/main" id="{6A373959-7937-4239-AAA7-0B90CAF1A620}"/>
+          <p:cNvPr id="26" name="TextBox 25">
+            <a:extLst>
+              <a:ext uri="{FF2B5EF4-FFF2-40B4-BE49-F238E27FC236}">
+                <a16:creationId xmlns:a16="http://schemas.microsoft.com/office/drawing/2014/main" id="{CC7BEBFF-3D20-441C-B1B2-0CE34904FDE4}"/>
               </a:ext>
             </a:extLst>
           </p:cNvPr>
@@ -39793,8 +40368,8 @@
         </p:nvSpPr>
         <p:spPr>
           <a:xfrm>
-            <a:off x="2260283" y="4487322"/>
-            <a:ext cx="6097904" cy="923330"/>
+            <a:off x="1698819" y="1152907"/>
+            <a:ext cx="3654858" cy="400110"/>
           </a:xfrm>
           <a:prstGeom prst="rect">
             <a:avLst/>
@@ -39802,28 +40377,94 @@
           <a:noFill/>
         </p:spPr>
         <p:txBody>
-          <a:bodyPr wrap="square">
+          <a:bodyPr wrap="square" rtlCol="0">
             <a:spAutoFit/>
           </a:bodyPr>
           <a:lstStyle/>
           <a:p>
             <a:r>
-              <a:rPr lang="de-DE" b="1" dirty="0"/>
-              <a:t>CRC data set preparation and models:</a:t>
-            </a:r>
-          </a:p>
-          <a:p>
+              <a:rPr lang="de-DE" sz="2000" i="1" dirty="0"/>
+              <a:t>Problems and Notes</a:t>
+            </a:r>
+          </a:p>
+        </p:txBody>
+      </p:sp>
+      <p:sp>
+        <p:nvSpPr>
+          <p:cNvPr id="7" name="TextBox 6">
+            <a:extLst>
+              <a:ext uri="{FF2B5EF4-FFF2-40B4-BE49-F238E27FC236}">
+                <a16:creationId xmlns:a16="http://schemas.microsoft.com/office/drawing/2014/main" id="{B43BF96F-7A11-4087-9B01-CF6AACD20E04}"/>
+              </a:ext>
+            </a:extLst>
+          </p:cNvPr>
+          <p:cNvSpPr txBox="1"/>
+          <p:nvPr/>
+        </p:nvSpPr>
+        <p:spPr>
+          <a:xfrm>
+            <a:off x="2589212" y="1742696"/>
+            <a:ext cx="7102549" cy="1754326"/>
+          </a:xfrm>
+          <a:prstGeom prst="rect">
+            <a:avLst/>
+          </a:prstGeom>
+          <a:noFill/>
+        </p:spPr>
+        <p:txBody>
+          <a:bodyPr wrap="square" rtlCol="0">
+            <a:spAutoFit/>
+          </a:bodyPr>
+          <a:lstStyle/>
+          <a:p>
+            <a:r>
+              <a:rPr lang="de-DE" u="sng" dirty="0"/>
+              <a:t>PCA</a:t>
+            </a:r>
             <a:r>
               <a:rPr lang="de-DE" dirty="0"/>
-              <a:t>https://github.com/zellerlab/crc_meta/blob/master/src/prepare_data.R</a:t>
-            </a:r>
+              <a:t>:</a:t>
+            </a:r>
+          </a:p>
+          <a:p>
+            <a:pPr marL="285750" indent="-285750">
+              <a:buFontTx/>
+              <a:buChar char="-"/>
+            </a:pPr>
+            <a:r>
+              <a:rPr lang="de-DE" dirty="0"/>
+              <a:t>Microbiome Preprocessing Machine Learning Pipeline (2021)</a:t>
+            </a:r>
+          </a:p>
+          <a:p>
+            <a:pPr marL="285750" indent="-285750">
+              <a:buFontTx/>
+              <a:buChar char="-"/>
+            </a:pPr>
+            <a:r>
+              <a:rPr lang="de-DE" dirty="0"/>
+              <a:t>Proposes to use PCA as hierarchy reduction </a:t>
+            </a:r>
+          </a:p>
+          <a:p>
+            <a:pPr marL="285750" indent="-285750">
+              <a:buFontTx/>
+              <a:buChar char="-"/>
+            </a:pPr>
+            <a:r>
+              <a:rPr lang="de-DE" dirty="0"/>
+              <a:t>Families can be clustered and genus is not necessary</a:t>
+            </a:r>
+          </a:p>
+          <a:p>
+            <a:endParaRPr lang="de-DE" dirty="0"/>
           </a:p>
         </p:txBody>
       </p:sp>
     </p:spTree>
     <p:extLst>
       <p:ext uri="{BB962C8B-B14F-4D97-AF65-F5344CB8AC3E}">
-        <p14:creationId xmlns:p14="http://schemas.microsoft.com/office/powerpoint/2010/main" val="4097922265"/>
+        <p14:creationId xmlns:p14="http://schemas.microsoft.com/office/powerpoint/2010/main" val="2182919606"/>
       </p:ext>
     </p:extLst>
   </p:cSld>
@@ -39855,6 +40496,543 @@
           <p:cNvPr id="2" name="Title 1">
             <a:extLst>
               <a:ext uri="{FF2B5EF4-FFF2-40B4-BE49-F238E27FC236}">
+                <a16:creationId xmlns:a16="http://schemas.microsoft.com/office/drawing/2014/main" id="{6806FBA4-537C-4226-9D3A-758C7B787D79}"/>
+              </a:ext>
+            </a:extLst>
+          </p:cNvPr>
+          <p:cNvSpPr>
+            <a:spLocks noGrp="1"/>
+          </p:cNvSpPr>
+          <p:nvPr>
+            <p:ph type="title"/>
+          </p:nvPr>
+        </p:nvSpPr>
+        <p:spPr/>
+        <p:txBody>
+          <a:bodyPr>
+            <a:normAutofit/>
+          </a:bodyPr>
+          <a:lstStyle/>
+          <a:p>
+            <a:r>
+              <a:rPr lang="de-DE" sz="3200" b="1" dirty="0"/>
+              <a:t>mikropml</a:t>
+            </a:r>
+            <a:endParaRPr lang="en-US" sz="3200" b="1" dirty="0"/>
+          </a:p>
+        </p:txBody>
+      </p:sp>
+      <p:sp>
+        <p:nvSpPr>
+          <p:cNvPr id="6" name="Slide Number Placeholder 5">
+            <a:extLst>
+              <a:ext uri="{FF2B5EF4-FFF2-40B4-BE49-F238E27FC236}">
+                <a16:creationId xmlns:a16="http://schemas.microsoft.com/office/drawing/2014/main" id="{1028CB34-29B5-49CB-99E4-E945C3D78896}"/>
+              </a:ext>
+            </a:extLst>
+          </p:cNvPr>
+          <p:cNvSpPr>
+            <a:spLocks noGrp="1"/>
+          </p:cNvSpPr>
+          <p:nvPr>
+            <p:ph type="sldNum" sz="quarter" idx="12"/>
+          </p:nvPr>
+        </p:nvSpPr>
+        <p:spPr/>
+        <p:txBody>
+          <a:bodyPr/>
+          <a:lstStyle/>
+          <a:p>
+            <a:fld id="{D57F1E4F-1CFF-5643-939E-217C01CDF565}" type="slidenum">
+              <a:rPr lang="en-US" smtClean="0"/>
+              <a:pPr/>
+              <a:t>63</a:t>
+            </a:fld>
+            <a:endParaRPr lang="en-US" dirty="0"/>
+          </a:p>
+        </p:txBody>
+      </p:sp>
+      <p:sp>
+        <p:nvSpPr>
+          <p:cNvPr id="8" name="TextBox 7">
+            <a:extLst>
+              <a:ext uri="{FF2B5EF4-FFF2-40B4-BE49-F238E27FC236}">
+                <a16:creationId xmlns:a16="http://schemas.microsoft.com/office/drawing/2014/main" id="{C9FAD4F5-81D5-4890-8BB5-F06C93EDD254}"/>
+              </a:ext>
+            </a:extLst>
+          </p:cNvPr>
+          <p:cNvSpPr txBox="1"/>
+          <p:nvPr/>
+        </p:nvSpPr>
+        <p:spPr>
+          <a:xfrm>
+            <a:off x="1392866" y="1268569"/>
+            <a:ext cx="8753253" cy="5509200"/>
+          </a:xfrm>
+          <a:prstGeom prst="rect">
+            <a:avLst/>
+          </a:prstGeom>
+          <a:noFill/>
+        </p:spPr>
+        <p:txBody>
+          <a:bodyPr wrap="square">
+            <a:spAutoFit/>
+          </a:bodyPr>
+          <a:lstStyle/>
+          <a:p>
+            <a:r>
+              <a:rPr lang="de-DE" sz="1100" dirty="0"/>
+              <a:t>Testing out mikropml as it already has a function run_ml() that incorporates nested cross-validation for several standard supervised machine learning models:</a:t>
+            </a:r>
+          </a:p>
+          <a:p>
+            <a:endParaRPr lang="de-DE" sz="1100" dirty="0"/>
+          </a:p>
+          <a:p>
+            <a:r>
+              <a:rPr lang="de-DE" sz="1100" dirty="0"/>
+              <a:t>    Logistic/multiclass/linear regression ("glmnet")</a:t>
+            </a:r>
+          </a:p>
+          <a:p>
+            <a:r>
+              <a:rPr lang="de-DE" sz="1100" dirty="0"/>
+              <a:t>    Random forest ("rf")</a:t>
+            </a:r>
+          </a:p>
+          <a:p>
+            <a:r>
+              <a:rPr lang="de-DE" sz="1100" dirty="0"/>
+              <a:t>    Decision tree ("rpart2")</a:t>
+            </a:r>
+          </a:p>
+          <a:p>
+            <a:r>
+              <a:rPr lang="de-DE" sz="1100" dirty="0"/>
+              <a:t>    Support vector machine with a radial basis kernel ("svmRadial")</a:t>
+            </a:r>
+          </a:p>
+          <a:p>
+            <a:r>
+              <a:rPr lang="de-DE" sz="1100" dirty="0"/>
+              <a:t>    xgboost ("xgbTree")</a:t>
+            </a:r>
+          </a:p>
+          <a:p>
+            <a:endParaRPr lang="de-DE" sz="1100" dirty="0"/>
+          </a:p>
+          <a:p>
+            <a:r>
+              <a:rPr lang="de-DE" sz="1100" dirty="0"/>
+              <a:t>Test it here for linear regression and xgboost.</a:t>
+            </a:r>
+          </a:p>
+          <a:p>
+            <a:r>
+              <a:rPr lang="de-DE" sz="1100" dirty="0"/>
+              <a:t>Function run_ml has several parameters:</a:t>
+            </a:r>
+          </a:p>
+          <a:p>
+            <a:r>
+              <a:rPr lang="de-DE" sz="1100" dirty="0"/>
+              <a:t>           dataset,</a:t>
+            </a:r>
+          </a:p>
+          <a:p>
+            <a:r>
+              <a:rPr lang="de-DE" sz="1100" dirty="0"/>
+              <a:t>           method,</a:t>
+            </a:r>
+          </a:p>
+          <a:p>
+            <a:r>
+              <a:rPr lang="de-DE" sz="1100" dirty="0"/>
+              <a:t>           outcome_colname = NULL, (standardized the first column)</a:t>
+            </a:r>
+          </a:p>
+          <a:p>
+            <a:r>
+              <a:rPr lang="de-DE" sz="1100" dirty="0"/>
+              <a:t>           hyperparameters = NULL,</a:t>
+            </a:r>
+          </a:p>
+          <a:p>
+            <a:r>
+              <a:rPr lang="de-DE" sz="1100" dirty="0"/>
+              <a:t>           find_feature_importance = FALSE, (`TRUE` is recommended if you would like to identify features important for predicting your                                                outcome, but it is resource-intensive.</a:t>
+            </a:r>
+          </a:p>
+          <a:p>
+            <a:r>
+              <a:rPr lang="de-DE" sz="1100" dirty="0"/>
+              <a:t>           calculate_performance = TRUE,</a:t>
+            </a:r>
+          </a:p>
+          <a:p>
+            <a:r>
+              <a:rPr lang="de-DE" sz="1100" dirty="0"/>
+              <a:t>           kfold = 5, (standard at 5)</a:t>
+            </a:r>
+          </a:p>
+          <a:p>
+            <a:r>
+              <a:rPr lang="de-DE" sz="1100" dirty="0"/>
+              <a:t>           cv_times = 100, (standard at 100)</a:t>
+            </a:r>
+          </a:p>
+          <a:p>
+            <a:r>
+              <a:rPr lang="de-DE" sz="1100" dirty="0"/>
+              <a:t>           cross_val = NULL, (cross_val a custom cross-validation scheme from `caret::trainControl()` (default: `NULL`, uses `kfold` cross                              validation repeated `cv_times`). `kfold` and `cv_times` are ignored if the user provides a custom                                          cross-validation scheme.)</a:t>
+            </a:r>
+          </a:p>
+          <a:p>
+            <a:r>
+              <a:rPr lang="de-DE" sz="1100" dirty="0"/>
+              <a:t>           training_frac = 0.8, (standard at 0.8)</a:t>
+            </a:r>
+          </a:p>
+          <a:p>
+            <a:r>
+              <a:rPr lang="de-DE" sz="1100" dirty="0"/>
+              <a:t>           perf_metric_function = NULL,</a:t>
+            </a:r>
+          </a:p>
+          <a:p>
+            <a:r>
+              <a:rPr lang="de-DE" sz="1100" dirty="0"/>
+              <a:t>           perf_metric_name = NULL,</a:t>
+            </a:r>
+          </a:p>
+          <a:p>
+            <a:r>
+              <a:rPr lang="de-DE" sz="1100" dirty="0"/>
+              <a:t>           groups = NULL,</a:t>
+            </a:r>
+          </a:p>
+          <a:p>
+            <a:r>
+              <a:rPr lang="de-DE" sz="1100" dirty="0"/>
+              <a:t>           group_partitions = NULL,</a:t>
+            </a:r>
+          </a:p>
+          <a:p>
+            <a:r>
+              <a:rPr lang="de-DE" sz="1100" dirty="0"/>
+              <a:t>           corr_thresh = 1,</a:t>
+            </a:r>
+          </a:p>
+          <a:p>
+            <a:r>
+              <a:rPr lang="de-DE" sz="1100" dirty="0"/>
+              <a:t>           ntree = 1000, (For random forest, how many trees to use (default: `1000`). Caret doesn't allow this hyperparameter to be tuned)</a:t>
+            </a:r>
+          </a:p>
+          <a:p>
+            <a:r>
+              <a:rPr lang="de-DE" sz="1100" dirty="0"/>
+              <a:t>           seed = NA (set seed for reproducibility)</a:t>
+            </a:r>
+          </a:p>
+        </p:txBody>
+      </p:sp>
+    </p:spTree>
+    <p:extLst>
+      <p:ext uri="{BB962C8B-B14F-4D97-AF65-F5344CB8AC3E}">
+        <p14:creationId xmlns:p14="http://schemas.microsoft.com/office/powerpoint/2010/main" val="3541464901"/>
+      </p:ext>
+    </p:extLst>
+  </p:cSld>
+  <p:clrMapOvr>
+    <a:masterClrMapping/>
+  </p:clrMapOvr>
+</p:sld>
+</file>
+
+<file path=ppt/slides/slide64.xml><?xml version="1.0" encoding="utf-8"?>
+<p:sld xmlns:a="http://schemas.openxmlformats.org/drawingml/2006/main" xmlns:r="http://schemas.openxmlformats.org/officeDocument/2006/relationships" xmlns:p="http://schemas.openxmlformats.org/presentationml/2006/main">
+  <p:cSld>
+    <p:spTree>
+      <p:nvGrpSpPr>
+        <p:cNvPr id="1" name=""/>
+        <p:cNvGrpSpPr/>
+        <p:nvPr/>
+      </p:nvGrpSpPr>
+      <p:grpSpPr>
+        <a:xfrm>
+          <a:off x="0" y="0"/>
+          <a:ext cx="0" cy="0"/>
+          <a:chOff x="0" y="0"/>
+          <a:chExt cx="0" cy="0"/>
+        </a:xfrm>
+      </p:grpSpPr>
+      <p:sp>
+        <p:nvSpPr>
+          <p:cNvPr id="2" name="Title 1">
+            <a:extLst>
+              <a:ext uri="{FF2B5EF4-FFF2-40B4-BE49-F238E27FC236}">
+                <a16:creationId xmlns:a16="http://schemas.microsoft.com/office/drawing/2014/main" id="{169D9D37-B637-4D74-BB75-639D51A491FB}"/>
+              </a:ext>
+            </a:extLst>
+          </p:cNvPr>
+          <p:cNvSpPr>
+            <a:spLocks noGrp="1"/>
+          </p:cNvSpPr>
+          <p:nvPr>
+            <p:ph type="title"/>
+          </p:nvPr>
+        </p:nvSpPr>
+        <p:spPr>
+          <a:xfrm>
+            <a:off x="1640156" y="628124"/>
+            <a:ext cx="8911687" cy="1280890"/>
+          </a:xfrm>
+        </p:spPr>
+        <p:txBody>
+          <a:bodyPr/>
+          <a:lstStyle/>
+          <a:p>
+            <a:r>
+              <a:rPr lang="de-DE" b="1" dirty="0"/>
+              <a:t>Data set</a:t>
+            </a:r>
+            <a:endParaRPr lang="en-US" b="1" dirty="0"/>
+          </a:p>
+        </p:txBody>
+      </p:sp>
+      <p:sp>
+        <p:nvSpPr>
+          <p:cNvPr id="3" name="Content Placeholder 2">
+            <a:extLst>
+              <a:ext uri="{FF2B5EF4-FFF2-40B4-BE49-F238E27FC236}">
+                <a16:creationId xmlns:a16="http://schemas.microsoft.com/office/drawing/2014/main" id="{D4D56813-9DF8-4D28-B156-1DE48E95DBC2}"/>
+              </a:ext>
+            </a:extLst>
+          </p:cNvPr>
+          <p:cNvSpPr>
+            <a:spLocks noGrp="1"/>
+          </p:cNvSpPr>
+          <p:nvPr>
+            <p:ph idx="1"/>
+          </p:nvPr>
+        </p:nvSpPr>
+        <p:spPr>
+          <a:xfrm>
+            <a:off x="2592495" y="1317171"/>
+            <a:ext cx="8915400" cy="4369465"/>
+          </a:xfrm>
+        </p:spPr>
+        <p:txBody>
+          <a:bodyPr>
+            <a:normAutofit/>
+          </a:bodyPr>
+          <a:lstStyle/>
+          <a:p>
+            <a:r>
+              <a:rPr lang="de-DE" dirty="0"/>
+              <a:t>Compare what Thomas P. Quinn uses (13 datasets) and take out from estonian biobank</a:t>
+            </a:r>
+          </a:p>
+          <a:p>
+            <a:r>
+              <a:rPr lang="de-DE" dirty="0"/>
+              <a:t> prediction/classification tasks</a:t>
+            </a:r>
+          </a:p>
+          <a:p>
+            <a:r>
+              <a:rPr lang="de-DE" dirty="0"/>
+              <a:t>One with continuous and one with discrete variables</a:t>
+            </a:r>
+          </a:p>
+          <a:p>
+            <a:r>
+              <a:rPr lang="de-DE" dirty="0"/>
+              <a:t>one with high correlation and one with low to microbiomes</a:t>
+            </a:r>
+          </a:p>
+          <a:p>
+            <a:r>
+              <a:rPr lang="de-DE" dirty="0"/>
+              <a:t>one small and one large data set</a:t>
+            </a:r>
+          </a:p>
+          <a:p>
+            <a:r>
+              <a:rPr lang="de-DE" dirty="0"/>
+              <a:t>EstMB, colorectal cancer, PCOS</a:t>
+            </a:r>
+          </a:p>
+          <a:p>
+            <a:endParaRPr lang="de-DE" dirty="0"/>
+          </a:p>
+        </p:txBody>
+      </p:sp>
+      <p:sp>
+        <p:nvSpPr>
+          <p:cNvPr id="4" name="Date Placeholder 3">
+            <a:extLst>
+              <a:ext uri="{FF2B5EF4-FFF2-40B4-BE49-F238E27FC236}">
+                <a16:creationId xmlns:a16="http://schemas.microsoft.com/office/drawing/2014/main" id="{D53DB4F4-84EC-4588-88E6-8D8519D6A1E8}"/>
+              </a:ext>
+            </a:extLst>
+          </p:cNvPr>
+          <p:cNvSpPr>
+            <a:spLocks noGrp="1"/>
+          </p:cNvSpPr>
+          <p:nvPr>
+            <p:ph type="dt" sz="half" idx="10"/>
+          </p:nvPr>
+        </p:nvSpPr>
+        <p:spPr/>
+        <p:txBody>
+          <a:bodyPr/>
+          <a:lstStyle/>
+          <a:p>
+            <a:fld id="{5A2DBB50-F561-45B0-9BE5-95A455D2CD8B}" type="datetime1">
+              <a:rPr lang="en-US" smtClean="0"/>
+              <a:t>5/19/2022</a:t>
+            </a:fld>
+            <a:endParaRPr lang="en-US" dirty="0"/>
+          </a:p>
+        </p:txBody>
+      </p:sp>
+      <p:sp>
+        <p:nvSpPr>
+          <p:cNvPr id="5" name="Footer Placeholder 4">
+            <a:extLst>
+              <a:ext uri="{FF2B5EF4-FFF2-40B4-BE49-F238E27FC236}">
+                <a16:creationId xmlns:a16="http://schemas.microsoft.com/office/drawing/2014/main" id="{A7F3346A-3F24-484B-A6D3-55D66520C917}"/>
+              </a:ext>
+            </a:extLst>
+          </p:cNvPr>
+          <p:cNvSpPr>
+            <a:spLocks noGrp="1"/>
+          </p:cNvSpPr>
+          <p:nvPr>
+            <p:ph type="ftr" sz="quarter" idx="11"/>
+          </p:nvPr>
+        </p:nvSpPr>
+        <p:spPr/>
+        <p:txBody>
+          <a:bodyPr/>
+          <a:lstStyle/>
+          <a:p>
+            <a:r>
+              <a:rPr lang="en-US"/>
+              <a:t>jennifer.neumaier@t-online.de</a:t>
+            </a:r>
+            <a:endParaRPr lang="en-US" dirty="0"/>
+          </a:p>
+        </p:txBody>
+      </p:sp>
+      <p:sp>
+        <p:nvSpPr>
+          <p:cNvPr id="6" name="Slide Number Placeholder 5">
+            <a:extLst>
+              <a:ext uri="{FF2B5EF4-FFF2-40B4-BE49-F238E27FC236}">
+                <a16:creationId xmlns:a16="http://schemas.microsoft.com/office/drawing/2014/main" id="{C4B3B4A6-E708-4F88-8CA2-BDE8FCF0C0AC}"/>
+              </a:ext>
+            </a:extLst>
+          </p:cNvPr>
+          <p:cNvSpPr>
+            <a:spLocks noGrp="1"/>
+          </p:cNvSpPr>
+          <p:nvPr>
+            <p:ph type="sldNum" sz="quarter" idx="12"/>
+          </p:nvPr>
+        </p:nvSpPr>
+        <p:spPr/>
+        <p:txBody>
+          <a:bodyPr/>
+          <a:lstStyle/>
+          <a:p>
+            <a:fld id="{D57F1E4F-1CFF-5643-939E-217C01CDF565}" type="slidenum">
+              <a:rPr lang="en-US" smtClean="0"/>
+              <a:pPr/>
+              <a:t>64</a:t>
+            </a:fld>
+            <a:endParaRPr lang="en-US" dirty="0"/>
+          </a:p>
+        </p:txBody>
+      </p:sp>
+      <p:sp>
+        <p:nvSpPr>
+          <p:cNvPr id="8" name="TextBox 7">
+            <a:extLst>
+              <a:ext uri="{FF2B5EF4-FFF2-40B4-BE49-F238E27FC236}">
+                <a16:creationId xmlns:a16="http://schemas.microsoft.com/office/drawing/2014/main" id="{6A373959-7937-4239-AAA7-0B90CAF1A620}"/>
+              </a:ext>
+            </a:extLst>
+          </p:cNvPr>
+          <p:cNvSpPr txBox="1"/>
+          <p:nvPr/>
+        </p:nvSpPr>
+        <p:spPr>
+          <a:xfrm>
+            <a:off x="2260283" y="4487322"/>
+            <a:ext cx="6097904" cy="923330"/>
+          </a:xfrm>
+          <a:prstGeom prst="rect">
+            <a:avLst/>
+          </a:prstGeom>
+          <a:noFill/>
+        </p:spPr>
+        <p:txBody>
+          <a:bodyPr wrap="square">
+            <a:spAutoFit/>
+          </a:bodyPr>
+          <a:lstStyle/>
+          <a:p>
+            <a:r>
+              <a:rPr lang="de-DE" b="1" dirty="0"/>
+              <a:t>CRC data set preparation and models:</a:t>
+            </a:r>
+          </a:p>
+          <a:p>
+            <a:r>
+              <a:rPr lang="de-DE" dirty="0"/>
+              <a:t>https://github.com/zellerlab/crc_meta/blob/master/src/prepare_data.R</a:t>
+            </a:r>
+          </a:p>
+        </p:txBody>
+      </p:sp>
+    </p:spTree>
+    <p:extLst>
+      <p:ext uri="{BB962C8B-B14F-4D97-AF65-F5344CB8AC3E}">
+        <p14:creationId xmlns:p14="http://schemas.microsoft.com/office/powerpoint/2010/main" val="4097922265"/>
+      </p:ext>
+    </p:extLst>
+  </p:cSld>
+  <p:clrMapOvr>
+    <a:masterClrMapping/>
+  </p:clrMapOvr>
+</p:sld>
+</file>
+
+<file path=ppt/slides/slide65.xml><?xml version="1.0" encoding="utf-8"?>
+<p:sld xmlns:a="http://schemas.openxmlformats.org/drawingml/2006/main" xmlns:r="http://schemas.openxmlformats.org/officeDocument/2006/relationships" xmlns:p="http://schemas.openxmlformats.org/presentationml/2006/main">
+  <p:cSld>
+    <p:spTree>
+      <p:nvGrpSpPr>
+        <p:cNvPr id="1" name=""/>
+        <p:cNvGrpSpPr/>
+        <p:nvPr/>
+      </p:nvGrpSpPr>
+      <p:grpSpPr>
+        <a:xfrm>
+          <a:off x="0" y="0"/>
+          <a:ext cx="0" cy="0"/>
+          <a:chOff x="0" y="0"/>
+          <a:chExt cx="0" cy="0"/>
+        </a:xfrm>
+      </p:grpSpPr>
+      <p:sp>
+        <p:nvSpPr>
+          <p:cNvPr id="2" name="Title 1">
+            <a:extLst>
+              <a:ext uri="{FF2B5EF4-FFF2-40B4-BE49-F238E27FC236}">
                 <a16:creationId xmlns:a16="http://schemas.microsoft.com/office/drawing/2014/main" id="{150EAB59-F93C-4B56-AD7E-A9B5BD800221}"/>
               </a:ext>
             </a:extLst>
@@ -39907,7 +41085,7 @@
           <a:p>
             <a:fld id="{BDD716FE-4A5D-4A13-A8EE-37F9C34BE666}" type="datetime1">
               <a:rPr lang="en-US" smtClean="0"/>
-              <a:t>5/13/2022</a:t>
+              <a:t>5/19/2022</a:t>
             </a:fld>
             <a:endParaRPr lang="en-US" dirty="0"/>
           </a:p>
@@ -39966,7 +41144,7 @@
             <a:fld id="{D57F1E4F-1CFF-5643-939E-217C01CDF565}" type="slidenum">
               <a:rPr lang="en-US" smtClean="0"/>
               <a:pPr/>
-              <a:t>63</a:t>
+              <a:t>65</a:t>
             </a:fld>
             <a:endParaRPr lang="en-US" dirty="0"/>
           </a:p>
@@ -40075,400 +41253,6 @@
 </p:sld>
 </file>
 
-<file path=ppt/slides/slide64.xml><?xml version="1.0" encoding="utf-8"?>
-<p:sld xmlns:a="http://schemas.openxmlformats.org/drawingml/2006/main" xmlns:r="http://schemas.openxmlformats.org/officeDocument/2006/relationships" xmlns:p="http://schemas.openxmlformats.org/presentationml/2006/main">
-  <p:cSld>
-    <p:spTree>
-      <p:nvGrpSpPr>
-        <p:cNvPr id="1" name=""/>
-        <p:cNvGrpSpPr/>
-        <p:nvPr/>
-      </p:nvGrpSpPr>
-      <p:grpSpPr>
-        <a:xfrm>
-          <a:off x="0" y="0"/>
-          <a:ext cx="0" cy="0"/>
-          <a:chOff x="0" y="0"/>
-          <a:chExt cx="0" cy="0"/>
-        </a:xfrm>
-      </p:grpSpPr>
-      <p:sp>
-        <p:nvSpPr>
-          <p:cNvPr id="2" name="Title 1">
-            <a:extLst>
-              <a:ext uri="{FF2B5EF4-FFF2-40B4-BE49-F238E27FC236}">
-                <a16:creationId xmlns:a16="http://schemas.microsoft.com/office/drawing/2014/main" id="{169D9D37-B637-4D74-BB75-639D51A491FB}"/>
-              </a:ext>
-            </a:extLst>
-          </p:cNvPr>
-          <p:cNvSpPr>
-            <a:spLocks noGrp="1"/>
-          </p:cNvSpPr>
-          <p:nvPr>
-            <p:ph type="title"/>
-          </p:nvPr>
-        </p:nvSpPr>
-        <p:spPr>
-          <a:xfrm>
-            <a:off x="1640156" y="628124"/>
-            <a:ext cx="8911687" cy="1280890"/>
-          </a:xfrm>
-        </p:spPr>
-        <p:txBody>
-          <a:bodyPr/>
-          <a:lstStyle/>
-          <a:p>
-            <a:r>
-              <a:rPr lang="de-DE" b="1" dirty="0"/>
-              <a:t>Problems</a:t>
-            </a:r>
-            <a:endParaRPr lang="en-US" b="1" dirty="0"/>
-          </a:p>
-        </p:txBody>
-      </p:sp>
-      <p:sp>
-        <p:nvSpPr>
-          <p:cNvPr id="3" name="Content Placeholder 2">
-            <a:extLst>
-              <a:ext uri="{FF2B5EF4-FFF2-40B4-BE49-F238E27FC236}">
-                <a16:creationId xmlns:a16="http://schemas.microsoft.com/office/drawing/2014/main" id="{D4D56813-9DF8-4D28-B156-1DE48E95DBC2}"/>
-              </a:ext>
-            </a:extLst>
-          </p:cNvPr>
-          <p:cNvSpPr>
-            <a:spLocks noGrp="1"/>
-          </p:cNvSpPr>
-          <p:nvPr>
-            <p:ph idx="1"/>
-          </p:nvPr>
-        </p:nvSpPr>
-        <p:spPr/>
-        <p:txBody>
-          <a:bodyPr/>
-          <a:lstStyle/>
-          <a:p>
-            <a:r>
-              <a:rPr lang="de-DE" dirty="0"/>
-              <a:t>Microbial features are not independent </a:t>
-            </a:r>
-          </a:p>
-          <a:p>
-            <a:r>
-              <a:rPr lang="de-DE" dirty="0"/>
-              <a:t>Some microbial features are found in correlation!</a:t>
-            </a:r>
-          </a:p>
-        </p:txBody>
-      </p:sp>
-      <p:sp>
-        <p:nvSpPr>
-          <p:cNvPr id="4" name="Date Placeholder 3">
-            <a:extLst>
-              <a:ext uri="{FF2B5EF4-FFF2-40B4-BE49-F238E27FC236}">
-                <a16:creationId xmlns:a16="http://schemas.microsoft.com/office/drawing/2014/main" id="{D53DB4F4-84EC-4588-88E6-8D8519D6A1E8}"/>
-              </a:ext>
-            </a:extLst>
-          </p:cNvPr>
-          <p:cNvSpPr>
-            <a:spLocks noGrp="1"/>
-          </p:cNvSpPr>
-          <p:nvPr>
-            <p:ph type="dt" sz="half" idx="10"/>
-          </p:nvPr>
-        </p:nvSpPr>
-        <p:spPr/>
-        <p:txBody>
-          <a:bodyPr/>
-          <a:lstStyle/>
-          <a:p>
-            <a:fld id="{5A2DBB50-F561-45B0-9BE5-95A455D2CD8B}" type="datetime1">
-              <a:rPr lang="en-US" smtClean="0"/>
-              <a:t>5/13/2022</a:t>
-            </a:fld>
-            <a:endParaRPr lang="en-US" dirty="0"/>
-          </a:p>
-        </p:txBody>
-      </p:sp>
-      <p:sp>
-        <p:nvSpPr>
-          <p:cNvPr id="5" name="Footer Placeholder 4">
-            <a:extLst>
-              <a:ext uri="{FF2B5EF4-FFF2-40B4-BE49-F238E27FC236}">
-                <a16:creationId xmlns:a16="http://schemas.microsoft.com/office/drawing/2014/main" id="{A7F3346A-3F24-484B-A6D3-55D66520C917}"/>
-              </a:ext>
-            </a:extLst>
-          </p:cNvPr>
-          <p:cNvSpPr>
-            <a:spLocks noGrp="1"/>
-          </p:cNvSpPr>
-          <p:nvPr>
-            <p:ph type="ftr" sz="quarter" idx="11"/>
-          </p:nvPr>
-        </p:nvSpPr>
-        <p:spPr/>
-        <p:txBody>
-          <a:bodyPr/>
-          <a:lstStyle/>
-          <a:p>
-            <a:r>
-              <a:rPr lang="en-US"/>
-              <a:t>jennifer.neumaier@t-online.de</a:t>
-            </a:r>
-            <a:endParaRPr lang="en-US" dirty="0"/>
-          </a:p>
-        </p:txBody>
-      </p:sp>
-      <p:sp>
-        <p:nvSpPr>
-          <p:cNvPr id="6" name="Slide Number Placeholder 5">
-            <a:extLst>
-              <a:ext uri="{FF2B5EF4-FFF2-40B4-BE49-F238E27FC236}">
-                <a16:creationId xmlns:a16="http://schemas.microsoft.com/office/drawing/2014/main" id="{C4B3B4A6-E708-4F88-8CA2-BDE8FCF0C0AC}"/>
-              </a:ext>
-            </a:extLst>
-          </p:cNvPr>
-          <p:cNvSpPr>
-            <a:spLocks noGrp="1"/>
-          </p:cNvSpPr>
-          <p:nvPr>
-            <p:ph type="sldNum" sz="quarter" idx="12"/>
-          </p:nvPr>
-        </p:nvSpPr>
-        <p:spPr/>
-        <p:txBody>
-          <a:bodyPr/>
-          <a:lstStyle/>
-          <a:p>
-            <a:fld id="{D57F1E4F-1CFF-5643-939E-217C01CDF565}" type="slidenum">
-              <a:rPr lang="en-US" smtClean="0"/>
-              <a:pPr/>
-              <a:t>64</a:t>
-            </a:fld>
-            <a:endParaRPr lang="en-US" dirty="0"/>
-          </a:p>
-        </p:txBody>
-      </p:sp>
-    </p:spTree>
-    <p:extLst>
-      <p:ext uri="{BB962C8B-B14F-4D97-AF65-F5344CB8AC3E}">
-        <p14:creationId xmlns:p14="http://schemas.microsoft.com/office/powerpoint/2010/main" val="1795355039"/>
-      </p:ext>
-    </p:extLst>
-  </p:cSld>
-  <p:clrMapOvr>
-    <a:masterClrMapping/>
-  </p:clrMapOvr>
-</p:sld>
-</file>
-
-<file path=ppt/slides/slide65.xml><?xml version="1.0" encoding="utf-8"?>
-<p:sld xmlns:a="http://schemas.openxmlformats.org/drawingml/2006/main" xmlns:r="http://schemas.openxmlformats.org/officeDocument/2006/relationships" xmlns:p="http://schemas.openxmlformats.org/presentationml/2006/main">
-  <p:cSld>
-    <p:spTree>
-      <p:nvGrpSpPr>
-        <p:cNvPr id="1" name=""/>
-        <p:cNvGrpSpPr/>
-        <p:nvPr/>
-      </p:nvGrpSpPr>
-      <p:grpSpPr>
-        <a:xfrm>
-          <a:off x="0" y="0"/>
-          <a:ext cx="0" cy="0"/>
-          <a:chOff x="0" y="0"/>
-          <a:chExt cx="0" cy="0"/>
-        </a:xfrm>
-      </p:grpSpPr>
-      <p:sp>
-        <p:nvSpPr>
-          <p:cNvPr id="2" name="Title 1">
-            <a:extLst>
-              <a:ext uri="{FF2B5EF4-FFF2-40B4-BE49-F238E27FC236}">
-                <a16:creationId xmlns:a16="http://schemas.microsoft.com/office/drawing/2014/main" id="{169D9D37-B637-4D74-BB75-639D51A491FB}"/>
-              </a:ext>
-            </a:extLst>
-          </p:cNvPr>
-          <p:cNvSpPr>
-            <a:spLocks noGrp="1"/>
-          </p:cNvSpPr>
-          <p:nvPr>
-            <p:ph type="title"/>
-          </p:nvPr>
-        </p:nvSpPr>
-        <p:spPr>
-          <a:xfrm>
-            <a:off x="1640156" y="628124"/>
-            <a:ext cx="8911687" cy="1280890"/>
-          </a:xfrm>
-        </p:spPr>
-        <p:txBody>
-          <a:bodyPr/>
-          <a:lstStyle/>
-          <a:p>
-            <a:r>
-              <a:rPr lang="de-DE" b="1" dirty="0"/>
-              <a:t>Notes 30.01. meeting</a:t>
-            </a:r>
-            <a:endParaRPr lang="en-US" b="1" dirty="0"/>
-          </a:p>
-        </p:txBody>
-      </p:sp>
-      <p:sp>
-        <p:nvSpPr>
-          <p:cNvPr id="3" name="Content Placeholder 2">
-            <a:extLst>
-              <a:ext uri="{FF2B5EF4-FFF2-40B4-BE49-F238E27FC236}">
-                <a16:creationId xmlns:a16="http://schemas.microsoft.com/office/drawing/2014/main" id="{D4D56813-9DF8-4D28-B156-1DE48E95DBC2}"/>
-              </a:ext>
-            </a:extLst>
-          </p:cNvPr>
-          <p:cNvSpPr>
-            <a:spLocks noGrp="1"/>
-          </p:cNvSpPr>
-          <p:nvPr>
-            <p:ph idx="1"/>
-          </p:nvPr>
-        </p:nvSpPr>
-        <p:spPr/>
-        <p:txBody>
-          <a:bodyPr/>
-          <a:lstStyle/>
-          <a:p>
-            <a:r>
-              <a:rPr lang="de-DE" dirty="0"/>
-              <a:t>Review paper ML for microbiome paper</a:t>
-            </a:r>
-          </a:p>
-          <a:p>
-            <a:r>
-              <a:rPr lang="de-DE" dirty="0"/>
-              <a:t>COST action paper</a:t>
-            </a:r>
-          </a:p>
-          <a:p>
-            <a:r>
-              <a:rPr lang="de-DE"/>
-              <a:t>Confidentiality form, sign, scan and send to Elin</a:t>
-            </a:r>
-            <a:endParaRPr lang="de-DE" dirty="0"/>
-          </a:p>
-          <a:p>
-            <a:r>
-              <a:rPr lang="de-DE" dirty="0"/>
-              <a:t>Meeting Oliver Friday, 4th February</a:t>
-            </a:r>
-          </a:p>
-          <a:p>
-            <a:r>
-              <a:rPr lang="de-DE" dirty="0"/>
-              <a:t>Literature Review: ~10-20 pages, include Figures and Tables, equations for major transformations, write for biologists</a:t>
-            </a:r>
-          </a:p>
-          <a:p>
-            <a:endParaRPr lang="de-DE" dirty="0"/>
-          </a:p>
-        </p:txBody>
-      </p:sp>
-      <p:sp>
-        <p:nvSpPr>
-          <p:cNvPr id="4" name="Date Placeholder 3">
-            <a:extLst>
-              <a:ext uri="{FF2B5EF4-FFF2-40B4-BE49-F238E27FC236}">
-                <a16:creationId xmlns:a16="http://schemas.microsoft.com/office/drawing/2014/main" id="{D53DB4F4-84EC-4588-88E6-8D8519D6A1E8}"/>
-              </a:ext>
-            </a:extLst>
-          </p:cNvPr>
-          <p:cNvSpPr>
-            <a:spLocks noGrp="1"/>
-          </p:cNvSpPr>
-          <p:nvPr>
-            <p:ph type="dt" sz="half" idx="10"/>
-          </p:nvPr>
-        </p:nvSpPr>
-        <p:spPr/>
-        <p:txBody>
-          <a:bodyPr/>
-          <a:lstStyle/>
-          <a:p>
-            <a:fld id="{5A2DBB50-F561-45B0-9BE5-95A455D2CD8B}" type="datetime1">
-              <a:rPr lang="en-US" smtClean="0"/>
-              <a:t>5/13/2022</a:t>
-            </a:fld>
-            <a:endParaRPr lang="en-US" dirty="0"/>
-          </a:p>
-        </p:txBody>
-      </p:sp>
-      <p:sp>
-        <p:nvSpPr>
-          <p:cNvPr id="5" name="Footer Placeholder 4">
-            <a:extLst>
-              <a:ext uri="{FF2B5EF4-FFF2-40B4-BE49-F238E27FC236}">
-                <a16:creationId xmlns:a16="http://schemas.microsoft.com/office/drawing/2014/main" id="{A7F3346A-3F24-484B-A6D3-55D66520C917}"/>
-              </a:ext>
-            </a:extLst>
-          </p:cNvPr>
-          <p:cNvSpPr>
-            <a:spLocks noGrp="1"/>
-          </p:cNvSpPr>
-          <p:nvPr>
-            <p:ph type="ftr" sz="quarter" idx="11"/>
-          </p:nvPr>
-        </p:nvSpPr>
-        <p:spPr/>
-        <p:txBody>
-          <a:bodyPr/>
-          <a:lstStyle/>
-          <a:p>
-            <a:r>
-              <a:rPr lang="en-US"/>
-              <a:t>jennifer.neumaier@t-online.de</a:t>
-            </a:r>
-            <a:endParaRPr lang="en-US" dirty="0"/>
-          </a:p>
-        </p:txBody>
-      </p:sp>
-      <p:sp>
-        <p:nvSpPr>
-          <p:cNvPr id="6" name="Slide Number Placeholder 5">
-            <a:extLst>
-              <a:ext uri="{FF2B5EF4-FFF2-40B4-BE49-F238E27FC236}">
-                <a16:creationId xmlns:a16="http://schemas.microsoft.com/office/drawing/2014/main" id="{C4B3B4A6-E708-4F88-8CA2-BDE8FCF0C0AC}"/>
-              </a:ext>
-            </a:extLst>
-          </p:cNvPr>
-          <p:cNvSpPr>
-            <a:spLocks noGrp="1"/>
-          </p:cNvSpPr>
-          <p:nvPr>
-            <p:ph type="sldNum" sz="quarter" idx="12"/>
-          </p:nvPr>
-        </p:nvSpPr>
-        <p:spPr/>
-        <p:txBody>
-          <a:bodyPr/>
-          <a:lstStyle/>
-          <a:p>
-            <a:fld id="{D57F1E4F-1CFF-5643-939E-217C01CDF565}" type="slidenum">
-              <a:rPr lang="en-US" smtClean="0"/>
-              <a:pPr/>
-              <a:t>65</a:t>
-            </a:fld>
-            <a:endParaRPr lang="en-US" dirty="0"/>
-          </a:p>
-        </p:txBody>
-      </p:sp>
-    </p:spTree>
-    <p:extLst>
-      <p:ext uri="{BB962C8B-B14F-4D97-AF65-F5344CB8AC3E}">
-        <p14:creationId xmlns:p14="http://schemas.microsoft.com/office/powerpoint/2010/main" val="3993456640"/>
-      </p:ext>
-    </p:extLst>
-  </p:cSld>
-  <p:clrMapOvr>
-    <a:masterClrMapping/>
-  </p:clrMapOvr>
-</p:sld>
-</file>
-
 <file path=ppt/slides/slide66.xml><?xml version="1.0" encoding="utf-8"?>
 <p:sld xmlns:a="http://schemas.openxmlformats.org/drawingml/2006/main" xmlns:r="http://schemas.openxmlformats.org/officeDocument/2006/relationships" xmlns:p="http://schemas.openxmlformats.org/presentationml/2006/main">
   <p:cSld>
@@ -40491,7 +41275,7 @@
           <p:cNvPr id="2" name="Title 1">
             <a:extLst>
               <a:ext uri="{FF2B5EF4-FFF2-40B4-BE49-F238E27FC236}">
-                <a16:creationId xmlns:a16="http://schemas.microsoft.com/office/drawing/2014/main" id="{D63F1953-0627-4313-9F69-D3CE525D057A}"/>
+                <a16:creationId xmlns:a16="http://schemas.microsoft.com/office/drawing/2014/main" id="{169D9D37-B637-4D74-BB75-639D51A491FB}"/>
               </a:ext>
             </a:extLst>
           </p:cNvPr>
@@ -40502,15 +41286,21 @@
             <p:ph type="title"/>
           </p:nvPr>
         </p:nvSpPr>
-        <p:spPr/>
+        <p:spPr>
+          <a:xfrm>
+            <a:off x="1640156" y="628124"/>
+            <a:ext cx="8911687" cy="1280890"/>
+          </a:xfrm>
+        </p:spPr>
         <p:txBody>
           <a:bodyPr/>
           <a:lstStyle/>
           <a:p>
             <a:r>
               <a:rPr lang="de-DE" b="1" dirty="0"/>
-              <a:t>Notes: 01.04. meeting</a:t>
-            </a:r>
+              <a:t>Problems</a:t>
+            </a:r>
+            <a:endParaRPr lang="en-US" b="1" dirty="0"/>
           </a:p>
         </p:txBody>
       </p:sp>
@@ -40519,7 +41309,7 @@
           <p:cNvPr id="3" name="Content Placeholder 2">
             <a:extLst>
               <a:ext uri="{FF2B5EF4-FFF2-40B4-BE49-F238E27FC236}">
-                <a16:creationId xmlns:a16="http://schemas.microsoft.com/office/drawing/2014/main" id="{10F6F84D-370D-481F-BDA8-9BEF48EC1F3D}"/>
+                <a16:creationId xmlns:a16="http://schemas.microsoft.com/office/drawing/2014/main" id="{D4D56813-9DF8-4D28-B156-1DE48E95DBC2}"/>
               </a:ext>
             </a:extLst>
           </p:cNvPr>
@@ -40537,81 +41327,14 @@
           <a:p>
             <a:r>
               <a:rPr lang="de-DE" dirty="0"/>
-              <a:t>Pipeline:</a:t>
-            </a:r>
-          </a:p>
-          <a:p>
-            <a:pPr lvl="1"/>
+              <a:t>Microbial features are not independent </a:t>
+            </a:r>
+          </a:p>
+          <a:p>
             <a:r>
               <a:rPr lang="de-DE" dirty="0"/>
-              <a:t>Test models and codacore on the same training&amp;test split (and set seed)</a:t>
-            </a:r>
-          </a:p>
-          <a:p>
-            <a:pPr lvl="1"/>
-            <a:r>
-              <a:rPr lang="de-DE" dirty="0"/>
-              <a:t>Take out training and test split from run_ml?</a:t>
-            </a:r>
-          </a:p>
-          <a:p>
-            <a:pPr lvl="1"/>
-            <a:r>
-              <a:rPr lang="de-DE" dirty="0"/>
-              <a:t>K_folds and CV_folds don‘t have to be the same for every data set</a:t>
-            </a:r>
-          </a:p>
-          <a:p>
-            <a:pPr lvl="1"/>
-            <a:r>
-              <a:rPr lang="de-DE" dirty="0"/>
-              <a:t>Time comparison?</a:t>
-            </a:r>
-          </a:p>
-          <a:p>
-            <a:r>
-              <a:rPr lang="de-DE" dirty="0"/>
-              <a:t>CRC:</a:t>
-            </a:r>
-          </a:p>
-          <a:p>
-            <a:pPr lvl="1"/>
-            <a:r>
-              <a:rPr lang="de-DE" dirty="0"/>
-              <a:t>Keep one country cohorts for extra validation </a:t>
-            </a:r>
-          </a:p>
-          <a:p>
-            <a:pPr lvl="1"/>
-            <a:r>
-              <a:rPr lang="de-DE" dirty="0"/>
-              <a:t>BMI as outcome_column for continuous</a:t>
-            </a:r>
-          </a:p>
-          <a:p>
-            <a:pPr lvl="1"/>
-            <a:r>
-              <a:rPr lang="de-DE" dirty="0"/>
-              <a:t>GROUP for classification </a:t>
-            </a:r>
-          </a:p>
-          <a:p>
-            <a:pPr marL="457200" lvl="1" indent="0">
-              <a:buNone/>
-            </a:pPr>
-            <a:endParaRPr lang="de-DE" dirty="0"/>
-          </a:p>
-          <a:p>
-            <a:pPr lvl="1"/>
-            <a:endParaRPr lang="de-DE" dirty="0"/>
-          </a:p>
-          <a:p>
-            <a:pPr lvl="1"/>
-            <a:endParaRPr lang="de-DE" dirty="0"/>
-          </a:p>
-          <a:p>
-            <a:pPr lvl="1"/>
-            <a:endParaRPr lang="de-DE" dirty="0"/>
+              <a:t>Some microbial features are found in correlation!</a:t>
+            </a:r>
           </a:p>
         </p:txBody>
       </p:sp>
@@ -40620,7 +41343,7 @@
           <p:cNvPr id="4" name="Date Placeholder 3">
             <a:extLst>
               <a:ext uri="{FF2B5EF4-FFF2-40B4-BE49-F238E27FC236}">
-                <a16:creationId xmlns:a16="http://schemas.microsoft.com/office/drawing/2014/main" id="{DBF0C8DB-9090-4B20-AED9-6E2044F98AC2}"/>
+                <a16:creationId xmlns:a16="http://schemas.microsoft.com/office/drawing/2014/main" id="{D53DB4F4-84EC-4588-88E6-8D8519D6A1E8}"/>
               </a:ext>
             </a:extLst>
           </p:cNvPr>
@@ -40636,10 +41359,9 @@
           <a:bodyPr/>
           <a:lstStyle/>
           <a:p>
-            <a:fld id="{36D18B76-5E8B-4456-8722-FC5B14B0F354}" type="datetime1">
+            <a:fld id="{5A2DBB50-F561-45B0-9BE5-95A455D2CD8B}" type="datetime1">
               <a:rPr lang="en-US" smtClean="0"/>
-              <a:pPr/>
-              <a:t>5/13/2022</a:t>
+              <a:t>5/19/2022</a:t>
             </a:fld>
             <a:endParaRPr lang="en-US" dirty="0"/>
           </a:p>
@@ -40650,7 +41372,7 @@
           <p:cNvPr id="5" name="Footer Placeholder 4">
             <a:extLst>
               <a:ext uri="{FF2B5EF4-FFF2-40B4-BE49-F238E27FC236}">
-                <a16:creationId xmlns:a16="http://schemas.microsoft.com/office/drawing/2014/main" id="{DA6DF03D-2B74-42A5-8C31-B3A7B6D53ABB}"/>
+                <a16:creationId xmlns:a16="http://schemas.microsoft.com/office/drawing/2014/main" id="{A7F3346A-3F24-484B-A6D3-55D66520C917}"/>
               </a:ext>
             </a:extLst>
           </p:cNvPr>
@@ -40679,7 +41401,7 @@
           <p:cNvPr id="6" name="Slide Number Placeholder 5">
             <a:extLst>
               <a:ext uri="{FF2B5EF4-FFF2-40B4-BE49-F238E27FC236}">
-                <a16:creationId xmlns:a16="http://schemas.microsoft.com/office/drawing/2014/main" id="{EB397826-F4D6-4DDE-B171-FF032CD952B6}"/>
+                <a16:creationId xmlns:a16="http://schemas.microsoft.com/office/drawing/2014/main" id="{C4B3B4A6-E708-4F88-8CA2-BDE8FCF0C0AC}"/>
               </a:ext>
             </a:extLst>
           </p:cNvPr>
@@ -40707,7 +41429,7 @@
     </p:spTree>
     <p:extLst>
       <p:ext uri="{BB962C8B-B14F-4D97-AF65-F5344CB8AC3E}">
-        <p14:creationId xmlns:p14="http://schemas.microsoft.com/office/powerpoint/2010/main" val="1848759324"/>
+        <p14:creationId xmlns:p14="http://schemas.microsoft.com/office/powerpoint/2010/main" val="1795355039"/>
       </p:ext>
     </p:extLst>
   </p:cSld>
@@ -40739,6 +41461,462 @@
           <p:cNvPr id="2" name="Title 1">
             <a:extLst>
               <a:ext uri="{FF2B5EF4-FFF2-40B4-BE49-F238E27FC236}">
+                <a16:creationId xmlns:a16="http://schemas.microsoft.com/office/drawing/2014/main" id="{169D9D37-B637-4D74-BB75-639D51A491FB}"/>
+              </a:ext>
+            </a:extLst>
+          </p:cNvPr>
+          <p:cNvSpPr>
+            <a:spLocks noGrp="1"/>
+          </p:cNvSpPr>
+          <p:nvPr>
+            <p:ph type="title"/>
+          </p:nvPr>
+        </p:nvSpPr>
+        <p:spPr>
+          <a:xfrm>
+            <a:off x="1640156" y="628124"/>
+            <a:ext cx="8911687" cy="1280890"/>
+          </a:xfrm>
+        </p:spPr>
+        <p:txBody>
+          <a:bodyPr/>
+          <a:lstStyle/>
+          <a:p>
+            <a:r>
+              <a:rPr lang="de-DE" b="1" dirty="0"/>
+              <a:t>Notes 30.01. meeting</a:t>
+            </a:r>
+            <a:endParaRPr lang="en-US" b="1" dirty="0"/>
+          </a:p>
+        </p:txBody>
+      </p:sp>
+      <p:sp>
+        <p:nvSpPr>
+          <p:cNvPr id="3" name="Content Placeholder 2">
+            <a:extLst>
+              <a:ext uri="{FF2B5EF4-FFF2-40B4-BE49-F238E27FC236}">
+                <a16:creationId xmlns:a16="http://schemas.microsoft.com/office/drawing/2014/main" id="{D4D56813-9DF8-4D28-B156-1DE48E95DBC2}"/>
+              </a:ext>
+            </a:extLst>
+          </p:cNvPr>
+          <p:cNvSpPr>
+            <a:spLocks noGrp="1"/>
+          </p:cNvSpPr>
+          <p:nvPr>
+            <p:ph idx="1"/>
+          </p:nvPr>
+        </p:nvSpPr>
+        <p:spPr/>
+        <p:txBody>
+          <a:bodyPr/>
+          <a:lstStyle/>
+          <a:p>
+            <a:r>
+              <a:rPr lang="de-DE" dirty="0"/>
+              <a:t>Review paper ML for microbiome paper</a:t>
+            </a:r>
+          </a:p>
+          <a:p>
+            <a:r>
+              <a:rPr lang="de-DE" dirty="0"/>
+              <a:t>COST action paper</a:t>
+            </a:r>
+          </a:p>
+          <a:p>
+            <a:r>
+              <a:rPr lang="de-DE"/>
+              <a:t>Confidentiality form, sign, scan and send to Elin</a:t>
+            </a:r>
+            <a:endParaRPr lang="de-DE" dirty="0"/>
+          </a:p>
+          <a:p>
+            <a:r>
+              <a:rPr lang="de-DE" dirty="0"/>
+              <a:t>Meeting Oliver Friday, 4th February</a:t>
+            </a:r>
+          </a:p>
+          <a:p>
+            <a:r>
+              <a:rPr lang="de-DE" dirty="0"/>
+              <a:t>Literature Review: ~10-20 pages, include Figures and Tables, equations for major transformations, write for biologists</a:t>
+            </a:r>
+          </a:p>
+          <a:p>
+            <a:endParaRPr lang="de-DE" dirty="0"/>
+          </a:p>
+        </p:txBody>
+      </p:sp>
+      <p:sp>
+        <p:nvSpPr>
+          <p:cNvPr id="4" name="Date Placeholder 3">
+            <a:extLst>
+              <a:ext uri="{FF2B5EF4-FFF2-40B4-BE49-F238E27FC236}">
+                <a16:creationId xmlns:a16="http://schemas.microsoft.com/office/drawing/2014/main" id="{D53DB4F4-84EC-4588-88E6-8D8519D6A1E8}"/>
+              </a:ext>
+            </a:extLst>
+          </p:cNvPr>
+          <p:cNvSpPr>
+            <a:spLocks noGrp="1"/>
+          </p:cNvSpPr>
+          <p:nvPr>
+            <p:ph type="dt" sz="half" idx="10"/>
+          </p:nvPr>
+        </p:nvSpPr>
+        <p:spPr/>
+        <p:txBody>
+          <a:bodyPr/>
+          <a:lstStyle/>
+          <a:p>
+            <a:fld id="{5A2DBB50-F561-45B0-9BE5-95A455D2CD8B}" type="datetime1">
+              <a:rPr lang="en-US" smtClean="0"/>
+              <a:t>5/19/2022</a:t>
+            </a:fld>
+            <a:endParaRPr lang="en-US" dirty="0"/>
+          </a:p>
+        </p:txBody>
+      </p:sp>
+      <p:sp>
+        <p:nvSpPr>
+          <p:cNvPr id="5" name="Footer Placeholder 4">
+            <a:extLst>
+              <a:ext uri="{FF2B5EF4-FFF2-40B4-BE49-F238E27FC236}">
+                <a16:creationId xmlns:a16="http://schemas.microsoft.com/office/drawing/2014/main" id="{A7F3346A-3F24-484B-A6D3-55D66520C917}"/>
+              </a:ext>
+            </a:extLst>
+          </p:cNvPr>
+          <p:cNvSpPr>
+            <a:spLocks noGrp="1"/>
+          </p:cNvSpPr>
+          <p:nvPr>
+            <p:ph type="ftr" sz="quarter" idx="11"/>
+          </p:nvPr>
+        </p:nvSpPr>
+        <p:spPr/>
+        <p:txBody>
+          <a:bodyPr/>
+          <a:lstStyle/>
+          <a:p>
+            <a:r>
+              <a:rPr lang="en-US"/>
+              <a:t>jennifer.neumaier@t-online.de</a:t>
+            </a:r>
+            <a:endParaRPr lang="en-US" dirty="0"/>
+          </a:p>
+        </p:txBody>
+      </p:sp>
+      <p:sp>
+        <p:nvSpPr>
+          <p:cNvPr id="6" name="Slide Number Placeholder 5">
+            <a:extLst>
+              <a:ext uri="{FF2B5EF4-FFF2-40B4-BE49-F238E27FC236}">
+                <a16:creationId xmlns:a16="http://schemas.microsoft.com/office/drawing/2014/main" id="{C4B3B4A6-E708-4F88-8CA2-BDE8FCF0C0AC}"/>
+              </a:ext>
+            </a:extLst>
+          </p:cNvPr>
+          <p:cNvSpPr>
+            <a:spLocks noGrp="1"/>
+          </p:cNvSpPr>
+          <p:nvPr>
+            <p:ph type="sldNum" sz="quarter" idx="12"/>
+          </p:nvPr>
+        </p:nvSpPr>
+        <p:spPr/>
+        <p:txBody>
+          <a:bodyPr/>
+          <a:lstStyle/>
+          <a:p>
+            <a:fld id="{D57F1E4F-1CFF-5643-939E-217C01CDF565}" type="slidenum">
+              <a:rPr lang="en-US" smtClean="0"/>
+              <a:pPr/>
+              <a:t>67</a:t>
+            </a:fld>
+            <a:endParaRPr lang="en-US" dirty="0"/>
+          </a:p>
+        </p:txBody>
+      </p:sp>
+    </p:spTree>
+    <p:extLst>
+      <p:ext uri="{BB962C8B-B14F-4D97-AF65-F5344CB8AC3E}">
+        <p14:creationId xmlns:p14="http://schemas.microsoft.com/office/powerpoint/2010/main" val="3993456640"/>
+      </p:ext>
+    </p:extLst>
+  </p:cSld>
+  <p:clrMapOvr>
+    <a:masterClrMapping/>
+  </p:clrMapOvr>
+</p:sld>
+</file>
+
+<file path=ppt/slides/slide68.xml><?xml version="1.0" encoding="utf-8"?>
+<p:sld xmlns:a="http://schemas.openxmlformats.org/drawingml/2006/main" xmlns:r="http://schemas.openxmlformats.org/officeDocument/2006/relationships" xmlns:p="http://schemas.openxmlformats.org/presentationml/2006/main">
+  <p:cSld>
+    <p:spTree>
+      <p:nvGrpSpPr>
+        <p:cNvPr id="1" name=""/>
+        <p:cNvGrpSpPr/>
+        <p:nvPr/>
+      </p:nvGrpSpPr>
+      <p:grpSpPr>
+        <a:xfrm>
+          <a:off x="0" y="0"/>
+          <a:ext cx="0" cy="0"/>
+          <a:chOff x="0" y="0"/>
+          <a:chExt cx="0" cy="0"/>
+        </a:xfrm>
+      </p:grpSpPr>
+      <p:sp>
+        <p:nvSpPr>
+          <p:cNvPr id="2" name="Title 1">
+            <a:extLst>
+              <a:ext uri="{FF2B5EF4-FFF2-40B4-BE49-F238E27FC236}">
+                <a16:creationId xmlns:a16="http://schemas.microsoft.com/office/drawing/2014/main" id="{D63F1953-0627-4313-9F69-D3CE525D057A}"/>
+              </a:ext>
+            </a:extLst>
+          </p:cNvPr>
+          <p:cNvSpPr>
+            <a:spLocks noGrp="1"/>
+          </p:cNvSpPr>
+          <p:nvPr>
+            <p:ph type="title"/>
+          </p:nvPr>
+        </p:nvSpPr>
+        <p:spPr/>
+        <p:txBody>
+          <a:bodyPr/>
+          <a:lstStyle/>
+          <a:p>
+            <a:r>
+              <a:rPr lang="de-DE" b="1" dirty="0"/>
+              <a:t>Notes: 01.04. meeting</a:t>
+            </a:r>
+          </a:p>
+        </p:txBody>
+      </p:sp>
+      <p:sp>
+        <p:nvSpPr>
+          <p:cNvPr id="3" name="Content Placeholder 2">
+            <a:extLst>
+              <a:ext uri="{FF2B5EF4-FFF2-40B4-BE49-F238E27FC236}">
+                <a16:creationId xmlns:a16="http://schemas.microsoft.com/office/drawing/2014/main" id="{10F6F84D-370D-481F-BDA8-9BEF48EC1F3D}"/>
+              </a:ext>
+            </a:extLst>
+          </p:cNvPr>
+          <p:cNvSpPr>
+            <a:spLocks noGrp="1"/>
+          </p:cNvSpPr>
+          <p:nvPr>
+            <p:ph idx="1"/>
+          </p:nvPr>
+        </p:nvSpPr>
+        <p:spPr/>
+        <p:txBody>
+          <a:bodyPr/>
+          <a:lstStyle/>
+          <a:p>
+            <a:r>
+              <a:rPr lang="de-DE" dirty="0"/>
+              <a:t>Pipeline:</a:t>
+            </a:r>
+          </a:p>
+          <a:p>
+            <a:pPr lvl="1"/>
+            <a:r>
+              <a:rPr lang="de-DE" dirty="0"/>
+              <a:t>Test models and codacore on the same training&amp;test split (and set seed)</a:t>
+            </a:r>
+          </a:p>
+          <a:p>
+            <a:pPr lvl="1"/>
+            <a:r>
+              <a:rPr lang="de-DE" dirty="0"/>
+              <a:t>Take out training and test split from run_ml?</a:t>
+            </a:r>
+          </a:p>
+          <a:p>
+            <a:pPr lvl="1"/>
+            <a:r>
+              <a:rPr lang="de-DE" dirty="0"/>
+              <a:t>K_folds and CV_folds don‘t have to be the same for every data set</a:t>
+            </a:r>
+          </a:p>
+          <a:p>
+            <a:pPr lvl="1"/>
+            <a:r>
+              <a:rPr lang="de-DE" dirty="0"/>
+              <a:t>Time comparison?</a:t>
+            </a:r>
+          </a:p>
+          <a:p>
+            <a:r>
+              <a:rPr lang="de-DE" dirty="0"/>
+              <a:t>CRC:</a:t>
+            </a:r>
+          </a:p>
+          <a:p>
+            <a:pPr lvl="1"/>
+            <a:r>
+              <a:rPr lang="de-DE" dirty="0"/>
+              <a:t>Keep one country cohorts for extra validation </a:t>
+            </a:r>
+          </a:p>
+          <a:p>
+            <a:pPr lvl="1"/>
+            <a:r>
+              <a:rPr lang="de-DE" dirty="0"/>
+              <a:t>BMI as outcome_column for continuous</a:t>
+            </a:r>
+          </a:p>
+          <a:p>
+            <a:pPr lvl="1"/>
+            <a:r>
+              <a:rPr lang="de-DE" dirty="0"/>
+              <a:t>GROUP for classification </a:t>
+            </a:r>
+          </a:p>
+          <a:p>
+            <a:pPr marL="457200" lvl="1" indent="0">
+              <a:buNone/>
+            </a:pPr>
+            <a:endParaRPr lang="de-DE" dirty="0"/>
+          </a:p>
+          <a:p>
+            <a:pPr lvl="1"/>
+            <a:endParaRPr lang="de-DE" dirty="0"/>
+          </a:p>
+          <a:p>
+            <a:pPr lvl="1"/>
+            <a:endParaRPr lang="de-DE" dirty="0"/>
+          </a:p>
+          <a:p>
+            <a:pPr lvl="1"/>
+            <a:endParaRPr lang="de-DE" dirty="0"/>
+          </a:p>
+        </p:txBody>
+      </p:sp>
+      <p:sp>
+        <p:nvSpPr>
+          <p:cNvPr id="4" name="Date Placeholder 3">
+            <a:extLst>
+              <a:ext uri="{FF2B5EF4-FFF2-40B4-BE49-F238E27FC236}">
+                <a16:creationId xmlns:a16="http://schemas.microsoft.com/office/drawing/2014/main" id="{DBF0C8DB-9090-4B20-AED9-6E2044F98AC2}"/>
+              </a:ext>
+            </a:extLst>
+          </p:cNvPr>
+          <p:cNvSpPr>
+            <a:spLocks noGrp="1"/>
+          </p:cNvSpPr>
+          <p:nvPr>
+            <p:ph type="dt" sz="half" idx="10"/>
+          </p:nvPr>
+        </p:nvSpPr>
+        <p:spPr/>
+        <p:txBody>
+          <a:bodyPr/>
+          <a:lstStyle/>
+          <a:p>
+            <a:fld id="{36D18B76-5E8B-4456-8722-FC5B14B0F354}" type="datetime1">
+              <a:rPr lang="en-US" smtClean="0"/>
+              <a:pPr/>
+              <a:t>5/19/2022</a:t>
+            </a:fld>
+            <a:endParaRPr lang="en-US" dirty="0"/>
+          </a:p>
+        </p:txBody>
+      </p:sp>
+      <p:sp>
+        <p:nvSpPr>
+          <p:cNvPr id="5" name="Footer Placeholder 4">
+            <a:extLst>
+              <a:ext uri="{FF2B5EF4-FFF2-40B4-BE49-F238E27FC236}">
+                <a16:creationId xmlns:a16="http://schemas.microsoft.com/office/drawing/2014/main" id="{DA6DF03D-2B74-42A5-8C31-B3A7B6D53ABB}"/>
+              </a:ext>
+            </a:extLst>
+          </p:cNvPr>
+          <p:cNvSpPr>
+            <a:spLocks noGrp="1"/>
+          </p:cNvSpPr>
+          <p:nvPr>
+            <p:ph type="ftr" sz="quarter" idx="11"/>
+          </p:nvPr>
+        </p:nvSpPr>
+        <p:spPr/>
+        <p:txBody>
+          <a:bodyPr/>
+          <a:lstStyle/>
+          <a:p>
+            <a:r>
+              <a:rPr lang="en-US"/>
+              <a:t>jennifer.neumaier@t-online.de</a:t>
+            </a:r>
+            <a:endParaRPr lang="en-US" dirty="0"/>
+          </a:p>
+        </p:txBody>
+      </p:sp>
+      <p:sp>
+        <p:nvSpPr>
+          <p:cNvPr id="6" name="Slide Number Placeholder 5">
+            <a:extLst>
+              <a:ext uri="{FF2B5EF4-FFF2-40B4-BE49-F238E27FC236}">
+                <a16:creationId xmlns:a16="http://schemas.microsoft.com/office/drawing/2014/main" id="{EB397826-F4D6-4DDE-B171-FF032CD952B6}"/>
+              </a:ext>
+            </a:extLst>
+          </p:cNvPr>
+          <p:cNvSpPr>
+            <a:spLocks noGrp="1"/>
+          </p:cNvSpPr>
+          <p:nvPr>
+            <p:ph type="sldNum" sz="quarter" idx="12"/>
+          </p:nvPr>
+        </p:nvSpPr>
+        <p:spPr/>
+        <p:txBody>
+          <a:bodyPr/>
+          <a:lstStyle/>
+          <a:p>
+            <a:fld id="{D57F1E4F-1CFF-5643-939E-217C01CDF565}" type="slidenum">
+              <a:rPr lang="en-US" smtClean="0"/>
+              <a:pPr/>
+              <a:t>68</a:t>
+            </a:fld>
+            <a:endParaRPr lang="en-US" dirty="0"/>
+          </a:p>
+        </p:txBody>
+      </p:sp>
+    </p:spTree>
+    <p:extLst>
+      <p:ext uri="{BB962C8B-B14F-4D97-AF65-F5344CB8AC3E}">
+        <p14:creationId xmlns:p14="http://schemas.microsoft.com/office/powerpoint/2010/main" val="1848759324"/>
+      </p:ext>
+    </p:extLst>
+  </p:cSld>
+  <p:clrMapOvr>
+    <a:masterClrMapping/>
+  </p:clrMapOvr>
+</p:sld>
+</file>
+
+<file path=ppt/slides/slide69.xml><?xml version="1.0" encoding="utf-8"?>
+<p:sld xmlns:a="http://schemas.openxmlformats.org/drawingml/2006/main" xmlns:r="http://schemas.openxmlformats.org/officeDocument/2006/relationships" xmlns:p="http://schemas.openxmlformats.org/presentationml/2006/main">
+  <p:cSld>
+    <p:spTree>
+      <p:nvGrpSpPr>
+        <p:cNvPr id="1" name=""/>
+        <p:cNvGrpSpPr/>
+        <p:nvPr/>
+      </p:nvGrpSpPr>
+      <p:grpSpPr>
+        <a:xfrm>
+          <a:off x="0" y="0"/>
+          <a:ext cx="0" cy="0"/>
+          <a:chOff x="0" y="0"/>
+          <a:chExt cx="0" cy="0"/>
+        </a:xfrm>
+      </p:grpSpPr>
+      <p:sp>
+        <p:nvSpPr>
+          <p:cNvPr id="2" name="Title 1">
+            <a:extLst>
+              <a:ext uri="{FF2B5EF4-FFF2-40B4-BE49-F238E27FC236}">
                 <a16:creationId xmlns:a16="http://schemas.microsoft.com/office/drawing/2014/main" id="{B0A21C35-E073-46BF-B8BA-AD632020DA6A}"/>
               </a:ext>
             </a:extLst>
@@ -40843,7 +42021,7 @@
           <a:p>
             <a:fld id="{93673764-947C-4E64-9BD5-474B9E9D9329}" type="datetime1">
               <a:rPr lang="en-US" smtClean="0"/>
-              <a:t>5/13/2022</a:t>
+              <a:t>5/19/2022</a:t>
             </a:fld>
             <a:endParaRPr lang="en-US" dirty="0"/>
           </a:p>
@@ -40902,7 +42080,7 @@
             <a:fld id="{D57F1E4F-1CFF-5643-939E-217C01CDF565}" type="slidenum">
               <a:rPr lang="en-US" smtClean="0"/>
               <a:pPr/>
-              <a:t>67</a:t>
+              <a:t>69</a:t>
             </a:fld>
             <a:endParaRPr lang="en-US" dirty="0"/>
           </a:p>
@@ -40921,7 +42099,190 @@
 </p:sld>
 </file>
 
-<file path=ppt/slides/slide68.xml><?xml version="1.0" encoding="utf-8"?>
+<file path=ppt/slides/slide7.xml><?xml version="1.0" encoding="utf-8"?>
+<p:sld xmlns:a="http://schemas.openxmlformats.org/drawingml/2006/main" xmlns:r="http://schemas.openxmlformats.org/officeDocument/2006/relationships" xmlns:p="http://schemas.openxmlformats.org/presentationml/2006/main">
+  <p:cSld>
+    <p:spTree>
+      <p:nvGrpSpPr>
+        <p:cNvPr id="1" name=""/>
+        <p:cNvGrpSpPr/>
+        <p:nvPr/>
+      </p:nvGrpSpPr>
+      <p:grpSpPr>
+        <a:xfrm>
+          <a:off x="0" y="0"/>
+          <a:ext cx="0" cy="0"/>
+          <a:chOff x="0" y="0"/>
+          <a:chExt cx="0" cy="0"/>
+        </a:xfrm>
+      </p:grpSpPr>
+      <p:sp>
+        <p:nvSpPr>
+          <p:cNvPr id="16" name="Title 15">
+            <a:extLst>
+              <a:ext uri="{FF2B5EF4-FFF2-40B4-BE49-F238E27FC236}">
+                <a16:creationId xmlns:a16="http://schemas.microsoft.com/office/drawing/2014/main" id="{BFD68236-2DF3-4941-ABB4-93B649770EEF}"/>
+              </a:ext>
+            </a:extLst>
+          </p:cNvPr>
+          <p:cNvSpPr>
+            <a:spLocks noGrp="1"/>
+          </p:cNvSpPr>
+          <p:nvPr>
+            <p:ph type="title"/>
+          </p:nvPr>
+        </p:nvSpPr>
+        <p:spPr>
+          <a:xfrm>
+            <a:off x="1640156" y="613274"/>
+            <a:ext cx="8911687" cy="1280890"/>
+          </a:xfrm>
+        </p:spPr>
+        <p:txBody>
+          <a:bodyPr/>
+          <a:lstStyle/>
+          <a:p>
+            <a:r>
+              <a:rPr lang="de-DE" b="1" dirty="0"/>
+              <a:t>Log-Ratio Transformations</a:t>
+            </a:r>
+            <a:endParaRPr lang="en-US" b="1" dirty="0"/>
+          </a:p>
+        </p:txBody>
+      </p:sp>
+      <p:sp>
+        <p:nvSpPr>
+          <p:cNvPr id="8" name="Slide Number Placeholder 7">
+            <a:extLst>
+              <a:ext uri="{FF2B5EF4-FFF2-40B4-BE49-F238E27FC236}">
+                <a16:creationId xmlns:a16="http://schemas.microsoft.com/office/drawing/2014/main" id="{0EDD2C64-4C29-4476-ABF6-96B082C0E166}"/>
+              </a:ext>
+            </a:extLst>
+          </p:cNvPr>
+          <p:cNvSpPr>
+            <a:spLocks noGrp="1"/>
+          </p:cNvSpPr>
+          <p:nvPr>
+            <p:ph type="sldNum" sz="quarter" idx="12"/>
+          </p:nvPr>
+        </p:nvSpPr>
+        <p:spPr/>
+        <p:txBody>
+          <a:bodyPr/>
+          <a:lstStyle/>
+          <a:p>
+            <a:fld id="{D57F1E4F-1CFF-5643-939E-217C01CDF565}" type="slidenum">
+              <a:rPr lang="en-US" smtClean="0"/>
+              <a:pPr/>
+              <a:t>7</a:t>
+            </a:fld>
+            <a:endParaRPr lang="en-US" dirty="0"/>
+          </a:p>
+        </p:txBody>
+      </p:sp>
+      <p:sp>
+        <p:nvSpPr>
+          <p:cNvPr id="17" name="TextBox 16">
+            <a:extLst>
+              <a:ext uri="{FF2B5EF4-FFF2-40B4-BE49-F238E27FC236}">
+                <a16:creationId xmlns:a16="http://schemas.microsoft.com/office/drawing/2014/main" id="{391BB8BD-AFC8-43A6-801D-D06E61729BAE}"/>
+              </a:ext>
+            </a:extLst>
+          </p:cNvPr>
+          <p:cNvSpPr txBox="1"/>
+          <p:nvPr/>
+        </p:nvSpPr>
+        <p:spPr>
+          <a:xfrm>
+            <a:off x="1694844" y="1229380"/>
+            <a:ext cx="1788736" cy="300082"/>
+          </a:xfrm>
+          <a:prstGeom prst="rect">
+            <a:avLst/>
+          </a:prstGeom>
+          <a:noFill/>
+        </p:spPr>
+        <p:txBody>
+          <a:bodyPr wrap="square" rtlCol="0">
+            <a:spAutoFit/>
+          </a:bodyPr>
+          <a:lstStyle/>
+          <a:p>
+            <a:r>
+              <a:rPr lang="de-DE" sz="1350" dirty="0"/>
+              <a:t>Stand: 22.01.22</a:t>
+            </a:r>
+            <a:endParaRPr lang="en-US" sz="1350" dirty="0"/>
+          </a:p>
+        </p:txBody>
+      </p:sp>
+      <p:sp>
+        <p:nvSpPr>
+          <p:cNvPr id="5" name="TextBox 4">
+            <a:extLst>
+              <a:ext uri="{FF2B5EF4-FFF2-40B4-BE49-F238E27FC236}">
+                <a16:creationId xmlns:a16="http://schemas.microsoft.com/office/drawing/2014/main" id="{3433A140-A782-4B43-8154-51F77E0557E9}"/>
+              </a:ext>
+            </a:extLst>
+          </p:cNvPr>
+          <p:cNvSpPr txBox="1"/>
+          <p:nvPr/>
+        </p:nvSpPr>
+        <p:spPr>
+          <a:xfrm>
+            <a:off x="1694844" y="1529462"/>
+            <a:ext cx="4962075" cy="1477328"/>
+          </a:xfrm>
+          <a:prstGeom prst="rect">
+            <a:avLst/>
+          </a:prstGeom>
+          <a:noFill/>
+        </p:spPr>
+        <p:txBody>
+          <a:bodyPr wrap="square" rtlCol="0">
+            <a:spAutoFit/>
+          </a:bodyPr>
+          <a:lstStyle/>
+          <a:p>
+            <a:r>
+              <a:rPr lang="de-DE" dirty="0"/>
+              <a:t>Which ones exist</a:t>
+            </a:r>
+          </a:p>
+          <a:p>
+            <a:r>
+              <a:rPr lang="de-DE" dirty="0"/>
+              <a:t>Characteristics</a:t>
+            </a:r>
+          </a:p>
+          <a:p>
+            <a:r>
+              <a:rPr lang="de-DE" dirty="0"/>
+              <a:t>What are they doing?</a:t>
+            </a:r>
+          </a:p>
+          <a:p>
+            <a:r>
+              <a:rPr lang="de-DE" dirty="0"/>
+              <a:t>Q: do they improve machine learning performances?</a:t>
+            </a:r>
+          </a:p>
+        </p:txBody>
+      </p:sp>
+    </p:spTree>
+    <p:extLst>
+      <p:ext uri="{BB962C8B-B14F-4D97-AF65-F5344CB8AC3E}">
+        <p14:creationId xmlns:p14="http://schemas.microsoft.com/office/powerpoint/2010/main" val="1591942023"/>
+      </p:ext>
+    </p:extLst>
+  </p:cSld>
+  <p:clrMapOvr>
+    <a:masterClrMapping/>
+  </p:clrMapOvr>
+</p:sld>
+</file>
+
+<file path=ppt/slides/slide70.xml><?xml version="1.0" encoding="utf-8"?>
 <p:sld xmlns:a="http://schemas.openxmlformats.org/drawingml/2006/main" xmlns:r="http://schemas.openxmlformats.org/officeDocument/2006/relationships" xmlns:p="http://schemas.openxmlformats.org/presentationml/2006/main">
   <p:cSld>
     <p:spTree>
@@ -41288,7 +42649,7 @@
           <a:p>
             <a:fld id="{524BA6AA-761D-44D9-9696-AC66CE044BF5}" type="datetime1">
               <a:rPr lang="en-US" smtClean="0"/>
-              <a:t>5/13/2022</a:t>
+              <a:t>5/19/2022</a:t>
             </a:fld>
             <a:endParaRPr lang="en-US" dirty="0"/>
           </a:p>
@@ -41346,7 +42707,7 @@
             <a:fld id="{D57F1E4F-1CFF-5643-939E-217C01CDF565}" type="slidenum">
               <a:rPr lang="en-US" smtClean="0"/>
               <a:pPr/>
-              <a:t>68</a:t>
+              <a:t>70</a:t>
             </a:fld>
             <a:endParaRPr lang="en-US" dirty="0"/>
           </a:p>
@@ -41356,189 +42717,6 @@
     <p:extLst>
       <p:ext uri="{BB962C8B-B14F-4D97-AF65-F5344CB8AC3E}">
         <p14:creationId xmlns:p14="http://schemas.microsoft.com/office/powerpoint/2010/main" val="1870852049"/>
-      </p:ext>
-    </p:extLst>
-  </p:cSld>
-  <p:clrMapOvr>
-    <a:masterClrMapping/>
-  </p:clrMapOvr>
-</p:sld>
-</file>
-
-<file path=ppt/slides/slide7.xml><?xml version="1.0" encoding="utf-8"?>
-<p:sld xmlns:a="http://schemas.openxmlformats.org/drawingml/2006/main" xmlns:r="http://schemas.openxmlformats.org/officeDocument/2006/relationships" xmlns:p="http://schemas.openxmlformats.org/presentationml/2006/main">
-  <p:cSld>
-    <p:spTree>
-      <p:nvGrpSpPr>
-        <p:cNvPr id="1" name=""/>
-        <p:cNvGrpSpPr/>
-        <p:nvPr/>
-      </p:nvGrpSpPr>
-      <p:grpSpPr>
-        <a:xfrm>
-          <a:off x="0" y="0"/>
-          <a:ext cx="0" cy="0"/>
-          <a:chOff x="0" y="0"/>
-          <a:chExt cx="0" cy="0"/>
-        </a:xfrm>
-      </p:grpSpPr>
-      <p:sp>
-        <p:nvSpPr>
-          <p:cNvPr id="16" name="Title 15">
-            <a:extLst>
-              <a:ext uri="{FF2B5EF4-FFF2-40B4-BE49-F238E27FC236}">
-                <a16:creationId xmlns:a16="http://schemas.microsoft.com/office/drawing/2014/main" id="{BFD68236-2DF3-4941-ABB4-93B649770EEF}"/>
-              </a:ext>
-            </a:extLst>
-          </p:cNvPr>
-          <p:cNvSpPr>
-            <a:spLocks noGrp="1"/>
-          </p:cNvSpPr>
-          <p:nvPr>
-            <p:ph type="title"/>
-          </p:nvPr>
-        </p:nvSpPr>
-        <p:spPr>
-          <a:xfrm>
-            <a:off x="1640156" y="613274"/>
-            <a:ext cx="8911687" cy="1280890"/>
-          </a:xfrm>
-        </p:spPr>
-        <p:txBody>
-          <a:bodyPr/>
-          <a:lstStyle/>
-          <a:p>
-            <a:r>
-              <a:rPr lang="de-DE" b="1" dirty="0"/>
-              <a:t>Log-Ratio Transformations</a:t>
-            </a:r>
-            <a:endParaRPr lang="en-US" b="1" dirty="0"/>
-          </a:p>
-        </p:txBody>
-      </p:sp>
-      <p:sp>
-        <p:nvSpPr>
-          <p:cNvPr id="8" name="Slide Number Placeholder 7">
-            <a:extLst>
-              <a:ext uri="{FF2B5EF4-FFF2-40B4-BE49-F238E27FC236}">
-                <a16:creationId xmlns:a16="http://schemas.microsoft.com/office/drawing/2014/main" id="{0EDD2C64-4C29-4476-ABF6-96B082C0E166}"/>
-              </a:ext>
-            </a:extLst>
-          </p:cNvPr>
-          <p:cNvSpPr>
-            <a:spLocks noGrp="1"/>
-          </p:cNvSpPr>
-          <p:nvPr>
-            <p:ph type="sldNum" sz="quarter" idx="12"/>
-          </p:nvPr>
-        </p:nvSpPr>
-        <p:spPr/>
-        <p:txBody>
-          <a:bodyPr/>
-          <a:lstStyle/>
-          <a:p>
-            <a:fld id="{D57F1E4F-1CFF-5643-939E-217C01CDF565}" type="slidenum">
-              <a:rPr lang="en-US" smtClean="0"/>
-              <a:pPr/>
-              <a:t>7</a:t>
-            </a:fld>
-            <a:endParaRPr lang="en-US" dirty="0"/>
-          </a:p>
-        </p:txBody>
-      </p:sp>
-      <p:sp>
-        <p:nvSpPr>
-          <p:cNvPr id="17" name="TextBox 16">
-            <a:extLst>
-              <a:ext uri="{FF2B5EF4-FFF2-40B4-BE49-F238E27FC236}">
-                <a16:creationId xmlns:a16="http://schemas.microsoft.com/office/drawing/2014/main" id="{391BB8BD-AFC8-43A6-801D-D06E61729BAE}"/>
-              </a:ext>
-            </a:extLst>
-          </p:cNvPr>
-          <p:cNvSpPr txBox="1"/>
-          <p:nvPr/>
-        </p:nvSpPr>
-        <p:spPr>
-          <a:xfrm>
-            <a:off x="1694844" y="1229380"/>
-            <a:ext cx="1788736" cy="300082"/>
-          </a:xfrm>
-          <a:prstGeom prst="rect">
-            <a:avLst/>
-          </a:prstGeom>
-          <a:noFill/>
-        </p:spPr>
-        <p:txBody>
-          <a:bodyPr wrap="square" rtlCol="0">
-            <a:spAutoFit/>
-          </a:bodyPr>
-          <a:lstStyle/>
-          <a:p>
-            <a:r>
-              <a:rPr lang="de-DE" sz="1350" dirty="0"/>
-              <a:t>Stand: 22.01.22</a:t>
-            </a:r>
-            <a:endParaRPr lang="en-US" sz="1350" dirty="0"/>
-          </a:p>
-        </p:txBody>
-      </p:sp>
-      <p:sp>
-        <p:nvSpPr>
-          <p:cNvPr id="5" name="TextBox 4">
-            <a:extLst>
-              <a:ext uri="{FF2B5EF4-FFF2-40B4-BE49-F238E27FC236}">
-                <a16:creationId xmlns:a16="http://schemas.microsoft.com/office/drawing/2014/main" id="{3433A140-A782-4B43-8154-51F77E0557E9}"/>
-              </a:ext>
-            </a:extLst>
-          </p:cNvPr>
-          <p:cNvSpPr txBox="1"/>
-          <p:nvPr/>
-        </p:nvSpPr>
-        <p:spPr>
-          <a:xfrm>
-            <a:off x="1694844" y="1529462"/>
-            <a:ext cx="4962075" cy="1477328"/>
-          </a:xfrm>
-          <a:prstGeom prst="rect">
-            <a:avLst/>
-          </a:prstGeom>
-          <a:noFill/>
-        </p:spPr>
-        <p:txBody>
-          <a:bodyPr wrap="square" rtlCol="0">
-            <a:spAutoFit/>
-          </a:bodyPr>
-          <a:lstStyle/>
-          <a:p>
-            <a:r>
-              <a:rPr lang="de-DE" dirty="0"/>
-              <a:t>Which ones exist</a:t>
-            </a:r>
-          </a:p>
-          <a:p>
-            <a:r>
-              <a:rPr lang="de-DE" dirty="0"/>
-              <a:t>Characteristics</a:t>
-            </a:r>
-          </a:p>
-          <a:p>
-            <a:r>
-              <a:rPr lang="de-DE" dirty="0"/>
-              <a:t>What are they doing?</a:t>
-            </a:r>
-          </a:p>
-          <a:p>
-            <a:r>
-              <a:rPr lang="de-DE" dirty="0"/>
-              <a:t>Q: do they improve machine learning performances?</a:t>
-            </a:r>
-          </a:p>
-        </p:txBody>
-      </p:sp>
-    </p:spTree>
-    <p:extLst>
-      <p:ext uri="{BB962C8B-B14F-4D97-AF65-F5344CB8AC3E}">
-        <p14:creationId xmlns:p14="http://schemas.microsoft.com/office/powerpoint/2010/main" val="1591942023"/>
       </p:ext>
     </p:extLst>
   </p:cSld>
@@ -41622,7 +42800,7 @@
           <a:p>
             <a:fld id="{A70B3D3E-FC47-4E47-BC37-6E33025EDD36}" type="datetime1">
               <a:rPr lang="en-US" smtClean="0"/>
-              <a:t>5/13/2022</a:t>
+              <a:t>5/19/2022</a:t>
             </a:fld>
             <a:endParaRPr lang="en-US" dirty="0"/>
           </a:p>

</xml_diff>